<commit_message>
collecte en preek uit liturgie overzicht gehaald
</commit_message>
<xml_diff>
--- a/src/main/resources/template.pptx
+++ b/src/main/resources/template.pptx
@@ -235,7 +235,7 @@
               <a:pPr>
                 <a:defRPr/>
               </a:pPr>
-              <a:t>30/12/2014</a:t>
+              <a:t>11/01/2015</a:t>
             </a:fld>
             <a:endParaRPr lang="en-GB"/>
           </a:p>
@@ -319,7 +319,7 @@
     </p:spTree>
     <p:extLst>
       <p:ext uri="{BB962C8B-B14F-4D97-AF65-F5344CB8AC3E}">
-        <p14:creationId xmlns:p14="http://schemas.microsoft.com/office/powerpoint/2010/main" xmlns="" val="2562165451"/>
+        <p14:creationId xmlns:p14="http://schemas.microsoft.com/office/powerpoint/2010/main" val="2562165451"/>
       </p:ext>
     </p:extLst>
   </p:cSld>
@@ -418,7 +418,7 @@
               <a:pPr>
                 <a:defRPr/>
               </a:pPr>
-              <a:t>30-12-2014</a:t>
+              <a:t>11-1-2015</a:t>
             </a:fld>
             <a:endParaRPr lang="nl-NL"/>
           </a:p>
@@ -598,7 +598,7 @@
     </p:spTree>
     <p:extLst>
       <p:ext uri="{BB962C8B-B14F-4D97-AF65-F5344CB8AC3E}">
-        <p14:creationId xmlns:p14="http://schemas.microsoft.com/office/powerpoint/2010/main" xmlns="" val="4277614354"/>
+        <p14:creationId xmlns:p14="http://schemas.microsoft.com/office/powerpoint/2010/main" val="4277614354"/>
       </p:ext>
     </p:extLst>
   </p:cSld>
@@ -1699,7 +1699,7 @@
               <a:pPr>
                 <a:defRPr/>
               </a:pPr>
-              <a:t>30/12/2014</a:t>
+              <a:t>11/01/2015</a:t>
             </a:fld>
             <a:endParaRPr lang="en-GB"/>
           </a:p>
@@ -1930,7 +1930,7 @@
       </p:grpSpPr>
       <p:sp>
         <p:nvSpPr>
-          <p:cNvPr id="5" name="Text Placeholder 4"/>
+          <p:cNvPr id="3" name="Text Placeholder 4"/>
           <p:cNvSpPr>
             <a:spLocks noGrp="1"/>
           </p:cNvSpPr>
@@ -1940,8 +1940,8 @@
         </p:nvSpPr>
         <p:spPr>
           <a:xfrm>
-            <a:off x="0" y="1239715"/>
-            <a:ext cx="9144000" cy="5365271"/>
+            <a:off x="712176" y="1151792"/>
+            <a:ext cx="8431823" cy="5453194"/>
           </a:xfrm>
           <a:prstGeom prst="rect">
             <a:avLst/>
@@ -1966,7 +1966,7 @@
           <a:p>
             <a:pPr lvl="0"/>
             <a:r>
-              <a:rPr lang="en-US" smtClean="0"/>
+              <a:rPr lang="en-US" dirty="0" smtClean="0"/>
               <a:t>Click to edit Master text styles</a:t>
             </a:r>
           </a:p>
@@ -1974,46 +1974,55 @@
       </p:sp>
       <p:sp>
         <p:nvSpPr>
-          <p:cNvPr id="3" name="Text Placeholder 4"/>
-          <p:cNvSpPr>
-            <a:spLocks noGrp="1"/>
-          </p:cNvSpPr>
-          <p:nvPr>
-            <p:ph type="body" sz="quarter" idx="11" hasCustomPrompt="1"/>
-          </p:nvPr>
+          <p:cNvPr id="2" name="Tekstvak 1"/>
+          <p:cNvSpPr txBox="1"/>
+          <p:nvPr userDrawn="1"/>
         </p:nvSpPr>
-        <p:spPr>
+        <p:spPr bwMode="auto">
           <a:xfrm>
-            <a:off x="0" y="0"/>
-            <a:ext cx="6444208" cy="1186962"/>
+            <a:off x="0" y="301253"/>
+            <a:ext cx="3525714" cy="584775"/>
           </a:xfrm>
           <a:prstGeom prst="rect">
             <a:avLst/>
           </a:prstGeom>
+          <a:noFill/>
+          <a:ln w="9525">
+            <a:noFill/>
+            <a:miter lim="800000"/>
+            <a:headEnd/>
+            <a:tailEnd/>
+          </a:ln>
         </p:spPr>
         <p:txBody>
-          <a:bodyPr lIns="180000" tIns="0" bIns="360000" anchor="b" anchorCtr="0"/>
-          <a:lstStyle>
-            <a:lvl1pPr marL="0" indent="0">
-              <a:buNone/>
-              <a:defRPr sz="3000" b="0" baseline="0">
+          <a:bodyPr wrap="square" lIns="720000" rIns="180000" rtlCol="0" anchor="t" anchorCtr="0">
+            <a:spAutoFit/>
+          </a:bodyPr>
+          <a:lstStyle/>
+          <a:p>
+            <a:pPr fontAlgn="auto">
+              <a:spcAft>
+                <a:spcPts val="0"/>
+              </a:spcAft>
+            </a:pPr>
+            <a:r>
+              <a:rPr lang="nl-NL" sz="3200" b="0" u="sng" dirty="0" smtClean="0">
                 <a:solidFill>
-                  <a:schemeClr val="tx1">
-                    <a:lumMod val="95000"/>
-                  </a:schemeClr>
+                  <a:schemeClr val="bg1"/>
                 </a:solidFill>
-                <a:effectLst/>
-                <a:latin typeface="+mj-lt"/>
-              </a:defRPr>
-            </a:lvl1pPr>
-          </a:lstStyle>
-          <a:p>
-            <a:pPr lvl="0"/>
-            <a:r>
-              <a:rPr lang="en-US" dirty="0" err="1" smtClean="0"/>
+                <a:effectLst>
+                  <a:outerShdw blurRad="38100" dist="38100" dir="2700000" algn="tl">
+                    <a:srgbClr val="000000">
+                      <a:alpha val="43137"/>
+                    </a:srgbClr>
+                  </a:outerShdw>
+                </a:effectLst>
+                <a:latin typeface="Tahoma" pitchFamily="34" charset="0"/>
+                <a:ea typeface="+mj-ea"/>
+                <a:cs typeface="Tahoma" pitchFamily="34" charset="0"/>
+              </a:rPr>
               <a:t>Liturgie</a:t>
             </a:r>
-            <a:endParaRPr lang="en-US" dirty="0" smtClean="0"/>
           </a:p>
         </p:txBody>
       </p:sp>
@@ -2115,7 +2124,7 @@
     </p:spTree>
     <p:extLst>
       <p:ext uri="{BB962C8B-B14F-4D97-AF65-F5344CB8AC3E}">
-        <p14:creationId xmlns:p14="http://schemas.microsoft.com/office/powerpoint/2010/main" xmlns="" val="407480130"/>
+        <p14:creationId xmlns:p14="http://schemas.microsoft.com/office/powerpoint/2010/main" val="407480130"/>
       </p:ext>
     </p:extLst>
   </p:cSld>
@@ -4813,7 +4822,7 @@
     </p:spTree>
     <p:extLst>
       <p:ext uri="{BB962C8B-B14F-4D97-AF65-F5344CB8AC3E}">
-        <p14:creationId xmlns:p14="http://schemas.microsoft.com/office/powerpoint/2010/main" xmlns="" val="1735715938"/>
+        <p14:creationId xmlns:p14="http://schemas.microsoft.com/office/powerpoint/2010/main" val="1735715938"/>
       </p:ext>
     </p:extLst>
   </p:cSld>

</xml_diff>

<commit_message>
fixed titles and chapter numbers and whitelines in bible txt's
</commit_message>
<xml_diff>
--- a/src/main/resources/template.pptx
+++ b/src/main/resources/template.pptx
@@ -235,7 +235,7 @@
               <a:pPr>
                 <a:defRPr/>
               </a:pPr>
-              <a:t>11/01/2015</a:t>
+              <a:t>12/02/2015</a:t>
             </a:fld>
             <a:endParaRPr lang="en-GB"/>
           </a:p>
@@ -319,7 +319,7 @@
     </p:spTree>
     <p:extLst>
       <p:ext uri="{BB962C8B-B14F-4D97-AF65-F5344CB8AC3E}">
-        <p14:creationId xmlns:p14="http://schemas.microsoft.com/office/powerpoint/2010/main" val="2562165451"/>
+        <p14:creationId xmlns="" xmlns:p14="http://schemas.microsoft.com/office/powerpoint/2010/main" val="2562165451"/>
       </p:ext>
     </p:extLst>
   </p:cSld>
@@ -418,7 +418,7 @@
               <a:pPr>
                 <a:defRPr/>
               </a:pPr>
-              <a:t>11-1-2015</a:t>
+              <a:t>12-2-2015</a:t>
             </a:fld>
             <a:endParaRPr lang="nl-NL"/>
           </a:p>
@@ -598,7 +598,7 @@
     </p:spTree>
     <p:extLst>
       <p:ext uri="{BB962C8B-B14F-4D97-AF65-F5344CB8AC3E}">
-        <p14:creationId xmlns:p14="http://schemas.microsoft.com/office/powerpoint/2010/main" val="4277614354"/>
+        <p14:creationId xmlns="" xmlns:p14="http://schemas.microsoft.com/office/powerpoint/2010/main" val="4277614354"/>
       </p:ext>
     </p:extLst>
   </p:cSld>
@@ -1699,7 +1699,7 @@
               <a:pPr>
                 <a:defRPr/>
               </a:pPr>
-              <a:t>11/01/2015</a:t>
+              <a:t>12/02/2015</a:t>
             </a:fld>
             <a:endParaRPr lang="en-GB"/>
           </a:p>
@@ -2124,7 +2124,7 @@
     </p:spTree>
     <p:extLst>
       <p:ext uri="{BB962C8B-B14F-4D97-AF65-F5344CB8AC3E}">
-        <p14:creationId xmlns:p14="http://schemas.microsoft.com/office/powerpoint/2010/main" val="407480130"/>
+        <p14:creationId xmlns="" xmlns:p14="http://schemas.microsoft.com/office/powerpoint/2010/main" val="407480130"/>
       </p:ext>
     </p:extLst>
   </p:cSld>
@@ -3286,6 +3286,125 @@
           </a:p>
         </p:txBody>
       </p:sp>
+      <p:sp>
+        <p:nvSpPr>
+          <p:cNvPr id="11" name="Afgeronde rechthoek 10"/>
+          <p:cNvSpPr/>
+          <p:nvPr userDrawn="1"/>
+        </p:nvSpPr>
+        <p:spPr>
+          <a:xfrm>
+            <a:off x="5917224" y="4659923"/>
+            <a:ext cx="2620107" cy="562708"/>
+          </a:xfrm>
+          <a:prstGeom prst="roundRect">
+            <a:avLst/>
+          </a:prstGeom>
+          <a:solidFill>
+            <a:srgbClr val="1E1B1A"/>
+          </a:solidFill>
+          <a:ln>
+            <a:solidFill>
+              <a:srgbClr val="1E1B1A"/>
+            </a:solidFill>
+          </a:ln>
+        </p:spPr>
+        <p:style>
+          <a:lnRef idx="2">
+            <a:schemeClr val="accent1">
+              <a:shade val="50000"/>
+            </a:schemeClr>
+          </a:lnRef>
+          <a:fillRef idx="1">
+            <a:schemeClr val="accent1"/>
+          </a:fillRef>
+          <a:effectRef idx="0">
+            <a:schemeClr val="accent1"/>
+          </a:effectRef>
+          <a:fontRef idx="minor">
+            <a:schemeClr val="lt1"/>
+          </a:fontRef>
+        </p:style>
+        <p:txBody>
+          <a:bodyPr rtlCol="0" anchor="ctr"/>
+          <a:lstStyle/>
+          <a:p>
+            <a:pPr algn="ctr"/>
+            <a:endParaRPr lang="nl-NL" dirty="0">
+              <a:solidFill>
+                <a:srgbClr val="1E1B1A"/>
+              </a:solidFill>
+            </a:endParaRPr>
+          </a:p>
+        </p:txBody>
+      </p:sp>
+      <p:sp>
+        <p:nvSpPr>
+          <p:cNvPr id="12" name="Tekstvak 11"/>
+          <p:cNvSpPr txBox="1"/>
+          <p:nvPr userDrawn="1"/>
+        </p:nvSpPr>
+        <p:spPr bwMode="auto">
+          <a:xfrm>
+            <a:off x="5249007" y="6207368"/>
+            <a:ext cx="4317024" cy="430887"/>
+          </a:xfrm>
+          <a:prstGeom prst="rect">
+            <a:avLst/>
+          </a:prstGeom>
+          <a:noFill/>
+          <a:ln w="9525">
+            <a:noFill/>
+            <a:miter lim="800000"/>
+            <a:headEnd/>
+            <a:tailEnd/>
+          </a:ln>
+        </p:spPr>
+        <p:txBody>
+          <a:bodyPr wrap="square" lIns="720000" rIns="180000" rtlCol="0" anchor="t" anchorCtr="0">
+            <a:spAutoFit/>
+          </a:bodyPr>
+          <a:lstStyle/>
+          <a:p>
+            <a:pPr algn="l" fontAlgn="auto">
+              <a:spcAft>
+                <a:spcPts val="0"/>
+              </a:spcAft>
+            </a:pPr>
+            <a:r>
+              <a:rPr lang="nl-NL" sz="1050" b="1" dirty="0" smtClean="0">
+                <a:solidFill>
+                  <a:schemeClr val="bg1"/>
+                </a:solidFill>
+                <a:effectLst/>
+                <a:latin typeface="Tahoma" pitchFamily="34" charset="0"/>
+                <a:ea typeface="+mj-ea"/>
+                <a:cs typeface="Tahoma" pitchFamily="34" charset="0"/>
+              </a:rPr>
+              <a:t>Bijbel in Gewone taal</a:t>
+            </a:r>
+          </a:p>
+          <a:p>
+            <a:pPr algn="l" fontAlgn="auto">
+              <a:spcAft>
+                <a:spcPts val="0"/>
+              </a:spcAft>
+            </a:pPr>
+            <a:r>
+              <a:rPr lang="nl-NL" sz="1050" b="1" dirty="0" smtClean="0">
+                <a:solidFill>
+                  <a:schemeClr val="bg1"/>
+                </a:solidFill>
+                <a:effectLst/>
+                <a:latin typeface="Tahoma" pitchFamily="34" charset="0"/>
+                <a:ea typeface="+mj-ea"/>
+                <a:cs typeface="Tahoma" pitchFamily="34" charset="0"/>
+              </a:rPr>
+              <a:t>© Nederlands Bijbelgenootschap 2014</a:t>
+            </a:r>
+          </a:p>
+        </p:txBody>
+      </p:sp>
     </p:spTree>
   </p:cSld>
   <p:clrMapOvr>
@@ -3680,6 +3799,125 @@
           </a:ln>
         </p:spPr>
       </p:pic>
+      <p:sp>
+        <p:nvSpPr>
+          <p:cNvPr id="5" name="Tekstvak 4"/>
+          <p:cNvSpPr txBox="1"/>
+          <p:nvPr userDrawn="1"/>
+        </p:nvSpPr>
+        <p:spPr bwMode="auto">
+          <a:xfrm>
+            <a:off x="5249007" y="6207368"/>
+            <a:ext cx="4317024" cy="430887"/>
+          </a:xfrm>
+          <a:prstGeom prst="rect">
+            <a:avLst/>
+          </a:prstGeom>
+          <a:noFill/>
+          <a:ln w="9525">
+            <a:noFill/>
+            <a:miter lim="800000"/>
+            <a:headEnd/>
+            <a:tailEnd/>
+          </a:ln>
+        </p:spPr>
+        <p:txBody>
+          <a:bodyPr wrap="square" lIns="720000" rIns="180000" rtlCol="0" anchor="t" anchorCtr="0">
+            <a:spAutoFit/>
+          </a:bodyPr>
+          <a:lstStyle/>
+          <a:p>
+            <a:pPr algn="l" fontAlgn="auto">
+              <a:spcAft>
+                <a:spcPts val="0"/>
+              </a:spcAft>
+            </a:pPr>
+            <a:r>
+              <a:rPr lang="nl-NL" sz="1050" b="1" dirty="0" smtClean="0">
+                <a:solidFill>
+                  <a:schemeClr val="bg1"/>
+                </a:solidFill>
+                <a:effectLst/>
+                <a:latin typeface="Tahoma" pitchFamily="34" charset="0"/>
+                <a:ea typeface="+mj-ea"/>
+                <a:cs typeface="Tahoma" pitchFamily="34" charset="0"/>
+              </a:rPr>
+              <a:t>Bijbel in Gewone taal</a:t>
+            </a:r>
+          </a:p>
+          <a:p>
+            <a:pPr algn="l" fontAlgn="auto">
+              <a:spcAft>
+                <a:spcPts val="0"/>
+              </a:spcAft>
+            </a:pPr>
+            <a:r>
+              <a:rPr lang="nl-NL" sz="1050" b="1" dirty="0" smtClean="0">
+                <a:solidFill>
+                  <a:schemeClr val="bg1"/>
+                </a:solidFill>
+                <a:effectLst/>
+                <a:latin typeface="Tahoma" pitchFamily="34" charset="0"/>
+                <a:ea typeface="+mj-ea"/>
+                <a:cs typeface="Tahoma" pitchFamily="34" charset="0"/>
+              </a:rPr>
+              <a:t>© Nederlands Bijbelgenootschap 2014</a:t>
+            </a:r>
+          </a:p>
+        </p:txBody>
+      </p:sp>
+      <p:sp>
+        <p:nvSpPr>
+          <p:cNvPr id="6" name="Afgeronde rechthoek 5"/>
+          <p:cNvSpPr/>
+          <p:nvPr userDrawn="1"/>
+        </p:nvSpPr>
+        <p:spPr>
+          <a:xfrm>
+            <a:off x="5917224" y="4659923"/>
+            <a:ext cx="2620107" cy="562708"/>
+          </a:xfrm>
+          <a:prstGeom prst="roundRect">
+            <a:avLst/>
+          </a:prstGeom>
+          <a:solidFill>
+            <a:srgbClr val="1E1B1A"/>
+          </a:solidFill>
+          <a:ln>
+            <a:solidFill>
+              <a:srgbClr val="1E1B1A"/>
+            </a:solidFill>
+          </a:ln>
+        </p:spPr>
+        <p:style>
+          <a:lnRef idx="2">
+            <a:schemeClr val="accent1">
+              <a:shade val="50000"/>
+            </a:schemeClr>
+          </a:lnRef>
+          <a:fillRef idx="1">
+            <a:schemeClr val="accent1"/>
+          </a:fillRef>
+          <a:effectRef idx="0">
+            <a:schemeClr val="accent1"/>
+          </a:effectRef>
+          <a:fontRef idx="minor">
+            <a:schemeClr val="lt1"/>
+          </a:fontRef>
+        </p:style>
+        <p:txBody>
+          <a:bodyPr rtlCol="0" anchor="ctr"/>
+          <a:lstStyle/>
+          <a:p>
+            <a:pPr algn="ctr"/>
+            <a:endParaRPr lang="nl-NL" dirty="0">
+              <a:solidFill>
+                <a:srgbClr val="1E1B1A"/>
+              </a:solidFill>
+            </a:endParaRPr>
+          </a:p>
+        </p:txBody>
+      </p:sp>
     </p:spTree>
   </p:cSld>
   <p:clrMapOvr>
@@ -4822,7 +5060,7 @@
     </p:spTree>
     <p:extLst>
       <p:ext uri="{BB962C8B-B14F-4D97-AF65-F5344CB8AC3E}">
-        <p14:creationId xmlns:p14="http://schemas.microsoft.com/office/powerpoint/2010/main" val="1735715938"/>
+        <p14:creationId xmlns="" xmlns:p14="http://schemas.microsoft.com/office/powerpoint/2010/main" val="1735715938"/>
       </p:ext>
     </p:extLst>
   </p:cSld>

</xml_diff>

<commit_message>
grijze achtergrond bij eindslides vervangen door zwarte achtergrond;versie nummer wordt geprint in console;
</commit_message>
<xml_diff>
--- a/src/main/resources/template.pptx
+++ b/src/main/resources/template.pptx
@@ -235,7 +235,7 @@
               <a:pPr>
                 <a:defRPr/>
               </a:pPr>
-              <a:t>12/02/2015</a:t>
+              <a:t>02/09/2015</a:t>
             </a:fld>
             <a:endParaRPr lang="en-GB"/>
           </a:p>
@@ -319,7 +319,7 @@
     </p:spTree>
     <p:extLst>
       <p:ext uri="{BB962C8B-B14F-4D97-AF65-F5344CB8AC3E}">
-        <p14:creationId xmlns="" xmlns:p14="http://schemas.microsoft.com/office/powerpoint/2010/main" val="2562165451"/>
+        <p14:creationId xmlns:p14="http://schemas.microsoft.com/office/powerpoint/2010/main" val="2562165451"/>
       </p:ext>
     </p:extLst>
   </p:cSld>
@@ -418,7 +418,7 @@
               <a:pPr>
                 <a:defRPr/>
               </a:pPr>
-              <a:t>12-2-2015</a:t>
+              <a:t>2-9-2015</a:t>
             </a:fld>
             <a:endParaRPr lang="nl-NL"/>
           </a:p>
@@ -598,7 +598,7 @@
     </p:spTree>
     <p:extLst>
       <p:ext uri="{BB962C8B-B14F-4D97-AF65-F5344CB8AC3E}">
-        <p14:creationId xmlns="" xmlns:p14="http://schemas.microsoft.com/office/powerpoint/2010/main" val="4277614354"/>
+        <p14:creationId xmlns:p14="http://schemas.microsoft.com/office/powerpoint/2010/main" val="4277614354"/>
       </p:ext>
     </p:extLst>
   </p:cSld>
@@ -1699,7 +1699,7 @@
               <a:pPr>
                 <a:defRPr/>
               </a:pPr>
-              <a:t>12/02/2015</a:t>
+              <a:t>02/09/2015</a:t>
             </a:fld>
             <a:endParaRPr lang="en-GB"/>
           </a:p>
@@ -2124,7 +2124,7 @@
     </p:spTree>
     <p:extLst>
       <p:ext uri="{BB962C8B-B14F-4D97-AF65-F5344CB8AC3E}">
-        <p14:creationId xmlns="" xmlns:p14="http://schemas.microsoft.com/office/powerpoint/2010/main" val="407480130"/>
+        <p14:creationId xmlns:p14="http://schemas.microsoft.com/office/powerpoint/2010/main" val="407480130"/>
       </p:ext>
     </p:extLst>
   </p:cSld>
@@ -2830,32 +2830,6 @@
           <a:chExt cx="0" cy="0"/>
         </a:xfrm>
       </p:grpSpPr>
-      <p:pic>
-        <p:nvPicPr>
-          <p:cNvPr id="8" name="Tijdelijke aanduiding voor inhoud 3" descr="Einde.jpg"/>
-          <p:cNvPicPr>
-            <a:picLocks noChangeAspect="1"/>
-          </p:cNvPicPr>
-          <p:nvPr/>
-        </p:nvPicPr>
-        <p:blipFill rotWithShape="1">
-          <a:blip r:embed="rId2" cstate="print"/>
-          <a:srcRect l="62817"/>
-          <a:stretch/>
-        </p:blipFill>
-        <p:spPr>
-          <a:xfrm>
-            <a:off x="5753100" y="16032"/>
-            <a:ext cx="3405459" cy="6841968"/>
-          </a:xfrm>
-          <a:prstGeom prst="rect">
-            <a:avLst/>
-          </a:prstGeom>
-          <a:effectLst>
-            <a:softEdge rad="112500"/>
-          </a:effectLst>
-        </p:spPr>
-      </p:pic>
       <p:sp>
         <p:nvSpPr>
           <p:cNvPr id="9" name="Rectangle 8"/>
@@ -3104,38 +3078,6 @@
           </a:p>
         </p:txBody>
       </p:sp>
-      <p:pic>
-        <p:nvPicPr>
-          <p:cNvPr id="10" name="Picture 2"/>
-          <p:cNvPicPr>
-            <a:picLocks noChangeAspect="1" noChangeArrowheads="1"/>
-          </p:cNvPicPr>
-          <p:nvPr/>
-        </p:nvPicPr>
-        <p:blipFill>
-          <a:blip r:embed="rId3" cstate="print"/>
-          <a:srcRect/>
-          <a:stretch>
-            <a:fillRect/>
-          </a:stretch>
-        </p:blipFill>
-        <p:spPr bwMode="auto">
-          <a:xfrm>
-            <a:off x="5940425" y="4232275"/>
-            <a:ext cx="2771775" cy="314325"/>
-          </a:xfrm>
-          <a:prstGeom prst="rect">
-            <a:avLst/>
-          </a:prstGeom>
-          <a:noFill/>
-          <a:ln w="9525">
-            <a:noFill/>
-            <a:miter lim="800000"/>
-            <a:headEnd/>
-            <a:tailEnd/>
-          </a:ln>
-        </p:spPr>
-      </p:pic>
       <p:sp>
         <p:nvSpPr>
           <p:cNvPr id="5" name="Text Placeholder 4"/>
@@ -3288,25 +3230,23 @@
       </p:sp>
       <p:sp>
         <p:nvSpPr>
-          <p:cNvPr id="11" name="Afgeronde rechthoek 10"/>
+          <p:cNvPr id="15" name="Afgeronde rechthoek 14"/>
           <p:cNvSpPr/>
           <p:nvPr userDrawn="1"/>
         </p:nvSpPr>
         <p:spPr>
           <a:xfrm>
-            <a:off x="5917224" y="4659923"/>
-            <a:ext cx="2620107" cy="562708"/>
+            <a:off x="6158754" y="1581912"/>
+            <a:ext cx="2985246" cy="5260056"/>
           </a:xfrm>
           <a:prstGeom prst="roundRect">
-            <a:avLst/>
+            <a:avLst>
+              <a:gd name="adj" fmla="val 0"/>
+            </a:avLst>
           </a:prstGeom>
-          <a:solidFill>
-            <a:srgbClr val="1E1B1A"/>
-          </a:solidFill>
+          <a:noFill/>
           <a:ln>
-            <a:solidFill>
-              <a:srgbClr val="1E1B1A"/>
-            </a:solidFill>
+            <a:noFill/>
           </a:ln>
         </p:spPr>
         <p:style>
@@ -3329,42 +3269,173 @@
           <a:bodyPr rtlCol="0" anchor="ctr"/>
           <a:lstStyle/>
           <a:p>
-            <a:pPr algn="ctr"/>
-            <a:endParaRPr lang="nl-NL" dirty="0">
+            <a:pPr algn="l"/>
+            <a:r>
+              <a:rPr lang="nl-NL" sz="1600" b="1" dirty="0" smtClean="0">
+                <a:solidFill>
+                  <a:schemeClr val="bg1"/>
+                </a:solidFill>
+                <a:latin typeface="+mj-lt"/>
+              </a:rPr>
+              <a:t>Website</a:t>
+            </a:r>
+          </a:p>
+          <a:p>
+            <a:pPr algn="l"/>
+            <a:r>
+              <a:rPr lang="nl-NL" sz="1600" b="0" dirty="0" smtClean="0">
+                <a:solidFill>
+                  <a:schemeClr val="bg1"/>
+                </a:solidFill>
+                <a:latin typeface="+mj-lt"/>
+                <a:ea typeface="Tahoma" panose="020B0604030504040204" pitchFamily="34" charset="0"/>
+                <a:cs typeface="Arial" panose="020B0604020202020204" pitchFamily="34" charset="0"/>
+              </a:rPr>
+              <a:t>www.gkvassenpeelo.nl</a:t>
+            </a:r>
+          </a:p>
+          <a:p>
+            <a:pPr algn="l"/>
+            <a:endParaRPr lang="nl-NL" sz="1600" b="0" dirty="0" smtClean="0">
               <a:solidFill>
-                <a:srgbClr val="1E1B1A"/>
+                <a:schemeClr val="bg1"/>
               </a:solidFill>
+              <a:latin typeface="+mj-lt"/>
+              <a:ea typeface="Tahoma" panose="020B0604030504040204" pitchFamily="34" charset="0"/>
+              <a:cs typeface="Arial" panose="020B0604020202020204" pitchFamily="34" charset="0"/>
             </a:endParaRPr>
           </a:p>
-        </p:txBody>
-      </p:sp>
-      <p:sp>
-        <p:nvSpPr>
-          <p:cNvPr id="12" name="Tekstvak 11"/>
-          <p:cNvSpPr txBox="1"/>
-          <p:nvPr userDrawn="1"/>
-        </p:nvSpPr>
-        <p:spPr bwMode="auto">
-          <a:xfrm>
-            <a:off x="5249007" y="6207368"/>
-            <a:ext cx="4317024" cy="430887"/>
-          </a:xfrm>
-          <a:prstGeom prst="rect">
-            <a:avLst/>
-          </a:prstGeom>
-          <a:noFill/>
-          <a:ln w="9525">
-            <a:noFill/>
-            <a:miter lim="800000"/>
-            <a:headEnd/>
-            <a:tailEnd/>
-          </a:ln>
-        </p:spPr>
-        <p:txBody>
-          <a:bodyPr wrap="square" lIns="720000" rIns="180000" rtlCol="0" anchor="t" anchorCtr="0">
-            <a:spAutoFit/>
-          </a:bodyPr>
-          <a:lstStyle/>
+          <a:p>
+            <a:pPr algn="l"/>
+            <a:r>
+              <a:rPr lang="nl-NL" sz="1600" b="1" dirty="0" smtClean="0">
+                <a:solidFill>
+                  <a:schemeClr val="bg1"/>
+                </a:solidFill>
+                <a:latin typeface="+mj-lt"/>
+                <a:ea typeface="Tahoma" panose="020B0604030504040204" pitchFamily="34" charset="0"/>
+                <a:cs typeface="Arial" panose="020B0604020202020204" pitchFamily="34" charset="0"/>
+              </a:rPr>
+              <a:t>Beamteam</a:t>
+            </a:r>
+          </a:p>
+          <a:p>
+            <a:pPr algn="l"/>
+            <a:r>
+              <a:rPr lang="nl-NL" sz="1600" b="0" dirty="0" smtClean="0">
+                <a:solidFill>
+                  <a:schemeClr val="bg1"/>
+                </a:solidFill>
+                <a:latin typeface="+mj-lt"/>
+                <a:ea typeface="Tahoma" panose="020B0604030504040204" pitchFamily="34" charset="0"/>
+                <a:cs typeface="Arial" panose="020B0604020202020204" pitchFamily="34" charset="0"/>
+              </a:rPr>
+              <a:t>beamteam@gkvassenpeelo.nl</a:t>
+            </a:r>
+          </a:p>
+          <a:p>
+            <a:pPr algn="l"/>
+            <a:endParaRPr lang="nl-NL" sz="1600" b="0" dirty="0" smtClean="0">
+              <a:solidFill>
+                <a:schemeClr val="bg1"/>
+              </a:solidFill>
+              <a:latin typeface="+mj-lt"/>
+              <a:ea typeface="Tahoma" panose="020B0604030504040204" pitchFamily="34" charset="0"/>
+              <a:cs typeface="Arial" panose="020B0604020202020204" pitchFamily="34" charset="0"/>
+            </a:endParaRPr>
+          </a:p>
+          <a:p>
+            <a:pPr algn="l"/>
+            <a:r>
+              <a:rPr lang="nl-NL" sz="1600" b="1" dirty="0" smtClean="0">
+                <a:solidFill>
+                  <a:schemeClr val="bg1"/>
+                </a:solidFill>
+                <a:latin typeface="+mj-lt"/>
+                <a:ea typeface="Tahoma" panose="020B0604030504040204" pitchFamily="34" charset="0"/>
+                <a:cs typeface="Arial" panose="020B0604020202020204" pitchFamily="34" charset="0"/>
+              </a:rPr>
+              <a:t>Kerkbode De Bouwsteen</a:t>
+            </a:r>
+          </a:p>
+          <a:p>
+            <a:pPr algn="l"/>
+            <a:r>
+              <a:rPr lang="nl-NL" sz="1600" b="0" dirty="0" smtClean="0">
+                <a:solidFill>
+                  <a:schemeClr val="bg1"/>
+                </a:solidFill>
+                <a:latin typeface="+mj-lt"/>
+                <a:ea typeface="Tahoma" panose="020B0604030504040204" pitchFamily="34" charset="0"/>
+                <a:cs typeface="Arial" panose="020B0604020202020204" pitchFamily="34" charset="0"/>
+              </a:rPr>
+              <a:t>bouwsteen@gkvassenpeelo.nl</a:t>
+            </a:r>
+          </a:p>
+          <a:p>
+            <a:pPr algn="l"/>
+            <a:endParaRPr lang="nl-NL" sz="1600" b="0" dirty="0" smtClean="0">
+              <a:solidFill>
+                <a:schemeClr val="bg1"/>
+              </a:solidFill>
+              <a:latin typeface="+mj-lt"/>
+              <a:ea typeface="Tahoma" panose="020B0604030504040204" pitchFamily="34" charset="0"/>
+              <a:cs typeface="Arial" panose="020B0604020202020204" pitchFamily="34" charset="0"/>
+            </a:endParaRPr>
+          </a:p>
+          <a:p>
+            <a:pPr algn="l"/>
+            <a:r>
+              <a:rPr lang="nl-NL" sz="1600" b="1" dirty="0" smtClean="0">
+                <a:solidFill>
+                  <a:schemeClr val="bg1"/>
+                </a:solidFill>
+                <a:latin typeface="+mj-lt"/>
+                <a:ea typeface="Tahoma" panose="020B0604030504040204" pitchFamily="34" charset="0"/>
+                <a:cs typeface="Arial" panose="020B0604020202020204" pitchFamily="34" charset="0"/>
+              </a:rPr>
+              <a:t>Nabestelling opname DVD</a:t>
+            </a:r>
+          </a:p>
+          <a:p>
+            <a:pPr algn="l"/>
+            <a:r>
+              <a:rPr lang="nl-NL" sz="1600" b="0" dirty="0" smtClean="0">
+                <a:solidFill>
+                  <a:schemeClr val="bg1"/>
+                </a:solidFill>
+                <a:latin typeface="+mj-lt"/>
+                <a:ea typeface="Tahoma" panose="020B0604030504040204" pitchFamily="34" charset="0"/>
+                <a:cs typeface="Arial" panose="020B0604020202020204" pitchFamily="34" charset="0"/>
+              </a:rPr>
+              <a:t>j.s.smith@home.nl</a:t>
+            </a:r>
+          </a:p>
+          <a:p>
+            <a:pPr algn="l"/>
+            <a:endParaRPr lang="nl-NL" sz="1600" b="0" dirty="0" smtClean="0">
+              <a:solidFill>
+                <a:schemeClr val="bg1"/>
+              </a:solidFill>
+              <a:latin typeface="+mj-lt"/>
+              <a:ea typeface="Tahoma" panose="020B0604030504040204" pitchFamily="34" charset="0"/>
+              <a:cs typeface="Arial" panose="020B0604020202020204" pitchFamily="34" charset="0"/>
+            </a:endParaRPr>
+          </a:p>
+          <a:p>
+            <a:pPr algn="l"/>
+            <a:r>
+              <a:rPr lang="nl-NL" sz="1600" b="1" dirty="0" smtClean="0">
+                <a:solidFill>
+                  <a:schemeClr val="bg1"/>
+                </a:solidFill>
+                <a:latin typeface="+mj-lt"/>
+                <a:ea typeface="Tahoma" panose="020B0604030504040204" pitchFamily="34" charset="0"/>
+                <a:cs typeface="Arial" panose="020B0604020202020204" pitchFamily="34" charset="0"/>
+              </a:rPr>
+              <a:t>Bijbelteksten</a:t>
+            </a:r>
+          </a:p>
           <a:p>
             <a:pPr algn="l" fontAlgn="auto">
               <a:spcAft>
@@ -3372,13 +3443,51 @@
               </a:spcAft>
             </a:pPr>
             <a:r>
-              <a:rPr lang="nl-NL" sz="1050" b="1" dirty="0" smtClean="0">
+              <a:rPr lang="nl-NL" sz="1200" b="0" kern="1200" dirty="0" smtClean="0">
                 <a:solidFill>
                   <a:schemeClr val="bg1"/>
                 </a:solidFill>
                 <a:effectLst/>
-                <a:latin typeface="Tahoma" pitchFamily="34" charset="0"/>
-                <a:ea typeface="+mj-ea"/>
+                <a:latin typeface="+mj-lt"/>
+                <a:ea typeface="+mn-ea"/>
+                <a:cs typeface="Tahoma" pitchFamily="34" charset="0"/>
+              </a:rPr>
+              <a:t>De Nieuwe Bijbelvertaling</a:t>
+            </a:r>
+          </a:p>
+          <a:p>
+            <a:pPr algn="l" fontAlgn="auto">
+              <a:spcAft>
+                <a:spcPts val="0"/>
+              </a:spcAft>
+            </a:pPr>
+            <a:r>
+              <a:rPr lang="nl-NL" sz="1200" b="0" kern="1200" dirty="0" smtClean="0">
+                <a:solidFill>
+                  <a:schemeClr val="bg1"/>
+                </a:solidFill>
+                <a:effectLst/>
+                <a:latin typeface="+mj-lt"/>
+                <a:ea typeface="+mn-ea"/>
+                <a:cs typeface="Tahoma" pitchFamily="34" charset="0"/>
+              </a:rPr>
+              <a:t>© Nederlands Bijbelgenootschap 2004</a:t>
+            </a:r>
+          </a:p>
+          <a:p>
+            <a:pPr algn="l" fontAlgn="auto">
+              <a:spcAft>
+                <a:spcPts val="0"/>
+              </a:spcAft>
+            </a:pPr>
+            <a:r>
+              <a:rPr lang="nl-NL" sz="1200" b="0" kern="1200" dirty="0" smtClean="0">
+                <a:solidFill>
+                  <a:schemeClr val="bg1"/>
+                </a:solidFill>
+                <a:effectLst/>
+                <a:latin typeface="+mj-lt"/>
+                <a:ea typeface="+mn-ea"/>
                 <a:cs typeface="Tahoma" pitchFamily="34" charset="0"/>
               </a:rPr>
               <a:t>Bijbel in Gewone taal</a:t>
@@ -3391,17 +3500,28 @@
               </a:spcAft>
             </a:pPr>
             <a:r>
-              <a:rPr lang="nl-NL" sz="1050" b="1" dirty="0" smtClean="0">
+              <a:rPr lang="nl-NL" sz="1200" b="0" kern="1200" dirty="0" smtClean="0">
                 <a:solidFill>
                   <a:schemeClr val="bg1"/>
                 </a:solidFill>
                 <a:effectLst/>
-                <a:latin typeface="Tahoma" pitchFamily="34" charset="0"/>
-                <a:ea typeface="+mj-ea"/>
+                <a:latin typeface="+mj-lt"/>
+                <a:ea typeface="+mn-ea"/>
                 <a:cs typeface="Tahoma" pitchFamily="34" charset="0"/>
               </a:rPr>
               <a:t>© Nederlands Bijbelgenootschap 2014</a:t>
             </a:r>
+          </a:p>
+          <a:p>
+            <a:pPr algn="l"/>
+            <a:endParaRPr lang="nl-NL" sz="1600" b="0" dirty="0">
+              <a:solidFill>
+                <a:schemeClr val="bg1"/>
+              </a:solidFill>
+              <a:latin typeface="+mj-lt"/>
+              <a:ea typeface="Tahoma" panose="020B0604030504040204" pitchFamily="34" charset="0"/>
+              <a:cs typeface="Arial" panose="020B0604020202020204" pitchFamily="34" charset="0"/>
+            </a:endParaRPr>
           </a:p>
         </p:txBody>
       </p:sp>
@@ -3433,32 +3553,6 @@
           <a:chExt cx="0" cy="0"/>
         </a:xfrm>
       </p:grpSpPr>
-      <p:pic>
-        <p:nvPicPr>
-          <p:cNvPr id="2" name="Tijdelijke aanduiding voor inhoud 3" descr="Einde.jpg"/>
-          <p:cNvPicPr>
-            <a:picLocks noChangeAspect="1"/>
-          </p:cNvPicPr>
-          <p:nvPr/>
-        </p:nvPicPr>
-        <p:blipFill rotWithShape="1">
-          <a:blip r:embed="rId2" cstate="print"/>
-          <a:srcRect l="62955"/>
-          <a:stretch/>
-        </p:blipFill>
-        <p:spPr>
-          <a:xfrm>
-            <a:off x="5765800" y="16032"/>
-            <a:ext cx="3392759" cy="6841968"/>
-          </a:xfrm>
-          <a:prstGeom prst="rect">
-            <a:avLst/>
-          </a:prstGeom>
-          <a:effectLst>
-            <a:softEdge rad="112500"/>
-          </a:effectLst>
-        </p:spPr>
-      </p:pic>
       <p:sp>
         <p:nvSpPr>
           <p:cNvPr id="3" name="Rectangle 2"/>
@@ -3767,126 +3861,25 @@
           </a:p>
         </p:txBody>
       </p:sp>
-      <p:pic>
-        <p:nvPicPr>
-          <p:cNvPr id="4" name="Picture 2"/>
-          <p:cNvPicPr>
-            <a:picLocks noChangeAspect="1" noChangeArrowheads="1"/>
-          </p:cNvPicPr>
-          <p:nvPr/>
-        </p:nvPicPr>
-        <p:blipFill>
-          <a:blip r:embed="rId3" cstate="print"/>
-          <a:srcRect/>
-          <a:stretch>
-            <a:fillRect/>
-          </a:stretch>
-        </p:blipFill>
-        <p:spPr bwMode="auto">
-          <a:xfrm>
-            <a:off x="5940425" y="4232275"/>
-            <a:ext cx="2771775" cy="314325"/>
-          </a:xfrm>
-          <a:prstGeom prst="rect">
-            <a:avLst/>
-          </a:prstGeom>
-          <a:noFill/>
-          <a:ln w="9525">
-            <a:noFill/>
-            <a:miter lim="800000"/>
-            <a:headEnd/>
-            <a:tailEnd/>
-          </a:ln>
-        </p:spPr>
-      </p:pic>
       <p:sp>
         <p:nvSpPr>
-          <p:cNvPr id="5" name="Tekstvak 4"/>
-          <p:cNvSpPr txBox="1"/>
-          <p:nvPr userDrawn="1"/>
-        </p:nvSpPr>
-        <p:spPr bwMode="auto">
-          <a:xfrm>
-            <a:off x="5249007" y="6207368"/>
-            <a:ext cx="4317024" cy="430887"/>
-          </a:xfrm>
-          <a:prstGeom prst="rect">
-            <a:avLst/>
-          </a:prstGeom>
-          <a:noFill/>
-          <a:ln w="9525">
-            <a:noFill/>
-            <a:miter lim="800000"/>
-            <a:headEnd/>
-            <a:tailEnd/>
-          </a:ln>
-        </p:spPr>
-        <p:txBody>
-          <a:bodyPr wrap="square" lIns="720000" rIns="180000" rtlCol="0" anchor="t" anchorCtr="0">
-            <a:spAutoFit/>
-          </a:bodyPr>
-          <a:lstStyle/>
-          <a:p>
-            <a:pPr algn="l" fontAlgn="auto">
-              <a:spcAft>
-                <a:spcPts val="0"/>
-              </a:spcAft>
-            </a:pPr>
-            <a:r>
-              <a:rPr lang="nl-NL" sz="1050" b="1" dirty="0" smtClean="0">
-                <a:solidFill>
-                  <a:schemeClr val="bg1"/>
-                </a:solidFill>
-                <a:effectLst/>
-                <a:latin typeface="Tahoma" pitchFamily="34" charset="0"/>
-                <a:ea typeface="+mj-ea"/>
-                <a:cs typeface="Tahoma" pitchFamily="34" charset="0"/>
-              </a:rPr>
-              <a:t>Bijbel in Gewone taal</a:t>
-            </a:r>
-          </a:p>
-          <a:p>
-            <a:pPr algn="l" fontAlgn="auto">
-              <a:spcAft>
-                <a:spcPts val="0"/>
-              </a:spcAft>
-            </a:pPr>
-            <a:r>
-              <a:rPr lang="nl-NL" sz="1050" b="1" dirty="0" smtClean="0">
-                <a:solidFill>
-                  <a:schemeClr val="bg1"/>
-                </a:solidFill>
-                <a:effectLst/>
-                <a:latin typeface="Tahoma" pitchFamily="34" charset="0"/>
-                <a:ea typeface="+mj-ea"/>
-                <a:cs typeface="Tahoma" pitchFamily="34" charset="0"/>
-              </a:rPr>
-              <a:t>© Nederlands Bijbelgenootschap 2014</a:t>
-            </a:r>
-          </a:p>
-        </p:txBody>
-      </p:sp>
-      <p:sp>
-        <p:nvSpPr>
-          <p:cNvPr id="6" name="Afgeronde rechthoek 5"/>
+          <p:cNvPr id="10" name="Afgeronde rechthoek 9"/>
           <p:cNvSpPr/>
           <p:nvPr userDrawn="1"/>
         </p:nvSpPr>
         <p:spPr>
           <a:xfrm>
-            <a:off x="5917224" y="4659923"/>
-            <a:ext cx="2620107" cy="562708"/>
+            <a:off x="6158754" y="1581912"/>
+            <a:ext cx="2985246" cy="5260056"/>
           </a:xfrm>
           <a:prstGeom prst="roundRect">
-            <a:avLst/>
+            <a:avLst>
+              <a:gd name="adj" fmla="val 0"/>
+            </a:avLst>
           </a:prstGeom>
-          <a:solidFill>
-            <a:srgbClr val="1E1B1A"/>
-          </a:solidFill>
+          <a:noFill/>
           <a:ln>
-            <a:solidFill>
-              <a:srgbClr val="1E1B1A"/>
-            </a:solidFill>
+            <a:noFill/>
           </a:ln>
         </p:spPr>
         <p:style>
@@ -3909,11 +3902,258 @@
           <a:bodyPr rtlCol="0" anchor="ctr"/>
           <a:lstStyle/>
           <a:p>
-            <a:pPr algn="ctr"/>
-            <a:endParaRPr lang="nl-NL" dirty="0">
+            <a:pPr algn="l"/>
+            <a:r>
+              <a:rPr lang="nl-NL" sz="1600" b="1" dirty="0" smtClean="0">
+                <a:solidFill>
+                  <a:schemeClr val="bg1"/>
+                </a:solidFill>
+                <a:latin typeface="+mj-lt"/>
+              </a:rPr>
+              <a:t>Website</a:t>
+            </a:r>
+          </a:p>
+          <a:p>
+            <a:pPr algn="l"/>
+            <a:r>
+              <a:rPr lang="nl-NL" sz="1600" b="0" dirty="0" smtClean="0">
+                <a:solidFill>
+                  <a:schemeClr val="bg1"/>
+                </a:solidFill>
+                <a:latin typeface="+mj-lt"/>
+                <a:ea typeface="Tahoma" panose="020B0604030504040204" pitchFamily="34" charset="0"/>
+                <a:cs typeface="Arial" panose="020B0604020202020204" pitchFamily="34" charset="0"/>
+              </a:rPr>
+              <a:t>www.gkvassenpeelo.nl</a:t>
+            </a:r>
+          </a:p>
+          <a:p>
+            <a:pPr algn="l"/>
+            <a:endParaRPr lang="nl-NL" sz="1600" b="0" dirty="0" smtClean="0">
               <a:solidFill>
-                <a:srgbClr val="1E1B1A"/>
+                <a:schemeClr val="bg1"/>
               </a:solidFill>
+              <a:latin typeface="+mj-lt"/>
+              <a:ea typeface="Tahoma" panose="020B0604030504040204" pitchFamily="34" charset="0"/>
+              <a:cs typeface="Arial" panose="020B0604020202020204" pitchFamily="34" charset="0"/>
+            </a:endParaRPr>
+          </a:p>
+          <a:p>
+            <a:pPr algn="l"/>
+            <a:r>
+              <a:rPr lang="nl-NL" sz="1600" b="1" dirty="0" smtClean="0">
+                <a:solidFill>
+                  <a:schemeClr val="bg1"/>
+                </a:solidFill>
+                <a:latin typeface="+mj-lt"/>
+                <a:ea typeface="Tahoma" panose="020B0604030504040204" pitchFamily="34" charset="0"/>
+                <a:cs typeface="Arial" panose="020B0604020202020204" pitchFamily="34" charset="0"/>
+              </a:rPr>
+              <a:t>Beamteam</a:t>
+            </a:r>
+          </a:p>
+          <a:p>
+            <a:pPr algn="l"/>
+            <a:r>
+              <a:rPr lang="nl-NL" sz="1600" b="0" dirty="0" smtClean="0">
+                <a:solidFill>
+                  <a:schemeClr val="bg1"/>
+                </a:solidFill>
+                <a:latin typeface="+mj-lt"/>
+                <a:ea typeface="Tahoma" panose="020B0604030504040204" pitchFamily="34" charset="0"/>
+                <a:cs typeface="Arial" panose="020B0604020202020204" pitchFamily="34" charset="0"/>
+              </a:rPr>
+              <a:t>beamteam@gkvassenpeelo.nl</a:t>
+            </a:r>
+          </a:p>
+          <a:p>
+            <a:pPr algn="l"/>
+            <a:endParaRPr lang="nl-NL" sz="1600" b="0" dirty="0" smtClean="0">
+              <a:solidFill>
+                <a:schemeClr val="bg1"/>
+              </a:solidFill>
+              <a:latin typeface="+mj-lt"/>
+              <a:ea typeface="Tahoma" panose="020B0604030504040204" pitchFamily="34" charset="0"/>
+              <a:cs typeface="Arial" panose="020B0604020202020204" pitchFamily="34" charset="0"/>
+            </a:endParaRPr>
+          </a:p>
+          <a:p>
+            <a:pPr algn="l"/>
+            <a:r>
+              <a:rPr lang="nl-NL" sz="1600" b="1" dirty="0" smtClean="0">
+                <a:solidFill>
+                  <a:schemeClr val="bg1"/>
+                </a:solidFill>
+                <a:latin typeface="+mj-lt"/>
+                <a:ea typeface="Tahoma" panose="020B0604030504040204" pitchFamily="34" charset="0"/>
+                <a:cs typeface="Arial" panose="020B0604020202020204" pitchFamily="34" charset="0"/>
+              </a:rPr>
+              <a:t>Kerkbode De Bouwsteen</a:t>
+            </a:r>
+          </a:p>
+          <a:p>
+            <a:pPr algn="l"/>
+            <a:r>
+              <a:rPr lang="nl-NL" sz="1600" b="0" dirty="0" smtClean="0">
+                <a:solidFill>
+                  <a:schemeClr val="bg1"/>
+                </a:solidFill>
+                <a:latin typeface="+mj-lt"/>
+                <a:ea typeface="Tahoma" panose="020B0604030504040204" pitchFamily="34" charset="0"/>
+                <a:cs typeface="Arial" panose="020B0604020202020204" pitchFamily="34" charset="0"/>
+              </a:rPr>
+              <a:t>bouwsteen@gkvassenpeelo.nl</a:t>
+            </a:r>
+          </a:p>
+          <a:p>
+            <a:pPr algn="l"/>
+            <a:endParaRPr lang="nl-NL" sz="1600" b="0" dirty="0" smtClean="0">
+              <a:solidFill>
+                <a:schemeClr val="bg1"/>
+              </a:solidFill>
+              <a:latin typeface="+mj-lt"/>
+              <a:ea typeface="Tahoma" panose="020B0604030504040204" pitchFamily="34" charset="0"/>
+              <a:cs typeface="Arial" panose="020B0604020202020204" pitchFamily="34" charset="0"/>
+            </a:endParaRPr>
+          </a:p>
+          <a:p>
+            <a:pPr algn="l"/>
+            <a:r>
+              <a:rPr lang="nl-NL" sz="1600" b="1" dirty="0" smtClean="0">
+                <a:solidFill>
+                  <a:schemeClr val="bg1"/>
+                </a:solidFill>
+                <a:latin typeface="+mj-lt"/>
+                <a:ea typeface="Tahoma" panose="020B0604030504040204" pitchFamily="34" charset="0"/>
+                <a:cs typeface="Arial" panose="020B0604020202020204" pitchFamily="34" charset="0"/>
+              </a:rPr>
+              <a:t>Nabestelling opname DVD</a:t>
+            </a:r>
+          </a:p>
+          <a:p>
+            <a:pPr algn="l"/>
+            <a:r>
+              <a:rPr lang="nl-NL" sz="1600" b="0" dirty="0" smtClean="0">
+                <a:solidFill>
+                  <a:schemeClr val="bg1"/>
+                </a:solidFill>
+                <a:latin typeface="+mj-lt"/>
+                <a:ea typeface="Tahoma" panose="020B0604030504040204" pitchFamily="34" charset="0"/>
+                <a:cs typeface="Arial" panose="020B0604020202020204" pitchFamily="34" charset="0"/>
+              </a:rPr>
+              <a:t>j.s.smith@home.nl</a:t>
+            </a:r>
+          </a:p>
+          <a:p>
+            <a:pPr algn="l"/>
+            <a:endParaRPr lang="nl-NL" sz="1600" b="0" dirty="0" smtClean="0">
+              <a:solidFill>
+                <a:schemeClr val="bg1"/>
+              </a:solidFill>
+              <a:latin typeface="+mj-lt"/>
+              <a:ea typeface="Tahoma" panose="020B0604030504040204" pitchFamily="34" charset="0"/>
+              <a:cs typeface="Arial" panose="020B0604020202020204" pitchFamily="34" charset="0"/>
+            </a:endParaRPr>
+          </a:p>
+          <a:p>
+            <a:pPr algn="l"/>
+            <a:r>
+              <a:rPr lang="nl-NL" sz="1600" b="1" dirty="0" smtClean="0">
+                <a:solidFill>
+                  <a:schemeClr val="bg1"/>
+                </a:solidFill>
+                <a:latin typeface="+mj-lt"/>
+                <a:ea typeface="Tahoma" panose="020B0604030504040204" pitchFamily="34" charset="0"/>
+                <a:cs typeface="Arial" panose="020B0604020202020204" pitchFamily="34" charset="0"/>
+              </a:rPr>
+              <a:t>Bijbelteksten</a:t>
+            </a:r>
+          </a:p>
+          <a:p>
+            <a:pPr algn="l" fontAlgn="auto">
+              <a:spcAft>
+                <a:spcPts val="0"/>
+              </a:spcAft>
+            </a:pPr>
+            <a:r>
+              <a:rPr lang="nl-NL" sz="1200" b="0" kern="1200" dirty="0" smtClean="0">
+                <a:solidFill>
+                  <a:schemeClr val="bg1"/>
+                </a:solidFill>
+                <a:effectLst/>
+                <a:latin typeface="+mj-lt"/>
+                <a:ea typeface="+mn-ea"/>
+                <a:cs typeface="Tahoma" pitchFamily="34" charset="0"/>
+              </a:rPr>
+              <a:t>De Nieuwe Bijbelvertaling</a:t>
+            </a:r>
+          </a:p>
+          <a:p>
+            <a:pPr algn="l" fontAlgn="auto">
+              <a:spcAft>
+                <a:spcPts val="0"/>
+              </a:spcAft>
+            </a:pPr>
+            <a:r>
+              <a:rPr lang="nl-NL" sz="1200" b="0" kern="1200" dirty="0" smtClean="0">
+                <a:solidFill>
+                  <a:schemeClr val="bg1"/>
+                </a:solidFill>
+                <a:effectLst/>
+                <a:latin typeface="+mj-lt"/>
+                <a:ea typeface="+mn-ea"/>
+                <a:cs typeface="Tahoma" pitchFamily="34" charset="0"/>
+              </a:rPr>
+              <a:t>© Nederlands Bijbelgenootschap 2004</a:t>
+            </a:r>
+          </a:p>
+          <a:p>
+            <a:pPr algn="l" fontAlgn="auto">
+              <a:spcAft>
+                <a:spcPts val="0"/>
+              </a:spcAft>
+            </a:pPr>
+            <a:r>
+              <a:rPr lang="nl-NL" sz="1200" b="0" kern="1200" dirty="0" smtClean="0">
+                <a:solidFill>
+                  <a:schemeClr val="bg1"/>
+                </a:solidFill>
+                <a:effectLst/>
+                <a:latin typeface="+mj-lt"/>
+                <a:ea typeface="+mn-ea"/>
+                <a:cs typeface="Tahoma" pitchFamily="34" charset="0"/>
+              </a:rPr>
+              <a:t>Bijbel in Gewone taal</a:t>
+            </a:r>
+          </a:p>
+          <a:p>
+            <a:pPr algn="l" fontAlgn="auto">
+              <a:spcAft>
+                <a:spcPts val="0"/>
+              </a:spcAft>
+            </a:pPr>
+            <a:r>
+              <a:rPr lang="nl-NL" sz="1200" b="0" kern="1200" dirty="0" smtClean="0">
+                <a:solidFill>
+                  <a:schemeClr val="bg1"/>
+                </a:solidFill>
+                <a:effectLst/>
+                <a:latin typeface="+mj-lt"/>
+                <a:ea typeface="+mn-ea"/>
+                <a:cs typeface="Tahoma" pitchFamily="34" charset="0"/>
+              </a:rPr>
+              <a:t>© Nederlands Bijbelgenootschap 2014</a:t>
+            </a:r>
+          </a:p>
+          <a:p>
+            <a:pPr algn="l"/>
+            <a:endParaRPr lang="nl-NL" sz="1600" b="0" dirty="0">
+              <a:solidFill>
+                <a:schemeClr val="bg1"/>
+              </a:solidFill>
+              <a:latin typeface="+mj-lt"/>
+              <a:ea typeface="Tahoma" panose="020B0604030504040204" pitchFamily="34" charset="0"/>
+              <a:cs typeface="Arial" panose="020B0604020202020204" pitchFamily="34" charset="0"/>
             </a:endParaRPr>
           </a:p>
         </p:txBody>
@@ -5060,7 +5300,7 @@
     </p:spTree>
     <p:extLst>
       <p:ext uri="{BB962C8B-B14F-4D97-AF65-F5344CB8AC3E}">
-        <p14:creationId xmlns="" xmlns:p14="http://schemas.microsoft.com/office/powerpoint/2010/main" val="1735715938"/>
+        <p14:creationId xmlns:p14="http://schemas.microsoft.com/office/powerpoint/2010/main" val="1735715938"/>
       </p:ext>
     </p:extLst>
   </p:cSld>

</xml_diff>

<commit_message>
'al geweest'-items in liturgie overzichts slide hebben een donkerder kleur gekregen. Nabestellen DVD is verwijderd uit eindslides. Versienummer in welkomstslide toegevoegd.
</commit_message>
<xml_diff>
--- a/src/main/resources/template.pptx
+++ b/src/main/resources/template.pptx
@@ -235,7 +235,7 @@
               <a:pPr>
                 <a:defRPr/>
               </a:pPr>
-              <a:t>02/09/2015</a:t>
+              <a:t>02/10/2015</a:t>
             </a:fld>
             <a:endParaRPr lang="en-GB"/>
           </a:p>
@@ -319,7 +319,7 @@
     </p:spTree>
     <p:extLst>
       <p:ext uri="{BB962C8B-B14F-4D97-AF65-F5344CB8AC3E}">
-        <p14:creationId xmlns:p14="http://schemas.microsoft.com/office/powerpoint/2010/main" val="2562165451"/>
+        <p14:creationId xmlns="" xmlns:p14="http://schemas.microsoft.com/office/powerpoint/2010/main" val="2562165451"/>
       </p:ext>
     </p:extLst>
   </p:cSld>
@@ -418,7 +418,7 @@
               <a:pPr>
                 <a:defRPr/>
               </a:pPr>
-              <a:t>2-9-2015</a:t>
+              <a:t>2-10-2015</a:t>
             </a:fld>
             <a:endParaRPr lang="nl-NL"/>
           </a:p>
@@ -598,7 +598,7 @@
     </p:spTree>
     <p:extLst>
       <p:ext uri="{BB962C8B-B14F-4D97-AF65-F5344CB8AC3E}">
-        <p14:creationId xmlns:p14="http://schemas.microsoft.com/office/powerpoint/2010/main" val="4277614354"/>
+        <p14:creationId xmlns="" xmlns:p14="http://schemas.microsoft.com/office/powerpoint/2010/main" val="4277614354"/>
       </p:ext>
     </p:extLst>
   </p:cSld>
@@ -988,7 +988,7 @@
               <a:defRPr/>
             </a:pPr>
             <a:r>
-              <a:rPr lang="en-GB" sz="1100" dirty="0">
+              <a:rPr lang="en-GB" sz="1100" dirty="0" smtClean="0">
                 <a:solidFill>
                   <a:schemeClr val="bg1"/>
                 </a:solidFill>
@@ -1002,7 +1002,7 @@
                 <a:ea typeface="+mj-ea"/>
                 <a:cs typeface="Tahoma" pitchFamily="34" charset="0"/>
               </a:rPr>
-              <a:t>1.4</a:t>
+              <a:t>3.1</a:t>
             </a:r>
             <a:endParaRPr lang="nl-NL" sz="1100" dirty="0">
               <a:solidFill>
@@ -1053,7 +1053,7 @@
           <a:p>
             <a:pPr lvl="0"/>
             <a:r>
-              <a:rPr lang="en-US" smtClean="0"/>
+              <a:rPr lang="en-US" dirty="0" smtClean="0"/>
               <a:t>Click to edit Master text styles</a:t>
             </a:r>
           </a:p>
@@ -1699,7 +1699,7 @@
               <a:pPr>
                 <a:defRPr/>
               </a:pPr>
-              <a:t>02/09/2015</a:t>
+              <a:t>02/10/2015</a:t>
             </a:fld>
             <a:endParaRPr lang="en-GB"/>
           </a:p>
@@ -2124,7 +2124,7 @@
     </p:spTree>
     <p:extLst>
       <p:ext uri="{BB962C8B-B14F-4D97-AF65-F5344CB8AC3E}">
-        <p14:creationId xmlns:p14="http://schemas.microsoft.com/office/powerpoint/2010/main" val="407480130"/>
+        <p14:creationId xmlns="" xmlns:p14="http://schemas.microsoft.com/office/powerpoint/2010/main" val="407480130"/>
       </p:ext>
     </p:extLst>
   </p:cSld>
@@ -3385,31 +3385,47 @@
           </a:p>
           <a:p>
             <a:pPr algn="l"/>
-            <a:r>
-              <a:rPr lang="nl-NL" sz="1600" b="1" dirty="0" smtClean="0">
-                <a:solidFill>
-                  <a:schemeClr val="bg1"/>
-                </a:solidFill>
-                <a:latin typeface="+mj-lt"/>
-                <a:ea typeface="Tahoma" panose="020B0604030504040204" pitchFamily="34" charset="0"/>
-                <a:cs typeface="Arial" panose="020B0604020202020204" pitchFamily="34" charset="0"/>
-              </a:rPr>
-              <a:t>Nabestelling opname DVD</a:t>
-            </a:r>
+            <a:endParaRPr lang="nl-NL" sz="1600" b="0" dirty="0" smtClean="0">
+              <a:solidFill>
+                <a:schemeClr val="bg1"/>
+              </a:solidFill>
+              <a:latin typeface="+mj-lt"/>
+              <a:ea typeface="Tahoma" panose="020B0604030504040204" pitchFamily="34" charset="0"/>
+              <a:cs typeface="Arial" panose="020B0604020202020204" pitchFamily="34" charset="0"/>
+            </a:endParaRPr>
           </a:p>
           <a:p>
             <a:pPr algn="l"/>
-            <a:r>
-              <a:rPr lang="nl-NL" sz="1600" b="0" dirty="0" smtClean="0">
-                <a:solidFill>
-                  <a:schemeClr val="bg1"/>
-                </a:solidFill>
-                <a:latin typeface="+mj-lt"/>
-                <a:ea typeface="Tahoma" panose="020B0604030504040204" pitchFamily="34" charset="0"/>
-                <a:cs typeface="Arial" panose="020B0604020202020204" pitchFamily="34" charset="0"/>
-              </a:rPr>
-              <a:t>j.s.smith@home.nl</a:t>
-            </a:r>
+            <a:endParaRPr lang="nl-NL" sz="1600" b="0" dirty="0" smtClean="0">
+              <a:solidFill>
+                <a:schemeClr val="bg1"/>
+              </a:solidFill>
+              <a:latin typeface="+mj-lt"/>
+              <a:ea typeface="Tahoma" panose="020B0604030504040204" pitchFamily="34" charset="0"/>
+              <a:cs typeface="Arial" panose="020B0604020202020204" pitchFamily="34" charset="0"/>
+            </a:endParaRPr>
+          </a:p>
+          <a:p>
+            <a:pPr algn="l"/>
+            <a:endParaRPr lang="nl-NL" sz="1600" b="0" dirty="0" smtClean="0">
+              <a:solidFill>
+                <a:schemeClr val="bg1"/>
+              </a:solidFill>
+              <a:latin typeface="+mj-lt"/>
+              <a:ea typeface="Tahoma" panose="020B0604030504040204" pitchFamily="34" charset="0"/>
+              <a:cs typeface="Arial" panose="020B0604020202020204" pitchFamily="34" charset="0"/>
+            </a:endParaRPr>
+          </a:p>
+          <a:p>
+            <a:pPr algn="l"/>
+            <a:endParaRPr lang="nl-NL" sz="1600" b="0" dirty="0" smtClean="0">
+              <a:solidFill>
+                <a:schemeClr val="bg1"/>
+              </a:solidFill>
+              <a:latin typeface="+mj-lt"/>
+              <a:ea typeface="Tahoma" panose="020B0604030504040204" pitchFamily="34" charset="0"/>
+              <a:cs typeface="Arial" panose="020B0604020202020204" pitchFamily="34" charset="0"/>
+            </a:endParaRPr>
           </a:p>
           <a:p>
             <a:pPr algn="l"/>
@@ -4018,31 +4034,47 @@
           </a:p>
           <a:p>
             <a:pPr algn="l"/>
-            <a:r>
-              <a:rPr lang="nl-NL" sz="1600" b="1" dirty="0" smtClean="0">
-                <a:solidFill>
-                  <a:schemeClr val="bg1"/>
-                </a:solidFill>
-                <a:latin typeface="+mj-lt"/>
-                <a:ea typeface="Tahoma" panose="020B0604030504040204" pitchFamily="34" charset="0"/>
-                <a:cs typeface="Arial" panose="020B0604020202020204" pitchFamily="34" charset="0"/>
-              </a:rPr>
-              <a:t>Nabestelling opname DVD</a:t>
-            </a:r>
+            <a:endParaRPr lang="nl-NL" sz="1600" b="0" dirty="0" smtClean="0">
+              <a:solidFill>
+                <a:schemeClr val="bg1"/>
+              </a:solidFill>
+              <a:latin typeface="+mj-lt"/>
+              <a:ea typeface="Tahoma" panose="020B0604030504040204" pitchFamily="34" charset="0"/>
+              <a:cs typeface="Arial" panose="020B0604020202020204" pitchFamily="34" charset="0"/>
+            </a:endParaRPr>
           </a:p>
           <a:p>
             <a:pPr algn="l"/>
-            <a:r>
-              <a:rPr lang="nl-NL" sz="1600" b="0" dirty="0" smtClean="0">
-                <a:solidFill>
-                  <a:schemeClr val="bg1"/>
-                </a:solidFill>
-                <a:latin typeface="+mj-lt"/>
-                <a:ea typeface="Tahoma" panose="020B0604030504040204" pitchFamily="34" charset="0"/>
-                <a:cs typeface="Arial" panose="020B0604020202020204" pitchFamily="34" charset="0"/>
-              </a:rPr>
-              <a:t>j.s.smith@home.nl</a:t>
-            </a:r>
+            <a:endParaRPr lang="nl-NL" sz="1600" b="0" dirty="0" smtClean="0">
+              <a:solidFill>
+                <a:schemeClr val="bg1"/>
+              </a:solidFill>
+              <a:latin typeface="+mj-lt"/>
+              <a:ea typeface="Tahoma" panose="020B0604030504040204" pitchFamily="34" charset="0"/>
+              <a:cs typeface="Arial" panose="020B0604020202020204" pitchFamily="34" charset="0"/>
+            </a:endParaRPr>
+          </a:p>
+          <a:p>
+            <a:pPr algn="l"/>
+            <a:endParaRPr lang="nl-NL" sz="1600" b="0" dirty="0" smtClean="0">
+              <a:solidFill>
+                <a:schemeClr val="bg1"/>
+              </a:solidFill>
+              <a:latin typeface="+mj-lt"/>
+              <a:ea typeface="Tahoma" panose="020B0604030504040204" pitchFamily="34" charset="0"/>
+              <a:cs typeface="Arial" panose="020B0604020202020204" pitchFamily="34" charset="0"/>
+            </a:endParaRPr>
+          </a:p>
+          <a:p>
+            <a:pPr algn="l"/>
+            <a:endParaRPr lang="nl-NL" sz="1600" b="0" dirty="0" smtClean="0">
+              <a:solidFill>
+                <a:schemeClr val="bg1"/>
+              </a:solidFill>
+              <a:latin typeface="+mj-lt"/>
+              <a:ea typeface="Tahoma" panose="020B0604030504040204" pitchFamily="34" charset="0"/>
+              <a:cs typeface="Arial" panose="020B0604020202020204" pitchFamily="34" charset="0"/>
+            </a:endParaRPr>
           </a:p>
           <a:p>
             <a:pPr algn="l"/>
@@ -5300,7 +5332,7 @@
     </p:spTree>
     <p:extLst>
       <p:ext uri="{BB962C8B-B14F-4D97-AF65-F5344CB8AC3E}">
-        <p14:creationId xmlns:p14="http://schemas.microsoft.com/office/powerpoint/2010/main" val="1735715938"/>
+        <p14:creationId xmlns="" xmlns:p14="http://schemas.microsoft.com/office/powerpoint/2010/main" val="1735715938"/>
       </p:ext>
     </p:extLst>
   </p:cSld>

</xml_diff>

<commit_message>
added video notice slide
</commit_message>
<xml_diff>
--- a/src/main/resources/template.pptx
+++ b/src/main/resources/template.pptx
@@ -235,7 +235,7 @@
               <a:pPr>
                 <a:defRPr/>
               </a:pPr>
-              <a:t>02/09/2015</a:t>
+              <a:t>01/01/2016</a:t>
             </a:fld>
             <a:endParaRPr lang="en-GB"/>
           </a:p>
@@ -418,7 +418,7 @@
               <a:pPr>
                 <a:defRPr/>
               </a:pPr>
-              <a:t>2-9-2015</a:t>
+              <a:t>1-1-2016</a:t>
             </a:fld>
             <a:endParaRPr lang="nl-NL"/>
           </a:p>
@@ -1699,7 +1699,7 @@
               <a:pPr>
                 <a:defRPr/>
               </a:pPr>
-              <a:t>02/09/2015</a:t>
+              <a:t>01/01/2016</a:t>
             </a:fld>
             <a:endParaRPr lang="en-GB"/>
           </a:p>
@@ -2038,6 +2038,531 @@
 </file>
 
 <file path=ppt/slideLayouts/slideLayout21.xml><?xml version="1.0" encoding="utf-8"?>
+<p:sldLayout xmlns:a="http://schemas.openxmlformats.org/drawingml/2006/main" xmlns:r="http://schemas.openxmlformats.org/officeDocument/2006/relationships" xmlns:p="http://schemas.openxmlformats.org/presentationml/2006/main" preserve="1" userDrawn="1">
+  <p:cSld name="video melding">
+    <p:spTree>
+      <p:nvGrpSpPr>
+        <p:cNvPr id="1" name=""/>
+        <p:cNvGrpSpPr/>
+        <p:nvPr/>
+      </p:nvGrpSpPr>
+      <p:grpSpPr>
+        <a:xfrm>
+          <a:off x="0" y="0"/>
+          <a:ext cx="0" cy="0"/>
+          <a:chOff x="0" y="0"/>
+          <a:chExt cx="0" cy="0"/>
+        </a:xfrm>
+      </p:grpSpPr>
+      <p:sp>
+        <p:nvSpPr>
+          <p:cNvPr id="2" name="Tekstvak 1"/>
+          <p:cNvSpPr txBox="1"/>
+          <p:nvPr userDrawn="1"/>
+        </p:nvSpPr>
+        <p:spPr bwMode="auto">
+          <a:xfrm>
+            <a:off x="86264" y="543464"/>
+            <a:ext cx="5966071" cy="646331"/>
+          </a:xfrm>
+          <a:prstGeom prst="rect">
+            <a:avLst/>
+          </a:prstGeom>
+          <a:noFill/>
+          <a:ln w="9525">
+            <a:noFill/>
+            <a:miter lim="800000"/>
+            <a:headEnd/>
+            <a:tailEnd/>
+          </a:ln>
+        </p:spPr>
+        <p:txBody>
+          <a:bodyPr wrap="none" lIns="720000" rIns="180000" rtlCol="0" anchor="t" anchorCtr="0">
+            <a:spAutoFit/>
+          </a:bodyPr>
+          <a:lstStyle/>
+          <a:p>
+            <a:pPr fontAlgn="auto">
+              <a:spcAft>
+                <a:spcPts val="0"/>
+              </a:spcAft>
+            </a:pPr>
+            <a:r>
+              <a:rPr lang="nl-NL" sz="3600" dirty="0" smtClean="0">
+                <a:solidFill>
+                  <a:schemeClr val="bg1"/>
+                </a:solidFill>
+                <a:effectLst>
+                  <a:outerShdw blurRad="38100" dist="38100" dir="2700000" algn="tl">
+                    <a:srgbClr val="000000">
+                      <a:alpha val="43137"/>
+                    </a:srgbClr>
+                  </a:outerShdw>
+                </a:effectLst>
+                <a:latin typeface="Tahoma" pitchFamily="34" charset="0"/>
+                <a:ea typeface="+mj-ea"/>
+                <a:cs typeface="Tahoma" pitchFamily="34" charset="0"/>
+              </a:rPr>
+              <a:t>Video</a:t>
+            </a:r>
+            <a:r>
+              <a:rPr lang="nl-NL" sz="3600" baseline="0" dirty="0" smtClean="0">
+                <a:solidFill>
+                  <a:schemeClr val="bg1"/>
+                </a:solidFill>
+                <a:effectLst>
+                  <a:outerShdw blurRad="38100" dist="38100" dir="2700000" algn="tl">
+                    <a:srgbClr val="000000">
+                      <a:alpha val="43137"/>
+                    </a:srgbClr>
+                  </a:outerShdw>
+                </a:effectLst>
+                <a:latin typeface="Tahoma" pitchFamily="34" charset="0"/>
+                <a:ea typeface="+mj-ea"/>
+                <a:cs typeface="Tahoma" pitchFamily="34" charset="0"/>
+              </a:rPr>
+              <a:t> in het Noorderlicht</a:t>
+            </a:r>
+            <a:endParaRPr lang="nl-NL" sz="3600" dirty="0" smtClean="0">
+              <a:solidFill>
+                <a:schemeClr val="bg1"/>
+              </a:solidFill>
+              <a:effectLst>
+                <a:outerShdw blurRad="38100" dist="38100" dir="2700000" algn="tl">
+                  <a:srgbClr val="000000">
+                    <a:alpha val="43137"/>
+                  </a:srgbClr>
+                </a:outerShdw>
+              </a:effectLst>
+              <a:latin typeface="Tahoma" pitchFamily="34" charset="0"/>
+              <a:ea typeface="+mj-ea"/>
+              <a:cs typeface="Tahoma" pitchFamily="34" charset="0"/>
+            </a:endParaRPr>
+          </a:p>
+        </p:txBody>
+      </p:sp>
+      <p:sp>
+        <p:nvSpPr>
+          <p:cNvPr id="4" name="Tekstvak 3"/>
+          <p:cNvSpPr txBox="1"/>
+          <p:nvPr userDrawn="1"/>
+        </p:nvSpPr>
+        <p:spPr bwMode="auto">
+          <a:xfrm>
+            <a:off x="86264" y="1759787"/>
+            <a:ext cx="7241164" cy="1938992"/>
+          </a:xfrm>
+          <a:prstGeom prst="rect">
+            <a:avLst/>
+          </a:prstGeom>
+          <a:noFill/>
+          <a:ln w="9525">
+            <a:noFill/>
+            <a:miter lim="800000"/>
+            <a:headEnd/>
+            <a:tailEnd/>
+          </a:ln>
+        </p:spPr>
+        <p:txBody>
+          <a:bodyPr wrap="none" lIns="720000" rIns="180000" rtlCol="0" anchor="t" anchorCtr="0">
+            <a:spAutoFit/>
+          </a:bodyPr>
+          <a:lstStyle/>
+          <a:p>
+            <a:pPr fontAlgn="auto">
+              <a:spcAft>
+                <a:spcPts val="0"/>
+              </a:spcAft>
+            </a:pPr>
+            <a:r>
+              <a:rPr lang="nl-NL" sz="2400" dirty="0" smtClean="0">
+                <a:solidFill>
+                  <a:schemeClr val="bg1"/>
+                </a:solidFill>
+                <a:effectLst>
+                  <a:outerShdw blurRad="38100" dist="38100" dir="2700000" algn="tl">
+                    <a:srgbClr val="000000">
+                      <a:alpha val="43137"/>
+                    </a:srgbClr>
+                  </a:outerShdw>
+                </a:effectLst>
+                <a:latin typeface="Tahoma" pitchFamily="34" charset="0"/>
+                <a:ea typeface="+mj-ea"/>
+                <a:cs typeface="Tahoma" pitchFamily="34" charset="0"/>
+              </a:rPr>
+              <a:t>Deze dienst wordt opgenomen en uitgezonden</a:t>
+            </a:r>
+          </a:p>
+          <a:p>
+            <a:pPr fontAlgn="auto">
+              <a:spcAft>
+                <a:spcPts val="0"/>
+              </a:spcAft>
+            </a:pPr>
+            <a:r>
+              <a:rPr lang="nl-NL" sz="2400" dirty="0" smtClean="0">
+                <a:solidFill>
+                  <a:schemeClr val="bg1"/>
+                </a:solidFill>
+                <a:effectLst>
+                  <a:outerShdw blurRad="38100" dist="38100" dir="2700000" algn="tl">
+                    <a:srgbClr val="000000">
+                      <a:alpha val="43137"/>
+                    </a:srgbClr>
+                  </a:outerShdw>
+                </a:effectLst>
+                <a:latin typeface="Tahoma" pitchFamily="34" charset="0"/>
+                <a:ea typeface="+mj-ea"/>
+                <a:cs typeface="Tahoma" pitchFamily="34" charset="0"/>
+              </a:rPr>
+              <a:t>via een livestream</a:t>
+            </a:r>
+            <a:r>
+              <a:rPr lang="nl-NL" sz="2400" baseline="0" dirty="0" smtClean="0">
+                <a:solidFill>
+                  <a:schemeClr val="bg1"/>
+                </a:solidFill>
+                <a:effectLst>
+                  <a:outerShdw blurRad="38100" dist="38100" dir="2700000" algn="tl">
+                    <a:srgbClr val="000000">
+                      <a:alpha val="43137"/>
+                    </a:srgbClr>
+                  </a:outerShdw>
+                </a:effectLst>
+                <a:latin typeface="Tahoma" pitchFamily="34" charset="0"/>
+                <a:ea typeface="+mj-ea"/>
+                <a:cs typeface="Tahoma" pitchFamily="34" charset="0"/>
+              </a:rPr>
+              <a:t> op het internet.</a:t>
+            </a:r>
+          </a:p>
+          <a:p>
+            <a:pPr fontAlgn="auto">
+              <a:spcAft>
+                <a:spcPts val="0"/>
+              </a:spcAft>
+            </a:pPr>
+            <a:r>
+              <a:rPr lang="nl-NL" sz="2400" baseline="0" dirty="0" smtClean="0">
+                <a:solidFill>
+                  <a:schemeClr val="bg1"/>
+                </a:solidFill>
+                <a:effectLst>
+                  <a:outerShdw blurRad="38100" dist="38100" dir="2700000" algn="tl">
+                    <a:srgbClr val="000000">
+                      <a:alpha val="43137"/>
+                    </a:srgbClr>
+                  </a:outerShdw>
+                </a:effectLst>
+                <a:latin typeface="Tahoma" pitchFamily="34" charset="0"/>
+                <a:ea typeface="+mj-ea"/>
+                <a:cs typeface="Tahoma" pitchFamily="34" charset="0"/>
+              </a:rPr>
+              <a:t>Wanneer u niet in beeld wilt komen dan is </a:t>
+            </a:r>
+          </a:p>
+          <a:p>
+            <a:pPr fontAlgn="auto">
+              <a:spcAft>
+                <a:spcPts val="0"/>
+              </a:spcAft>
+            </a:pPr>
+            <a:r>
+              <a:rPr lang="nl-NL" sz="2400" baseline="0" dirty="0" smtClean="0">
+                <a:solidFill>
+                  <a:schemeClr val="bg1"/>
+                </a:solidFill>
+                <a:effectLst>
+                  <a:outerShdw blurRad="38100" dist="38100" dir="2700000" algn="tl">
+                    <a:srgbClr val="000000">
+                      <a:alpha val="43137"/>
+                    </a:srgbClr>
+                  </a:outerShdw>
+                </a:effectLst>
+                <a:latin typeface="Tahoma" pitchFamily="34" charset="0"/>
+                <a:ea typeface="+mj-ea"/>
+                <a:cs typeface="Tahoma" pitchFamily="34" charset="0"/>
+              </a:rPr>
+              <a:t>achterin het kerkgebouw, in het lage gedeelte,</a:t>
+            </a:r>
+          </a:p>
+          <a:p>
+            <a:pPr fontAlgn="auto">
+              <a:spcAft>
+                <a:spcPts val="0"/>
+              </a:spcAft>
+            </a:pPr>
+            <a:r>
+              <a:rPr lang="nl-NL" sz="2400" baseline="0" dirty="0" smtClean="0">
+                <a:solidFill>
+                  <a:schemeClr val="bg1"/>
+                </a:solidFill>
+                <a:effectLst>
+                  <a:outerShdw blurRad="38100" dist="38100" dir="2700000" algn="tl">
+                    <a:srgbClr val="000000">
+                      <a:alpha val="43137"/>
+                    </a:srgbClr>
+                  </a:outerShdw>
+                </a:effectLst>
+                <a:latin typeface="Tahoma" pitchFamily="34" charset="0"/>
+                <a:ea typeface="+mj-ea"/>
+                <a:cs typeface="Tahoma" pitchFamily="34" charset="0"/>
+              </a:rPr>
+              <a:t>een videovrije zone.</a:t>
+            </a:r>
+          </a:p>
+        </p:txBody>
+      </p:sp>
+      <p:sp>
+        <p:nvSpPr>
+          <p:cNvPr id="5" name="Tekstvak 4"/>
+          <p:cNvSpPr txBox="1"/>
+          <p:nvPr userDrawn="1"/>
+        </p:nvSpPr>
+        <p:spPr bwMode="auto">
+          <a:xfrm>
+            <a:off x="2092768" y="4649634"/>
+            <a:ext cx="6832205" cy="707886"/>
+          </a:xfrm>
+          <a:prstGeom prst="rect">
+            <a:avLst/>
+          </a:prstGeom>
+          <a:noFill/>
+          <a:ln w="9525">
+            <a:noFill/>
+            <a:miter lim="800000"/>
+            <a:headEnd/>
+            <a:tailEnd/>
+          </a:ln>
+        </p:spPr>
+        <p:txBody>
+          <a:bodyPr wrap="none" lIns="720000" rIns="180000" rtlCol="0" anchor="t" anchorCtr="0">
+            <a:spAutoFit/>
+          </a:bodyPr>
+          <a:lstStyle/>
+          <a:p>
+            <a:pPr fontAlgn="auto">
+              <a:spcAft>
+                <a:spcPts val="0"/>
+              </a:spcAft>
+            </a:pPr>
+            <a:r>
+              <a:rPr lang="nl-NL" sz="2000" dirty="0" smtClean="0">
+                <a:solidFill>
+                  <a:schemeClr val="bg1"/>
+                </a:solidFill>
+                <a:effectLst>
+                  <a:outerShdw blurRad="38100" dist="38100" dir="2700000" algn="tl">
+                    <a:srgbClr val="000000">
+                      <a:alpha val="43137"/>
+                    </a:srgbClr>
+                  </a:outerShdw>
+                </a:effectLst>
+                <a:latin typeface="Tahoma" pitchFamily="34" charset="0"/>
+                <a:ea typeface="+mj-ea"/>
+                <a:cs typeface="Tahoma" pitchFamily="34" charset="0"/>
+              </a:rPr>
+              <a:t>Meer informatie</a:t>
+            </a:r>
+            <a:r>
+              <a:rPr lang="nl-NL" sz="2000" baseline="0" dirty="0" smtClean="0">
+                <a:solidFill>
+                  <a:schemeClr val="bg1"/>
+                </a:solidFill>
+                <a:effectLst>
+                  <a:outerShdw blurRad="38100" dist="38100" dir="2700000" algn="tl">
+                    <a:srgbClr val="000000">
+                      <a:alpha val="43137"/>
+                    </a:srgbClr>
+                  </a:outerShdw>
+                </a:effectLst>
+                <a:latin typeface="Tahoma" pitchFamily="34" charset="0"/>
+                <a:ea typeface="+mj-ea"/>
+                <a:cs typeface="Tahoma" pitchFamily="34" charset="0"/>
+              </a:rPr>
+              <a:t> kunt u verkrijgen bij het mediateam</a:t>
+            </a:r>
+          </a:p>
+          <a:p>
+            <a:pPr fontAlgn="auto">
+              <a:spcAft>
+                <a:spcPts val="0"/>
+              </a:spcAft>
+            </a:pPr>
+            <a:r>
+              <a:rPr lang="nl-NL" sz="2000" baseline="0" dirty="0" smtClean="0">
+                <a:solidFill>
+                  <a:schemeClr val="bg1"/>
+                </a:solidFill>
+                <a:effectLst>
+                  <a:outerShdw blurRad="38100" dist="38100" dir="2700000" algn="tl">
+                    <a:srgbClr val="000000">
+                      <a:alpha val="43137"/>
+                    </a:srgbClr>
+                  </a:outerShdw>
+                </a:effectLst>
+                <a:latin typeface="Tahoma" pitchFamily="34" charset="0"/>
+                <a:ea typeface="+mj-ea"/>
+                <a:cs typeface="Tahoma" pitchFamily="34" charset="0"/>
+              </a:rPr>
+              <a:t>achter de desk.</a:t>
+            </a:r>
+            <a:endParaRPr lang="nl-NL" sz="2000" dirty="0" smtClean="0">
+              <a:solidFill>
+                <a:schemeClr val="bg1"/>
+              </a:solidFill>
+              <a:effectLst>
+                <a:outerShdw blurRad="38100" dist="38100" dir="2700000" algn="tl">
+                  <a:srgbClr val="000000">
+                    <a:alpha val="43137"/>
+                  </a:srgbClr>
+                </a:outerShdw>
+              </a:effectLst>
+              <a:latin typeface="Tahoma" pitchFamily="34" charset="0"/>
+              <a:ea typeface="+mj-ea"/>
+              <a:cs typeface="Tahoma" pitchFamily="34" charset="0"/>
+            </a:endParaRPr>
+          </a:p>
+        </p:txBody>
+      </p:sp>
+      <p:sp>
+        <p:nvSpPr>
+          <p:cNvPr id="6" name="Tekstvak 5"/>
+          <p:cNvSpPr txBox="1"/>
+          <p:nvPr userDrawn="1"/>
+        </p:nvSpPr>
+        <p:spPr bwMode="auto">
+          <a:xfrm>
+            <a:off x="960295" y="6067579"/>
+            <a:ext cx="7847227" cy="461665"/>
+          </a:xfrm>
+          <a:prstGeom prst="rect">
+            <a:avLst/>
+          </a:prstGeom>
+          <a:noFill/>
+          <a:ln w="9525">
+            <a:noFill/>
+            <a:miter lim="800000"/>
+            <a:headEnd/>
+            <a:tailEnd/>
+          </a:ln>
+        </p:spPr>
+        <p:txBody>
+          <a:bodyPr wrap="none" lIns="720000" rIns="180000" rtlCol="0" anchor="t" anchorCtr="0">
+            <a:spAutoFit/>
+          </a:bodyPr>
+          <a:lstStyle/>
+          <a:p>
+            <a:pPr algn="l" fontAlgn="auto">
+              <a:spcAft>
+                <a:spcPts val="0"/>
+              </a:spcAft>
+            </a:pPr>
+            <a:r>
+              <a:rPr lang="nl-NL" sz="2400" dirty="0" smtClean="0">
+                <a:solidFill>
+                  <a:schemeClr val="bg1"/>
+                </a:solidFill>
+                <a:effectLst>
+                  <a:outerShdw blurRad="38100" dist="38100" dir="2700000" algn="tl">
+                    <a:srgbClr val="000000">
+                      <a:alpha val="43137"/>
+                    </a:srgbClr>
+                  </a:outerShdw>
+                </a:effectLst>
+                <a:latin typeface="Tahoma" pitchFamily="34" charset="0"/>
+                <a:ea typeface="+mj-ea"/>
+                <a:cs typeface="Tahoma" pitchFamily="34" charset="0"/>
+              </a:rPr>
+              <a:t>De opname kunt u terugkijken op www.mijnkerk.tv</a:t>
+            </a:r>
+            <a:endParaRPr lang="nl-NL" sz="2400" dirty="0" smtClean="0">
+              <a:solidFill>
+                <a:schemeClr val="bg1"/>
+              </a:solidFill>
+              <a:effectLst>
+                <a:outerShdw blurRad="38100" dist="38100" dir="2700000" algn="tl">
+                  <a:srgbClr val="000000">
+                    <a:alpha val="43137"/>
+                  </a:srgbClr>
+                </a:outerShdw>
+              </a:effectLst>
+              <a:latin typeface="Tahoma" pitchFamily="34" charset="0"/>
+              <a:ea typeface="+mj-ea"/>
+              <a:cs typeface="Tahoma" pitchFamily="34" charset="0"/>
+            </a:endParaRPr>
+          </a:p>
+        </p:txBody>
+      </p:sp>
+      <p:pic>
+        <p:nvPicPr>
+          <p:cNvPr id="1031" name="Picture 7"/>
+          <p:cNvPicPr>
+            <a:picLocks noChangeAspect="1" noChangeArrowheads="1"/>
+          </p:cNvPicPr>
+          <p:nvPr userDrawn="1"/>
+        </p:nvPicPr>
+        <p:blipFill>
+          <a:blip r:embed="rId2">
+            <a:extLst>
+              <a:ext uri="{28A0092B-C50C-407E-A947-70E740481C1C}">
+                <a14:useLocalDpi xmlns:a14="http://schemas.microsoft.com/office/drawing/2010/main" val="0"/>
+              </a:ext>
+            </a:extLst>
+          </a:blip>
+          <a:srcRect/>
+          <a:stretch>
+            <a:fillRect/>
+          </a:stretch>
+        </p:blipFill>
+        <p:spPr bwMode="auto">
+          <a:xfrm>
+            <a:off x="-133470" y="3976777"/>
+            <a:ext cx="2468156" cy="3781486"/>
+          </a:xfrm>
+          <a:prstGeom prst="rect">
+            <a:avLst/>
+          </a:prstGeom>
+          <a:noFill/>
+          <a:ln>
+            <a:noFill/>
+          </a:ln>
+          <a:extLst>
+            <a:ext uri="{909E8E84-426E-40DD-AFC4-6F175D3DCCD1}">
+              <a14:hiddenFill xmlns:a14="http://schemas.microsoft.com/office/drawing/2010/main">
+                <a:solidFill>
+                  <a:schemeClr val="accent1"/>
+                </a:solidFill>
+              </a14:hiddenFill>
+            </a:ext>
+            <a:ext uri="{91240B29-F687-4F45-9708-019B960494DF}">
+              <a14:hiddenLine xmlns:a14="http://schemas.microsoft.com/office/drawing/2010/main" w="9525">
+                <a:solidFill>
+                  <a:schemeClr val="tx1"/>
+                </a:solidFill>
+                <a:miter lim="800000"/>
+                <a:headEnd/>
+                <a:tailEnd/>
+              </a14:hiddenLine>
+            </a:ext>
+          </a:extLst>
+        </p:spPr>
+      </p:pic>
+    </p:spTree>
+    <p:extLst>
+      <p:ext uri="{BB962C8B-B14F-4D97-AF65-F5344CB8AC3E}">
+        <p14:creationId xmlns:p14="http://schemas.microsoft.com/office/powerpoint/2010/main" val="4036904755"/>
+      </p:ext>
+    </p:extLst>
+  </p:cSld>
+  <p:clrMapOvr>
+    <a:masterClrMapping/>
+  </p:clrMapOvr>
+  <p:transition/>
+</p:sldLayout>
+</file>
+
+<file path=ppt/slideLayouts/slideLayout22.xml><?xml version="1.0" encoding="utf-8"?>
 <p:sldLayout xmlns:a="http://schemas.openxmlformats.org/drawingml/2006/main" xmlns:r="http://schemas.openxmlformats.org/officeDocument/2006/relationships" xmlns:p="http://schemas.openxmlformats.org/presentationml/2006/main" userDrawn="1">
   <p:cSld name="Object">
     <p:spTree>
@@ -4839,7 +5364,7 @@
           <p:nvPr userDrawn="1"/>
         </p:nvPicPr>
         <p:blipFill>
-          <a:blip r:embed="rId23" cstate="print"/>
+          <a:blip r:embed="rId24" cstate="print"/>
           <a:srcRect/>
           <a:stretch>
             <a:fillRect/>
@@ -4886,7 +5411,8 @@
     <p:sldLayoutId id="2147484231" r:id="rId18"/>
     <p:sldLayoutId id="2147484232" r:id="rId19"/>
     <p:sldLayoutId id="2147484296" r:id="rId20"/>
-    <p:sldLayoutId id="2147484295" r:id="rId21"/>
+    <p:sldLayoutId id="2147484297" r:id="rId21"/>
+    <p:sldLayoutId id="2147484295" r:id="rId22"/>
   </p:sldLayoutIdLst>
   <p:transition>
     <p:fade/>
@@ -5310,6 +5836,13 @@
   <p:transition>
     <p:fade/>
   </p:transition>
+  <p:timing>
+    <p:tnLst>
+      <p:par>
+        <p:cTn id="1" dur="indefinite" restart="never" nodeType="tmRoot"/>
+      </p:par>
+    </p:tnLst>
+  </p:timing>
 </p:sld>
 </file>
 

</xml_diff>

<commit_message>
restored dark liturgy items and dvd after sale
</commit_message>
<xml_diff>
--- a/src/main/resources/template.pptx
+++ b/src/main/resources/template.pptx
@@ -235,7 +235,7 @@
               <a:pPr>
                 <a:defRPr/>
               </a:pPr>
-              <a:t>02/01/2016</a:t>
+              <a:t>16/01/2016</a:t>
             </a:fld>
             <a:endParaRPr lang="en-GB"/>
           </a:p>
@@ -319,7 +319,7 @@
     </p:spTree>
     <p:extLst>
       <p:ext uri="{BB962C8B-B14F-4D97-AF65-F5344CB8AC3E}">
-        <p14:creationId xmlns:p14="http://schemas.microsoft.com/office/powerpoint/2010/main" val="2562165451"/>
+        <p14:creationId xmlns:p14="http://schemas.microsoft.com/office/powerpoint/2010/main" xmlns="" val="2562165451"/>
       </p:ext>
     </p:extLst>
   </p:cSld>
@@ -418,7 +418,7 @@
               <a:pPr>
                 <a:defRPr/>
               </a:pPr>
-              <a:t>2-1-2016</a:t>
+              <a:t>16-1-2016</a:t>
             </a:fld>
             <a:endParaRPr lang="nl-NL"/>
           </a:p>
@@ -598,7 +598,7 @@
     </p:spTree>
     <p:extLst>
       <p:ext uri="{BB962C8B-B14F-4D97-AF65-F5344CB8AC3E}">
-        <p14:creationId xmlns:p14="http://schemas.microsoft.com/office/powerpoint/2010/main" val="4277614354"/>
+        <p14:creationId xmlns:p14="http://schemas.microsoft.com/office/powerpoint/2010/main" xmlns="" val="4277614354"/>
       </p:ext>
     </p:extLst>
   </p:cSld>
@@ -1685,7 +1685,7 @@
               <a:pPr>
                 <a:defRPr/>
               </a:pPr>
-              <a:t>02/01/2016</a:t>
+              <a:t>16/01/2016</a:t>
             </a:fld>
             <a:endParaRPr lang="en-GB"/>
           </a:p>
@@ -2049,10 +2049,10 @@
           <p:nvPr userDrawn="1"/>
         </p:nvPicPr>
         <p:blipFill>
-          <a:blip r:embed="rId2">
+          <a:blip r:embed="rId2" cstate="print">
             <a:extLst>
               <a:ext uri="{28A0092B-C50C-407E-A947-70E740481C1C}">
-                <a14:useLocalDpi xmlns:a14="http://schemas.microsoft.com/office/drawing/2010/main" val="0"/>
+                <a14:useLocalDpi xmlns:a14="http://schemas.microsoft.com/office/drawing/2010/main" xmlns="" val="0"/>
               </a:ext>
             </a:extLst>
           </a:blip>
@@ -2075,14 +2075,14 @@
           </a:ln>
           <a:extLst>
             <a:ext uri="{909E8E84-426E-40DD-AFC4-6F175D3DCCD1}">
-              <a14:hiddenFill xmlns:a14="http://schemas.microsoft.com/office/drawing/2010/main">
+              <a14:hiddenFill xmlns:a14="http://schemas.microsoft.com/office/drawing/2010/main" xmlns="">
                 <a:solidFill>
                   <a:schemeClr val="accent1"/>
                 </a:solidFill>
               </a14:hiddenFill>
             </a:ext>
             <a:ext uri="{91240B29-F687-4F45-9708-019B960494DF}">
-              <a14:hiddenLine xmlns:a14="http://schemas.microsoft.com/office/drawing/2010/main" w="9525">
+              <a14:hiddenLine xmlns:a14="http://schemas.microsoft.com/office/drawing/2010/main" xmlns="" w="9525">
                 <a:solidFill>
                   <a:schemeClr val="tx1"/>
                 </a:solidFill>
@@ -2522,7 +2522,7 @@
     </p:spTree>
     <p:extLst>
       <p:ext uri="{BB962C8B-B14F-4D97-AF65-F5344CB8AC3E}">
-        <p14:creationId xmlns:p14="http://schemas.microsoft.com/office/powerpoint/2010/main" val="4036904755"/>
+        <p14:creationId xmlns:p14="http://schemas.microsoft.com/office/powerpoint/2010/main" xmlns="" val="4036904755"/>
       </p:ext>
     </p:extLst>
   </p:cSld>
@@ -2627,7 +2627,7 @@
     </p:spTree>
     <p:extLst>
       <p:ext uri="{BB962C8B-B14F-4D97-AF65-F5344CB8AC3E}">
-        <p14:creationId xmlns:p14="http://schemas.microsoft.com/office/powerpoint/2010/main" val="2244282078"/>
+        <p14:creationId xmlns:p14="http://schemas.microsoft.com/office/powerpoint/2010/main" xmlns="" val="2244282078"/>
       </p:ext>
     </p:extLst>
   </p:cSld>
@@ -2727,7 +2727,7 @@
     </p:spTree>
     <p:extLst>
       <p:ext uri="{BB962C8B-B14F-4D97-AF65-F5344CB8AC3E}">
-        <p14:creationId xmlns:p14="http://schemas.microsoft.com/office/powerpoint/2010/main" val="407480130"/>
+        <p14:creationId xmlns:p14="http://schemas.microsoft.com/office/powerpoint/2010/main" xmlns="" val="407480130"/>
       </p:ext>
     </p:extLst>
   </p:cSld>
@@ -3418,7 +3418,7 @@
 
 <file path=ppt/slideLayouts/slideLayout7.xml><?xml version="1.0" encoding="utf-8"?>
 <p:sldLayout xmlns:a="http://schemas.openxmlformats.org/drawingml/2006/main" xmlns:r="http://schemas.openxmlformats.org/officeDocument/2006/relationships" xmlns:p="http://schemas.openxmlformats.org/presentationml/2006/main" preserve="1" userDrawn="1">
-  <p:cSld name="einde morgendienst">
+  <p:cSld name="1_einde morgendienst">
     <p:spTree>
       <p:nvGrpSpPr>
         <p:cNvPr id="1" name=""/>
@@ -3988,31 +3988,47 @@
           </a:p>
           <a:p>
             <a:pPr algn="l"/>
-            <a:r>
-              <a:rPr lang="nl-NL" sz="1600" b="1" dirty="0" smtClean="0">
-                <a:solidFill>
-                  <a:schemeClr val="bg1"/>
-                </a:solidFill>
-                <a:latin typeface="+mj-lt"/>
-                <a:ea typeface="Tahoma" panose="020B0604030504040204" pitchFamily="34" charset="0"/>
-                <a:cs typeface="Arial" panose="020B0604020202020204" pitchFamily="34" charset="0"/>
-              </a:rPr>
-              <a:t>Nabestelling opname DVD</a:t>
-            </a:r>
+            <a:endParaRPr lang="nl-NL" sz="1600" b="0" dirty="0" smtClean="0">
+              <a:solidFill>
+                <a:schemeClr val="bg1"/>
+              </a:solidFill>
+              <a:latin typeface="+mj-lt"/>
+              <a:ea typeface="Tahoma" panose="020B0604030504040204" pitchFamily="34" charset="0"/>
+              <a:cs typeface="Arial" panose="020B0604020202020204" pitchFamily="34" charset="0"/>
+            </a:endParaRPr>
           </a:p>
           <a:p>
             <a:pPr algn="l"/>
-            <a:r>
-              <a:rPr lang="nl-NL" sz="1600" b="0" dirty="0" smtClean="0">
-                <a:solidFill>
-                  <a:schemeClr val="bg1"/>
-                </a:solidFill>
-                <a:latin typeface="+mj-lt"/>
-                <a:ea typeface="Tahoma" panose="020B0604030504040204" pitchFamily="34" charset="0"/>
-                <a:cs typeface="Arial" panose="020B0604020202020204" pitchFamily="34" charset="0"/>
-              </a:rPr>
-              <a:t>j.s.smith@home.nl</a:t>
-            </a:r>
+            <a:endParaRPr lang="nl-NL" sz="1600" b="0" dirty="0" smtClean="0">
+              <a:solidFill>
+                <a:schemeClr val="bg1"/>
+              </a:solidFill>
+              <a:latin typeface="+mj-lt"/>
+              <a:ea typeface="Tahoma" panose="020B0604030504040204" pitchFamily="34" charset="0"/>
+              <a:cs typeface="Arial" panose="020B0604020202020204" pitchFamily="34" charset="0"/>
+            </a:endParaRPr>
+          </a:p>
+          <a:p>
+            <a:pPr algn="l"/>
+            <a:endParaRPr lang="nl-NL" sz="1600" b="0" dirty="0" smtClean="0">
+              <a:solidFill>
+                <a:schemeClr val="bg1"/>
+              </a:solidFill>
+              <a:latin typeface="+mj-lt"/>
+              <a:ea typeface="Tahoma" panose="020B0604030504040204" pitchFamily="34" charset="0"/>
+              <a:cs typeface="Arial" panose="020B0604020202020204" pitchFamily="34" charset="0"/>
+            </a:endParaRPr>
+          </a:p>
+          <a:p>
+            <a:pPr algn="l"/>
+            <a:endParaRPr lang="nl-NL" sz="1600" b="0" dirty="0" smtClean="0">
+              <a:solidFill>
+                <a:schemeClr val="bg1"/>
+              </a:solidFill>
+              <a:latin typeface="+mj-lt"/>
+              <a:ea typeface="Tahoma" panose="020B0604030504040204" pitchFamily="34" charset="0"/>
+              <a:cs typeface="Arial" panose="020B0604020202020204" pitchFamily="34" charset="0"/>
+            </a:endParaRPr>
           </a:p>
           <a:p>
             <a:pPr algn="l"/>
@@ -4141,7 +4157,7 @@
 
 <file path=ppt/slideLayouts/slideLayout8.xml><?xml version="1.0" encoding="utf-8"?>
 <p:sldLayout xmlns:a="http://schemas.openxmlformats.org/drawingml/2006/main" xmlns:r="http://schemas.openxmlformats.org/officeDocument/2006/relationships" xmlns:p="http://schemas.openxmlformats.org/presentationml/2006/main" preserve="1" userDrawn="1">
-  <p:cSld name="einde middagdienst">
+  <p:cSld name="1_einde middagdienst">
     <p:spTree>
       <p:nvGrpSpPr>
         <p:cNvPr id="1" name=""/>
@@ -4621,31 +4637,47 @@
           </a:p>
           <a:p>
             <a:pPr algn="l"/>
-            <a:r>
-              <a:rPr lang="nl-NL" sz="1600" b="1" dirty="0" smtClean="0">
-                <a:solidFill>
-                  <a:schemeClr val="bg1"/>
-                </a:solidFill>
-                <a:latin typeface="+mj-lt"/>
-                <a:ea typeface="Tahoma" panose="020B0604030504040204" pitchFamily="34" charset="0"/>
-                <a:cs typeface="Arial" panose="020B0604020202020204" pitchFamily="34" charset="0"/>
-              </a:rPr>
-              <a:t>Nabestelling opname DVD</a:t>
-            </a:r>
+            <a:endParaRPr lang="nl-NL" sz="1600" b="0" dirty="0" smtClean="0">
+              <a:solidFill>
+                <a:schemeClr val="bg1"/>
+              </a:solidFill>
+              <a:latin typeface="+mj-lt"/>
+              <a:ea typeface="Tahoma" panose="020B0604030504040204" pitchFamily="34" charset="0"/>
+              <a:cs typeface="Arial" panose="020B0604020202020204" pitchFamily="34" charset="0"/>
+            </a:endParaRPr>
           </a:p>
           <a:p>
             <a:pPr algn="l"/>
-            <a:r>
-              <a:rPr lang="nl-NL" sz="1600" b="0" dirty="0" smtClean="0">
-                <a:solidFill>
-                  <a:schemeClr val="bg1"/>
-                </a:solidFill>
-                <a:latin typeface="+mj-lt"/>
-                <a:ea typeface="Tahoma" panose="020B0604030504040204" pitchFamily="34" charset="0"/>
-                <a:cs typeface="Arial" panose="020B0604020202020204" pitchFamily="34" charset="0"/>
-              </a:rPr>
-              <a:t>j.s.smith@home.nl</a:t>
-            </a:r>
+            <a:endParaRPr lang="nl-NL" sz="1600" b="0" dirty="0" smtClean="0">
+              <a:solidFill>
+                <a:schemeClr val="bg1"/>
+              </a:solidFill>
+              <a:latin typeface="+mj-lt"/>
+              <a:ea typeface="Tahoma" panose="020B0604030504040204" pitchFamily="34" charset="0"/>
+              <a:cs typeface="Arial" panose="020B0604020202020204" pitchFamily="34" charset="0"/>
+            </a:endParaRPr>
+          </a:p>
+          <a:p>
+            <a:pPr algn="l"/>
+            <a:endParaRPr lang="nl-NL" sz="1600" b="0" dirty="0" smtClean="0">
+              <a:solidFill>
+                <a:schemeClr val="bg1"/>
+              </a:solidFill>
+              <a:latin typeface="+mj-lt"/>
+              <a:ea typeface="Tahoma" panose="020B0604030504040204" pitchFamily="34" charset="0"/>
+              <a:cs typeface="Arial" panose="020B0604020202020204" pitchFamily="34" charset="0"/>
+            </a:endParaRPr>
+          </a:p>
+          <a:p>
+            <a:pPr algn="l"/>
+            <a:endParaRPr lang="nl-NL" sz="1600" b="0" dirty="0" smtClean="0">
+              <a:solidFill>
+                <a:schemeClr val="bg1"/>
+              </a:solidFill>
+              <a:latin typeface="+mj-lt"/>
+              <a:ea typeface="Tahoma" panose="020B0604030504040204" pitchFamily="34" charset="0"/>
+              <a:cs typeface="Arial" panose="020B0604020202020204" pitchFamily="34" charset="0"/>
+            </a:endParaRPr>
           </a:p>
           <a:p>
             <a:pPr algn="l"/>
@@ -5475,8 +5507,8 @@
     <p:sldLayoutId id="2147484214" r:id="rId4"/>
     <p:sldLayoutId id="2147484218" r:id="rId5"/>
     <p:sldLayoutId id="2147484219" r:id="rId6"/>
-    <p:sldLayoutId id="2147484220" r:id="rId7"/>
-    <p:sldLayoutId id="2147484221" r:id="rId8"/>
+    <p:sldLayoutId id="2147484299" r:id="rId7"/>
+    <p:sldLayoutId id="2147484300" r:id="rId8"/>
     <p:sldLayoutId id="2147484222" r:id="rId9"/>
     <p:sldLayoutId id="2147484223" r:id="rId10"/>
     <p:sldLayoutId id="2147484224" r:id="rId11"/>
@@ -5905,7 +5937,7 @@
     </p:spTree>
     <p:extLst>
       <p:ext uri="{BB962C8B-B14F-4D97-AF65-F5344CB8AC3E}">
-        <p14:creationId xmlns:p14="http://schemas.microsoft.com/office/powerpoint/2010/main" val="1735715938"/>
+        <p14:creationId xmlns:p14="http://schemas.microsoft.com/office/powerpoint/2010/main" xmlns="" val="1735715938"/>
       </p:ext>
     </p:extLst>
   </p:cSld>

</xml_diff>

<commit_message>
updated version in console and welcome sheet
</commit_message>
<xml_diff>
--- a/src/main/resources/template.pptx
+++ b/src/main/resources/template.pptx
@@ -235,7 +235,7 @@
               <a:pPr>
                 <a:defRPr/>
               </a:pPr>
-              <a:t>16/01/2016</a:t>
+              <a:t>21/01/2016</a:t>
             </a:fld>
             <a:endParaRPr lang="en-GB"/>
           </a:p>
@@ -319,7 +319,7 @@
     </p:spTree>
     <p:extLst>
       <p:ext uri="{BB962C8B-B14F-4D97-AF65-F5344CB8AC3E}">
-        <p14:creationId xmlns:p14="http://schemas.microsoft.com/office/powerpoint/2010/main" xmlns="" val="2562165451"/>
+        <p14:creationId xmlns:p14="http://schemas.microsoft.com/office/powerpoint/2010/main" val="2562165451"/>
       </p:ext>
     </p:extLst>
   </p:cSld>
@@ -418,7 +418,7 @@
               <a:pPr>
                 <a:defRPr/>
               </a:pPr>
-              <a:t>16-1-2016</a:t>
+              <a:t>21-1-2016</a:t>
             </a:fld>
             <a:endParaRPr lang="nl-NL"/>
           </a:p>
@@ -598,7 +598,7 @@
     </p:spTree>
     <p:extLst>
       <p:ext uri="{BB962C8B-B14F-4D97-AF65-F5344CB8AC3E}">
-        <p14:creationId xmlns:p14="http://schemas.microsoft.com/office/powerpoint/2010/main" xmlns="" val="4277614354"/>
+        <p14:creationId xmlns:p14="http://schemas.microsoft.com/office/powerpoint/2010/main" val="4277614354"/>
       </p:ext>
     </p:extLst>
   </p:cSld>
@@ -1002,8 +1002,22 @@
                 <a:ea typeface="+mj-ea"/>
                 <a:cs typeface="Tahoma" pitchFamily="34" charset="0"/>
               </a:rPr>
-              <a:t>3.2</a:t>
-            </a:r>
+              <a:t>3.3.2</a:t>
+            </a:r>
+            <a:endParaRPr lang="nl-NL" sz="1100" dirty="0" smtClean="0">
+              <a:solidFill>
+                <a:schemeClr val="bg1"/>
+              </a:solidFill>
+              <a:effectLst>
+                <a:outerShdw blurRad="38100" dist="38100" dir="2700000" algn="tl">
+                  <a:srgbClr val="000000">
+                    <a:alpha val="43137"/>
+                  </a:srgbClr>
+                </a:outerShdw>
+              </a:effectLst>
+              <a:ea typeface="+mj-ea"/>
+              <a:cs typeface="Tahoma" pitchFamily="34" charset="0"/>
+            </a:endParaRPr>
           </a:p>
         </p:txBody>
       </p:sp>
@@ -1685,7 +1699,7 @@
               <a:pPr>
                 <a:defRPr/>
               </a:pPr>
-              <a:t>16/01/2016</a:t>
+              <a:t>21/01/2016</a:t>
             </a:fld>
             <a:endParaRPr lang="en-GB"/>
           </a:p>
@@ -2052,7 +2066,7 @@
           <a:blip r:embed="rId2" cstate="print">
             <a:extLst>
               <a:ext uri="{28A0092B-C50C-407E-A947-70E740481C1C}">
-                <a14:useLocalDpi xmlns:a14="http://schemas.microsoft.com/office/drawing/2010/main" xmlns="" val="0"/>
+                <a14:useLocalDpi xmlns:a14="http://schemas.microsoft.com/office/drawing/2010/main" val="0"/>
               </a:ext>
             </a:extLst>
           </a:blip>
@@ -2075,14 +2089,14 @@
           </a:ln>
           <a:extLst>
             <a:ext uri="{909E8E84-426E-40DD-AFC4-6F175D3DCCD1}">
-              <a14:hiddenFill xmlns:a14="http://schemas.microsoft.com/office/drawing/2010/main" xmlns="">
+              <a14:hiddenFill xmlns:a14="http://schemas.microsoft.com/office/drawing/2010/main">
                 <a:solidFill>
                   <a:schemeClr val="accent1"/>
                 </a:solidFill>
               </a14:hiddenFill>
             </a:ext>
             <a:ext uri="{91240B29-F687-4F45-9708-019B960494DF}">
-              <a14:hiddenLine xmlns:a14="http://schemas.microsoft.com/office/drawing/2010/main" xmlns="" w="9525">
+              <a14:hiddenLine xmlns:a14="http://schemas.microsoft.com/office/drawing/2010/main" w="9525">
                 <a:solidFill>
                   <a:schemeClr val="tx1"/>
                 </a:solidFill>
@@ -2522,7 +2536,7 @@
     </p:spTree>
     <p:extLst>
       <p:ext uri="{BB962C8B-B14F-4D97-AF65-F5344CB8AC3E}">
-        <p14:creationId xmlns:p14="http://schemas.microsoft.com/office/powerpoint/2010/main" xmlns="" val="4036904755"/>
+        <p14:creationId xmlns:p14="http://schemas.microsoft.com/office/powerpoint/2010/main" val="4036904755"/>
       </p:ext>
     </p:extLst>
   </p:cSld>
@@ -2627,7 +2641,7 @@
     </p:spTree>
     <p:extLst>
       <p:ext uri="{BB962C8B-B14F-4D97-AF65-F5344CB8AC3E}">
-        <p14:creationId xmlns:p14="http://schemas.microsoft.com/office/powerpoint/2010/main" xmlns="" val="2244282078"/>
+        <p14:creationId xmlns:p14="http://schemas.microsoft.com/office/powerpoint/2010/main" val="2244282078"/>
       </p:ext>
     </p:extLst>
   </p:cSld>
@@ -2727,7 +2741,7 @@
     </p:spTree>
     <p:extLst>
       <p:ext uri="{BB962C8B-B14F-4D97-AF65-F5344CB8AC3E}">
-        <p14:creationId xmlns:p14="http://schemas.microsoft.com/office/powerpoint/2010/main" xmlns="" val="407480130"/>
+        <p14:creationId xmlns:p14="http://schemas.microsoft.com/office/powerpoint/2010/main" val="407480130"/>
       </p:ext>
     </p:extLst>
   </p:cSld>
@@ -5937,7 +5951,7 @@
     </p:spTree>
     <p:extLst>
       <p:ext uri="{BB962C8B-B14F-4D97-AF65-F5344CB8AC3E}">
-        <p14:creationId xmlns:p14="http://schemas.microsoft.com/office/powerpoint/2010/main" xmlns="" val="1735715938"/>
+        <p14:creationId xmlns:p14="http://schemas.microsoft.com/office/powerpoint/2010/main" val="1735715938"/>
       </p:ext>
     </p:extLst>
   </p:cSld>

</xml_diff>

<commit_message>
tekst voor camera sheet aangepast;refrein van gezang 130 verbeterd.
</commit_message>
<xml_diff>
--- a/src/main/resources/template.pptx
+++ b/src/main/resources/template.pptx
@@ -235,7 +235,7 @@
               <a:pPr>
                 <a:defRPr/>
               </a:pPr>
-              <a:t>21/01/2016</a:t>
+              <a:t>21/02/2016</a:t>
             </a:fld>
             <a:endParaRPr lang="en-GB"/>
           </a:p>
@@ -319,7 +319,7 @@
     </p:spTree>
     <p:extLst>
       <p:ext uri="{BB962C8B-B14F-4D97-AF65-F5344CB8AC3E}">
-        <p14:creationId xmlns:p14="http://schemas.microsoft.com/office/powerpoint/2010/main" val="2562165451"/>
+        <p14:creationId xmlns:p14="http://schemas.microsoft.com/office/powerpoint/2010/main" xmlns="" val="2562165451"/>
       </p:ext>
     </p:extLst>
   </p:cSld>
@@ -418,7 +418,7 @@
               <a:pPr>
                 <a:defRPr/>
               </a:pPr>
-              <a:t>21-1-2016</a:t>
+              <a:t>21-2-2016</a:t>
             </a:fld>
             <a:endParaRPr lang="nl-NL"/>
           </a:p>
@@ -598,7 +598,7 @@
     </p:spTree>
     <p:extLst>
       <p:ext uri="{BB962C8B-B14F-4D97-AF65-F5344CB8AC3E}">
-        <p14:creationId xmlns:p14="http://schemas.microsoft.com/office/powerpoint/2010/main" val="4277614354"/>
+        <p14:creationId xmlns:p14="http://schemas.microsoft.com/office/powerpoint/2010/main" xmlns="" val="4277614354"/>
       </p:ext>
     </p:extLst>
   </p:cSld>
@@ -1004,20 +1004,6 @@
               </a:rPr>
               <a:t>3.3.2</a:t>
             </a:r>
-            <a:endParaRPr lang="nl-NL" sz="1100" dirty="0" smtClean="0">
-              <a:solidFill>
-                <a:schemeClr val="bg1"/>
-              </a:solidFill>
-              <a:effectLst>
-                <a:outerShdw blurRad="38100" dist="38100" dir="2700000" algn="tl">
-                  <a:srgbClr val="000000">
-                    <a:alpha val="43137"/>
-                  </a:srgbClr>
-                </a:outerShdw>
-              </a:effectLst>
-              <a:ea typeface="+mj-ea"/>
-              <a:cs typeface="Tahoma" pitchFamily="34" charset="0"/>
-            </a:endParaRPr>
           </a:p>
         </p:txBody>
       </p:sp>
@@ -1699,7 +1685,7 @@
               <a:pPr>
                 <a:defRPr/>
               </a:pPr>
-              <a:t>21/01/2016</a:t>
+              <a:t>21/02/2016</a:t>
             </a:fld>
             <a:endParaRPr lang="en-GB"/>
           </a:p>
@@ -2066,7 +2052,7 @@
           <a:blip r:embed="rId2" cstate="print">
             <a:extLst>
               <a:ext uri="{28A0092B-C50C-407E-A947-70E740481C1C}">
-                <a14:useLocalDpi xmlns:a14="http://schemas.microsoft.com/office/drawing/2010/main" val="0"/>
+                <a14:useLocalDpi xmlns:a14="http://schemas.microsoft.com/office/drawing/2010/main" xmlns="" val="0"/>
               </a:ext>
             </a:extLst>
           </a:blip>
@@ -2089,14 +2075,14 @@
           </a:ln>
           <a:extLst>
             <a:ext uri="{909E8E84-426E-40DD-AFC4-6F175D3DCCD1}">
-              <a14:hiddenFill xmlns:a14="http://schemas.microsoft.com/office/drawing/2010/main">
+              <a14:hiddenFill xmlns:a14="http://schemas.microsoft.com/office/drawing/2010/main" xmlns="">
                 <a:solidFill>
                   <a:schemeClr val="accent1"/>
                 </a:solidFill>
               </a14:hiddenFill>
             </a:ext>
             <a:ext uri="{91240B29-F687-4F45-9708-019B960494DF}">
-              <a14:hiddenLine xmlns:a14="http://schemas.microsoft.com/office/drawing/2010/main" w="9525">
+              <a14:hiddenLine xmlns:a14="http://schemas.microsoft.com/office/drawing/2010/main" xmlns="" w="9525">
                 <a:solidFill>
                   <a:schemeClr val="tx1"/>
                 </a:solidFill>
@@ -2375,7 +2361,7 @@
         </p:nvSpPr>
         <p:spPr bwMode="auto">
           <a:xfrm>
-            <a:off x="2092768" y="4649634"/>
+            <a:off x="2092768" y="4025380"/>
             <a:ext cx="6832205" cy="707886"/>
           </a:xfrm>
           <a:prstGeom prst="rect">
@@ -2487,8 +2473,8 @@
         </p:nvSpPr>
         <p:spPr bwMode="auto">
           <a:xfrm>
-            <a:off x="960295" y="6067579"/>
-            <a:ext cx="7847227" cy="461665"/>
+            <a:off x="1855177" y="5082841"/>
+            <a:ext cx="7013892" cy="1569660"/>
           </a:xfrm>
           <a:prstGeom prst="rect">
             <a:avLst/>
@@ -2502,7 +2488,7 @@
           </a:ln>
         </p:spPr>
         <p:txBody>
-          <a:bodyPr wrap="none" lIns="720000" rIns="180000" rtlCol="0" anchor="t" anchorCtr="0">
+          <a:bodyPr wrap="square" lIns="720000" rIns="180000" numCol="2" rtlCol="0" anchor="t" anchorCtr="0">
             <a:spAutoFit/>
           </a:bodyPr>
           <a:lstStyle/>
@@ -2528,7 +2514,181 @@
                 <a:ea typeface="+mj-ea"/>
                 <a:cs typeface="Tahoma" pitchFamily="34" charset="0"/>
               </a:rPr>
-              <a:t>De opname kunt u terugkijken op www.mijnkerk.tv</a:t>
+              <a:t>Live meekijken:</a:t>
+            </a:r>
+          </a:p>
+          <a:p>
+            <a:pPr algn="l" fontAlgn="auto">
+              <a:spcAft>
+                <a:spcPts val="0"/>
+              </a:spcAft>
+            </a:pPr>
+            <a:r>
+              <a:rPr lang="nl-NL" sz="2400" dirty="0" smtClean="0">
+                <a:solidFill>
+                  <a:schemeClr val="bg1"/>
+                </a:solidFill>
+                <a:effectLst>
+                  <a:outerShdw blurRad="38100" dist="38100" dir="2700000" algn="tl">
+                    <a:srgbClr val="000000">
+                      <a:alpha val="43137"/>
+                    </a:srgbClr>
+                  </a:outerShdw>
+                </a:effectLst>
+                <a:latin typeface="Tahoma" pitchFamily="34" charset="0"/>
+                <a:ea typeface="+mj-ea"/>
+                <a:cs typeface="Tahoma" pitchFamily="34" charset="0"/>
+              </a:rPr>
+              <a:t>Opname terugkijken:</a:t>
+            </a:r>
+          </a:p>
+          <a:p>
+            <a:pPr algn="l" fontAlgn="auto">
+              <a:spcAft>
+                <a:spcPts val="0"/>
+              </a:spcAft>
+            </a:pPr>
+            <a:r>
+              <a:rPr lang="nl-NL" sz="2400" dirty="0" smtClean="0">
+                <a:solidFill>
+                  <a:schemeClr val="bg1"/>
+                </a:solidFill>
+                <a:effectLst>
+                  <a:outerShdw blurRad="38100" dist="38100" dir="2700000" algn="tl">
+                    <a:srgbClr val="000000">
+                      <a:alpha val="43137"/>
+                    </a:srgbClr>
+                  </a:outerShdw>
+                </a:effectLst>
+                <a:latin typeface="Tahoma" pitchFamily="34" charset="0"/>
+                <a:ea typeface="+mj-ea"/>
+                <a:cs typeface="Tahoma" pitchFamily="34" charset="0"/>
+              </a:rPr>
+              <a:t>Nabestellen:              </a:t>
+            </a:r>
+          </a:p>
+          <a:p>
+            <a:pPr algn="l" fontAlgn="auto">
+              <a:spcAft>
+                <a:spcPts val="0"/>
+              </a:spcAft>
+            </a:pPr>
+            <a:endParaRPr lang="nl-NL" sz="2400" dirty="0" smtClean="0">
+              <a:solidFill>
+                <a:schemeClr val="bg1"/>
+              </a:solidFill>
+              <a:effectLst>
+                <a:outerShdw blurRad="38100" dist="38100" dir="2700000" algn="tl">
+                  <a:srgbClr val="000000">
+                    <a:alpha val="43137"/>
+                  </a:srgbClr>
+                </a:outerShdw>
+              </a:effectLst>
+              <a:latin typeface="Tahoma" pitchFamily="34" charset="0"/>
+              <a:ea typeface="+mj-ea"/>
+              <a:cs typeface="Tahoma" pitchFamily="34" charset="0"/>
+            </a:endParaRPr>
+          </a:p>
+          <a:p>
+            <a:pPr algn="l" fontAlgn="auto">
+              <a:spcAft>
+                <a:spcPts val="0"/>
+              </a:spcAft>
+            </a:pPr>
+            <a:r>
+              <a:rPr lang="nl-NL" sz="2400" dirty="0" smtClean="0">
+                <a:solidFill>
+                  <a:schemeClr val="bg1"/>
+                </a:solidFill>
+                <a:effectLst>
+                  <a:outerShdw blurRad="38100" dist="38100" dir="2700000" algn="tl">
+                    <a:srgbClr val="000000">
+                      <a:alpha val="43137"/>
+                    </a:srgbClr>
+                  </a:outerShdw>
+                </a:effectLst>
+                <a:latin typeface="Tahoma" pitchFamily="34" charset="0"/>
+                <a:ea typeface="+mj-ea"/>
+                <a:cs typeface="Tahoma" pitchFamily="34" charset="0"/>
+              </a:rPr>
+              <a:t>www.mijnkerk.tv</a:t>
+            </a:r>
+          </a:p>
+          <a:p>
+            <a:pPr algn="l" fontAlgn="auto">
+              <a:spcAft>
+                <a:spcPts val="0"/>
+              </a:spcAft>
+            </a:pPr>
+            <a:r>
+              <a:rPr lang="nl-NL" sz="2400" kern="1200" dirty="0" err="1" smtClean="0">
+                <a:solidFill>
+                  <a:schemeClr val="bg1"/>
+                </a:solidFill>
+                <a:effectLst>
+                  <a:outerShdw blurRad="38100" dist="38100" dir="2700000" algn="tl">
+                    <a:srgbClr val="000000">
+                      <a:alpha val="43137"/>
+                    </a:srgbClr>
+                  </a:outerShdw>
+                </a:effectLst>
+                <a:latin typeface="Tahoma" pitchFamily="34" charset="0"/>
+                <a:ea typeface="+mn-ea"/>
+                <a:cs typeface="Tahoma" pitchFamily="34" charset="0"/>
+              </a:rPr>
+              <a:t>www.gkvassenpeelo.nl</a:t>
+            </a:r>
+            <a:endParaRPr lang="nl-NL" sz="2400" kern="1200" dirty="0" smtClean="0">
+              <a:solidFill>
+                <a:schemeClr val="bg1"/>
+              </a:solidFill>
+              <a:effectLst>
+                <a:outerShdw blurRad="38100" dist="38100" dir="2700000" algn="tl">
+                  <a:srgbClr val="000000">
+                    <a:alpha val="43137"/>
+                  </a:srgbClr>
+                </a:outerShdw>
+              </a:effectLst>
+              <a:latin typeface="Tahoma" pitchFamily="34" charset="0"/>
+              <a:ea typeface="+mn-ea"/>
+              <a:cs typeface="Tahoma" pitchFamily="34" charset="0"/>
+            </a:endParaRPr>
+          </a:p>
+          <a:p>
+            <a:pPr marL="0" marR="0" indent="0" algn="l" defTabSz="914400" rtl="0" eaLnBrk="1" fontAlgn="auto" latinLnBrk="0" hangingPunct="1">
+              <a:lnSpc>
+                <a:spcPct val="100000"/>
+              </a:lnSpc>
+              <a:spcBef>
+                <a:spcPct val="0"/>
+              </a:spcBef>
+              <a:spcAft>
+                <a:spcPts val="0"/>
+              </a:spcAft>
+              <a:buClrTx/>
+              <a:buSzTx/>
+              <a:buFontTx/>
+              <a:buNone/>
+              <a:tabLst/>
+              <a:defRPr/>
+            </a:pPr>
+            <a:r>
+              <a:rPr lang="nl-NL" sz="2400" kern="1200" dirty="0" smtClean="0">
+                <a:solidFill>
+                  <a:schemeClr val="bg1"/>
+                </a:solidFill>
+                <a:effectLst>
+                  <a:outerShdw blurRad="38100" dist="38100" dir="2700000" algn="tl">
+                    <a:srgbClr val="000000">
+                      <a:alpha val="43137"/>
+                    </a:srgbClr>
+                  </a:outerShdw>
+                </a:effectLst>
+                <a:latin typeface="Tahoma" pitchFamily="34" charset="0"/>
+                <a:ea typeface="+mn-ea"/>
+                <a:cs typeface="Tahoma" pitchFamily="34" charset="0"/>
+              </a:rPr>
+              <a:t>www.mijnkerk.tv</a:t>
             </a:r>
           </a:p>
         </p:txBody>
@@ -2536,7 +2696,7 @@
     </p:spTree>
     <p:extLst>
       <p:ext uri="{BB962C8B-B14F-4D97-AF65-F5344CB8AC3E}">
-        <p14:creationId xmlns:p14="http://schemas.microsoft.com/office/powerpoint/2010/main" val="4036904755"/>
+        <p14:creationId xmlns:p14="http://schemas.microsoft.com/office/powerpoint/2010/main" xmlns="" val="4036904755"/>
       </p:ext>
     </p:extLst>
   </p:cSld>
@@ -2641,7 +2801,7 @@
     </p:spTree>
     <p:extLst>
       <p:ext uri="{BB962C8B-B14F-4D97-AF65-F5344CB8AC3E}">
-        <p14:creationId xmlns:p14="http://schemas.microsoft.com/office/powerpoint/2010/main" val="2244282078"/>
+        <p14:creationId xmlns:p14="http://schemas.microsoft.com/office/powerpoint/2010/main" xmlns="" val="2244282078"/>
       </p:ext>
     </p:extLst>
   </p:cSld>
@@ -2741,7 +2901,7 @@
     </p:spTree>
     <p:extLst>
       <p:ext uri="{BB962C8B-B14F-4D97-AF65-F5344CB8AC3E}">
-        <p14:creationId xmlns:p14="http://schemas.microsoft.com/office/powerpoint/2010/main" val="407480130"/>
+        <p14:creationId xmlns:p14="http://schemas.microsoft.com/office/powerpoint/2010/main" xmlns="" val="407480130"/>
       </p:ext>
     </p:extLst>
   </p:cSld>
@@ -5951,7 +6111,7 @@
     </p:spTree>
     <p:extLst>
       <p:ext uri="{BB962C8B-B14F-4D97-AF65-F5344CB8AC3E}">
-        <p14:creationId xmlns:p14="http://schemas.microsoft.com/office/powerpoint/2010/main" val="1735715938"/>
+        <p14:creationId xmlns:p14="http://schemas.microsoft.com/office/powerpoint/2010/main" xmlns="" val="1735715938"/>
       </p:ext>
     </p:extLst>
   </p:cSld>

</xml_diff>

<commit_message>
normale weergave bij openen
</commit_message>
<xml_diff>
--- a/src/main/resources/template.pptx
+++ b/src/main/resources/template.pptx
@@ -235,7 +235,7 @@
               <a:pPr>
                 <a:defRPr/>
               </a:pPr>
-              <a:t>21/02/2016</a:t>
+              <a:t>22/03/2016</a:t>
             </a:fld>
             <a:endParaRPr lang="en-GB"/>
           </a:p>
@@ -319,7 +319,7 @@
     </p:spTree>
     <p:extLst>
       <p:ext uri="{BB962C8B-B14F-4D97-AF65-F5344CB8AC3E}">
-        <p14:creationId xmlns="" xmlns:p14="http://schemas.microsoft.com/office/powerpoint/2010/main" val="2562165451"/>
+        <p14:creationId xmlns:p14="http://schemas.microsoft.com/office/powerpoint/2010/main" xmlns="" val="2562165451"/>
       </p:ext>
     </p:extLst>
   </p:cSld>
@@ -418,7 +418,7 @@
               <a:pPr>
                 <a:defRPr/>
               </a:pPr>
-              <a:t>21-2-2016</a:t>
+              <a:t>22-3-2016</a:t>
             </a:fld>
             <a:endParaRPr lang="nl-NL"/>
           </a:p>
@@ -598,7 +598,7 @@
     </p:spTree>
     <p:extLst>
       <p:ext uri="{BB962C8B-B14F-4D97-AF65-F5344CB8AC3E}">
-        <p14:creationId xmlns="" xmlns:p14="http://schemas.microsoft.com/office/powerpoint/2010/main" val="4277614354"/>
+        <p14:creationId xmlns:p14="http://schemas.microsoft.com/office/powerpoint/2010/main" xmlns="" val="4277614354"/>
       </p:ext>
     </p:extLst>
   </p:cSld>
@@ -1004,20 +1004,6 @@
               </a:rPr>
               <a:t>3.3.3</a:t>
             </a:r>
-            <a:endParaRPr lang="nl-NL" sz="1100" dirty="0" smtClean="0">
-              <a:solidFill>
-                <a:schemeClr val="bg1"/>
-              </a:solidFill>
-              <a:effectLst>
-                <a:outerShdw blurRad="38100" dist="38100" dir="2700000" algn="tl">
-                  <a:srgbClr val="000000">
-                    <a:alpha val="43137"/>
-                  </a:srgbClr>
-                </a:outerShdw>
-              </a:effectLst>
-              <a:ea typeface="+mj-ea"/>
-              <a:cs typeface="Tahoma" pitchFamily="34" charset="0"/>
-            </a:endParaRPr>
           </a:p>
         </p:txBody>
       </p:sp>
@@ -1699,7 +1685,7 @@
               <a:pPr>
                 <a:defRPr/>
               </a:pPr>
-              <a:t>21/02/2016</a:t>
+              <a:t>22/03/2016</a:t>
             </a:fld>
             <a:endParaRPr lang="en-GB"/>
           </a:p>
@@ -2066,7 +2052,7 @@
           <a:blip r:embed="rId2" cstate="print">
             <a:extLst>
               <a:ext uri="{28A0092B-C50C-407E-A947-70E740481C1C}">
-                <a14:useLocalDpi xmlns="" xmlns:a14="http://schemas.microsoft.com/office/drawing/2010/main" val="0"/>
+                <a14:useLocalDpi xmlns:a14="http://schemas.microsoft.com/office/drawing/2010/main" xmlns="" val="0"/>
               </a:ext>
             </a:extLst>
           </a:blip>
@@ -2089,14 +2075,14 @@
           </a:ln>
           <a:extLst>
             <a:ext uri="{909E8E84-426E-40DD-AFC4-6F175D3DCCD1}">
-              <a14:hiddenFill xmlns="" xmlns:a14="http://schemas.microsoft.com/office/drawing/2010/main">
+              <a14:hiddenFill xmlns:a14="http://schemas.microsoft.com/office/drawing/2010/main" xmlns="">
                 <a:solidFill>
                   <a:schemeClr val="accent1"/>
                 </a:solidFill>
               </a14:hiddenFill>
             </a:ext>
             <a:ext uri="{91240B29-F687-4F45-9708-019B960494DF}">
-              <a14:hiddenLine xmlns="" xmlns:a14="http://schemas.microsoft.com/office/drawing/2010/main" w="9525">
+              <a14:hiddenLine xmlns:a14="http://schemas.microsoft.com/office/drawing/2010/main" xmlns="" w="9525">
                 <a:solidFill>
                   <a:schemeClr val="tx1"/>
                 </a:solidFill>
@@ -2710,7 +2696,7 @@
     </p:spTree>
     <p:extLst>
       <p:ext uri="{BB962C8B-B14F-4D97-AF65-F5344CB8AC3E}">
-        <p14:creationId xmlns="" xmlns:p14="http://schemas.microsoft.com/office/powerpoint/2010/main" val="4036904755"/>
+        <p14:creationId xmlns:p14="http://schemas.microsoft.com/office/powerpoint/2010/main" xmlns="" val="4036904755"/>
       </p:ext>
     </p:extLst>
   </p:cSld>
@@ -2815,7 +2801,7 @@
     </p:spTree>
     <p:extLst>
       <p:ext uri="{BB962C8B-B14F-4D97-AF65-F5344CB8AC3E}">
-        <p14:creationId xmlns="" xmlns:p14="http://schemas.microsoft.com/office/powerpoint/2010/main" val="2244282078"/>
+        <p14:creationId xmlns:p14="http://schemas.microsoft.com/office/powerpoint/2010/main" xmlns="" val="2244282078"/>
       </p:ext>
     </p:extLst>
   </p:cSld>
@@ -2915,7 +2901,7 @@
     </p:spTree>
     <p:extLst>
       <p:ext uri="{BB962C8B-B14F-4D97-AF65-F5344CB8AC3E}">
-        <p14:creationId xmlns="" xmlns:p14="http://schemas.microsoft.com/office/powerpoint/2010/main" val="407480130"/>
+        <p14:creationId xmlns:p14="http://schemas.microsoft.com/office/powerpoint/2010/main" xmlns="" val="407480130"/>
       </p:ext>
     </p:extLst>
   </p:cSld>
@@ -6125,7 +6111,7 @@
     </p:spTree>
     <p:extLst>
       <p:ext uri="{BB962C8B-B14F-4D97-AF65-F5344CB8AC3E}">
-        <p14:creationId xmlns="" xmlns:p14="http://schemas.microsoft.com/office/powerpoint/2010/main" val="1735715938"/>
+        <p14:creationId xmlns:p14="http://schemas.microsoft.com/office/powerpoint/2010/main" xmlns="" val="1735715938"/>
       </p:ext>
     </p:extLst>
   </p:cSld>

</xml_diff>

<commit_message>
updated version to 3.4
</commit_message>
<xml_diff>
--- a/src/main/resources/template.pptx
+++ b/src/main/resources/template.pptx
@@ -319,7 +319,7 @@
     </p:spTree>
     <p:extLst>
       <p:ext uri="{BB962C8B-B14F-4D97-AF65-F5344CB8AC3E}">
-        <p14:creationId xmlns="" xmlns:p14="http://schemas.microsoft.com/office/powerpoint/2010/main" val="2562165451"/>
+        <p14:creationId xmlns:p14="http://schemas.microsoft.com/office/powerpoint/2010/main" xmlns="" val="2562165451"/>
       </p:ext>
     </p:extLst>
   </p:cSld>
@@ -598,7 +598,7 @@
     </p:spTree>
     <p:extLst>
       <p:ext uri="{BB962C8B-B14F-4D97-AF65-F5344CB8AC3E}">
-        <p14:creationId xmlns="" xmlns:p14="http://schemas.microsoft.com/office/powerpoint/2010/main" val="4277614354"/>
+        <p14:creationId xmlns:p14="http://schemas.microsoft.com/office/powerpoint/2010/main" xmlns="" val="4277614354"/>
       </p:ext>
     </p:extLst>
   </p:cSld>
@@ -1002,7 +1002,7 @@
                 <a:ea typeface="+mj-ea"/>
                 <a:cs typeface="Tahoma" pitchFamily="34" charset="0"/>
               </a:rPr>
-              <a:t>3.3.4</a:t>
+              <a:t>3.4</a:t>
             </a:r>
             <a:endParaRPr lang="nl-NL" sz="1100" dirty="0" smtClean="0">
               <a:solidFill>
@@ -2066,7 +2066,7 @@
           <a:blip r:embed="rId2" cstate="print">
             <a:extLst>
               <a:ext uri="{28A0092B-C50C-407E-A947-70E740481C1C}">
-                <a14:useLocalDpi xmlns="" xmlns:a14="http://schemas.microsoft.com/office/drawing/2010/main" val="0"/>
+                <a14:useLocalDpi xmlns:a14="http://schemas.microsoft.com/office/drawing/2010/main" xmlns="" val="0"/>
               </a:ext>
             </a:extLst>
           </a:blip>
@@ -2089,14 +2089,14 @@
           </a:ln>
           <a:extLst>
             <a:ext uri="{909E8E84-426E-40DD-AFC4-6F175D3DCCD1}">
-              <a14:hiddenFill xmlns="" xmlns:a14="http://schemas.microsoft.com/office/drawing/2010/main">
+              <a14:hiddenFill xmlns:a14="http://schemas.microsoft.com/office/drawing/2010/main" xmlns="">
                 <a:solidFill>
                   <a:schemeClr val="accent1"/>
                 </a:solidFill>
               </a14:hiddenFill>
             </a:ext>
             <a:ext uri="{91240B29-F687-4F45-9708-019B960494DF}">
-              <a14:hiddenLine xmlns="" xmlns:a14="http://schemas.microsoft.com/office/drawing/2010/main" w="9525">
+              <a14:hiddenLine xmlns:a14="http://schemas.microsoft.com/office/drawing/2010/main" xmlns="" w="9525">
                 <a:solidFill>
                   <a:schemeClr val="tx1"/>
                 </a:solidFill>
@@ -2710,7 +2710,7 @@
     </p:spTree>
     <p:extLst>
       <p:ext uri="{BB962C8B-B14F-4D97-AF65-F5344CB8AC3E}">
-        <p14:creationId xmlns="" xmlns:p14="http://schemas.microsoft.com/office/powerpoint/2010/main" val="4036904755"/>
+        <p14:creationId xmlns:p14="http://schemas.microsoft.com/office/powerpoint/2010/main" xmlns="" val="4036904755"/>
       </p:ext>
     </p:extLst>
   </p:cSld>
@@ -2815,7 +2815,7 @@
     </p:spTree>
     <p:extLst>
       <p:ext uri="{BB962C8B-B14F-4D97-AF65-F5344CB8AC3E}">
-        <p14:creationId xmlns="" xmlns:p14="http://schemas.microsoft.com/office/powerpoint/2010/main" val="2244282078"/>
+        <p14:creationId xmlns:p14="http://schemas.microsoft.com/office/powerpoint/2010/main" xmlns="" val="2244282078"/>
       </p:ext>
     </p:extLst>
   </p:cSld>
@@ -2915,7 +2915,7 @@
     </p:spTree>
     <p:extLst>
       <p:ext uri="{BB962C8B-B14F-4D97-AF65-F5344CB8AC3E}">
-        <p14:creationId xmlns="" xmlns:p14="http://schemas.microsoft.com/office/powerpoint/2010/main" val="407480130"/>
+        <p14:creationId xmlns:p14="http://schemas.microsoft.com/office/powerpoint/2010/main" xmlns="" val="407480130"/>
       </p:ext>
     </p:extLst>
   </p:cSld>
@@ -6125,7 +6125,7 @@
     </p:spTree>
     <p:extLst>
       <p:ext uri="{BB962C8B-B14F-4D97-AF65-F5344CB8AC3E}">
-        <p14:creationId xmlns="" xmlns:p14="http://schemas.microsoft.com/office/powerpoint/2010/main" val="1735715938"/>
+        <p14:creationId xmlns:p14="http://schemas.microsoft.com/office/powerpoint/2010/main" xmlns="" val="1735715938"/>
       </p:ext>
     </p:extLst>
   </p:cSld>

</xml_diff>

<commit_message>
added opwekking 769, added new votum and groet
</commit_message>
<xml_diff>
--- a/src/main/resources/template.pptx
+++ b/src/main/resources/template.pptx
@@ -253,7 +253,7 @@
               <a:pPr>
                 <a:defRPr/>
               </a:pPr>
-              <a:t>13/11/2016</a:t>
+              <a:t>23/09/2017</a:t>
             </a:fld>
             <a:endParaRPr lang="en-GB"/>
           </a:p>
@@ -328,7 +328,7 @@
               <a:pPr>
                 <a:defRPr/>
               </a:pPr>
-              <a:t>‹nr.›</a:t>
+              <a:t>‹#›</a:t>
             </a:fld>
             <a:endParaRPr lang="en-GB"/>
           </a:p>
@@ -436,7 +436,7 @@
               <a:pPr>
                 <a:defRPr/>
               </a:pPr>
-              <a:t>13-11-2016</a:t>
+              <a:t>23-09-17</a:t>
             </a:fld>
             <a:endParaRPr lang="nl-NL"/>
           </a:p>
@@ -607,7 +607,7 @@
               <a:pPr>
                 <a:defRPr/>
               </a:pPr>
-              <a:t>‹nr.›</a:t>
+              <a:t>‹#›</a:t>
             </a:fld>
             <a:endParaRPr lang="nl-NL"/>
           </a:p>
@@ -1717,7 +1717,7 @@
               <a:pPr>
                 <a:defRPr/>
               </a:pPr>
-              <a:t>13/11/2016</a:t>
+              <a:t>23/09/2017</a:t>
             </a:fld>
             <a:endParaRPr lang="en-GB"/>
           </a:p>
@@ -1810,7 +1810,7 @@
               <a:pPr>
                 <a:defRPr/>
               </a:pPr>
-              <a:t>‹nr.›</a:t>
+              <a:t>‹#›</a:t>
             </a:fld>
             <a:endParaRPr lang="en-GB"/>
           </a:p>
@@ -2961,70 +2961,6 @@
           <a:chExt cx="0" cy="0"/>
         </a:xfrm>
       </p:grpSpPr>
-      <p:pic>
-        <p:nvPicPr>
-          <p:cNvPr id="2" name="Picture 2"/>
-          <p:cNvPicPr>
-            <a:picLocks noChangeAspect="1" noChangeArrowheads="1"/>
-          </p:cNvPicPr>
-          <p:nvPr/>
-        </p:nvPicPr>
-        <p:blipFill>
-          <a:blip r:embed="rId2" cstate="print"/>
-          <a:srcRect b="45238"/>
-          <a:stretch>
-            <a:fillRect/>
-          </a:stretch>
-        </p:blipFill>
-        <p:spPr bwMode="auto">
-          <a:xfrm>
-            <a:off x="179388" y="1700213"/>
-            <a:ext cx="8785225" cy="2582862"/>
-          </a:xfrm>
-          <a:prstGeom prst="rect">
-            <a:avLst/>
-          </a:prstGeom>
-          <a:noFill/>
-          <a:ln w="9525">
-            <a:noFill/>
-            <a:miter lim="800000"/>
-            <a:headEnd/>
-            <a:tailEnd/>
-          </a:ln>
-        </p:spPr>
-      </p:pic>
-      <p:pic>
-        <p:nvPicPr>
-          <p:cNvPr id="3" name="Picture 3"/>
-          <p:cNvPicPr>
-            <a:picLocks noChangeAspect="1" noChangeArrowheads="1"/>
-          </p:cNvPicPr>
-          <p:nvPr/>
-        </p:nvPicPr>
-        <p:blipFill>
-          <a:blip r:embed="rId2" cstate="print"/>
-          <a:srcRect l="77359" t="29018" r="943" b="45238"/>
-          <a:stretch>
-            <a:fillRect/>
-          </a:stretch>
-        </p:blipFill>
-        <p:spPr bwMode="auto">
-          <a:xfrm>
-            <a:off x="3492500" y="4437063"/>
-            <a:ext cx="2244725" cy="1647825"/>
-          </a:xfrm>
-          <a:prstGeom prst="rect">
-            <a:avLst/>
-          </a:prstGeom>
-          <a:noFill/>
-          <a:ln w="9525">
-            <a:noFill/>
-            <a:miter lim="800000"/>
-            <a:headEnd/>
-            <a:tailEnd/>
-          </a:ln>
-        </p:spPr>
-      </p:pic>
       <p:sp>
         <p:nvSpPr>
           <p:cNvPr id="4" name="Rechthoek 8"/>
@@ -3073,6 +3009,116 @@
           </a:p>
         </p:txBody>
       </p:sp>
+      <p:sp>
+        <p:nvSpPr>
+          <p:cNvPr id="7" name="Rectangle 6"/>
+          <p:cNvSpPr/>
+          <p:nvPr userDrawn="1"/>
+        </p:nvSpPr>
+        <p:spPr>
+          <a:xfrm>
+            <a:off x="5996539" y="77002"/>
+            <a:ext cx="3051208" cy="1742173"/>
+          </a:xfrm>
+          <a:prstGeom prst="rect">
+            <a:avLst/>
+          </a:prstGeom>
+          <a:solidFill>
+            <a:srgbClr val="000000"/>
+          </a:solidFill>
+          <a:ln>
+            <a:noFill/>
+          </a:ln>
+        </p:spPr>
+        <p:style>
+          <a:lnRef idx="2">
+            <a:schemeClr val="accent1">
+              <a:shade val="50000"/>
+            </a:schemeClr>
+          </a:lnRef>
+          <a:fillRef idx="1">
+            <a:schemeClr val="accent1"/>
+          </a:fillRef>
+          <a:effectRef idx="0">
+            <a:schemeClr val="accent1"/>
+          </a:effectRef>
+          <a:fontRef idx="minor">
+            <a:schemeClr val="lt1"/>
+          </a:fontRef>
+        </p:style>
+        <p:txBody>
+          <a:bodyPr rtlCol="0" anchor="ctr"/>
+          <a:lstStyle/>
+          <a:p>
+            <a:pPr algn="ctr"/>
+            <a:endParaRPr lang="en-US"/>
+          </a:p>
+        </p:txBody>
+      </p:sp>
+      <p:pic>
+        <p:nvPicPr>
+          <p:cNvPr id="8" name="Picture 7" descr="D:\Klaas\Documents\GKV PNG wit op zwart\Nlb 416 groet.png"/>
+          <p:cNvPicPr>
+            <a:picLocks noChangeAspect="1" noChangeArrowheads="1"/>
+          </p:cNvPicPr>
+          <p:nvPr userDrawn="1"/>
+        </p:nvPicPr>
+        <p:blipFill>
+          <a:blip r:embed="rId2">
+            <a:clrChange>
+              <a:clrFrom>
+                <a:srgbClr val="000000"/>
+              </a:clrFrom>
+              <a:clrTo>
+                <a:srgbClr val="000000">
+                  <a:alpha val="0"/>
+                </a:srgbClr>
+              </a:clrTo>
+            </a:clrChange>
+            <a:extLst>
+              <a:ext uri="{28A0092B-C50C-407E-A947-70E740481C1C}">
+                <a14:useLocalDpi xmlns:a14="http://schemas.microsoft.com/office/drawing/2010/main" val="0"/>
+              </a:ext>
+            </a:extLst>
+          </a:blip>
+          <a:srcRect/>
+          <a:stretch>
+            <a:fillRect/>
+          </a:stretch>
+        </p:blipFill>
+        <p:spPr bwMode="auto">
+          <a:xfrm>
+            <a:off x="71228" y="66233"/>
+            <a:ext cx="9001545" cy="6724094"/>
+          </a:xfrm>
+          <a:prstGeom prst="rect">
+            <a:avLst/>
+          </a:prstGeom>
+          <a:noFill/>
+          <a:ln>
+            <a:noFill/>
+          </a:ln>
+          <a:extLst>
+            <a:ext uri="{909E8E84-426E-40DD-AFC4-6F175D3DCCD1}">
+              <a14:hiddenFill xmlns:a14="http://schemas.microsoft.com/office/drawing/2010/main">
+                <a:solidFill>
+                  <a:srgbClr val="FFFFFF"/>
+                </a:solidFill>
+              </a14:hiddenFill>
+            </a:ext>
+            <a:ext uri="{91240B29-F687-4F45-9708-019B960494DF}">
+              <a14:hiddenLine xmlns:a14="http://schemas.microsoft.com/office/drawing/2010/main" w="9525">
+                <a:solidFill>
+                  <a:srgbClr val="000000"/>
+                </a:solidFill>
+                <a:miter lim="800000"/>
+                <a:headEnd/>
+                <a:tailEnd/>
+              </a14:hiddenLine>
+            </a:ext>
+          </a:extLst>
+        </p:spPr>
+      </p:pic>
     </p:spTree>
   </p:cSld>
   <p:clrMapOvr>
@@ -4910,16 +4956,80 @@
           <a:chExt cx="0" cy="0"/>
         </a:xfrm>
       </p:grpSpPr>
+      <p:pic>
+        <p:nvPicPr>
+          <p:cNvPr id="9" name="Picture 8" descr="D:\Klaas\Documents\GKV PNG wit op zwart\Nlb 416 Zegen 2.png"/>
+          <p:cNvPicPr>
+            <a:picLocks noChangeAspect="1" noChangeArrowheads="1"/>
+          </p:cNvPicPr>
+          <p:nvPr userDrawn="1"/>
+        </p:nvPicPr>
+        <p:blipFill>
+          <a:blip r:embed="rId2">
+            <a:clrChange>
+              <a:clrFrom>
+                <a:srgbClr val="000000"/>
+              </a:clrFrom>
+              <a:clrTo>
+                <a:srgbClr val="000000">
+                  <a:alpha val="0"/>
+                </a:srgbClr>
+              </a:clrTo>
+            </a:clrChange>
+            <a:extLst>
+              <a:ext uri="{28A0092B-C50C-407E-A947-70E740481C1C}">
+                <a14:useLocalDpi xmlns:a14="http://schemas.microsoft.com/office/drawing/2010/main" val="0"/>
+              </a:ext>
+            </a:extLst>
+          </a:blip>
+          <a:srcRect/>
+          <a:stretch>
+            <a:fillRect/>
+          </a:stretch>
+        </p:blipFill>
+        <p:spPr bwMode="auto">
+          <a:xfrm>
+            <a:off x="142455" y="-1512195"/>
+            <a:ext cx="9001545" cy="6724094"/>
+          </a:xfrm>
+          <a:prstGeom prst="rect">
+            <a:avLst/>
+          </a:prstGeom>
+          <a:noFill/>
+          <a:ln>
+            <a:noFill/>
+          </a:ln>
+          <a:extLst>
+            <a:ext uri="{909E8E84-426E-40DD-AFC4-6F175D3DCCD1}">
+              <a14:hiddenFill xmlns:a14="http://schemas.microsoft.com/office/drawing/2010/main">
+                <a:solidFill>
+                  <a:srgbClr val="FFFFFF"/>
+                </a:solidFill>
+              </a14:hiddenFill>
+            </a:ext>
+            <a:ext uri="{91240B29-F687-4F45-9708-019B960494DF}">
+              <a14:hiddenLine xmlns:a14="http://schemas.microsoft.com/office/drawing/2010/main" w="9525">
+                <a:solidFill>
+                  <a:srgbClr val="000000"/>
+                </a:solidFill>
+                <a:miter lim="800000"/>
+                <a:headEnd/>
+                <a:tailEnd/>
+              </a14:hiddenLine>
+            </a:ext>
+          </a:extLst>
+        </p:spPr>
+      </p:pic>
       <p:sp>
         <p:nvSpPr>
-          <p:cNvPr id="2" name="Rectangle 1"/>
-          <p:cNvSpPr/>
-          <p:nvPr/>
+          <p:cNvPr id="10" name="Tekstvak 1"/>
+          <p:cNvSpPr txBox="1"/>
+          <p:nvPr userDrawn="1"/>
         </p:nvSpPr>
-        <p:spPr>
-          <a:xfrm>
-            <a:off x="5795963" y="0"/>
-            <a:ext cx="3348037" cy="1844675"/>
+        <p:spPr bwMode="auto">
+          <a:xfrm>
+            <a:off x="0" y="-97971"/>
+            <a:ext cx="9144000" cy="2895600"/>
           </a:xfrm>
           <a:prstGeom prst="rect">
             <a:avLst/>
@@ -4927,52 +5037,6 @@
           <a:solidFill>
             <a:srgbClr val="000000"/>
           </a:solidFill>
-          <a:ln>
-            <a:noFill/>
-          </a:ln>
-        </p:spPr>
-        <p:style>
-          <a:lnRef idx="2">
-            <a:schemeClr val="accent1">
-              <a:shade val="50000"/>
-            </a:schemeClr>
-          </a:lnRef>
-          <a:fillRef idx="1">
-            <a:schemeClr val="accent1"/>
-          </a:fillRef>
-          <a:effectRef idx="0">
-            <a:schemeClr val="accent1"/>
-          </a:effectRef>
-          <a:fontRef idx="minor">
-            <a:schemeClr val="lt1"/>
-          </a:fontRef>
-        </p:style>
-        <p:txBody>
-          <a:bodyPr anchor="ctr"/>
-          <a:lstStyle/>
-          <a:p>
-            <a:pPr algn="ctr">
-              <a:defRPr/>
-            </a:pPr>
-            <a:endParaRPr lang="en-GB"/>
-          </a:p>
-        </p:txBody>
-      </p:sp>
-      <p:sp>
-        <p:nvSpPr>
-          <p:cNvPr id="3" name="TextBox 2"/>
-          <p:cNvSpPr txBox="1"/>
-          <p:nvPr/>
-        </p:nvSpPr>
-        <p:spPr bwMode="auto">
-          <a:xfrm>
-            <a:off x="0" y="0"/>
-            <a:ext cx="6443663" cy="1844675"/>
-          </a:xfrm>
-          <a:prstGeom prst="rect">
-            <a:avLst/>
-          </a:prstGeom>
-          <a:noFill/>
           <a:ln w="9525">
             <a:noFill/>
             <a:miter lim="800000"/>
@@ -4981,540 +5045,31 @@
           </a:ln>
         </p:spPr>
         <p:txBody>
-          <a:bodyPr wrap="none" lIns="180000" rIns="180000" anchor="b"/>
+          <a:bodyPr wrap="square" lIns="720000" rIns="180000" rtlCol="0" anchor="t" anchorCtr="0">
+            <a:spAutoFit/>
+          </a:bodyPr>
           <a:lstStyle/>
           <a:p>
             <a:pPr fontAlgn="auto">
               <a:spcAft>
                 <a:spcPts val="0"/>
               </a:spcAft>
-              <a:defRPr/>
-            </a:pPr>
-            <a:r>
-              <a:rPr lang="en-GB" sz="3000" dirty="0" err="1">
-                <a:solidFill>
-                  <a:schemeClr val="tx1">
-                    <a:lumMod val="95000"/>
-                  </a:schemeClr>
-                </a:solidFill>
-                <a:effectLst/>
-              </a:rPr>
-              <a:t>Gezongen</a:t>
-            </a:r>
-            <a:r>
-              <a:rPr lang="en-GB" sz="3000" dirty="0">
-                <a:solidFill>
-                  <a:schemeClr val="tx1">
-                    <a:lumMod val="95000"/>
-                  </a:schemeClr>
-                </a:solidFill>
-                <a:effectLst/>
-              </a:rPr>
-              <a:t> Amen</a:t>
-            </a:r>
-            <a:endParaRPr lang="en-GB" sz="3000" dirty="0">
+            </a:pPr>
+            <a:endParaRPr lang="nl-NL" sz="2800" dirty="0" smtClean="0">
               <a:solidFill>
-                <a:schemeClr val="tx1">
-                  <a:lumMod val="95000"/>
-                </a:schemeClr>
+                <a:schemeClr val="bg1"/>
               </a:solidFill>
-              <a:effectLst/>
+              <a:effectLst>
+                <a:outerShdw blurRad="38100" dist="38100" dir="2700000" algn="tl">
+                  <a:srgbClr val="000000">
+                    <a:alpha val="43137"/>
+                  </a:srgbClr>
+                </a:outerShdw>
+              </a:effectLst>
+              <a:latin typeface="Tahoma" pitchFamily="34" charset="0"/>
               <a:ea typeface="+mj-ea"/>
               <a:cs typeface="Tahoma" pitchFamily="34" charset="0"/>
             </a:endParaRPr>
-          </a:p>
-          <a:p>
-            <a:pPr fontAlgn="auto">
-              <a:spcAft>
-                <a:spcPts val="0"/>
-              </a:spcAft>
-              <a:defRPr/>
-            </a:pPr>
-            <a:endParaRPr lang="en-GB" sz="2800" dirty="0">
-              <a:solidFill>
-                <a:schemeClr val="tx1">
-                  <a:lumMod val="95000"/>
-                </a:schemeClr>
-              </a:solidFill>
-              <a:effectLst/>
-            </a:endParaRPr>
-          </a:p>
-        </p:txBody>
-      </p:sp>
-      <p:pic>
-        <p:nvPicPr>
-          <p:cNvPr id="4" name="Picture 2"/>
-          <p:cNvPicPr>
-            <a:picLocks noChangeAspect="1" noChangeArrowheads="1"/>
-          </p:cNvPicPr>
-          <p:nvPr/>
-        </p:nvPicPr>
-        <p:blipFill>
-          <a:blip r:embed="rId2" cstate="print"/>
-          <a:srcRect l="9837" t="15523" b="33356"/>
-          <a:stretch>
-            <a:fillRect/>
-          </a:stretch>
-        </p:blipFill>
-        <p:spPr bwMode="auto">
-          <a:xfrm>
-            <a:off x="709613" y="1484313"/>
-            <a:ext cx="8242300" cy="4537075"/>
-          </a:xfrm>
-          <a:prstGeom prst="rect">
-            <a:avLst/>
-          </a:prstGeom>
-          <a:noFill/>
-          <a:ln w="9525">
-            <a:noFill/>
-            <a:miter lim="800000"/>
-            <a:headEnd/>
-            <a:tailEnd/>
-          </a:ln>
-        </p:spPr>
-      </p:pic>
-      <p:sp>
-        <p:nvSpPr>
-          <p:cNvPr id="5" name="Tekstvak 5"/>
-          <p:cNvSpPr txBox="1">
-            <a:spLocks noChangeArrowheads="1"/>
-          </p:cNvSpPr>
-          <p:nvPr/>
-        </p:nvSpPr>
-        <p:spPr bwMode="auto">
-          <a:xfrm>
-            <a:off x="1504950" y="6051550"/>
-            <a:ext cx="7127875" cy="369888"/>
-          </a:xfrm>
-          <a:prstGeom prst="rect">
-            <a:avLst/>
-          </a:prstGeom>
-          <a:noFill/>
-          <a:ln>
-            <a:noFill/>
-          </a:ln>
-          <a:extLst/>
-        </p:spPr>
-        <p:txBody>
-          <a:bodyPr>
-            <a:spAutoFit/>
-          </a:bodyPr>
-          <a:lstStyle>
-            <a:lvl1pPr eaLnBrk="0" hangingPunct="0">
-              <a:defRPr>
-                <a:solidFill>
-                  <a:schemeClr val="tx1"/>
-                </a:solidFill>
-                <a:latin typeface="Arial" charset="0"/>
-                <a:cs typeface="Arial" charset="0"/>
-              </a:defRPr>
-            </a:lvl1pPr>
-            <a:lvl2pPr marL="742950" indent="-285750" eaLnBrk="0" hangingPunct="0">
-              <a:defRPr>
-                <a:solidFill>
-                  <a:schemeClr val="tx1"/>
-                </a:solidFill>
-                <a:latin typeface="Arial" charset="0"/>
-                <a:cs typeface="Arial" charset="0"/>
-              </a:defRPr>
-            </a:lvl2pPr>
-            <a:lvl3pPr marL="1143000" indent="-228600" eaLnBrk="0" hangingPunct="0">
-              <a:defRPr>
-                <a:solidFill>
-                  <a:schemeClr val="tx1"/>
-                </a:solidFill>
-                <a:latin typeface="Arial" charset="0"/>
-                <a:cs typeface="Arial" charset="0"/>
-              </a:defRPr>
-            </a:lvl3pPr>
-            <a:lvl4pPr marL="1600200" indent="-228600" eaLnBrk="0" hangingPunct="0">
-              <a:defRPr>
-                <a:solidFill>
-                  <a:schemeClr val="tx1"/>
-                </a:solidFill>
-                <a:latin typeface="Arial" charset="0"/>
-                <a:cs typeface="Arial" charset="0"/>
-              </a:defRPr>
-            </a:lvl4pPr>
-            <a:lvl5pPr marL="2057400" indent="-228600" eaLnBrk="0" hangingPunct="0">
-              <a:defRPr>
-                <a:solidFill>
-                  <a:schemeClr val="tx1"/>
-                </a:solidFill>
-                <a:latin typeface="Arial" charset="0"/>
-                <a:cs typeface="Arial" charset="0"/>
-              </a:defRPr>
-            </a:lvl5pPr>
-            <a:lvl6pPr marL="2514600" indent="-228600" eaLnBrk="0" fontAlgn="base" hangingPunct="0">
-              <a:spcBef>
-                <a:spcPct val="0"/>
-              </a:spcBef>
-              <a:spcAft>
-                <a:spcPct val="0"/>
-              </a:spcAft>
-              <a:defRPr>
-                <a:solidFill>
-                  <a:schemeClr val="tx1"/>
-                </a:solidFill>
-                <a:latin typeface="Arial" charset="0"/>
-                <a:cs typeface="Arial" charset="0"/>
-              </a:defRPr>
-            </a:lvl6pPr>
-            <a:lvl7pPr marL="2971800" indent="-228600" eaLnBrk="0" fontAlgn="base" hangingPunct="0">
-              <a:spcBef>
-                <a:spcPct val="0"/>
-              </a:spcBef>
-              <a:spcAft>
-                <a:spcPct val="0"/>
-              </a:spcAft>
-              <a:defRPr>
-                <a:solidFill>
-                  <a:schemeClr val="tx1"/>
-                </a:solidFill>
-                <a:latin typeface="Arial" charset="0"/>
-                <a:cs typeface="Arial" charset="0"/>
-              </a:defRPr>
-            </a:lvl7pPr>
-            <a:lvl8pPr marL="3429000" indent="-228600" eaLnBrk="0" fontAlgn="base" hangingPunct="0">
-              <a:spcBef>
-                <a:spcPct val="0"/>
-              </a:spcBef>
-              <a:spcAft>
-                <a:spcPct val="0"/>
-              </a:spcAft>
-              <a:defRPr>
-                <a:solidFill>
-                  <a:schemeClr val="tx1"/>
-                </a:solidFill>
-                <a:latin typeface="Arial" charset="0"/>
-                <a:cs typeface="Arial" charset="0"/>
-              </a:defRPr>
-            </a:lvl8pPr>
-            <a:lvl9pPr marL="3886200" indent="-228600" eaLnBrk="0" fontAlgn="base" hangingPunct="0">
-              <a:spcBef>
-                <a:spcPct val="0"/>
-              </a:spcBef>
-              <a:spcAft>
-                <a:spcPct val="0"/>
-              </a:spcAft>
-              <a:defRPr>
-                <a:solidFill>
-                  <a:schemeClr val="tx1"/>
-                </a:solidFill>
-                <a:latin typeface="Arial" charset="0"/>
-                <a:cs typeface="Arial" charset="0"/>
-              </a:defRPr>
-            </a:lvl9pPr>
-          </a:lstStyle>
-          <a:p>
-            <a:pPr eaLnBrk="1" hangingPunct="1">
-              <a:defRPr/>
-            </a:pPr>
-            <a:r>
-              <a:rPr lang="nl-NL" dirty="0" smtClean="0">
-                <a:solidFill>
-                  <a:schemeClr val="bg1"/>
-                </a:solidFill>
-              </a:rPr>
-              <a:t>A -      men,      A -       men,     A        -            -          -          men</a:t>
-            </a:r>
-          </a:p>
-        </p:txBody>
-      </p:sp>
-      <p:sp>
-        <p:nvSpPr>
-          <p:cNvPr id="6" name="Tekstvak 6"/>
-          <p:cNvSpPr txBox="1">
-            <a:spLocks noChangeArrowheads="1"/>
-          </p:cNvSpPr>
-          <p:nvPr/>
-        </p:nvSpPr>
-        <p:spPr bwMode="auto">
-          <a:xfrm>
-            <a:off x="347663" y="1773238"/>
-            <a:ext cx="339725" cy="4246562"/>
-          </a:xfrm>
-          <a:prstGeom prst="rect">
-            <a:avLst/>
-          </a:prstGeom>
-          <a:noFill/>
-          <a:ln>
-            <a:noFill/>
-          </a:ln>
-          <a:extLst/>
-        </p:spPr>
-        <p:txBody>
-          <a:bodyPr wrap="none">
-            <a:spAutoFit/>
-          </a:bodyPr>
-          <a:lstStyle>
-            <a:lvl1pPr eaLnBrk="0" hangingPunct="0">
-              <a:defRPr>
-                <a:solidFill>
-                  <a:schemeClr val="tx1"/>
-                </a:solidFill>
-                <a:latin typeface="Arial" charset="0"/>
-                <a:cs typeface="Arial" charset="0"/>
-              </a:defRPr>
-            </a:lvl1pPr>
-            <a:lvl2pPr marL="742950" indent="-285750" eaLnBrk="0" hangingPunct="0">
-              <a:defRPr>
-                <a:solidFill>
-                  <a:schemeClr val="tx1"/>
-                </a:solidFill>
-                <a:latin typeface="Arial" charset="0"/>
-                <a:cs typeface="Arial" charset="0"/>
-              </a:defRPr>
-            </a:lvl2pPr>
-            <a:lvl3pPr marL="1143000" indent="-228600" eaLnBrk="0" hangingPunct="0">
-              <a:defRPr>
-                <a:solidFill>
-                  <a:schemeClr val="tx1"/>
-                </a:solidFill>
-                <a:latin typeface="Arial" charset="0"/>
-                <a:cs typeface="Arial" charset="0"/>
-              </a:defRPr>
-            </a:lvl3pPr>
-            <a:lvl4pPr marL="1600200" indent="-228600" eaLnBrk="0" hangingPunct="0">
-              <a:defRPr>
-                <a:solidFill>
-                  <a:schemeClr val="tx1"/>
-                </a:solidFill>
-                <a:latin typeface="Arial" charset="0"/>
-                <a:cs typeface="Arial" charset="0"/>
-              </a:defRPr>
-            </a:lvl4pPr>
-            <a:lvl5pPr marL="2057400" indent="-228600" eaLnBrk="0" hangingPunct="0">
-              <a:defRPr>
-                <a:solidFill>
-                  <a:schemeClr val="tx1"/>
-                </a:solidFill>
-                <a:latin typeface="Arial" charset="0"/>
-                <a:cs typeface="Arial" charset="0"/>
-              </a:defRPr>
-            </a:lvl5pPr>
-            <a:lvl6pPr marL="2514600" indent="-228600" eaLnBrk="0" fontAlgn="base" hangingPunct="0">
-              <a:spcBef>
-                <a:spcPct val="0"/>
-              </a:spcBef>
-              <a:spcAft>
-                <a:spcPct val="0"/>
-              </a:spcAft>
-              <a:defRPr>
-                <a:solidFill>
-                  <a:schemeClr val="tx1"/>
-                </a:solidFill>
-                <a:latin typeface="Arial" charset="0"/>
-                <a:cs typeface="Arial" charset="0"/>
-              </a:defRPr>
-            </a:lvl6pPr>
-            <a:lvl7pPr marL="2971800" indent="-228600" eaLnBrk="0" fontAlgn="base" hangingPunct="0">
-              <a:spcBef>
-                <a:spcPct val="0"/>
-              </a:spcBef>
-              <a:spcAft>
-                <a:spcPct val="0"/>
-              </a:spcAft>
-              <a:defRPr>
-                <a:solidFill>
-                  <a:schemeClr val="tx1"/>
-                </a:solidFill>
-                <a:latin typeface="Arial" charset="0"/>
-                <a:cs typeface="Arial" charset="0"/>
-              </a:defRPr>
-            </a:lvl7pPr>
-            <a:lvl8pPr marL="3429000" indent="-228600" eaLnBrk="0" fontAlgn="base" hangingPunct="0">
-              <a:spcBef>
-                <a:spcPct val="0"/>
-              </a:spcBef>
-              <a:spcAft>
-                <a:spcPct val="0"/>
-              </a:spcAft>
-              <a:defRPr>
-                <a:solidFill>
-                  <a:schemeClr val="tx1"/>
-                </a:solidFill>
-                <a:latin typeface="Arial" charset="0"/>
-                <a:cs typeface="Arial" charset="0"/>
-              </a:defRPr>
-            </a:lvl8pPr>
-            <a:lvl9pPr marL="3886200" indent="-228600" eaLnBrk="0" fontAlgn="base" hangingPunct="0">
-              <a:spcBef>
-                <a:spcPct val="0"/>
-              </a:spcBef>
-              <a:spcAft>
-                <a:spcPct val="0"/>
-              </a:spcAft>
-              <a:defRPr>
-                <a:solidFill>
-                  <a:schemeClr val="tx1"/>
-                </a:solidFill>
-                <a:latin typeface="Arial" charset="0"/>
-                <a:cs typeface="Arial" charset="0"/>
-              </a:defRPr>
-            </a:lvl9pPr>
-          </a:lstStyle>
-          <a:p>
-            <a:pPr eaLnBrk="1" hangingPunct="1">
-              <a:defRPr/>
-            </a:pPr>
-            <a:r>
-              <a:rPr lang="nl-NL" dirty="0" smtClean="0">
-                <a:solidFill>
-                  <a:schemeClr val="bg1"/>
-                </a:solidFill>
-              </a:rPr>
-              <a:t>S</a:t>
-            </a:r>
-          </a:p>
-          <a:p>
-            <a:pPr eaLnBrk="1" hangingPunct="1">
-              <a:defRPr/>
-            </a:pPr>
-            <a:endParaRPr lang="nl-NL" dirty="0" smtClean="0">
-              <a:solidFill>
-                <a:schemeClr val="bg1"/>
-              </a:solidFill>
-            </a:endParaRPr>
-          </a:p>
-          <a:p>
-            <a:pPr eaLnBrk="1" hangingPunct="1">
-              <a:defRPr/>
-            </a:pPr>
-            <a:endParaRPr lang="nl-NL" dirty="0" smtClean="0">
-              <a:solidFill>
-                <a:schemeClr val="bg1"/>
-              </a:solidFill>
-            </a:endParaRPr>
-          </a:p>
-          <a:p>
-            <a:pPr eaLnBrk="1" hangingPunct="1">
-              <a:defRPr/>
-            </a:pPr>
-            <a:endParaRPr lang="nl-NL" dirty="0" smtClean="0">
-              <a:solidFill>
-                <a:schemeClr val="bg1"/>
-              </a:solidFill>
-            </a:endParaRPr>
-          </a:p>
-          <a:p>
-            <a:pPr eaLnBrk="1" hangingPunct="1">
-              <a:defRPr/>
-            </a:pPr>
-            <a:endParaRPr lang="nl-NL" dirty="0" smtClean="0">
-              <a:solidFill>
-                <a:schemeClr val="bg1"/>
-              </a:solidFill>
-            </a:endParaRPr>
-          </a:p>
-          <a:p>
-            <a:pPr eaLnBrk="1" hangingPunct="1">
-              <a:defRPr/>
-            </a:pPr>
-            <a:r>
-              <a:rPr lang="nl-NL" dirty="0" smtClean="0">
-                <a:solidFill>
-                  <a:schemeClr val="bg1"/>
-                </a:solidFill>
-              </a:rPr>
-              <a:t>A</a:t>
-            </a:r>
-          </a:p>
-          <a:p>
-            <a:pPr eaLnBrk="1" hangingPunct="1">
-              <a:defRPr/>
-            </a:pPr>
-            <a:endParaRPr lang="nl-NL" dirty="0" smtClean="0">
-              <a:solidFill>
-                <a:schemeClr val="bg1"/>
-              </a:solidFill>
-            </a:endParaRPr>
-          </a:p>
-          <a:p>
-            <a:pPr eaLnBrk="1" hangingPunct="1">
-              <a:defRPr/>
-            </a:pPr>
-            <a:endParaRPr lang="nl-NL" dirty="0" smtClean="0">
-              <a:solidFill>
-                <a:schemeClr val="bg1"/>
-              </a:solidFill>
-            </a:endParaRPr>
-          </a:p>
-          <a:p>
-            <a:pPr eaLnBrk="1" hangingPunct="1">
-              <a:defRPr/>
-            </a:pPr>
-            <a:endParaRPr lang="nl-NL" dirty="0" smtClean="0">
-              <a:solidFill>
-                <a:schemeClr val="bg1"/>
-              </a:solidFill>
-            </a:endParaRPr>
-          </a:p>
-          <a:p>
-            <a:pPr eaLnBrk="1" hangingPunct="1">
-              <a:defRPr/>
-            </a:pPr>
-            <a:r>
-              <a:rPr lang="nl-NL" dirty="0" smtClean="0">
-                <a:solidFill>
-                  <a:schemeClr val="bg1"/>
-                </a:solidFill>
-              </a:rPr>
-              <a:t>T</a:t>
-            </a:r>
-          </a:p>
-          <a:p>
-            <a:pPr eaLnBrk="1" hangingPunct="1">
-              <a:defRPr/>
-            </a:pPr>
-            <a:endParaRPr lang="nl-NL" dirty="0" smtClean="0">
-              <a:solidFill>
-                <a:schemeClr val="bg1"/>
-              </a:solidFill>
-            </a:endParaRPr>
-          </a:p>
-          <a:p>
-            <a:pPr eaLnBrk="1" hangingPunct="1">
-              <a:defRPr/>
-            </a:pPr>
-            <a:endParaRPr lang="nl-NL" dirty="0" smtClean="0">
-              <a:solidFill>
-                <a:schemeClr val="bg1"/>
-              </a:solidFill>
-            </a:endParaRPr>
-          </a:p>
-          <a:p>
-            <a:pPr eaLnBrk="1" hangingPunct="1">
-              <a:defRPr/>
-            </a:pPr>
-            <a:endParaRPr lang="nl-NL" dirty="0" smtClean="0">
-              <a:solidFill>
-                <a:schemeClr val="bg1"/>
-              </a:solidFill>
-            </a:endParaRPr>
-          </a:p>
-          <a:p>
-            <a:pPr eaLnBrk="1" hangingPunct="1">
-              <a:defRPr/>
-            </a:pPr>
-            <a:endParaRPr lang="nl-NL" dirty="0" smtClean="0">
-              <a:solidFill>
-                <a:schemeClr val="bg1"/>
-              </a:solidFill>
-            </a:endParaRPr>
-          </a:p>
-          <a:p>
-            <a:pPr eaLnBrk="1" hangingPunct="1">
-              <a:defRPr/>
-            </a:pPr>
-            <a:r>
-              <a:rPr lang="nl-NL" dirty="0" smtClean="0">
-                <a:solidFill>
-                  <a:schemeClr val="bg1"/>
-                </a:solidFill>
-              </a:rPr>
-              <a:t>B</a:t>
-            </a:r>
           </a:p>
         </p:txBody>
       </p:sp>

</xml_diff>

<commit_message>
dia verhouding naar 16:9
</commit_message>
<xml_diff>
--- a/src/main/resources/template.pptx
+++ b/src/main/resources/template.pptx
@@ -13,7 +13,7 @@
   <p:sldIdLst>
     <p:sldId id="256" r:id="rId2"/>
   </p:sldIdLst>
-  <p:sldSz cx="9144000" cy="6858000" type="screen4x3"/>
+  <p:sldSz cx="12192000" cy="6858000"/>
   <p:notesSz cx="6858000" cy="9144000"/>
   <p:defaultTextStyle>
     <a:defPPr>
@@ -143,12 +143,12 @@
   <p:extLst>
     <p:ext uri="{EFAFB233-063F-42B5-8137-9DF3F51BA10A}">
       <p15:sldGuideLst xmlns:p15="http://schemas.microsoft.com/office/powerpoint/2012/main">
-        <p15:guide id="1" orient="horz" pos="2160">
+        <p15:guide id="1" orient="horz" pos="2160" userDrawn="1">
           <p15:clr>
             <a:srgbClr val="A4A3A4"/>
           </p15:clr>
         </p15:guide>
-        <p15:guide id="2" pos="2880">
+        <p15:guide id="2" pos="3840" userDrawn="1">
           <p15:clr>
             <a:srgbClr val="A4A3A4"/>
           </p15:clr>
@@ -253,7 +253,7 @@
               <a:pPr>
                 <a:defRPr/>
               </a:pPr>
-              <a:t>23/09/2017</a:t>
+              <a:t>11/01/2018</a:t>
             </a:fld>
             <a:endParaRPr lang="en-GB"/>
           </a:p>
@@ -436,7 +436,7 @@
               <a:pPr>
                 <a:defRPr/>
               </a:pPr>
-              <a:t>23-09-17</a:t>
+              <a:t>11-01-18</a:t>
             </a:fld>
             <a:endParaRPr lang="nl-NL"/>
           </a:p>
@@ -454,8 +454,8 @@
         </p:nvSpPr>
         <p:spPr>
           <a:xfrm>
-            <a:off x="1143000" y="685800"/>
-            <a:ext cx="4572000" cy="3429000"/>
+            <a:off x="381000" y="685800"/>
+            <a:ext cx="6096000" cy="3429000"/>
           </a:xfrm>
           <a:prstGeom prst="rect">
             <a:avLst/>
@@ -774,7 +774,7 @@
         <p:spPr bwMode="auto">
           <a:xfrm>
             <a:off x="0" y="1628775"/>
-            <a:ext cx="9144000" cy="3455988"/>
+            <a:ext cx="12192000" cy="3455988"/>
           </a:xfrm>
           <a:prstGeom prst="rect">
             <a:avLst/>
@@ -979,8 +979,8 @@
         </p:nvSpPr>
         <p:spPr bwMode="auto">
           <a:xfrm>
-            <a:off x="8763000" y="6591300"/>
-            <a:ext cx="330200" cy="169863"/>
+            <a:off x="11684001" y="6591303"/>
+            <a:ext cx="440267" cy="169863"/>
           </a:xfrm>
           <a:prstGeom prst="rect">
             <a:avLst/>
@@ -1052,7 +1052,7 @@
         <p:spPr>
           <a:xfrm>
             <a:off x="0" y="5085184"/>
-            <a:ext cx="9144000" cy="1772816"/>
+            <a:ext cx="12192000" cy="1772816"/>
           </a:xfrm>
           <a:prstGeom prst="rect">
             <a:avLst/>
@@ -1122,8 +1122,8 @@
         </p:blipFill>
         <p:spPr bwMode="auto">
           <a:xfrm>
-            <a:off x="971550" y="549275"/>
-            <a:ext cx="2085975" cy="1866900"/>
+            <a:off x="1295402" y="549275"/>
+            <a:ext cx="2781300" cy="1866900"/>
           </a:xfrm>
           <a:prstGeom prst="rect">
             <a:avLst/>
@@ -1187,8 +1187,8 @@
         </p:blipFill>
         <p:spPr bwMode="auto">
           <a:xfrm>
-            <a:off x="971550" y="549275"/>
-            <a:ext cx="2581275" cy="1736725"/>
+            <a:off x="1295402" y="549278"/>
+            <a:ext cx="3441700" cy="1736725"/>
           </a:xfrm>
           <a:prstGeom prst="rect">
             <a:avLst/>
@@ -1252,8 +1252,8 @@
         </p:blipFill>
         <p:spPr bwMode="auto">
           <a:xfrm>
-            <a:off x="971550" y="549275"/>
-            <a:ext cx="1946275" cy="2009775"/>
+            <a:off x="1295402" y="549278"/>
+            <a:ext cx="2595033" cy="2009775"/>
           </a:xfrm>
           <a:prstGeom prst="rect">
             <a:avLst/>
@@ -1317,8 +1317,8 @@
         </p:blipFill>
         <p:spPr bwMode="auto">
           <a:xfrm>
-            <a:off x="971550" y="565150"/>
-            <a:ext cx="2019300" cy="1841500"/>
+            <a:off x="1295400" y="565150"/>
+            <a:ext cx="2692400" cy="1841500"/>
           </a:xfrm>
           <a:prstGeom prst="rect">
             <a:avLst/>
@@ -1376,8 +1376,8 @@
         </p:blipFill>
         <p:spPr>
           <a:xfrm>
-            <a:off x="971550" y="579438"/>
-            <a:ext cx="2254250" cy="1939925"/>
+            <a:off x="1295401" y="579441"/>
+            <a:ext cx="3005667" cy="1939925"/>
           </a:xfrm>
           <a:prstGeom prst="rect">
             <a:avLst/>
@@ -1435,8 +1435,8 @@
         </p:blipFill>
         <p:spPr>
           <a:xfrm>
-            <a:off x="966788" y="549275"/>
-            <a:ext cx="2403475" cy="1470025"/>
+            <a:off x="1289053" y="549278"/>
+            <a:ext cx="3204633" cy="1470025"/>
           </a:xfrm>
           <a:prstGeom prst="rect">
             <a:avLst/>
@@ -1494,8 +1494,8 @@
         </p:blipFill>
         <p:spPr>
           <a:xfrm>
-            <a:off x="971550" y="549275"/>
-            <a:ext cx="2120900" cy="1682750"/>
+            <a:off x="1295401" y="549275"/>
+            <a:ext cx="2827867" cy="1682750"/>
           </a:xfrm>
           <a:prstGeom prst="rect">
             <a:avLst/>
@@ -1554,8 +1554,8 @@
         </p:blipFill>
         <p:spPr bwMode="auto">
           <a:xfrm>
-            <a:off x="971550" y="549275"/>
-            <a:ext cx="1963738" cy="1571625"/>
+            <a:off x="1295400" y="549278"/>
+            <a:ext cx="2618317" cy="1571625"/>
           </a:xfrm>
           <a:prstGeom prst="rect">
             <a:avLst/>
@@ -1605,8 +1605,8 @@
         </p:nvSpPr>
         <p:spPr>
           <a:xfrm>
-            <a:off x="6227763" y="115888"/>
-            <a:ext cx="2916237" cy="1728787"/>
+            <a:off x="8303686" y="115889"/>
+            <a:ext cx="3888316" cy="1728787"/>
           </a:xfrm>
           <a:prstGeom prst="rect">
             <a:avLst/>
@@ -1685,8 +1685,8 @@
         </p:nvSpPr>
         <p:spPr>
           <a:xfrm>
-            <a:off x="457200" y="6356350"/>
-            <a:ext cx="2133600" cy="365125"/>
+            <a:off x="609600" y="6356353"/>
+            <a:ext cx="2844800" cy="365125"/>
           </a:xfrm>
           <a:prstGeom prst="rect">
             <a:avLst/>
@@ -1717,7 +1717,7 @@
               <a:pPr>
                 <a:defRPr/>
               </a:pPr>
-              <a:t>23/09/2017</a:t>
+              <a:t>11/01/2018</a:t>
             </a:fld>
             <a:endParaRPr lang="en-GB"/>
           </a:p>
@@ -1735,8 +1735,8 @@
         </p:nvSpPr>
         <p:spPr>
           <a:xfrm>
-            <a:off x="3124200" y="6356350"/>
-            <a:ext cx="2895600" cy="365125"/>
+            <a:off x="4165600" y="6356353"/>
+            <a:ext cx="3860800" cy="365125"/>
           </a:xfrm>
           <a:prstGeom prst="rect">
             <a:avLst/>
@@ -1778,8 +1778,8 @@
         </p:nvSpPr>
         <p:spPr>
           <a:xfrm>
-            <a:off x="6553200" y="6356350"/>
-            <a:ext cx="2133600" cy="365125"/>
+            <a:off x="8737600" y="6356353"/>
+            <a:ext cx="2844800" cy="365125"/>
           </a:xfrm>
           <a:prstGeom prst="rect">
             <a:avLst/>
@@ -1853,7 +1853,7 @@
         <p:spPr bwMode="auto">
           <a:xfrm>
             <a:off x="0" y="0"/>
-            <a:ext cx="4649788" cy="1908175"/>
+            <a:ext cx="6199717" cy="1908175"/>
           </a:xfrm>
           <a:prstGeom prst="rect">
             <a:avLst/>
@@ -1958,8 +1958,8 @@
         </p:nvSpPr>
         <p:spPr>
           <a:xfrm>
-            <a:off x="712176" y="1151792"/>
-            <a:ext cx="8431823" cy="5453194"/>
+            <a:off x="949570" y="1151792"/>
+            <a:ext cx="11242431" cy="5453194"/>
           </a:xfrm>
           <a:prstGeom prst="rect">
             <a:avLst/>
@@ -1998,8 +1998,8 @@
         </p:nvSpPr>
         <p:spPr bwMode="auto">
           <a:xfrm>
-            <a:off x="0" y="301253"/>
-            <a:ext cx="3525714" cy="584775"/>
+            <a:off x="0" y="301256"/>
+            <a:ext cx="4700952" cy="584775"/>
           </a:xfrm>
           <a:prstGeom prst="rect">
             <a:avLst/>
@@ -2056,690 +2056,6 @@
 </file>
 
 <file path=ppt/slideLayouts/slideLayout21.xml><?xml version="1.0" encoding="utf-8"?>
-<p:sldLayout xmlns:a="http://schemas.openxmlformats.org/drawingml/2006/main" xmlns:r="http://schemas.openxmlformats.org/officeDocument/2006/relationships" xmlns:p="http://schemas.openxmlformats.org/presentationml/2006/main" preserve="1" userDrawn="1">
-  <p:cSld name="video melding">
-    <p:spTree>
-      <p:nvGrpSpPr>
-        <p:cNvPr id="1" name=""/>
-        <p:cNvGrpSpPr/>
-        <p:nvPr/>
-      </p:nvGrpSpPr>
-      <p:grpSpPr>
-        <a:xfrm>
-          <a:off x="0" y="0"/>
-          <a:ext cx="0" cy="0"/>
-          <a:chOff x="0" y="0"/>
-          <a:chExt cx="0" cy="0"/>
-        </a:xfrm>
-      </p:grpSpPr>
-      <p:pic>
-        <p:nvPicPr>
-          <p:cNvPr id="1031" name="Picture 7"/>
-          <p:cNvPicPr>
-            <a:picLocks noChangeAspect="1" noChangeArrowheads="1"/>
-          </p:cNvPicPr>
-          <p:nvPr userDrawn="1"/>
-        </p:nvPicPr>
-        <p:blipFill>
-          <a:blip r:embed="rId2" cstate="print">
-            <a:extLst>
-              <a:ext uri="{28A0092B-C50C-407E-A947-70E740481C1C}">
-                <a14:useLocalDpi xmlns:a14="http://schemas.microsoft.com/office/drawing/2010/main" val="0"/>
-              </a:ext>
-            </a:extLst>
-          </a:blip>
-          <a:srcRect/>
-          <a:stretch>
-            <a:fillRect/>
-          </a:stretch>
-        </p:blipFill>
-        <p:spPr bwMode="auto">
-          <a:xfrm>
-            <a:off x="-133470" y="3976777"/>
-            <a:ext cx="2468156" cy="3781486"/>
-          </a:xfrm>
-          <a:prstGeom prst="rect">
-            <a:avLst/>
-          </a:prstGeom>
-          <a:noFill/>
-          <a:ln>
-            <a:noFill/>
-          </a:ln>
-          <a:extLst>
-            <a:ext uri="{909E8E84-426E-40DD-AFC4-6F175D3DCCD1}">
-              <a14:hiddenFill xmlns:a14="http://schemas.microsoft.com/office/drawing/2010/main">
-                <a:solidFill>
-                  <a:schemeClr val="accent1"/>
-                </a:solidFill>
-              </a14:hiddenFill>
-            </a:ext>
-            <a:ext uri="{91240B29-F687-4F45-9708-019B960494DF}">
-              <a14:hiddenLine xmlns:a14="http://schemas.microsoft.com/office/drawing/2010/main" w="9525">
-                <a:solidFill>
-                  <a:schemeClr val="tx1"/>
-                </a:solidFill>
-                <a:miter lim="800000"/>
-                <a:headEnd/>
-                <a:tailEnd/>
-              </a14:hiddenLine>
-            </a:ext>
-          </a:extLst>
-        </p:spPr>
-      </p:pic>
-      <p:sp>
-        <p:nvSpPr>
-          <p:cNvPr id="2" name="Tekstvak 1"/>
-          <p:cNvSpPr txBox="1"/>
-          <p:nvPr userDrawn="1"/>
-        </p:nvSpPr>
-        <p:spPr bwMode="auto">
-          <a:xfrm>
-            <a:off x="86264" y="543464"/>
-            <a:ext cx="5966071" cy="646331"/>
-          </a:xfrm>
-          <a:prstGeom prst="rect">
-            <a:avLst/>
-          </a:prstGeom>
-          <a:noFill/>
-          <a:ln w="9525">
-            <a:noFill/>
-            <a:miter lim="800000"/>
-            <a:headEnd/>
-            <a:tailEnd/>
-          </a:ln>
-        </p:spPr>
-        <p:txBody>
-          <a:bodyPr wrap="none" lIns="720000" rIns="180000" rtlCol="0" anchor="t" anchorCtr="0">
-            <a:spAutoFit/>
-          </a:bodyPr>
-          <a:lstStyle/>
-          <a:p>
-            <a:pPr fontAlgn="auto">
-              <a:spcAft>
-                <a:spcPts val="0"/>
-              </a:spcAft>
-            </a:pPr>
-            <a:r>
-              <a:rPr lang="nl-NL" sz="3600" dirty="0" smtClean="0">
-                <a:solidFill>
-                  <a:schemeClr val="bg1"/>
-                </a:solidFill>
-                <a:effectLst>
-                  <a:outerShdw blurRad="38100" dist="38100" dir="2700000" algn="tl">
-                    <a:srgbClr val="000000">
-                      <a:alpha val="43137"/>
-                    </a:srgbClr>
-                  </a:outerShdw>
-                </a:effectLst>
-                <a:latin typeface="Tahoma" pitchFamily="34" charset="0"/>
-                <a:ea typeface="+mj-ea"/>
-                <a:cs typeface="Tahoma" pitchFamily="34" charset="0"/>
-              </a:rPr>
-              <a:t>Video</a:t>
-            </a:r>
-            <a:r>
-              <a:rPr lang="nl-NL" sz="3600" baseline="0" dirty="0" smtClean="0">
-                <a:solidFill>
-                  <a:schemeClr val="bg1"/>
-                </a:solidFill>
-                <a:effectLst>
-                  <a:outerShdw blurRad="38100" dist="38100" dir="2700000" algn="tl">
-                    <a:srgbClr val="000000">
-                      <a:alpha val="43137"/>
-                    </a:srgbClr>
-                  </a:outerShdw>
-                </a:effectLst>
-                <a:latin typeface="Tahoma" pitchFamily="34" charset="0"/>
-                <a:ea typeface="+mj-ea"/>
-                <a:cs typeface="Tahoma" pitchFamily="34" charset="0"/>
-              </a:rPr>
-              <a:t> in het Noorderlicht</a:t>
-            </a:r>
-            <a:endParaRPr lang="nl-NL" sz="3600" dirty="0" smtClean="0">
-              <a:solidFill>
-                <a:schemeClr val="bg1"/>
-              </a:solidFill>
-              <a:effectLst>
-                <a:outerShdw blurRad="38100" dist="38100" dir="2700000" algn="tl">
-                  <a:srgbClr val="000000">
-                    <a:alpha val="43137"/>
-                  </a:srgbClr>
-                </a:outerShdw>
-              </a:effectLst>
-              <a:latin typeface="Tahoma" pitchFamily="34" charset="0"/>
-              <a:ea typeface="+mj-ea"/>
-              <a:cs typeface="Tahoma" pitchFamily="34" charset="0"/>
-            </a:endParaRPr>
-          </a:p>
-        </p:txBody>
-      </p:sp>
-      <p:sp>
-        <p:nvSpPr>
-          <p:cNvPr id="4" name="Tekstvak 3"/>
-          <p:cNvSpPr txBox="1"/>
-          <p:nvPr userDrawn="1"/>
-        </p:nvSpPr>
-        <p:spPr bwMode="auto">
-          <a:xfrm>
-            <a:off x="86264" y="1759787"/>
-            <a:ext cx="7241164" cy="1938992"/>
-          </a:xfrm>
-          <a:prstGeom prst="rect">
-            <a:avLst/>
-          </a:prstGeom>
-          <a:noFill/>
-          <a:ln w="9525">
-            <a:noFill/>
-            <a:miter lim="800000"/>
-            <a:headEnd/>
-            <a:tailEnd/>
-          </a:ln>
-        </p:spPr>
-        <p:txBody>
-          <a:bodyPr wrap="none" lIns="720000" rIns="180000" rtlCol="0" anchor="t" anchorCtr="0">
-            <a:spAutoFit/>
-          </a:bodyPr>
-          <a:lstStyle/>
-          <a:p>
-            <a:pPr fontAlgn="auto">
-              <a:spcAft>
-                <a:spcPts val="0"/>
-              </a:spcAft>
-            </a:pPr>
-            <a:r>
-              <a:rPr lang="nl-NL" sz="2400" dirty="0" smtClean="0">
-                <a:solidFill>
-                  <a:schemeClr val="bg1"/>
-                </a:solidFill>
-                <a:effectLst>
-                  <a:outerShdw blurRad="38100" dist="38100" dir="2700000" algn="tl">
-                    <a:srgbClr val="000000">
-                      <a:alpha val="43137"/>
-                    </a:srgbClr>
-                  </a:outerShdw>
-                </a:effectLst>
-                <a:latin typeface="Tahoma" pitchFamily="34" charset="0"/>
-                <a:ea typeface="+mj-ea"/>
-                <a:cs typeface="Tahoma" pitchFamily="34" charset="0"/>
-              </a:rPr>
-              <a:t>Deze dienst wordt opgenomen en uitgezonden</a:t>
-            </a:r>
-          </a:p>
-          <a:p>
-            <a:pPr fontAlgn="auto">
-              <a:spcAft>
-                <a:spcPts val="0"/>
-              </a:spcAft>
-            </a:pPr>
-            <a:r>
-              <a:rPr lang="nl-NL" sz="2400" dirty="0" smtClean="0">
-                <a:solidFill>
-                  <a:schemeClr val="bg1"/>
-                </a:solidFill>
-                <a:effectLst>
-                  <a:outerShdw blurRad="38100" dist="38100" dir="2700000" algn="tl">
-                    <a:srgbClr val="000000">
-                      <a:alpha val="43137"/>
-                    </a:srgbClr>
-                  </a:outerShdw>
-                </a:effectLst>
-                <a:latin typeface="Tahoma" pitchFamily="34" charset="0"/>
-                <a:ea typeface="+mj-ea"/>
-                <a:cs typeface="Tahoma" pitchFamily="34" charset="0"/>
-              </a:rPr>
-              <a:t>via een livestream</a:t>
-            </a:r>
-            <a:r>
-              <a:rPr lang="nl-NL" sz="2400" baseline="0" dirty="0" smtClean="0">
-                <a:solidFill>
-                  <a:schemeClr val="bg1"/>
-                </a:solidFill>
-                <a:effectLst>
-                  <a:outerShdw blurRad="38100" dist="38100" dir="2700000" algn="tl">
-                    <a:srgbClr val="000000">
-                      <a:alpha val="43137"/>
-                    </a:srgbClr>
-                  </a:outerShdw>
-                </a:effectLst>
-                <a:latin typeface="Tahoma" pitchFamily="34" charset="0"/>
-                <a:ea typeface="+mj-ea"/>
-                <a:cs typeface="Tahoma" pitchFamily="34" charset="0"/>
-              </a:rPr>
-              <a:t> op het internet.</a:t>
-            </a:r>
-          </a:p>
-          <a:p>
-            <a:pPr fontAlgn="auto">
-              <a:spcAft>
-                <a:spcPts val="0"/>
-              </a:spcAft>
-            </a:pPr>
-            <a:r>
-              <a:rPr lang="nl-NL" sz="2400" baseline="0" dirty="0" smtClean="0">
-                <a:solidFill>
-                  <a:schemeClr val="bg1"/>
-                </a:solidFill>
-                <a:effectLst>
-                  <a:outerShdw blurRad="38100" dist="38100" dir="2700000" algn="tl">
-                    <a:srgbClr val="000000">
-                      <a:alpha val="43137"/>
-                    </a:srgbClr>
-                  </a:outerShdw>
-                </a:effectLst>
-                <a:latin typeface="Tahoma" pitchFamily="34" charset="0"/>
-                <a:ea typeface="+mj-ea"/>
-                <a:cs typeface="Tahoma" pitchFamily="34" charset="0"/>
-              </a:rPr>
-              <a:t>Wanneer u niet in beeld wilt komen dan is </a:t>
-            </a:r>
-          </a:p>
-          <a:p>
-            <a:pPr fontAlgn="auto">
-              <a:spcAft>
-                <a:spcPts val="0"/>
-              </a:spcAft>
-            </a:pPr>
-            <a:r>
-              <a:rPr lang="nl-NL" sz="2400" baseline="0" dirty="0" smtClean="0">
-                <a:solidFill>
-                  <a:schemeClr val="bg1"/>
-                </a:solidFill>
-                <a:effectLst>
-                  <a:outerShdw blurRad="38100" dist="38100" dir="2700000" algn="tl">
-                    <a:srgbClr val="000000">
-                      <a:alpha val="43137"/>
-                    </a:srgbClr>
-                  </a:outerShdw>
-                </a:effectLst>
-                <a:latin typeface="Tahoma" pitchFamily="34" charset="0"/>
-                <a:ea typeface="+mj-ea"/>
-                <a:cs typeface="Tahoma" pitchFamily="34" charset="0"/>
-              </a:rPr>
-              <a:t>achterin het kerkgebouw, in het lage gedeelte,</a:t>
-            </a:r>
-          </a:p>
-          <a:p>
-            <a:pPr fontAlgn="auto">
-              <a:spcAft>
-                <a:spcPts val="0"/>
-              </a:spcAft>
-            </a:pPr>
-            <a:r>
-              <a:rPr lang="nl-NL" sz="2400" baseline="0" dirty="0" smtClean="0">
-                <a:solidFill>
-                  <a:schemeClr val="bg1"/>
-                </a:solidFill>
-                <a:effectLst>
-                  <a:outerShdw blurRad="38100" dist="38100" dir="2700000" algn="tl">
-                    <a:srgbClr val="000000">
-                      <a:alpha val="43137"/>
-                    </a:srgbClr>
-                  </a:outerShdw>
-                </a:effectLst>
-                <a:latin typeface="Tahoma" pitchFamily="34" charset="0"/>
-                <a:ea typeface="+mj-ea"/>
-                <a:cs typeface="Tahoma" pitchFamily="34" charset="0"/>
-              </a:rPr>
-              <a:t>een videovrije zone.</a:t>
-            </a:r>
-          </a:p>
-        </p:txBody>
-      </p:sp>
-      <p:sp>
-        <p:nvSpPr>
-          <p:cNvPr id="5" name="Tekstvak 4"/>
-          <p:cNvSpPr txBox="1"/>
-          <p:nvPr userDrawn="1"/>
-        </p:nvSpPr>
-        <p:spPr bwMode="auto">
-          <a:xfrm>
-            <a:off x="2092768" y="4025380"/>
-            <a:ext cx="6832205" cy="707886"/>
-          </a:xfrm>
-          <a:prstGeom prst="rect">
-            <a:avLst/>
-          </a:prstGeom>
-          <a:noFill/>
-          <a:ln w="9525">
-            <a:noFill/>
-            <a:miter lim="800000"/>
-            <a:headEnd/>
-            <a:tailEnd/>
-          </a:ln>
-        </p:spPr>
-        <p:txBody>
-          <a:bodyPr wrap="none" lIns="720000" rIns="180000" rtlCol="0" anchor="t" anchorCtr="0">
-            <a:spAutoFit/>
-          </a:bodyPr>
-          <a:lstStyle/>
-          <a:p>
-            <a:pPr fontAlgn="auto">
-              <a:spcAft>
-                <a:spcPts val="0"/>
-              </a:spcAft>
-            </a:pPr>
-            <a:r>
-              <a:rPr lang="nl-NL" sz="2000" dirty="0" smtClean="0">
-                <a:solidFill>
-                  <a:schemeClr val="bg1"/>
-                </a:solidFill>
-                <a:effectLst>
-                  <a:outerShdw blurRad="38100" dist="38100" dir="2700000" algn="tl">
-                    <a:srgbClr val="000000">
-                      <a:alpha val="43137"/>
-                    </a:srgbClr>
-                  </a:outerShdw>
-                </a:effectLst>
-                <a:latin typeface="Tahoma" pitchFamily="34" charset="0"/>
-                <a:ea typeface="+mj-ea"/>
-                <a:cs typeface="Tahoma" pitchFamily="34" charset="0"/>
-              </a:rPr>
-              <a:t>Meer informatie</a:t>
-            </a:r>
-            <a:r>
-              <a:rPr lang="nl-NL" sz="2000" baseline="0" dirty="0" smtClean="0">
-                <a:solidFill>
-                  <a:schemeClr val="bg1"/>
-                </a:solidFill>
-                <a:effectLst>
-                  <a:outerShdw blurRad="38100" dist="38100" dir="2700000" algn="tl">
-                    <a:srgbClr val="000000">
-                      <a:alpha val="43137"/>
-                    </a:srgbClr>
-                  </a:outerShdw>
-                </a:effectLst>
-                <a:latin typeface="Tahoma" pitchFamily="34" charset="0"/>
-                <a:ea typeface="+mj-ea"/>
-                <a:cs typeface="Tahoma" pitchFamily="34" charset="0"/>
-              </a:rPr>
-              <a:t> kunt u verkrijgen bij het mediateam</a:t>
-            </a:r>
-          </a:p>
-          <a:p>
-            <a:pPr fontAlgn="auto">
-              <a:spcAft>
-                <a:spcPts val="0"/>
-              </a:spcAft>
-            </a:pPr>
-            <a:r>
-              <a:rPr lang="nl-NL" sz="2000" baseline="0" dirty="0" smtClean="0">
-                <a:solidFill>
-                  <a:schemeClr val="bg1"/>
-                </a:solidFill>
-                <a:effectLst>
-                  <a:outerShdw blurRad="38100" dist="38100" dir="2700000" algn="tl">
-                    <a:srgbClr val="000000">
-                      <a:alpha val="43137"/>
-                    </a:srgbClr>
-                  </a:outerShdw>
-                </a:effectLst>
-                <a:latin typeface="Tahoma" pitchFamily="34" charset="0"/>
-                <a:ea typeface="+mj-ea"/>
-                <a:cs typeface="Tahoma" pitchFamily="34" charset="0"/>
-              </a:rPr>
-              <a:t>achter de desk.</a:t>
-            </a:r>
-            <a:endParaRPr lang="nl-NL" sz="2000" dirty="0" smtClean="0">
-              <a:solidFill>
-                <a:schemeClr val="bg1"/>
-              </a:solidFill>
-              <a:effectLst>
-                <a:outerShdw blurRad="38100" dist="38100" dir="2700000" algn="tl">
-                  <a:srgbClr val="000000">
-                    <a:alpha val="43137"/>
-                  </a:srgbClr>
-                </a:outerShdw>
-              </a:effectLst>
-              <a:latin typeface="Tahoma" pitchFamily="34" charset="0"/>
-              <a:ea typeface="+mj-ea"/>
-              <a:cs typeface="Tahoma" pitchFamily="34" charset="0"/>
-            </a:endParaRPr>
-          </a:p>
-        </p:txBody>
-      </p:sp>
-      <p:sp>
-        <p:nvSpPr>
-          <p:cNvPr id="6" name="Tekstvak 5"/>
-          <p:cNvSpPr txBox="1"/>
-          <p:nvPr userDrawn="1"/>
-        </p:nvSpPr>
-        <p:spPr bwMode="auto">
-          <a:xfrm>
-            <a:off x="1855177" y="5082841"/>
-            <a:ext cx="7013892" cy="1569660"/>
-          </a:xfrm>
-          <a:prstGeom prst="rect">
-            <a:avLst/>
-          </a:prstGeom>
-          <a:noFill/>
-          <a:ln w="9525">
-            <a:noFill/>
-            <a:miter lim="800000"/>
-            <a:headEnd/>
-            <a:tailEnd/>
-          </a:ln>
-        </p:spPr>
-        <p:txBody>
-          <a:bodyPr wrap="square" lIns="720000" rIns="180000" numCol="2" rtlCol="0" anchor="t" anchorCtr="0">
-            <a:spAutoFit/>
-          </a:bodyPr>
-          <a:lstStyle/>
-          <a:p>
-            <a:pPr algn="l" fontAlgn="auto">
-              <a:spcAft>
-                <a:spcPts val="0"/>
-              </a:spcAft>
-            </a:pPr>
-            <a:r>
-              <a:rPr lang="nl-NL" sz="2400" dirty="0" smtClean="0">
-                <a:solidFill>
-                  <a:schemeClr val="bg1"/>
-                </a:solidFill>
-                <a:effectLst>
-                  <a:outerShdw blurRad="38100" dist="38100" dir="2700000" algn="tl">
-                    <a:srgbClr val="000000">
-                      <a:alpha val="43137"/>
-                    </a:srgbClr>
-                  </a:outerShdw>
-                </a:effectLst>
-                <a:latin typeface="Tahoma" pitchFamily="34" charset="0"/>
-                <a:ea typeface="+mj-ea"/>
-                <a:cs typeface="Tahoma" pitchFamily="34" charset="0"/>
-              </a:rPr>
-              <a:t>Live meekijken:</a:t>
-            </a:r>
-          </a:p>
-          <a:p>
-            <a:pPr algn="l" fontAlgn="auto">
-              <a:spcAft>
-                <a:spcPts val="0"/>
-              </a:spcAft>
-            </a:pPr>
-            <a:r>
-              <a:rPr lang="nl-NL" sz="2400" dirty="0" smtClean="0">
-                <a:solidFill>
-                  <a:schemeClr val="bg1"/>
-                </a:solidFill>
-                <a:effectLst>
-                  <a:outerShdw blurRad="38100" dist="38100" dir="2700000" algn="tl">
-                    <a:srgbClr val="000000">
-                      <a:alpha val="43137"/>
-                    </a:srgbClr>
-                  </a:outerShdw>
-                </a:effectLst>
-                <a:latin typeface="Tahoma" pitchFamily="34" charset="0"/>
-                <a:ea typeface="+mj-ea"/>
-                <a:cs typeface="Tahoma" pitchFamily="34" charset="0"/>
-              </a:rPr>
-              <a:t>Opname terugkijken:</a:t>
-            </a:r>
-          </a:p>
-          <a:p>
-            <a:pPr algn="l" fontAlgn="auto">
-              <a:spcAft>
-                <a:spcPts val="0"/>
-              </a:spcAft>
-            </a:pPr>
-            <a:r>
-              <a:rPr lang="nl-NL" sz="2400" dirty="0" smtClean="0">
-                <a:solidFill>
-                  <a:schemeClr val="bg1"/>
-                </a:solidFill>
-                <a:effectLst>
-                  <a:outerShdw blurRad="38100" dist="38100" dir="2700000" algn="tl">
-                    <a:srgbClr val="000000">
-                      <a:alpha val="43137"/>
-                    </a:srgbClr>
-                  </a:outerShdw>
-                </a:effectLst>
-                <a:latin typeface="Tahoma" pitchFamily="34" charset="0"/>
-                <a:ea typeface="+mj-ea"/>
-                <a:cs typeface="Tahoma" pitchFamily="34" charset="0"/>
-              </a:rPr>
-              <a:t>Nabestellen:              </a:t>
-            </a:r>
-          </a:p>
-          <a:p>
-            <a:pPr algn="l" fontAlgn="auto">
-              <a:spcAft>
-                <a:spcPts val="0"/>
-              </a:spcAft>
-            </a:pPr>
-            <a:endParaRPr lang="nl-NL" sz="2400" dirty="0" smtClean="0">
-              <a:solidFill>
-                <a:schemeClr val="bg1"/>
-              </a:solidFill>
-              <a:effectLst>
-                <a:outerShdw blurRad="38100" dist="38100" dir="2700000" algn="tl">
-                  <a:srgbClr val="000000">
-                    <a:alpha val="43137"/>
-                  </a:srgbClr>
-                </a:outerShdw>
-              </a:effectLst>
-              <a:latin typeface="Tahoma" pitchFamily="34" charset="0"/>
-              <a:ea typeface="+mj-ea"/>
-              <a:cs typeface="Tahoma" pitchFamily="34" charset="0"/>
-            </a:endParaRPr>
-          </a:p>
-          <a:p>
-            <a:pPr algn="l" fontAlgn="auto">
-              <a:spcAft>
-                <a:spcPts val="0"/>
-              </a:spcAft>
-            </a:pPr>
-            <a:r>
-              <a:rPr lang="nl-NL" sz="2400" dirty="0" smtClean="0">
-                <a:solidFill>
-                  <a:schemeClr val="bg1"/>
-                </a:solidFill>
-                <a:effectLst>
-                  <a:outerShdw blurRad="38100" dist="38100" dir="2700000" algn="tl">
-                    <a:srgbClr val="000000">
-                      <a:alpha val="43137"/>
-                    </a:srgbClr>
-                  </a:outerShdw>
-                </a:effectLst>
-                <a:latin typeface="Tahoma" pitchFamily="34" charset="0"/>
-                <a:ea typeface="+mj-ea"/>
-                <a:cs typeface="Tahoma" pitchFamily="34" charset="0"/>
-              </a:rPr>
-              <a:t>www.mijnkerk.tv</a:t>
-            </a:r>
-          </a:p>
-          <a:p>
-            <a:pPr algn="l" fontAlgn="auto">
-              <a:spcAft>
-                <a:spcPts val="0"/>
-              </a:spcAft>
-            </a:pPr>
-            <a:r>
-              <a:rPr lang="nl-NL" sz="2400" kern="1200" dirty="0" err="1" smtClean="0">
-                <a:solidFill>
-                  <a:schemeClr val="bg1"/>
-                </a:solidFill>
-                <a:effectLst>
-                  <a:outerShdw blurRad="38100" dist="38100" dir="2700000" algn="tl">
-                    <a:srgbClr val="000000">
-                      <a:alpha val="43137"/>
-                    </a:srgbClr>
-                  </a:outerShdw>
-                </a:effectLst>
-                <a:latin typeface="Tahoma" pitchFamily="34" charset="0"/>
-                <a:ea typeface="+mn-ea"/>
-                <a:cs typeface="Tahoma" pitchFamily="34" charset="0"/>
-              </a:rPr>
-              <a:t>www.gkvassenpeelo.nl</a:t>
-            </a:r>
-            <a:endParaRPr lang="nl-NL" sz="2400" kern="1200" dirty="0" smtClean="0">
-              <a:solidFill>
-                <a:schemeClr val="bg1"/>
-              </a:solidFill>
-              <a:effectLst>
-                <a:outerShdw blurRad="38100" dist="38100" dir="2700000" algn="tl">
-                  <a:srgbClr val="000000">
-                    <a:alpha val="43137"/>
-                  </a:srgbClr>
-                </a:outerShdw>
-              </a:effectLst>
-              <a:latin typeface="Tahoma" pitchFamily="34" charset="0"/>
-              <a:ea typeface="+mn-ea"/>
-              <a:cs typeface="Tahoma" pitchFamily="34" charset="0"/>
-            </a:endParaRPr>
-          </a:p>
-          <a:p>
-            <a:pPr marL="0" marR="0" indent="0" algn="l" defTabSz="914400" rtl="0" eaLnBrk="1" fontAlgn="auto" latinLnBrk="0" hangingPunct="1">
-              <a:lnSpc>
-                <a:spcPct val="100000"/>
-              </a:lnSpc>
-              <a:spcBef>
-                <a:spcPct val="0"/>
-              </a:spcBef>
-              <a:spcAft>
-                <a:spcPts val="0"/>
-              </a:spcAft>
-              <a:buClrTx/>
-              <a:buSzTx/>
-              <a:buFontTx/>
-              <a:buNone/>
-              <a:tabLst/>
-              <a:defRPr/>
-            </a:pPr>
-            <a:r>
-              <a:rPr lang="nl-NL" sz="2400" kern="1200" dirty="0" smtClean="0">
-                <a:solidFill>
-                  <a:schemeClr val="bg1"/>
-                </a:solidFill>
-                <a:effectLst>
-                  <a:outerShdw blurRad="38100" dist="38100" dir="2700000" algn="tl">
-                    <a:srgbClr val="000000">
-                      <a:alpha val="43137"/>
-                    </a:srgbClr>
-                  </a:outerShdw>
-                </a:effectLst>
-                <a:latin typeface="Tahoma" pitchFamily="34" charset="0"/>
-                <a:ea typeface="+mn-ea"/>
-                <a:cs typeface="Tahoma" pitchFamily="34" charset="0"/>
-              </a:rPr>
-              <a:t>www.mijnkerk.tv</a:t>
-            </a:r>
-          </a:p>
-        </p:txBody>
-      </p:sp>
-    </p:spTree>
-    <p:extLst>
-      <p:ext uri="{BB962C8B-B14F-4D97-AF65-F5344CB8AC3E}">
-        <p14:creationId xmlns:p14="http://schemas.microsoft.com/office/powerpoint/2010/main" val="167533283"/>
-      </p:ext>
-    </p:extLst>
-  </p:cSld>
-  <p:clrMapOvr>
-    <a:masterClrMapping/>
-  </p:clrMapOvr>
-  <p:transition/>
-</p:sldLayout>
-</file>
-
-<file path=ppt/slideLayouts/slideLayout22.xml><?xml version="1.0" encoding="utf-8"?>
 <p:sldLayout xmlns:a="http://schemas.openxmlformats.org/drawingml/2006/main" xmlns:r="http://schemas.openxmlformats.org/officeDocument/2006/relationships" xmlns:p="http://schemas.openxmlformats.org/presentationml/2006/main" preserve="1" userDrawn="1">
   <p:cSld name="Schoonmaakrooster">
     <p:spTree>
@@ -2765,7 +2081,7 @@
         <p:spPr bwMode="auto">
           <a:xfrm>
             <a:off x="0" y="0"/>
-            <a:ext cx="4649788" cy="1908175"/>
+            <a:ext cx="6199717" cy="1908175"/>
           </a:xfrm>
           <a:prstGeom prst="rect">
             <a:avLst/>
@@ -2846,7 +2162,7 @@
 </p:sldLayout>
 </file>
 
-<file path=ppt/slideLayouts/slideLayout23.xml><?xml version="1.0" encoding="utf-8"?>
+<file path=ppt/slideLayouts/slideLayout22.xml><?xml version="1.0" encoding="utf-8"?>
 <p:sldLayout xmlns:a="http://schemas.openxmlformats.org/drawingml/2006/main" xmlns:r="http://schemas.openxmlformats.org/officeDocument/2006/relationships" xmlns:p="http://schemas.openxmlformats.org/presentationml/2006/main" userDrawn="1">
   <p:cSld name="Object">
     <p:spTree>
@@ -2875,8 +2191,8 @@
         </p:nvSpPr>
         <p:spPr>
           <a:xfrm>
-            <a:off x="539750" y="188913"/>
-            <a:ext cx="8208963" cy="6454797"/>
+            <a:off x="719667" y="188916"/>
+            <a:ext cx="10945284" cy="6454797"/>
           </a:xfrm>
           <a:prstGeom prst="rect">
             <a:avLst/>
@@ -2969,8 +2285,8 @@
         </p:nvSpPr>
         <p:spPr>
           <a:xfrm>
-            <a:off x="6732588" y="2924175"/>
-            <a:ext cx="2232025" cy="1296988"/>
+            <a:off x="8976786" y="2924175"/>
+            <a:ext cx="2976033" cy="1296988"/>
           </a:xfrm>
           <a:prstGeom prst="rect">
             <a:avLst/>
@@ -3006,52 +2322,6 @@
               <a:defRPr/>
             </a:pPr>
             <a:endParaRPr lang="nl-NL"/>
-          </a:p>
-        </p:txBody>
-      </p:sp>
-      <p:sp>
-        <p:nvSpPr>
-          <p:cNvPr id="7" name="Rectangle 6"/>
-          <p:cNvSpPr/>
-          <p:nvPr userDrawn="1"/>
-        </p:nvSpPr>
-        <p:spPr>
-          <a:xfrm>
-            <a:off x="5996539" y="77002"/>
-            <a:ext cx="3051208" cy="1742173"/>
-          </a:xfrm>
-          <a:prstGeom prst="rect">
-            <a:avLst/>
-          </a:prstGeom>
-          <a:solidFill>
-            <a:srgbClr val="000000"/>
-          </a:solidFill>
-          <a:ln>
-            <a:noFill/>
-          </a:ln>
-        </p:spPr>
-        <p:style>
-          <a:lnRef idx="2">
-            <a:schemeClr val="accent1">
-              <a:shade val="50000"/>
-            </a:schemeClr>
-          </a:lnRef>
-          <a:fillRef idx="1">
-            <a:schemeClr val="accent1"/>
-          </a:fillRef>
-          <a:effectRef idx="0">
-            <a:schemeClr val="accent1"/>
-          </a:effectRef>
-          <a:fontRef idx="minor">
-            <a:schemeClr val="lt1"/>
-          </a:fontRef>
-        </p:style>
-        <p:txBody>
-          <a:bodyPr rtlCol="0" anchor="ctr"/>
-          <a:lstStyle/>
-          <a:p>
-            <a:pPr algn="ctr"/>
-            <a:endParaRPr lang="en-US"/>
           </a:p>
         </p:txBody>
       </p:sp>
@@ -3088,8 +2358,8 @@
         </p:blipFill>
         <p:spPr bwMode="auto">
           <a:xfrm>
-            <a:off x="71228" y="66233"/>
-            <a:ext cx="9001545" cy="6724094"/>
+            <a:off x="105878" y="470488"/>
+            <a:ext cx="9307630" cy="6724094"/>
           </a:xfrm>
           <a:prstGeom prst="rect">
             <a:avLst/>
@@ -3160,7 +2430,7 @@
         <p:spPr>
           <a:xfrm>
             <a:off x="0" y="1908000"/>
-            <a:ext cx="9144000" cy="4696986"/>
+            <a:ext cx="12192000" cy="4696986"/>
           </a:xfrm>
           <a:prstGeom prst="rect">
             <a:avLst/>
@@ -3172,13 +2442,7 @@
             <a:lvl1pPr marL="0" indent="0">
               <a:buNone/>
               <a:defRPr sz="2800" baseline="0">
-                <a:effectLst>
-                  <a:outerShdw blurRad="63500" dist="38100" algn="ctr" rotWithShape="0">
-                    <a:schemeClr val="bg1">
-                      <a:alpha val="70000"/>
-                    </a:schemeClr>
-                  </a:outerShdw>
-                </a:effectLst>
+                <a:effectLst/>
               </a:defRPr>
             </a:lvl1pPr>
           </a:lstStyle>
@@ -3204,7 +2468,7 @@
         <p:spPr>
           <a:xfrm>
             <a:off x="0" y="0"/>
-            <a:ext cx="6444208" cy="1844824"/>
+            <a:ext cx="8592277" cy="1844824"/>
           </a:xfrm>
           <a:prstGeom prst="rect">
             <a:avLst/>
@@ -3216,13 +2480,7 @@
             <a:lvl1pPr marL="0" indent="0">
               <a:buNone/>
               <a:defRPr sz="3000" baseline="0">
-                <a:effectLst>
-                  <a:outerShdw blurRad="63500" dist="38100" algn="tl" rotWithShape="0">
-                    <a:schemeClr val="bg1">
-                      <a:alpha val="70000"/>
-                    </a:schemeClr>
-                  </a:outerShdw>
-                </a:effectLst>
+                <a:effectLst/>
                 <a:latin typeface="+mj-lt"/>
               </a:defRPr>
             </a:lvl1pPr>
@@ -3272,8 +2530,8 @@
         </p:nvSpPr>
         <p:spPr>
           <a:xfrm>
-            <a:off x="6372225" y="0"/>
-            <a:ext cx="2771775" cy="1989138"/>
+            <a:off x="8496302" y="0"/>
+            <a:ext cx="3695700" cy="1989138"/>
           </a:xfrm>
           <a:prstGeom prst="rect">
             <a:avLst/>
@@ -3325,7 +2583,7 @@
         <p:spPr>
           <a:xfrm>
             <a:off x="0" y="548640"/>
-            <a:ext cx="9144000" cy="6065224"/>
+            <a:ext cx="12192000" cy="6065224"/>
           </a:xfrm>
           <a:prstGeom prst="rect">
             <a:avLst/>
@@ -3337,13 +2595,7 @@
             <a:lvl1pPr marL="0" indent="0">
               <a:buNone/>
               <a:defRPr sz="2800" baseline="0">
-                <a:effectLst>
-                  <a:outerShdw blurRad="63500" dist="38100" algn="ctr" rotWithShape="0">
-                    <a:schemeClr val="bg1">
-                      <a:alpha val="70000"/>
-                    </a:schemeClr>
-                  </a:outerShdw>
-                </a:effectLst>
+                <a:effectLst/>
               </a:defRPr>
             </a:lvl1pPr>
           </a:lstStyle>
@@ -3392,8 +2644,8 @@
         </p:nvSpPr>
         <p:spPr>
           <a:xfrm>
-            <a:off x="-1" y="2330448"/>
-            <a:ext cx="2738966" cy="576263"/>
+            <a:off x="-2" y="2330451"/>
+            <a:ext cx="3651955" cy="576263"/>
           </a:xfrm>
           <a:prstGeom prst="rect">
             <a:avLst/>
@@ -3463,7 +2715,7 @@
         <p:spPr>
           <a:xfrm>
             <a:off x="-1" y="3230561"/>
-            <a:ext cx="2738965" cy="576262"/>
+            <a:ext cx="3651953" cy="576262"/>
           </a:xfrm>
           <a:prstGeom prst="rect">
             <a:avLst/>
@@ -3546,8 +2798,8 @@
         </p:blipFill>
         <p:spPr bwMode="auto">
           <a:xfrm>
-            <a:off x="179388" y="188913"/>
-            <a:ext cx="2339975" cy="1347787"/>
+            <a:off x="239186" y="188914"/>
+            <a:ext cx="3119967" cy="1347787"/>
           </a:xfrm>
           <a:prstGeom prst="rect">
             <a:avLst/>
@@ -3573,8 +2825,8 @@
         </p:nvSpPr>
         <p:spPr>
           <a:xfrm>
-            <a:off x="2815164" y="2330734"/>
-            <a:ext cx="6328835" cy="576063"/>
+            <a:off x="3753552" y="2330737"/>
+            <a:ext cx="8438447" cy="576063"/>
           </a:xfrm>
           <a:prstGeom prst="rect">
             <a:avLst/>
@@ -3589,13 +2841,7 @@
               </a:spcBef>
               <a:buNone/>
               <a:defRPr sz="2800">
-                <a:effectLst>
-                  <a:outerShdw blurRad="63500" dist="38100" algn="tl" rotWithShape="0">
-                    <a:schemeClr val="bg1">
-                      <a:alpha val="70000"/>
-                    </a:schemeClr>
-                  </a:outerShdw>
-                </a:effectLst>
+                <a:effectLst/>
                 <a:latin typeface="+mn-lt"/>
               </a:defRPr>
             </a:lvl1pPr>
@@ -3621,8 +2867,8 @@
         </p:nvSpPr>
         <p:spPr>
           <a:xfrm>
-            <a:off x="2815164" y="3230734"/>
-            <a:ext cx="6328835" cy="576063"/>
+            <a:off x="3753552" y="3230737"/>
+            <a:ext cx="8438447" cy="576063"/>
           </a:xfrm>
           <a:prstGeom prst="rect">
             <a:avLst/>
@@ -3637,13 +2883,7 @@
               </a:spcBef>
               <a:buNone/>
               <a:defRPr sz="2800">
-                <a:effectLst>
-                  <a:outerShdw blurRad="63500" dist="38100" algn="tl" rotWithShape="0">
-                    <a:schemeClr val="bg1">
-                      <a:alpha val="70000"/>
-                    </a:schemeClr>
-                  </a:outerShdw>
-                </a:effectLst>
+                <a:effectLst/>
                 <a:latin typeface="+mn-lt"/>
               </a:defRPr>
             </a:lvl1pPr>
@@ -3665,8 +2905,8 @@
         </p:nvSpPr>
         <p:spPr>
           <a:xfrm>
-            <a:off x="0" y="4382026"/>
-            <a:ext cx="4555067" cy="576262"/>
+            <a:off x="2" y="4382026"/>
+            <a:ext cx="6073423" cy="576262"/>
           </a:xfrm>
           <a:prstGeom prst="rect">
             <a:avLst/>
@@ -3720,8 +2960,8 @@
         </p:nvSpPr>
         <p:spPr>
           <a:xfrm>
-            <a:off x="2815165" y="5059534"/>
-            <a:ext cx="6328835" cy="576063"/>
+            <a:off x="3753555" y="5059537"/>
+            <a:ext cx="8438447" cy="576063"/>
           </a:xfrm>
           <a:prstGeom prst="rect">
             <a:avLst/>
@@ -3736,13 +2976,7 @@
               </a:spcBef>
               <a:buNone/>
               <a:defRPr sz="2800" baseline="0">
-                <a:effectLst>
-                  <a:outerShdw blurRad="63500" dist="38100" algn="tl" rotWithShape="0">
-                    <a:schemeClr val="bg1">
-                      <a:alpha val="70000"/>
-                    </a:schemeClr>
-                  </a:outerShdw>
-                </a:effectLst>
+                <a:effectLst/>
                 <a:latin typeface="+mn-lt"/>
               </a:defRPr>
             </a:lvl1pPr>
@@ -3772,8 +3006,8 @@
         </p:nvSpPr>
         <p:spPr>
           <a:xfrm>
-            <a:off x="2815162" y="5857454"/>
-            <a:ext cx="6328835" cy="576063"/>
+            <a:off x="3753551" y="5857457"/>
+            <a:ext cx="8438447" cy="576063"/>
           </a:xfrm>
           <a:prstGeom prst="rect">
             <a:avLst/>
@@ -3788,13 +3022,7 @@
               </a:spcBef>
               <a:buNone/>
               <a:defRPr sz="2800">
-                <a:effectLst>
-                  <a:outerShdw blurRad="63500" dist="38100" algn="tl" rotWithShape="0">
-                    <a:schemeClr val="bg1">
-                      <a:alpha val="70000"/>
-                    </a:schemeClr>
-                  </a:outerShdw>
-                </a:effectLst>
+                <a:effectLst/>
                 <a:latin typeface="+mn-lt"/>
               </a:defRPr>
             </a:lvl1pPr>
@@ -3840,32 +3068,6 @@
           <a:chExt cx="0" cy="0"/>
         </a:xfrm>
       </p:grpSpPr>
-      <p:pic>
-        <p:nvPicPr>
-          <p:cNvPr id="8" name="Tijdelijke aanduiding voor inhoud 3" descr="Einde.jpg"/>
-          <p:cNvPicPr>
-            <a:picLocks noChangeAspect="1"/>
-          </p:cNvPicPr>
-          <p:nvPr/>
-        </p:nvPicPr>
-        <p:blipFill rotWithShape="1">
-          <a:blip r:embed="rId2" cstate="print"/>
-          <a:srcRect l="62817"/>
-          <a:stretch/>
-        </p:blipFill>
-        <p:spPr>
-          <a:xfrm>
-            <a:off x="5753100" y="16032"/>
-            <a:ext cx="3405459" cy="6841968"/>
-          </a:xfrm>
-          <a:prstGeom prst="rect">
-            <a:avLst/>
-          </a:prstGeom>
-          <a:effectLst>
-            <a:softEdge rad="112500"/>
-          </a:effectLst>
-        </p:spPr>
-      </p:pic>
       <p:sp>
         <p:nvSpPr>
           <p:cNvPr id="9" name="Rectangle 8"/>
@@ -3874,8 +3076,8 @@
         </p:nvSpPr>
         <p:spPr>
           <a:xfrm>
-            <a:off x="0" y="15875"/>
-            <a:ext cx="5940425" cy="6842125"/>
+            <a:off x="2" y="15878"/>
+            <a:ext cx="7920567" cy="6842125"/>
           </a:xfrm>
           <a:prstGeom prst="rect">
             <a:avLst/>
@@ -3985,7 +3187,7 @@
               <a:defRPr/>
             </a:pPr>
             <a:r>
-              <a:rPr lang="nl-NL" sz="2600" dirty="0">
+              <a:rPr lang="nl-NL" sz="2600" dirty="0" smtClean="0">
                 <a:solidFill>
                   <a:schemeClr val="tx1">
                     <a:lumMod val="95000"/>
@@ -3995,8 +3197,18 @@
                 <a:latin typeface="+mn-lt"/>
                 <a:cs typeface="Arial" pitchFamily="34" charset="0"/>
               </a:rPr>
-              <a:t>aanvang </a:t>
+              <a:t>Aanvang: </a:t>
             </a:r>
+            <a:endParaRPr lang="nl-NL" sz="2600" dirty="0">
+              <a:solidFill>
+                <a:schemeClr val="tx1">
+                  <a:lumMod val="95000"/>
+                </a:schemeClr>
+              </a:solidFill>
+              <a:effectLst/>
+              <a:latin typeface="+mn-lt"/>
+              <a:cs typeface="Arial" pitchFamily="34" charset="0"/>
+            </a:endParaRPr>
           </a:p>
           <a:p>
             <a:pPr fontAlgn="auto">
@@ -4114,38 +3326,6 @@
           </a:p>
         </p:txBody>
       </p:sp>
-      <p:pic>
-        <p:nvPicPr>
-          <p:cNvPr id="10" name="Picture 2"/>
-          <p:cNvPicPr>
-            <a:picLocks noChangeAspect="1" noChangeArrowheads="1"/>
-          </p:cNvPicPr>
-          <p:nvPr/>
-        </p:nvPicPr>
-        <p:blipFill>
-          <a:blip r:embed="rId3" cstate="print"/>
-          <a:srcRect/>
-          <a:stretch>
-            <a:fillRect/>
-          </a:stretch>
-        </p:blipFill>
-        <p:spPr bwMode="auto">
-          <a:xfrm>
-            <a:off x="5940425" y="4232275"/>
-            <a:ext cx="2771775" cy="314325"/>
-          </a:xfrm>
-          <a:prstGeom prst="rect">
-            <a:avLst/>
-          </a:prstGeom>
-          <a:noFill/>
-          <a:ln w="9525">
-            <a:noFill/>
-            <a:miter lim="800000"/>
-            <a:headEnd/>
-            <a:tailEnd/>
-          </a:ln>
-        </p:spPr>
-      </p:pic>
       <p:sp>
         <p:nvSpPr>
           <p:cNvPr id="5" name="Text Placeholder 4"/>
@@ -4158,8 +3338,8 @@
         </p:nvSpPr>
         <p:spPr>
           <a:xfrm>
-            <a:off x="1956470" y="2026940"/>
-            <a:ext cx="3082033" cy="432048"/>
+            <a:off x="2046543" y="1632306"/>
+            <a:ext cx="5765351" cy="432048"/>
           </a:xfrm>
           <a:prstGeom prst="rect">
             <a:avLst/>
@@ -4174,13 +3354,7 @@
                 <a:solidFill>
                   <a:schemeClr val="bg1"/>
                 </a:solidFill>
-                <a:effectLst>
-                  <a:outerShdw blurRad="63500" dist="38100" algn="tl">
-                    <a:schemeClr val="bg1">
-                      <a:alpha val="70000"/>
-                    </a:schemeClr>
-                  </a:outerShdw>
-                </a:effectLst>
+                <a:effectLst/>
                 <a:latin typeface="+mn-lt"/>
                 <a:ea typeface="+mn-ea"/>
                 <a:cs typeface="Arial" pitchFamily="34" charset="0"/>
@@ -4190,7 +3364,7 @@
           <a:p>
             <a:pPr lvl="0"/>
             <a:r>
-              <a:rPr lang="en-US" smtClean="0"/>
+              <a:rPr lang="en-US" dirty="0" smtClean="0"/>
               <a:t>Click to edit Master text styles</a:t>
             </a:r>
           </a:p>
@@ -4208,8 +3382,8 @@
         </p:nvSpPr>
         <p:spPr>
           <a:xfrm>
-            <a:off x="2502570" y="2426990"/>
-            <a:ext cx="3082033" cy="432048"/>
+            <a:off x="2480114" y="2025854"/>
+            <a:ext cx="6025825" cy="432048"/>
           </a:xfrm>
           <a:prstGeom prst="rect">
             <a:avLst/>
@@ -4224,13 +3398,7 @@
                 <a:solidFill>
                   <a:schemeClr val="bg1"/>
                 </a:solidFill>
-                <a:effectLst>
-                  <a:outerShdw blurRad="63500" dist="38100" algn="tl">
-                    <a:schemeClr val="bg1">
-                      <a:alpha val="70000"/>
-                    </a:schemeClr>
-                  </a:outerShdw>
-                </a:effectLst>
+                <a:effectLst/>
                 <a:latin typeface="+mn-lt"/>
                 <a:ea typeface="+mn-ea"/>
                 <a:cs typeface="Arial" pitchFamily="34" charset="0"/>
@@ -4240,72 +3408,80 @@
           <a:p>
             <a:pPr lvl="0"/>
             <a:r>
-              <a:rPr lang="en-US" smtClean="0"/>
+              <a:rPr lang="en-US" dirty="0" smtClean="0"/>
               <a:t>Click to edit Master text styles</a:t>
             </a:r>
           </a:p>
         </p:txBody>
       </p:sp>
+      <p:pic>
+        <p:nvPicPr>
+          <p:cNvPr id="13" name="Tijdelijke aanduiding voor inhoud 3" descr="Einde.jpg"/>
+          <p:cNvPicPr>
+            <a:picLocks noChangeAspect="1"/>
+          </p:cNvPicPr>
+          <p:nvPr userDrawn="1"/>
+        </p:nvPicPr>
+        <p:blipFill rotWithShape="1">
+          <a:blip r:embed="rId2" cstate="print"/>
+          <a:srcRect l="62955"/>
+          <a:stretch/>
+        </p:blipFill>
+        <p:spPr>
+          <a:xfrm>
+            <a:off x="8604985" y="16032"/>
+            <a:ext cx="3606428" cy="6841968"/>
+          </a:xfrm>
+          <a:prstGeom prst="rect">
+            <a:avLst/>
+          </a:prstGeom>
+          <a:effectLst>
+            <a:softEdge rad="112500"/>
+          </a:effectLst>
+        </p:spPr>
+      </p:pic>
+      <p:pic>
+        <p:nvPicPr>
+          <p:cNvPr id="14" name="Picture 13"/>
+          <p:cNvPicPr>
+            <a:picLocks noChangeAspect="1" noChangeArrowheads="1"/>
+          </p:cNvPicPr>
+          <p:nvPr userDrawn="1"/>
+        </p:nvPicPr>
+        <p:blipFill>
+          <a:blip r:embed="rId3" cstate="print"/>
+          <a:srcRect/>
+          <a:stretch>
+            <a:fillRect/>
+          </a:stretch>
+        </p:blipFill>
+        <p:spPr bwMode="auto">
+          <a:xfrm>
+            <a:off x="8816741" y="4232278"/>
+            <a:ext cx="2799526" cy="314325"/>
+          </a:xfrm>
+          <a:prstGeom prst="rect">
+            <a:avLst/>
+          </a:prstGeom>
+          <a:noFill/>
+          <a:ln w="9525">
+            <a:noFill/>
+            <a:miter lim="800000"/>
+            <a:headEnd/>
+            <a:tailEnd/>
+          </a:ln>
+        </p:spPr>
+      </p:pic>
       <p:sp>
         <p:nvSpPr>
-          <p:cNvPr id="7" name="Text Placeholder 4"/>
-          <p:cNvSpPr>
-            <a:spLocks noGrp="1"/>
-          </p:cNvSpPr>
-          <p:nvPr>
-            <p:ph type="body" sz="quarter" idx="12"/>
-          </p:nvPr>
-        </p:nvSpPr>
-        <p:spPr>
-          <a:xfrm>
-            <a:off x="629320" y="2823865"/>
-            <a:ext cx="3082033" cy="432048"/>
-          </a:xfrm>
-          <a:prstGeom prst="rect">
-            <a:avLst/>
-          </a:prstGeom>
-        </p:spPr>
-        <p:txBody>
-          <a:bodyPr/>
-          <a:lstStyle>
-            <a:lvl1pPr marL="0" indent="0">
-              <a:buNone/>
-              <a:defRPr lang="en-GB" sz="2600" kern="1200" baseline="0" dirty="0">
-                <a:solidFill>
-                  <a:schemeClr val="bg1"/>
-                </a:solidFill>
-                <a:effectLst>
-                  <a:outerShdw blurRad="63500" dist="38100" algn="tl">
-                    <a:schemeClr val="bg1">
-                      <a:alpha val="70000"/>
-                    </a:schemeClr>
-                  </a:outerShdw>
-                </a:effectLst>
-                <a:latin typeface="+mn-lt"/>
-                <a:ea typeface="+mn-ea"/>
-                <a:cs typeface="Arial" pitchFamily="34" charset="0"/>
-              </a:defRPr>
-            </a:lvl1pPr>
-          </a:lstStyle>
-          <a:p>
-            <a:pPr lvl="0"/>
-            <a:r>
-              <a:rPr lang="en-US" smtClean="0"/>
-              <a:t>Click to edit Master text styles</a:t>
-            </a:r>
-          </a:p>
-        </p:txBody>
-      </p:sp>
-      <p:sp>
-        <p:nvSpPr>
-          <p:cNvPr id="11" name="Afgeronde rechthoek 10"/>
+          <p:cNvPr id="15" name="Afgeronde rechthoek 5"/>
           <p:cNvSpPr/>
           <p:nvPr userDrawn="1"/>
         </p:nvSpPr>
         <p:spPr>
           <a:xfrm>
-            <a:off x="5917224" y="4659923"/>
-            <a:ext cx="2620107" cy="562708"/>
+            <a:off x="8816741" y="4659923"/>
+            <a:ext cx="2566368" cy="562708"/>
           </a:xfrm>
           <a:prstGeom prst="roundRect">
             <a:avLst/>
@@ -4350,14 +3526,14 @@
       </p:sp>
       <p:sp>
         <p:nvSpPr>
-          <p:cNvPr id="12" name="Tekstvak 11"/>
+          <p:cNvPr id="16" name="Tekstvak 4"/>
           <p:cNvSpPr txBox="1"/>
           <p:nvPr userDrawn="1"/>
         </p:nvSpPr>
         <p:spPr bwMode="auto">
           <a:xfrm>
-            <a:off x="5249007" y="6207368"/>
-            <a:ext cx="4317024" cy="430887"/>
+            <a:off x="8114097" y="6207371"/>
+            <a:ext cx="4077904" cy="430887"/>
           </a:xfrm>
           <a:prstGeom prst="rect">
             <a:avLst/>
@@ -4458,8 +3634,8 @@
         </p:blipFill>
         <p:spPr>
           <a:xfrm>
-            <a:off x="5765800" y="16032"/>
-            <a:ext cx="3392759" cy="6841968"/>
+            <a:off x="8604985" y="16032"/>
+            <a:ext cx="3606428" cy="6841968"/>
           </a:xfrm>
           <a:prstGeom prst="rect">
             <a:avLst/>
@@ -4477,8 +3653,8 @@
         </p:nvSpPr>
         <p:spPr>
           <a:xfrm>
-            <a:off x="0" y="15875"/>
-            <a:ext cx="5940425" cy="6842125"/>
+            <a:off x="2" y="15878"/>
+            <a:ext cx="7920567" cy="6842125"/>
           </a:xfrm>
           <a:prstGeom prst="rect">
             <a:avLst/>
@@ -4794,8 +3970,8 @@
         </p:blipFill>
         <p:spPr bwMode="auto">
           <a:xfrm>
-            <a:off x="5940425" y="4232275"/>
-            <a:ext cx="2771775" cy="314325"/>
+            <a:off x="8816741" y="4232278"/>
+            <a:ext cx="2799526" cy="314325"/>
           </a:xfrm>
           <a:prstGeom prst="rect">
             <a:avLst/>
@@ -4817,8 +3993,8 @@
         </p:nvSpPr>
         <p:spPr bwMode="auto">
           <a:xfrm>
-            <a:off x="5249007" y="6207368"/>
-            <a:ext cx="4317024" cy="430887"/>
+            <a:off x="8114097" y="6207371"/>
+            <a:ext cx="4077904" cy="430887"/>
           </a:xfrm>
           <a:prstGeom prst="rect">
             <a:avLst/>
@@ -4884,8 +4060,8 @@
         </p:nvSpPr>
         <p:spPr>
           <a:xfrm>
-            <a:off x="5917224" y="4659923"/>
-            <a:ext cx="2620107" cy="562708"/>
+            <a:off x="8816741" y="4659923"/>
+            <a:ext cx="2566368" cy="562708"/>
           </a:xfrm>
           <a:prstGeom prst="roundRect">
             <a:avLst/>
@@ -4989,8 +4165,8 @@
         </p:blipFill>
         <p:spPr bwMode="auto">
           <a:xfrm>
-            <a:off x="142455" y="-1512195"/>
-            <a:ext cx="9001545" cy="6724094"/>
+            <a:off x="189942" y="-1512195"/>
+            <a:ext cx="9146563" cy="6724094"/>
           </a:xfrm>
           <a:prstGeom prst="rect">
             <a:avLst/>
@@ -5022,14 +4198,14 @@
       </p:pic>
       <p:sp>
         <p:nvSpPr>
-          <p:cNvPr id="10" name="Tekstvak 1"/>
-          <p:cNvSpPr txBox="1"/>
+          <p:cNvPr id="2" name="Rectangle 1"/>
+          <p:cNvSpPr/>
           <p:nvPr userDrawn="1"/>
         </p:nvSpPr>
-        <p:spPr bwMode="auto">
-          <a:xfrm>
-            <a:off x="0" y="-97971"/>
-            <a:ext cx="9144000" cy="2895600"/>
+        <p:spPr>
+          <a:xfrm>
+            <a:off x="-67377" y="-125128"/>
+            <a:ext cx="9577137" cy="3599848"/>
           </a:xfrm>
           <a:prstGeom prst="rect">
             <a:avLst/>
@@ -5037,38 +4213,42 @@
           <a:solidFill>
             <a:srgbClr val="000000"/>
           </a:solidFill>
-          <a:ln w="9525">
-            <a:noFill/>
-            <a:miter lim="800000"/>
-            <a:headEnd/>
-            <a:tailEnd/>
+          <a:ln>
+            <a:solidFill>
+              <a:srgbClr val="000000"/>
+            </a:solidFill>
           </a:ln>
         </p:spPr>
+        <p:style>
+          <a:lnRef idx="2">
+            <a:schemeClr val="accent1">
+              <a:shade val="50000"/>
+            </a:schemeClr>
+          </a:lnRef>
+          <a:fillRef idx="1">
+            <a:schemeClr val="accent1"/>
+          </a:fillRef>
+          <a:effectRef idx="0">
+            <a:schemeClr val="accent1"/>
+          </a:effectRef>
+          <a:fontRef idx="minor">
+            <a:schemeClr val="lt1"/>
+          </a:fontRef>
+        </p:style>
         <p:txBody>
-          <a:bodyPr wrap="square" lIns="720000" rIns="180000" rtlCol="0" anchor="t" anchorCtr="0">
-            <a:spAutoFit/>
-          </a:bodyPr>
+          <a:bodyPr rtlCol="0" anchor="ctr"/>
           <a:lstStyle/>
           <a:p>
-            <a:pPr fontAlgn="auto">
-              <a:spcAft>
-                <a:spcPts val="0"/>
-              </a:spcAft>
-            </a:pPr>
-            <a:endParaRPr lang="nl-NL" sz="2800" dirty="0" smtClean="0">
+            <a:pPr algn="ctr"/>
+            <a:endParaRPr lang="en-US">
+              <a:ln>
+                <a:solidFill>
+                  <a:sysClr val="windowText" lastClr="000000"/>
+                </a:solidFill>
+              </a:ln>
               <a:solidFill>
-                <a:schemeClr val="bg1"/>
+                <a:sysClr val="windowText" lastClr="000000"/>
               </a:solidFill>
-              <a:effectLst>
-                <a:outerShdw blurRad="38100" dist="38100" dir="2700000" algn="tl">
-                  <a:srgbClr val="000000">
-                    <a:alpha val="43137"/>
-                  </a:srgbClr>
-                </a:outerShdw>
-              </a:effectLst>
-              <a:latin typeface="Tahoma" pitchFamily="34" charset="0"/>
-              <a:ea typeface="+mj-ea"/>
-              <a:cs typeface="Tahoma" pitchFamily="34" charset="0"/>
             </a:endParaRPr>
           </a:p>
         </p:txBody>
@@ -5111,14 +4291,14 @@
       </p:grpSpPr>
       <p:pic>
         <p:nvPicPr>
-          <p:cNvPr id="1026" name="Picture 2"/>
+          <p:cNvPr id="3" name="Picture 2"/>
           <p:cNvPicPr>
             <a:picLocks noChangeAspect="1" noChangeArrowheads="1"/>
           </p:cNvPicPr>
           <p:nvPr userDrawn="1"/>
         </p:nvPicPr>
         <p:blipFill>
-          <a:blip r:embed="rId25" cstate="print"/>
+          <a:blip r:embed="rId24" cstate="print"/>
           <a:srcRect/>
           <a:stretch>
             <a:fillRect/>
@@ -5126,7 +4306,7 @@
         </p:blipFill>
         <p:spPr bwMode="auto">
           <a:xfrm>
-            <a:off x="6359543" y="0"/>
+            <a:off x="9407544" y="0"/>
             <a:ext cx="2784456" cy="1573823"/>
           </a:xfrm>
           <a:prstGeom prst="rect">
@@ -5165,9 +4345,8 @@
     <p:sldLayoutId id="2147484231" r:id="rId18"/>
     <p:sldLayoutId id="2147484232" r:id="rId19"/>
     <p:sldLayoutId id="2147484296" r:id="rId20"/>
-    <p:sldLayoutId id="2147484297" r:id="rId21"/>
-    <p:sldLayoutId id="2147484298" r:id="rId22"/>
-    <p:sldLayoutId id="2147484295" r:id="rId23"/>
+    <p:sldLayoutId id="2147484298" r:id="rId21"/>
+    <p:sldLayoutId id="2147484295" r:id="rId22"/>
   </p:sldLayoutIdLst>
   <p:transition>
     <p:fade/>

</xml_diff>

<commit_message>
Revert "dia verhouding naar 16:9"
This reverts commit 9456a89db9a075d5d1bc72398743f3c53fb931d1.
</commit_message>
<xml_diff>
--- a/src/main/resources/template.pptx
+++ b/src/main/resources/template.pptx
@@ -13,7 +13,7 @@
   <p:sldIdLst>
     <p:sldId id="256" r:id="rId2"/>
   </p:sldIdLst>
-  <p:sldSz cx="12192000" cy="6858000"/>
+  <p:sldSz cx="9144000" cy="6858000" type="screen4x3"/>
   <p:notesSz cx="6858000" cy="9144000"/>
   <p:defaultTextStyle>
     <a:defPPr>
@@ -143,12 +143,12 @@
   <p:extLst>
     <p:ext uri="{EFAFB233-063F-42B5-8137-9DF3F51BA10A}">
       <p15:sldGuideLst xmlns:p15="http://schemas.microsoft.com/office/powerpoint/2012/main">
-        <p15:guide id="1" orient="horz" pos="2160" userDrawn="1">
+        <p15:guide id="1" orient="horz" pos="2160">
           <p15:clr>
             <a:srgbClr val="A4A3A4"/>
           </p15:clr>
         </p15:guide>
-        <p15:guide id="2" pos="3840" userDrawn="1">
+        <p15:guide id="2" pos="2880">
           <p15:clr>
             <a:srgbClr val="A4A3A4"/>
           </p15:clr>
@@ -253,7 +253,7 @@
               <a:pPr>
                 <a:defRPr/>
               </a:pPr>
-              <a:t>11/01/2018</a:t>
+              <a:t>23/09/2017</a:t>
             </a:fld>
             <a:endParaRPr lang="en-GB"/>
           </a:p>
@@ -436,7 +436,7 @@
               <a:pPr>
                 <a:defRPr/>
               </a:pPr>
-              <a:t>11-01-18</a:t>
+              <a:t>23-09-17</a:t>
             </a:fld>
             <a:endParaRPr lang="nl-NL"/>
           </a:p>
@@ -454,8 +454,8 @@
         </p:nvSpPr>
         <p:spPr>
           <a:xfrm>
-            <a:off x="381000" y="685800"/>
-            <a:ext cx="6096000" cy="3429000"/>
+            <a:off x="1143000" y="685800"/>
+            <a:ext cx="4572000" cy="3429000"/>
           </a:xfrm>
           <a:prstGeom prst="rect">
             <a:avLst/>
@@ -774,7 +774,7 @@
         <p:spPr bwMode="auto">
           <a:xfrm>
             <a:off x="0" y="1628775"/>
-            <a:ext cx="12192000" cy="3455988"/>
+            <a:ext cx="9144000" cy="3455988"/>
           </a:xfrm>
           <a:prstGeom prst="rect">
             <a:avLst/>
@@ -979,8 +979,8 @@
         </p:nvSpPr>
         <p:spPr bwMode="auto">
           <a:xfrm>
-            <a:off x="11684001" y="6591303"/>
-            <a:ext cx="440267" cy="169863"/>
+            <a:off x="8763000" y="6591300"/>
+            <a:ext cx="330200" cy="169863"/>
           </a:xfrm>
           <a:prstGeom prst="rect">
             <a:avLst/>
@@ -1052,7 +1052,7 @@
         <p:spPr>
           <a:xfrm>
             <a:off x="0" y="5085184"/>
-            <a:ext cx="12192000" cy="1772816"/>
+            <a:ext cx="9144000" cy="1772816"/>
           </a:xfrm>
           <a:prstGeom prst="rect">
             <a:avLst/>
@@ -1122,8 +1122,8 @@
         </p:blipFill>
         <p:spPr bwMode="auto">
           <a:xfrm>
-            <a:off x="1295402" y="549275"/>
-            <a:ext cx="2781300" cy="1866900"/>
+            <a:off x="971550" y="549275"/>
+            <a:ext cx="2085975" cy="1866900"/>
           </a:xfrm>
           <a:prstGeom prst="rect">
             <a:avLst/>
@@ -1187,8 +1187,8 @@
         </p:blipFill>
         <p:spPr bwMode="auto">
           <a:xfrm>
-            <a:off x="1295402" y="549278"/>
-            <a:ext cx="3441700" cy="1736725"/>
+            <a:off x="971550" y="549275"/>
+            <a:ext cx="2581275" cy="1736725"/>
           </a:xfrm>
           <a:prstGeom prst="rect">
             <a:avLst/>
@@ -1252,8 +1252,8 @@
         </p:blipFill>
         <p:spPr bwMode="auto">
           <a:xfrm>
-            <a:off x="1295402" y="549278"/>
-            <a:ext cx="2595033" cy="2009775"/>
+            <a:off x="971550" y="549275"/>
+            <a:ext cx="1946275" cy="2009775"/>
           </a:xfrm>
           <a:prstGeom prst="rect">
             <a:avLst/>
@@ -1317,8 +1317,8 @@
         </p:blipFill>
         <p:spPr bwMode="auto">
           <a:xfrm>
-            <a:off x="1295400" y="565150"/>
-            <a:ext cx="2692400" cy="1841500"/>
+            <a:off x="971550" y="565150"/>
+            <a:ext cx="2019300" cy="1841500"/>
           </a:xfrm>
           <a:prstGeom prst="rect">
             <a:avLst/>
@@ -1376,8 +1376,8 @@
         </p:blipFill>
         <p:spPr>
           <a:xfrm>
-            <a:off x="1295401" y="579441"/>
-            <a:ext cx="3005667" cy="1939925"/>
+            <a:off x="971550" y="579438"/>
+            <a:ext cx="2254250" cy="1939925"/>
           </a:xfrm>
           <a:prstGeom prst="rect">
             <a:avLst/>
@@ -1435,8 +1435,8 @@
         </p:blipFill>
         <p:spPr>
           <a:xfrm>
-            <a:off x="1289053" y="549278"/>
-            <a:ext cx="3204633" cy="1470025"/>
+            <a:off x="966788" y="549275"/>
+            <a:ext cx="2403475" cy="1470025"/>
           </a:xfrm>
           <a:prstGeom prst="rect">
             <a:avLst/>
@@ -1494,8 +1494,8 @@
         </p:blipFill>
         <p:spPr>
           <a:xfrm>
-            <a:off x="1295401" y="549275"/>
-            <a:ext cx="2827867" cy="1682750"/>
+            <a:off x="971550" y="549275"/>
+            <a:ext cx="2120900" cy="1682750"/>
           </a:xfrm>
           <a:prstGeom prst="rect">
             <a:avLst/>
@@ -1554,8 +1554,8 @@
         </p:blipFill>
         <p:spPr bwMode="auto">
           <a:xfrm>
-            <a:off x="1295400" y="549278"/>
-            <a:ext cx="2618317" cy="1571625"/>
+            <a:off x="971550" y="549275"/>
+            <a:ext cx="1963738" cy="1571625"/>
           </a:xfrm>
           <a:prstGeom prst="rect">
             <a:avLst/>
@@ -1605,8 +1605,8 @@
         </p:nvSpPr>
         <p:spPr>
           <a:xfrm>
-            <a:off x="8303686" y="115889"/>
-            <a:ext cx="3888316" cy="1728787"/>
+            <a:off x="6227763" y="115888"/>
+            <a:ext cx="2916237" cy="1728787"/>
           </a:xfrm>
           <a:prstGeom prst="rect">
             <a:avLst/>
@@ -1685,8 +1685,8 @@
         </p:nvSpPr>
         <p:spPr>
           <a:xfrm>
-            <a:off x="609600" y="6356353"/>
-            <a:ext cx="2844800" cy="365125"/>
+            <a:off x="457200" y="6356350"/>
+            <a:ext cx="2133600" cy="365125"/>
           </a:xfrm>
           <a:prstGeom prst="rect">
             <a:avLst/>
@@ -1717,7 +1717,7 @@
               <a:pPr>
                 <a:defRPr/>
               </a:pPr>
-              <a:t>11/01/2018</a:t>
+              <a:t>23/09/2017</a:t>
             </a:fld>
             <a:endParaRPr lang="en-GB"/>
           </a:p>
@@ -1735,8 +1735,8 @@
         </p:nvSpPr>
         <p:spPr>
           <a:xfrm>
-            <a:off x="4165600" y="6356353"/>
-            <a:ext cx="3860800" cy="365125"/>
+            <a:off x="3124200" y="6356350"/>
+            <a:ext cx="2895600" cy="365125"/>
           </a:xfrm>
           <a:prstGeom prst="rect">
             <a:avLst/>
@@ -1778,8 +1778,8 @@
         </p:nvSpPr>
         <p:spPr>
           <a:xfrm>
-            <a:off x="8737600" y="6356353"/>
-            <a:ext cx="2844800" cy="365125"/>
+            <a:off x="6553200" y="6356350"/>
+            <a:ext cx="2133600" cy="365125"/>
           </a:xfrm>
           <a:prstGeom prst="rect">
             <a:avLst/>
@@ -1853,7 +1853,7 @@
         <p:spPr bwMode="auto">
           <a:xfrm>
             <a:off x="0" y="0"/>
-            <a:ext cx="6199717" cy="1908175"/>
+            <a:ext cx="4649788" cy="1908175"/>
           </a:xfrm>
           <a:prstGeom prst="rect">
             <a:avLst/>
@@ -1958,8 +1958,8 @@
         </p:nvSpPr>
         <p:spPr>
           <a:xfrm>
-            <a:off x="949570" y="1151792"/>
-            <a:ext cx="11242431" cy="5453194"/>
+            <a:off x="712176" y="1151792"/>
+            <a:ext cx="8431823" cy="5453194"/>
           </a:xfrm>
           <a:prstGeom prst="rect">
             <a:avLst/>
@@ -1998,8 +1998,8 @@
         </p:nvSpPr>
         <p:spPr bwMode="auto">
           <a:xfrm>
-            <a:off x="0" y="301256"/>
-            <a:ext cx="4700952" cy="584775"/>
+            <a:off x="0" y="301253"/>
+            <a:ext cx="3525714" cy="584775"/>
           </a:xfrm>
           <a:prstGeom prst="rect">
             <a:avLst/>
@@ -2056,6 +2056,690 @@
 </file>
 
 <file path=ppt/slideLayouts/slideLayout21.xml><?xml version="1.0" encoding="utf-8"?>
+<p:sldLayout xmlns:a="http://schemas.openxmlformats.org/drawingml/2006/main" xmlns:r="http://schemas.openxmlformats.org/officeDocument/2006/relationships" xmlns:p="http://schemas.openxmlformats.org/presentationml/2006/main" preserve="1" userDrawn="1">
+  <p:cSld name="video melding">
+    <p:spTree>
+      <p:nvGrpSpPr>
+        <p:cNvPr id="1" name=""/>
+        <p:cNvGrpSpPr/>
+        <p:nvPr/>
+      </p:nvGrpSpPr>
+      <p:grpSpPr>
+        <a:xfrm>
+          <a:off x="0" y="0"/>
+          <a:ext cx="0" cy="0"/>
+          <a:chOff x="0" y="0"/>
+          <a:chExt cx="0" cy="0"/>
+        </a:xfrm>
+      </p:grpSpPr>
+      <p:pic>
+        <p:nvPicPr>
+          <p:cNvPr id="1031" name="Picture 7"/>
+          <p:cNvPicPr>
+            <a:picLocks noChangeAspect="1" noChangeArrowheads="1"/>
+          </p:cNvPicPr>
+          <p:nvPr userDrawn="1"/>
+        </p:nvPicPr>
+        <p:blipFill>
+          <a:blip r:embed="rId2" cstate="print">
+            <a:extLst>
+              <a:ext uri="{28A0092B-C50C-407E-A947-70E740481C1C}">
+                <a14:useLocalDpi xmlns:a14="http://schemas.microsoft.com/office/drawing/2010/main" val="0"/>
+              </a:ext>
+            </a:extLst>
+          </a:blip>
+          <a:srcRect/>
+          <a:stretch>
+            <a:fillRect/>
+          </a:stretch>
+        </p:blipFill>
+        <p:spPr bwMode="auto">
+          <a:xfrm>
+            <a:off x="-133470" y="3976777"/>
+            <a:ext cx="2468156" cy="3781486"/>
+          </a:xfrm>
+          <a:prstGeom prst="rect">
+            <a:avLst/>
+          </a:prstGeom>
+          <a:noFill/>
+          <a:ln>
+            <a:noFill/>
+          </a:ln>
+          <a:extLst>
+            <a:ext uri="{909E8E84-426E-40DD-AFC4-6F175D3DCCD1}">
+              <a14:hiddenFill xmlns:a14="http://schemas.microsoft.com/office/drawing/2010/main">
+                <a:solidFill>
+                  <a:schemeClr val="accent1"/>
+                </a:solidFill>
+              </a14:hiddenFill>
+            </a:ext>
+            <a:ext uri="{91240B29-F687-4F45-9708-019B960494DF}">
+              <a14:hiddenLine xmlns:a14="http://schemas.microsoft.com/office/drawing/2010/main" w="9525">
+                <a:solidFill>
+                  <a:schemeClr val="tx1"/>
+                </a:solidFill>
+                <a:miter lim="800000"/>
+                <a:headEnd/>
+                <a:tailEnd/>
+              </a14:hiddenLine>
+            </a:ext>
+          </a:extLst>
+        </p:spPr>
+      </p:pic>
+      <p:sp>
+        <p:nvSpPr>
+          <p:cNvPr id="2" name="Tekstvak 1"/>
+          <p:cNvSpPr txBox="1"/>
+          <p:nvPr userDrawn="1"/>
+        </p:nvSpPr>
+        <p:spPr bwMode="auto">
+          <a:xfrm>
+            <a:off x="86264" y="543464"/>
+            <a:ext cx="5966071" cy="646331"/>
+          </a:xfrm>
+          <a:prstGeom prst="rect">
+            <a:avLst/>
+          </a:prstGeom>
+          <a:noFill/>
+          <a:ln w="9525">
+            <a:noFill/>
+            <a:miter lim="800000"/>
+            <a:headEnd/>
+            <a:tailEnd/>
+          </a:ln>
+        </p:spPr>
+        <p:txBody>
+          <a:bodyPr wrap="none" lIns="720000" rIns="180000" rtlCol="0" anchor="t" anchorCtr="0">
+            <a:spAutoFit/>
+          </a:bodyPr>
+          <a:lstStyle/>
+          <a:p>
+            <a:pPr fontAlgn="auto">
+              <a:spcAft>
+                <a:spcPts val="0"/>
+              </a:spcAft>
+            </a:pPr>
+            <a:r>
+              <a:rPr lang="nl-NL" sz="3600" dirty="0" smtClean="0">
+                <a:solidFill>
+                  <a:schemeClr val="bg1"/>
+                </a:solidFill>
+                <a:effectLst>
+                  <a:outerShdw blurRad="38100" dist="38100" dir="2700000" algn="tl">
+                    <a:srgbClr val="000000">
+                      <a:alpha val="43137"/>
+                    </a:srgbClr>
+                  </a:outerShdw>
+                </a:effectLst>
+                <a:latin typeface="Tahoma" pitchFamily="34" charset="0"/>
+                <a:ea typeface="+mj-ea"/>
+                <a:cs typeface="Tahoma" pitchFamily="34" charset="0"/>
+              </a:rPr>
+              <a:t>Video</a:t>
+            </a:r>
+            <a:r>
+              <a:rPr lang="nl-NL" sz="3600" baseline="0" dirty="0" smtClean="0">
+                <a:solidFill>
+                  <a:schemeClr val="bg1"/>
+                </a:solidFill>
+                <a:effectLst>
+                  <a:outerShdw blurRad="38100" dist="38100" dir="2700000" algn="tl">
+                    <a:srgbClr val="000000">
+                      <a:alpha val="43137"/>
+                    </a:srgbClr>
+                  </a:outerShdw>
+                </a:effectLst>
+                <a:latin typeface="Tahoma" pitchFamily="34" charset="0"/>
+                <a:ea typeface="+mj-ea"/>
+                <a:cs typeface="Tahoma" pitchFamily="34" charset="0"/>
+              </a:rPr>
+              <a:t> in het Noorderlicht</a:t>
+            </a:r>
+            <a:endParaRPr lang="nl-NL" sz="3600" dirty="0" smtClean="0">
+              <a:solidFill>
+                <a:schemeClr val="bg1"/>
+              </a:solidFill>
+              <a:effectLst>
+                <a:outerShdw blurRad="38100" dist="38100" dir="2700000" algn="tl">
+                  <a:srgbClr val="000000">
+                    <a:alpha val="43137"/>
+                  </a:srgbClr>
+                </a:outerShdw>
+              </a:effectLst>
+              <a:latin typeface="Tahoma" pitchFamily="34" charset="0"/>
+              <a:ea typeface="+mj-ea"/>
+              <a:cs typeface="Tahoma" pitchFamily="34" charset="0"/>
+            </a:endParaRPr>
+          </a:p>
+        </p:txBody>
+      </p:sp>
+      <p:sp>
+        <p:nvSpPr>
+          <p:cNvPr id="4" name="Tekstvak 3"/>
+          <p:cNvSpPr txBox="1"/>
+          <p:nvPr userDrawn="1"/>
+        </p:nvSpPr>
+        <p:spPr bwMode="auto">
+          <a:xfrm>
+            <a:off x="86264" y="1759787"/>
+            <a:ext cx="7241164" cy="1938992"/>
+          </a:xfrm>
+          <a:prstGeom prst="rect">
+            <a:avLst/>
+          </a:prstGeom>
+          <a:noFill/>
+          <a:ln w="9525">
+            <a:noFill/>
+            <a:miter lim="800000"/>
+            <a:headEnd/>
+            <a:tailEnd/>
+          </a:ln>
+        </p:spPr>
+        <p:txBody>
+          <a:bodyPr wrap="none" lIns="720000" rIns="180000" rtlCol="0" anchor="t" anchorCtr="0">
+            <a:spAutoFit/>
+          </a:bodyPr>
+          <a:lstStyle/>
+          <a:p>
+            <a:pPr fontAlgn="auto">
+              <a:spcAft>
+                <a:spcPts val="0"/>
+              </a:spcAft>
+            </a:pPr>
+            <a:r>
+              <a:rPr lang="nl-NL" sz="2400" dirty="0" smtClean="0">
+                <a:solidFill>
+                  <a:schemeClr val="bg1"/>
+                </a:solidFill>
+                <a:effectLst>
+                  <a:outerShdw blurRad="38100" dist="38100" dir="2700000" algn="tl">
+                    <a:srgbClr val="000000">
+                      <a:alpha val="43137"/>
+                    </a:srgbClr>
+                  </a:outerShdw>
+                </a:effectLst>
+                <a:latin typeface="Tahoma" pitchFamily="34" charset="0"/>
+                <a:ea typeface="+mj-ea"/>
+                <a:cs typeface="Tahoma" pitchFamily="34" charset="0"/>
+              </a:rPr>
+              <a:t>Deze dienst wordt opgenomen en uitgezonden</a:t>
+            </a:r>
+          </a:p>
+          <a:p>
+            <a:pPr fontAlgn="auto">
+              <a:spcAft>
+                <a:spcPts val="0"/>
+              </a:spcAft>
+            </a:pPr>
+            <a:r>
+              <a:rPr lang="nl-NL" sz="2400" dirty="0" smtClean="0">
+                <a:solidFill>
+                  <a:schemeClr val="bg1"/>
+                </a:solidFill>
+                <a:effectLst>
+                  <a:outerShdw blurRad="38100" dist="38100" dir="2700000" algn="tl">
+                    <a:srgbClr val="000000">
+                      <a:alpha val="43137"/>
+                    </a:srgbClr>
+                  </a:outerShdw>
+                </a:effectLst>
+                <a:latin typeface="Tahoma" pitchFamily="34" charset="0"/>
+                <a:ea typeface="+mj-ea"/>
+                <a:cs typeface="Tahoma" pitchFamily="34" charset="0"/>
+              </a:rPr>
+              <a:t>via een livestream</a:t>
+            </a:r>
+            <a:r>
+              <a:rPr lang="nl-NL" sz="2400" baseline="0" dirty="0" smtClean="0">
+                <a:solidFill>
+                  <a:schemeClr val="bg1"/>
+                </a:solidFill>
+                <a:effectLst>
+                  <a:outerShdw blurRad="38100" dist="38100" dir="2700000" algn="tl">
+                    <a:srgbClr val="000000">
+                      <a:alpha val="43137"/>
+                    </a:srgbClr>
+                  </a:outerShdw>
+                </a:effectLst>
+                <a:latin typeface="Tahoma" pitchFamily="34" charset="0"/>
+                <a:ea typeface="+mj-ea"/>
+                <a:cs typeface="Tahoma" pitchFamily="34" charset="0"/>
+              </a:rPr>
+              <a:t> op het internet.</a:t>
+            </a:r>
+          </a:p>
+          <a:p>
+            <a:pPr fontAlgn="auto">
+              <a:spcAft>
+                <a:spcPts val="0"/>
+              </a:spcAft>
+            </a:pPr>
+            <a:r>
+              <a:rPr lang="nl-NL" sz="2400" baseline="0" dirty="0" smtClean="0">
+                <a:solidFill>
+                  <a:schemeClr val="bg1"/>
+                </a:solidFill>
+                <a:effectLst>
+                  <a:outerShdw blurRad="38100" dist="38100" dir="2700000" algn="tl">
+                    <a:srgbClr val="000000">
+                      <a:alpha val="43137"/>
+                    </a:srgbClr>
+                  </a:outerShdw>
+                </a:effectLst>
+                <a:latin typeface="Tahoma" pitchFamily="34" charset="0"/>
+                <a:ea typeface="+mj-ea"/>
+                <a:cs typeface="Tahoma" pitchFamily="34" charset="0"/>
+              </a:rPr>
+              <a:t>Wanneer u niet in beeld wilt komen dan is </a:t>
+            </a:r>
+          </a:p>
+          <a:p>
+            <a:pPr fontAlgn="auto">
+              <a:spcAft>
+                <a:spcPts val="0"/>
+              </a:spcAft>
+            </a:pPr>
+            <a:r>
+              <a:rPr lang="nl-NL" sz="2400" baseline="0" dirty="0" smtClean="0">
+                <a:solidFill>
+                  <a:schemeClr val="bg1"/>
+                </a:solidFill>
+                <a:effectLst>
+                  <a:outerShdw blurRad="38100" dist="38100" dir="2700000" algn="tl">
+                    <a:srgbClr val="000000">
+                      <a:alpha val="43137"/>
+                    </a:srgbClr>
+                  </a:outerShdw>
+                </a:effectLst>
+                <a:latin typeface="Tahoma" pitchFamily="34" charset="0"/>
+                <a:ea typeface="+mj-ea"/>
+                <a:cs typeface="Tahoma" pitchFamily="34" charset="0"/>
+              </a:rPr>
+              <a:t>achterin het kerkgebouw, in het lage gedeelte,</a:t>
+            </a:r>
+          </a:p>
+          <a:p>
+            <a:pPr fontAlgn="auto">
+              <a:spcAft>
+                <a:spcPts val="0"/>
+              </a:spcAft>
+            </a:pPr>
+            <a:r>
+              <a:rPr lang="nl-NL" sz="2400" baseline="0" dirty="0" smtClean="0">
+                <a:solidFill>
+                  <a:schemeClr val="bg1"/>
+                </a:solidFill>
+                <a:effectLst>
+                  <a:outerShdw blurRad="38100" dist="38100" dir="2700000" algn="tl">
+                    <a:srgbClr val="000000">
+                      <a:alpha val="43137"/>
+                    </a:srgbClr>
+                  </a:outerShdw>
+                </a:effectLst>
+                <a:latin typeface="Tahoma" pitchFamily="34" charset="0"/>
+                <a:ea typeface="+mj-ea"/>
+                <a:cs typeface="Tahoma" pitchFamily="34" charset="0"/>
+              </a:rPr>
+              <a:t>een videovrije zone.</a:t>
+            </a:r>
+          </a:p>
+        </p:txBody>
+      </p:sp>
+      <p:sp>
+        <p:nvSpPr>
+          <p:cNvPr id="5" name="Tekstvak 4"/>
+          <p:cNvSpPr txBox="1"/>
+          <p:nvPr userDrawn="1"/>
+        </p:nvSpPr>
+        <p:spPr bwMode="auto">
+          <a:xfrm>
+            <a:off x="2092768" y="4025380"/>
+            <a:ext cx="6832205" cy="707886"/>
+          </a:xfrm>
+          <a:prstGeom prst="rect">
+            <a:avLst/>
+          </a:prstGeom>
+          <a:noFill/>
+          <a:ln w="9525">
+            <a:noFill/>
+            <a:miter lim="800000"/>
+            <a:headEnd/>
+            <a:tailEnd/>
+          </a:ln>
+        </p:spPr>
+        <p:txBody>
+          <a:bodyPr wrap="none" lIns="720000" rIns="180000" rtlCol="0" anchor="t" anchorCtr="0">
+            <a:spAutoFit/>
+          </a:bodyPr>
+          <a:lstStyle/>
+          <a:p>
+            <a:pPr fontAlgn="auto">
+              <a:spcAft>
+                <a:spcPts val="0"/>
+              </a:spcAft>
+            </a:pPr>
+            <a:r>
+              <a:rPr lang="nl-NL" sz="2000" dirty="0" smtClean="0">
+                <a:solidFill>
+                  <a:schemeClr val="bg1"/>
+                </a:solidFill>
+                <a:effectLst>
+                  <a:outerShdw blurRad="38100" dist="38100" dir="2700000" algn="tl">
+                    <a:srgbClr val="000000">
+                      <a:alpha val="43137"/>
+                    </a:srgbClr>
+                  </a:outerShdw>
+                </a:effectLst>
+                <a:latin typeface="Tahoma" pitchFamily="34" charset="0"/>
+                <a:ea typeface="+mj-ea"/>
+                <a:cs typeface="Tahoma" pitchFamily="34" charset="0"/>
+              </a:rPr>
+              <a:t>Meer informatie</a:t>
+            </a:r>
+            <a:r>
+              <a:rPr lang="nl-NL" sz="2000" baseline="0" dirty="0" smtClean="0">
+                <a:solidFill>
+                  <a:schemeClr val="bg1"/>
+                </a:solidFill>
+                <a:effectLst>
+                  <a:outerShdw blurRad="38100" dist="38100" dir="2700000" algn="tl">
+                    <a:srgbClr val="000000">
+                      <a:alpha val="43137"/>
+                    </a:srgbClr>
+                  </a:outerShdw>
+                </a:effectLst>
+                <a:latin typeface="Tahoma" pitchFamily="34" charset="0"/>
+                <a:ea typeface="+mj-ea"/>
+                <a:cs typeface="Tahoma" pitchFamily="34" charset="0"/>
+              </a:rPr>
+              <a:t> kunt u verkrijgen bij het mediateam</a:t>
+            </a:r>
+          </a:p>
+          <a:p>
+            <a:pPr fontAlgn="auto">
+              <a:spcAft>
+                <a:spcPts val="0"/>
+              </a:spcAft>
+            </a:pPr>
+            <a:r>
+              <a:rPr lang="nl-NL" sz="2000" baseline="0" dirty="0" smtClean="0">
+                <a:solidFill>
+                  <a:schemeClr val="bg1"/>
+                </a:solidFill>
+                <a:effectLst>
+                  <a:outerShdw blurRad="38100" dist="38100" dir="2700000" algn="tl">
+                    <a:srgbClr val="000000">
+                      <a:alpha val="43137"/>
+                    </a:srgbClr>
+                  </a:outerShdw>
+                </a:effectLst>
+                <a:latin typeface="Tahoma" pitchFamily="34" charset="0"/>
+                <a:ea typeface="+mj-ea"/>
+                <a:cs typeface="Tahoma" pitchFamily="34" charset="0"/>
+              </a:rPr>
+              <a:t>achter de desk.</a:t>
+            </a:r>
+            <a:endParaRPr lang="nl-NL" sz="2000" dirty="0" smtClean="0">
+              <a:solidFill>
+                <a:schemeClr val="bg1"/>
+              </a:solidFill>
+              <a:effectLst>
+                <a:outerShdw blurRad="38100" dist="38100" dir="2700000" algn="tl">
+                  <a:srgbClr val="000000">
+                    <a:alpha val="43137"/>
+                  </a:srgbClr>
+                </a:outerShdw>
+              </a:effectLst>
+              <a:latin typeface="Tahoma" pitchFamily="34" charset="0"/>
+              <a:ea typeface="+mj-ea"/>
+              <a:cs typeface="Tahoma" pitchFamily="34" charset="0"/>
+            </a:endParaRPr>
+          </a:p>
+        </p:txBody>
+      </p:sp>
+      <p:sp>
+        <p:nvSpPr>
+          <p:cNvPr id="6" name="Tekstvak 5"/>
+          <p:cNvSpPr txBox="1"/>
+          <p:nvPr userDrawn="1"/>
+        </p:nvSpPr>
+        <p:spPr bwMode="auto">
+          <a:xfrm>
+            <a:off x="1855177" y="5082841"/>
+            <a:ext cx="7013892" cy="1569660"/>
+          </a:xfrm>
+          <a:prstGeom prst="rect">
+            <a:avLst/>
+          </a:prstGeom>
+          <a:noFill/>
+          <a:ln w="9525">
+            <a:noFill/>
+            <a:miter lim="800000"/>
+            <a:headEnd/>
+            <a:tailEnd/>
+          </a:ln>
+        </p:spPr>
+        <p:txBody>
+          <a:bodyPr wrap="square" lIns="720000" rIns="180000" numCol="2" rtlCol="0" anchor="t" anchorCtr="0">
+            <a:spAutoFit/>
+          </a:bodyPr>
+          <a:lstStyle/>
+          <a:p>
+            <a:pPr algn="l" fontAlgn="auto">
+              <a:spcAft>
+                <a:spcPts val="0"/>
+              </a:spcAft>
+            </a:pPr>
+            <a:r>
+              <a:rPr lang="nl-NL" sz="2400" dirty="0" smtClean="0">
+                <a:solidFill>
+                  <a:schemeClr val="bg1"/>
+                </a:solidFill>
+                <a:effectLst>
+                  <a:outerShdw blurRad="38100" dist="38100" dir="2700000" algn="tl">
+                    <a:srgbClr val="000000">
+                      <a:alpha val="43137"/>
+                    </a:srgbClr>
+                  </a:outerShdw>
+                </a:effectLst>
+                <a:latin typeface="Tahoma" pitchFamily="34" charset="0"/>
+                <a:ea typeface="+mj-ea"/>
+                <a:cs typeface="Tahoma" pitchFamily="34" charset="0"/>
+              </a:rPr>
+              <a:t>Live meekijken:</a:t>
+            </a:r>
+          </a:p>
+          <a:p>
+            <a:pPr algn="l" fontAlgn="auto">
+              <a:spcAft>
+                <a:spcPts val="0"/>
+              </a:spcAft>
+            </a:pPr>
+            <a:r>
+              <a:rPr lang="nl-NL" sz="2400" dirty="0" smtClean="0">
+                <a:solidFill>
+                  <a:schemeClr val="bg1"/>
+                </a:solidFill>
+                <a:effectLst>
+                  <a:outerShdw blurRad="38100" dist="38100" dir="2700000" algn="tl">
+                    <a:srgbClr val="000000">
+                      <a:alpha val="43137"/>
+                    </a:srgbClr>
+                  </a:outerShdw>
+                </a:effectLst>
+                <a:latin typeface="Tahoma" pitchFamily="34" charset="0"/>
+                <a:ea typeface="+mj-ea"/>
+                <a:cs typeface="Tahoma" pitchFamily="34" charset="0"/>
+              </a:rPr>
+              <a:t>Opname terugkijken:</a:t>
+            </a:r>
+          </a:p>
+          <a:p>
+            <a:pPr algn="l" fontAlgn="auto">
+              <a:spcAft>
+                <a:spcPts val="0"/>
+              </a:spcAft>
+            </a:pPr>
+            <a:r>
+              <a:rPr lang="nl-NL" sz="2400" dirty="0" smtClean="0">
+                <a:solidFill>
+                  <a:schemeClr val="bg1"/>
+                </a:solidFill>
+                <a:effectLst>
+                  <a:outerShdw blurRad="38100" dist="38100" dir="2700000" algn="tl">
+                    <a:srgbClr val="000000">
+                      <a:alpha val="43137"/>
+                    </a:srgbClr>
+                  </a:outerShdw>
+                </a:effectLst>
+                <a:latin typeface="Tahoma" pitchFamily="34" charset="0"/>
+                <a:ea typeface="+mj-ea"/>
+                <a:cs typeface="Tahoma" pitchFamily="34" charset="0"/>
+              </a:rPr>
+              <a:t>Nabestellen:              </a:t>
+            </a:r>
+          </a:p>
+          <a:p>
+            <a:pPr algn="l" fontAlgn="auto">
+              <a:spcAft>
+                <a:spcPts val="0"/>
+              </a:spcAft>
+            </a:pPr>
+            <a:endParaRPr lang="nl-NL" sz="2400" dirty="0" smtClean="0">
+              <a:solidFill>
+                <a:schemeClr val="bg1"/>
+              </a:solidFill>
+              <a:effectLst>
+                <a:outerShdw blurRad="38100" dist="38100" dir="2700000" algn="tl">
+                  <a:srgbClr val="000000">
+                    <a:alpha val="43137"/>
+                  </a:srgbClr>
+                </a:outerShdw>
+              </a:effectLst>
+              <a:latin typeface="Tahoma" pitchFamily="34" charset="0"/>
+              <a:ea typeface="+mj-ea"/>
+              <a:cs typeface="Tahoma" pitchFamily="34" charset="0"/>
+            </a:endParaRPr>
+          </a:p>
+          <a:p>
+            <a:pPr algn="l" fontAlgn="auto">
+              <a:spcAft>
+                <a:spcPts val="0"/>
+              </a:spcAft>
+            </a:pPr>
+            <a:r>
+              <a:rPr lang="nl-NL" sz="2400" dirty="0" smtClean="0">
+                <a:solidFill>
+                  <a:schemeClr val="bg1"/>
+                </a:solidFill>
+                <a:effectLst>
+                  <a:outerShdw blurRad="38100" dist="38100" dir="2700000" algn="tl">
+                    <a:srgbClr val="000000">
+                      <a:alpha val="43137"/>
+                    </a:srgbClr>
+                  </a:outerShdw>
+                </a:effectLst>
+                <a:latin typeface="Tahoma" pitchFamily="34" charset="0"/>
+                <a:ea typeface="+mj-ea"/>
+                <a:cs typeface="Tahoma" pitchFamily="34" charset="0"/>
+              </a:rPr>
+              <a:t>www.mijnkerk.tv</a:t>
+            </a:r>
+          </a:p>
+          <a:p>
+            <a:pPr algn="l" fontAlgn="auto">
+              <a:spcAft>
+                <a:spcPts val="0"/>
+              </a:spcAft>
+            </a:pPr>
+            <a:r>
+              <a:rPr lang="nl-NL" sz="2400" kern="1200" dirty="0" err="1" smtClean="0">
+                <a:solidFill>
+                  <a:schemeClr val="bg1"/>
+                </a:solidFill>
+                <a:effectLst>
+                  <a:outerShdw blurRad="38100" dist="38100" dir="2700000" algn="tl">
+                    <a:srgbClr val="000000">
+                      <a:alpha val="43137"/>
+                    </a:srgbClr>
+                  </a:outerShdw>
+                </a:effectLst>
+                <a:latin typeface="Tahoma" pitchFamily="34" charset="0"/>
+                <a:ea typeface="+mn-ea"/>
+                <a:cs typeface="Tahoma" pitchFamily="34" charset="0"/>
+              </a:rPr>
+              <a:t>www.gkvassenpeelo.nl</a:t>
+            </a:r>
+            <a:endParaRPr lang="nl-NL" sz="2400" kern="1200" dirty="0" smtClean="0">
+              <a:solidFill>
+                <a:schemeClr val="bg1"/>
+              </a:solidFill>
+              <a:effectLst>
+                <a:outerShdw blurRad="38100" dist="38100" dir="2700000" algn="tl">
+                  <a:srgbClr val="000000">
+                    <a:alpha val="43137"/>
+                  </a:srgbClr>
+                </a:outerShdw>
+              </a:effectLst>
+              <a:latin typeface="Tahoma" pitchFamily="34" charset="0"/>
+              <a:ea typeface="+mn-ea"/>
+              <a:cs typeface="Tahoma" pitchFamily="34" charset="0"/>
+            </a:endParaRPr>
+          </a:p>
+          <a:p>
+            <a:pPr marL="0" marR="0" indent="0" algn="l" defTabSz="914400" rtl="0" eaLnBrk="1" fontAlgn="auto" latinLnBrk="0" hangingPunct="1">
+              <a:lnSpc>
+                <a:spcPct val="100000"/>
+              </a:lnSpc>
+              <a:spcBef>
+                <a:spcPct val="0"/>
+              </a:spcBef>
+              <a:spcAft>
+                <a:spcPts val="0"/>
+              </a:spcAft>
+              <a:buClrTx/>
+              <a:buSzTx/>
+              <a:buFontTx/>
+              <a:buNone/>
+              <a:tabLst/>
+              <a:defRPr/>
+            </a:pPr>
+            <a:r>
+              <a:rPr lang="nl-NL" sz="2400" kern="1200" dirty="0" smtClean="0">
+                <a:solidFill>
+                  <a:schemeClr val="bg1"/>
+                </a:solidFill>
+                <a:effectLst>
+                  <a:outerShdw blurRad="38100" dist="38100" dir="2700000" algn="tl">
+                    <a:srgbClr val="000000">
+                      <a:alpha val="43137"/>
+                    </a:srgbClr>
+                  </a:outerShdw>
+                </a:effectLst>
+                <a:latin typeface="Tahoma" pitchFamily="34" charset="0"/>
+                <a:ea typeface="+mn-ea"/>
+                <a:cs typeface="Tahoma" pitchFamily="34" charset="0"/>
+              </a:rPr>
+              <a:t>www.mijnkerk.tv</a:t>
+            </a:r>
+          </a:p>
+        </p:txBody>
+      </p:sp>
+    </p:spTree>
+    <p:extLst>
+      <p:ext uri="{BB962C8B-B14F-4D97-AF65-F5344CB8AC3E}">
+        <p14:creationId xmlns:p14="http://schemas.microsoft.com/office/powerpoint/2010/main" val="167533283"/>
+      </p:ext>
+    </p:extLst>
+  </p:cSld>
+  <p:clrMapOvr>
+    <a:masterClrMapping/>
+  </p:clrMapOvr>
+  <p:transition/>
+</p:sldLayout>
+</file>
+
+<file path=ppt/slideLayouts/slideLayout22.xml><?xml version="1.0" encoding="utf-8"?>
 <p:sldLayout xmlns:a="http://schemas.openxmlformats.org/drawingml/2006/main" xmlns:r="http://schemas.openxmlformats.org/officeDocument/2006/relationships" xmlns:p="http://schemas.openxmlformats.org/presentationml/2006/main" preserve="1" userDrawn="1">
   <p:cSld name="Schoonmaakrooster">
     <p:spTree>
@@ -2081,7 +2765,7 @@
         <p:spPr bwMode="auto">
           <a:xfrm>
             <a:off x="0" y="0"/>
-            <a:ext cx="6199717" cy="1908175"/>
+            <a:ext cx="4649788" cy="1908175"/>
           </a:xfrm>
           <a:prstGeom prst="rect">
             <a:avLst/>
@@ -2162,7 +2846,7 @@
 </p:sldLayout>
 </file>
 
-<file path=ppt/slideLayouts/slideLayout22.xml><?xml version="1.0" encoding="utf-8"?>
+<file path=ppt/slideLayouts/slideLayout23.xml><?xml version="1.0" encoding="utf-8"?>
 <p:sldLayout xmlns:a="http://schemas.openxmlformats.org/drawingml/2006/main" xmlns:r="http://schemas.openxmlformats.org/officeDocument/2006/relationships" xmlns:p="http://schemas.openxmlformats.org/presentationml/2006/main" userDrawn="1">
   <p:cSld name="Object">
     <p:spTree>
@@ -2191,8 +2875,8 @@
         </p:nvSpPr>
         <p:spPr>
           <a:xfrm>
-            <a:off x="719667" y="188916"/>
-            <a:ext cx="10945284" cy="6454797"/>
+            <a:off x="539750" y="188913"/>
+            <a:ext cx="8208963" cy="6454797"/>
           </a:xfrm>
           <a:prstGeom prst="rect">
             <a:avLst/>
@@ -2285,8 +2969,8 @@
         </p:nvSpPr>
         <p:spPr>
           <a:xfrm>
-            <a:off x="8976786" y="2924175"/>
-            <a:ext cx="2976033" cy="1296988"/>
+            <a:off x="6732588" y="2924175"/>
+            <a:ext cx="2232025" cy="1296988"/>
           </a:xfrm>
           <a:prstGeom prst="rect">
             <a:avLst/>
@@ -2322,6 +3006,52 @@
               <a:defRPr/>
             </a:pPr>
             <a:endParaRPr lang="nl-NL"/>
+          </a:p>
+        </p:txBody>
+      </p:sp>
+      <p:sp>
+        <p:nvSpPr>
+          <p:cNvPr id="7" name="Rectangle 6"/>
+          <p:cNvSpPr/>
+          <p:nvPr userDrawn="1"/>
+        </p:nvSpPr>
+        <p:spPr>
+          <a:xfrm>
+            <a:off x="5996539" y="77002"/>
+            <a:ext cx="3051208" cy="1742173"/>
+          </a:xfrm>
+          <a:prstGeom prst="rect">
+            <a:avLst/>
+          </a:prstGeom>
+          <a:solidFill>
+            <a:srgbClr val="000000"/>
+          </a:solidFill>
+          <a:ln>
+            <a:noFill/>
+          </a:ln>
+        </p:spPr>
+        <p:style>
+          <a:lnRef idx="2">
+            <a:schemeClr val="accent1">
+              <a:shade val="50000"/>
+            </a:schemeClr>
+          </a:lnRef>
+          <a:fillRef idx="1">
+            <a:schemeClr val="accent1"/>
+          </a:fillRef>
+          <a:effectRef idx="0">
+            <a:schemeClr val="accent1"/>
+          </a:effectRef>
+          <a:fontRef idx="minor">
+            <a:schemeClr val="lt1"/>
+          </a:fontRef>
+        </p:style>
+        <p:txBody>
+          <a:bodyPr rtlCol="0" anchor="ctr"/>
+          <a:lstStyle/>
+          <a:p>
+            <a:pPr algn="ctr"/>
+            <a:endParaRPr lang="en-US"/>
           </a:p>
         </p:txBody>
       </p:sp>
@@ -2358,8 +3088,8 @@
         </p:blipFill>
         <p:spPr bwMode="auto">
           <a:xfrm>
-            <a:off x="105878" y="470488"/>
-            <a:ext cx="9307630" cy="6724094"/>
+            <a:off x="71228" y="66233"/>
+            <a:ext cx="9001545" cy="6724094"/>
           </a:xfrm>
           <a:prstGeom prst="rect">
             <a:avLst/>
@@ -2430,7 +3160,7 @@
         <p:spPr>
           <a:xfrm>
             <a:off x="0" y="1908000"/>
-            <a:ext cx="12192000" cy="4696986"/>
+            <a:ext cx="9144000" cy="4696986"/>
           </a:xfrm>
           <a:prstGeom prst="rect">
             <a:avLst/>
@@ -2442,7 +3172,13 @@
             <a:lvl1pPr marL="0" indent="0">
               <a:buNone/>
               <a:defRPr sz="2800" baseline="0">
-                <a:effectLst/>
+                <a:effectLst>
+                  <a:outerShdw blurRad="63500" dist="38100" algn="ctr" rotWithShape="0">
+                    <a:schemeClr val="bg1">
+                      <a:alpha val="70000"/>
+                    </a:schemeClr>
+                  </a:outerShdw>
+                </a:effectLst>
               </a:defRPr>
             </a:lvl1pPr>
           </a:lstStyle>
@@ -2468,7 +3204,7 @@
         <p:spPr>
           <a:xfrm>
             <a:off x="0" y="0"/>
-            <a:ext cx="8592277" cy="1844824"/>
+            <a:ext cx="6444208" cy="1844824"/>
           </a:xfrm>
           <a:prstGeom prst="rect">
             <a:avLst/>
@@ -2480,7 +3216,13 @@
             <a:lvl1pPr marL="0" indent="0">
               <a:buNone/>
               <a:defRPr sz="3000" baseline="0">
-                <a:effectLst/>
+                <a:effectLst>
+                  <a:outerShdw blurRad="63500" dist="38100" algn="tl" rotWithShape="0">
+                    <a:schemeClr val="bg1">
+                      <a:alpha val="70000"/>
+                    </a:schemeClr>
+                  </a:outerShdw>
+                </a:effectLst>
                 <a:latin typeface="+mj-lt"/>
               </a:defRPr>
             </a:lvl1pPr>
@@ -2530,8 +3272,8 @@
         </p:nvSpPr>
         <p:spPr>
           <a:xfrm>
-            <a:off x="8496302" y="0"/>
-            <a:ext cx="3695700" cy="1989138"/>
+            <a:off x="6372225" y="0"/>
+            <a:ext cx="2771775" cy="1989138"/>
           </a:xfrm>
           <a:prstGeom prst="rect">
             <a:avLst/>
@@ -2583,7 +3325,7 @@
         <p:spPr>
           <a:xfrm>
             <a:off x="0" y="548640"/>
-            <a:ext cx="12192000" cy="6065224"/>
+            <a:ext cx="9144000" cy="6065224"/>
           </a:xfrm>
           <a:prstGeom prst="rect">
             <a:avLst/>
@@ -2595,7 +3337,13 @@
             <a:lvl1pPr marL="0" indent="0">
               <a:buNone/>
               <a:defRPr sz="2800" baseline="0">
-                <a:effectLst/>
+                <a:effectLst>
+                  <a:outerShdw blurRad="63500" dist="38100" algn="ctr" rotWithShape="0">
+                    <a:schemeClr val="bg1">
+                      <a:alpha val="70000"/>
+                    </a:schemeClr>
+                  </a:outerShdw>
+                </a:effectLst>
               </a:defRPr>
             </a:lvl1pPr>
           </a:lstStyle>
@@ -2644,8 +3392,8 @@
         </p:nvSpPr>
         <p:spPr>
           <a:xfrm>
-            <a:off x="-2" y="2330451"/>
-            <a:ext cx="3651955" cy="576263"/>
+            <a:off x="-1" y="2330448"/>
+            <a:ext cx="2738966" cy="576263"/>
           </a:xfrm>
           <a:prstGeom prst="rect">
             <a:avLst/>
@@ -2715,7 +3463,7 @@
         <p:spPr>
           <a:xfrm>
             <a:off x="-1" y="3230561"/>
-            <a:ext cx="3651953" cy="576262"/>
+            <a:ext cx="2738965" cy="576262"/>
           </a:xfrm>
           <a:prstGeom prst="rect">
             <a:avLst/>
@@ -2798,8 +3546,8 @@
         </p:blipFill>
         <p:spPr bwMode="auto">
           <a:xfrm>
-            <a:off x="239186" y="188914"/>
-            <a:ext cx="3119967" cy="1347787"/>
+            <a:off x="179388" y="188913"/>
+            <a:ext cx="2339975" cy="1347787"/>
           </a:xfrm>
           <a:prstGeom prst="rect">
             <a:avLst/>
@@ -2825,8 +3573,8 @@
         </p:nvSpPr>
         <p:spPr>
           <a:xfrm>
-            <a:off x="3753552" y="2330737"/>
-            <a:ext cx="8438447" cy="576063"/>
+            <a:off x="2815164" y="2330734"/>
+            <a:ext cx="6328835" cy="576063"/>
           </a:xfrm>
           <a:prstGeom prst="rect">
             <a:avLst/>
@@ -2841,7 +3589,13 @@
               </a:spcBef>
               <a:buNone/>
               <a:defRPr sz="2800">
-                <a:effectLst/>
+                <a:effectLst>
+                  <a:outerShdw blurRad="63500" dist="38100" algn="tl" rotWithShape="0">
+                    <a:schemeClr val="bg1">
+                      <a:alpha val="70000"/>
+                    </a:schemeClr>
+                  </a:outerShdw>
+                </a:effectLst>
                 <a:latin typeface="+mn-lt"/>
               </a:defRPr>
             </a:lvl1pPr>
@@ -2867,8 +3621,8 @@
         </p:nvSpPr>
         <p:spPr>
           <a:xfrm>
-            <a:off x="3753552" y="3230737"/>
-            <a:ext cx="8438447" cy="576063"/>
+            <a:off x="2815164" y="3230734"/>
+            <a:ext cx="6328835" cy="576063"/>
           </a:xfrm>
           <a:prstGeom prst="rect">
             <a:avLst/>
@@ -2883,7 +3637,13 @@
               </a:spcBef>
               <a:buNone/>
               <a:defRPr sz="2800">
-                <a:effectLst/>
+                <a:effectLst>
+                  <a:outerShdw blurRad="63500" dist="38100" algn="tl" rotWithShape="0">
+                    <a:schemeClr val="bg1">
+                      <a:alpha val="70000"/>
+                    </a:schemeClr>
+                  </a:outerShdw>
+                </a:effectLst>
                 <a:latin typeface="+mn-lt"/>
               </a:defRPr>
             </a:lvl1pPr>
@@ -2905,8 +3665,8 @@
         </p:nvSpPr>
         <p:spPr>
           <a:xfrm>
-            <a:off x="2" y="4382026"/>
-            <a:ext cx="6073423" cy="576262"/>
+            <a:off x="0" y="4382026"/>
+            <a:ext cx="4555067" cy="576262"/>
           </a:xfrm>
           <a:prstGeom prst="rect">
             <a:avLst/>
@@ -2960,8 +3720,8 @@
         </p:nvSpPr>
         <p:spPr>
           <a:xfrm>
-            <a:off x="3753555" y="5059537"/>
-            <a:ext cx="8438447" cy="576063"/>
+            <a:off x="2815165" y="5059534"/>
+            <a:ext cx="6328835" cy="576063"/>
           </a:xfrm>
           <a:prstGeom prst="rect">
             <a:avLst/>
@@ -2976,7 +3736,13 @@
               </a:spcBef>
               <a:buNone/>
               <a:defRPr sz="2800" baseline="0">
-                <a:effectLst/>
+                <a:effectLst>
+                  <a:outerShdw blurRad="63500" dist="38100" algn="tl" rotWithShape="0">
+                    <a:schemeClr val="bg1">
+                      <a:alpha val="70000"/>
+                    </a:schemeClr>
+                  </a:outerShdw>
+                </a:effectLst>
                 <a:latin typeface="+mn-lt"/>
               </a:defRPr>
             </a:lvl1pPr>
@@ -3006,8 +3772,8 @@
         </p:nvSpPr>
         <p:spPr>
           <a:xfrm>
-            <a:off x="3753551" y="5857457"/>
-            <a:ext cx="8438447" cy="576063"/>
+            <a:off x="2815162" y="5857454"/>
+            <a:ext cx="6328835" cy="576063"/>
           </a:xfrm>
           <a:prstGeom prst="rect">
             <a:avLst/>
@@ -3022,7 +3788,13 @@
               </a:spcBef>
               <a:buNone/>
               <a:defRPr sz="2800">
-                <a:effectLst/>
+                <a:effectLst>
+                  <a:outerShdw blurRad="63500" dist="38100" algn="tl" rotWithShape="0">
+                    <a:schemeClr val="bg1">
+                      <a:alpha val="70000"/>
+                    </a:schemeClr>
+                  </a:outerShdw>
+                </a:effectLst>
                 <a:latin typeface="+mn-lt"/>
               </a:defRPr>
             </a:lvl1pPr>
@@ -3068,6 +3840,32 @@
           <a:chExt cx="0" cy="0"/>
         </a:xfrm>
       </p:grpSpPr>
+      <p:pic>
+        <p:nvPicPr>
+          <p:cNvPr id="8" name="Tijdelijke aanduiding voor inhoud 3" descr="Einde.jpg"/>
+          <p:cNvPicPr>
+            <a:picLocks noChangeAspect="1"/>
+          </p:cNvPicPr>
+          <p:nvPr/>
+        </p:nvPicPr>
+        <p:blipFill rotWithShape="1">
+          <a:blip r:embed="rId2" cstate="print"/>
+          <a:srcRect l="62817"/>
+          <a:stretch/>
+        </p:blipFill>
+        <p:spPr>
+          <a:xfrm>
+            <a:off x="5753100" y="16032"/>
+            <a:ext cx="3405459" cy="6841968"/>
+          </a:xfrm>
+          <a:prstGeom prst="rect">
+            <a:avLst/>
+          </a:prstGeom>
+          <a:effectLst>
+            <a:softEdge rad="112500"/>
+          </a:effectLst>
+        </p:spPr>
+      </p:pic>
       <p:sp>
         <p:nvSpPr>
           <p:cNvPr id="9" name="Rectangle 8"/>
@@ -3076,8 +3874,8 @@
         </p:nvSpPr>
         <p:spPr>
           <a:xfrm>
-            <a:off x="2" y="15878"/>
-            <a:ext cx="7920567" cy="6842125"/>
+            <a:off x="0" y="15875"/>
+            <a:ext cx="5940425" cy="6842125"/>
           </a:xfrm>
           <a:prstGeom prst="rect">
             <a:avLst/>
@@ -3187,7 +3985,7 @@
               <a:defRPr/>
             </a:pPr>
             <a:r>
-              <a:rPr lang="nl-NL" sz="2600" dirty="0" smtClean="0">
+              <a:rPr lang="nl-NL" sz="2600" dirty="0">
                 <a:solidFill>
                   <a:schemeClr val="tx1">
                     <a:lumMod val="95000"/>
@@ -3197,18 +3995,8 @@
                 <a:latin typeface="+mn-lt"/>
                 <a:cs typeface="Arial" pitchFamily="34" charset="0"/>
               </a:rPr>
-              <a:t>Aanvang: </a:t>
-            </a:r>
-            <a:endParaRPr lang="nl-NL" sz="2600" dirty="0">
-              <a:solidFill>
-                <a:schemeClr val="tx1">
-                  <a:lumMod val="95000"/>
-                </a:schemeClr>
-              </a:solidFill>
-              <a:effectLst/>
-              <a:latin typeface="+mn-lt"/>
-              <a:cs typeface="Arial" pitchFamily="34" charset="0"/>
-            </a:endParaRPr>
+              <a:t>aanvang </a:t>
+            </a:r>
           </a:p>
           <a:p>
             <a:pPr fontAlgn="auto">
@@ -3326,6 +4114,38 @@
           </a:p>
         </p:txBody>
       </p:sp>
+      <p:pic>
+        <p:nvPicPr>
+          <p:cNvPr id="10" name="Picture 2"/>
+          <p:cNvPicPr>
+            <a:picLocks noChangeAspect="1" noChangeArrowheads="1"/>
+          </p:cNvPicPr>
+          <p:nvPr/>
+        </p:nvPicPr>
+        <p:blipFill>
+          <a:blip r:embed="rId3" cstate="print"/>
+          <a:srcRect/>
+          <a:stretch>
+            <a:fillRect/>
+          </a:stretch>
+        </p:blipFill>
+        <p:spPr bwMode="auto">
+          <a:xfrm>
+            <a:off x="5940425" y="4232275"/>
+            <a:ext cx="2771775" cy="314325"/>
+          </a:xfrm>
+          <a:prstGeom prst="rect">
+            <a:avLst/>
+          </a:prstGeom>
+          <a:noFill/>
+          <a:ln w="9525">
+            <a:noFill/>
+            <a:miter lim="800000"/>
+            <a:headEnd/>
+            <a:tailEnd/>
+          </a:ln>
+        </p:spPr>
+      </p:pic>
       <p:sp>
         <p:nvSpPr>
           <p:cNvPr id="5" name="Text Placeholder 4"/>
@@ -3338,8 +4158,8 @@
         </p:nvSpPr>
         <p:spPr>
           <a:xfrm>
-            <a:off x="2046543" y="1632306"/>
-            <a:ext cx="5765351" cy="432048"/>
+            <a:off x="1956470" y="2026940"/>
+            <a:ext cx="3082033" cy="432048"/>
           </a:xfrm>
           <a:prstGeom prst="rect">
             <a:avLst/>
@@ -3354,7 +4174,13 @@
                 <a:solidFill>
                   <a:schemeClr val="bg1"/>
                 </a:solidFill>
-                <a:effectLst/>
+                <a:effectLst>
+                  <a:outerShdw blurRad="63500" dist="38100" algn="tl">
+                    <a:schemeClr val="bg1">
+                      <a:alpha val="70000"/>
+                    </a:schemeClr>
+                  </a:outerShdw>
+                </a:effectLst>
                 <a:latin typeface="+mn-lt"/>
                 <a:ea typeface="+mn-ea"/>
                 <a:cs typeface="Arial" pitchFamily="34" charset="0"/>
@@ -3364,7 +4190,7 @@
           <a:p>
             <a:pPr lvl="0"/>
             <a:r>
-              <a:rPr lang="en-US" dirty="0" smtClean="0"/>
+              <a:rPr lang="en-US" smtClean="0"/>
               <a:t>Click to edit Master text styles</a:t>
             </a:r>
           </a:p>
@@ -3382,8 +4208,8 @@
         </p:nvSpPr>
         <p:spPr>
           <a:xfrm>
-            <a:off x="2480114" y="2025854"/>
-            <a:ext cx="6025825" cy="432048"/>
+            <a:off x="2502570" y="2426990"/>
+            <a:ext cx="3082033" cy="432048"/>
           </a:xfrm>
           <a:prstGeom prst="rect">
             <a:avLst/>
@@ -3398,7 +4224,13 @@
                 <a:solidFill>
                   <a:schemeClr val="bg1"/>
                 </a:solidFill>
-                <a:effectLst/>
+                <a:effectLst>
+                  <a:outerShdw blurRad="63500" dist="38100" algn="tl">
+                    <a:schemeClr val="bg1">
+                      <a:alpha val="70000"/>
+                    </a:schemeClr>
+                  </a:outerShdw>
+                </a:effectLst>
                 <a:latin typeface="+mn-lt"/>
                 <a:ea typeface="+mn-ea"/>
                 <a:cs typeface="Arial" pitchFamily="34" charset="0"/>
@@ -3408,80 +4240,72 @@
           <a:p>
             <a:pPr lvl="0"/>
             <a:r>
-              <a:rPr lang="en-US" dirty="0" smtClean="0"/>
+              <a:rPr lang="en-US" smtClean="0"/>
               <a:t>Click to edit Master text styles</a:t>
             </a:r>
           </a:p>
         </p:txBody>
       </p:sp>
-      <p:pic>
-        <p:nvPicPr>
-          <p:cNvPr id="13" name="Tijdelijke aanduiding voor inhoud 3" descr="Einde.jpg"/>
-          <p:cNvPicPr>
-            <a:picLocks noChangeAspect="1"/>
-          </p:cNvPicPr>
-          <p:nvPr userDrawn="1"/>
-        </p:nvPicPr>
-        <p:blipFill rotWithShape="1">
-          <a:blip r:embed="rId2" cstate="print"/>
-          <a:srcRect l="62955"/>
-          <a:stretch/>
-        </p:blipFill>
-        <p:spPr>
-          <a:xfrm>
-            <a:off x="8604985" y="16032"/>
-            <a:ext cx="3606428" cy="6841968"/>
-          </a:xfrm>
-          <a:prstGeom prst="rect">
-            <a:avLst/>
-          </a:prstGeom>
-          <a:effectLst>
-            <a:softEdge rad="112500"/>
-          </a:effectLst>
-        </p:spPr>
-      </p:pic>
-      <p:pic>
-        <p:nvPicPr>
-          <p:cNvPr id="14" name="Picture 13"/>
-          <p:cNvPicPr>
-            <a:picLocks noChangeAspect="1" noChangeArrowheads="1"/>
-          </p:cNvPicPr>
-          <p:nvPr userDrawn="1"/>
-        </p:nvPicPr>
-        <p:blipFill>
-          <a:blip r:embed="rId3" cstate="print"/>
-          <a:srcRect/>
-          <a:stretch>
-            <a:fillRect/>
-          </a:stretch>
-        </p:blipFill>
-        <p:spPr bwMode="auto">
-          <a:xfrm>
-            <a:off x="8816741" y="4232278"/>
-            <a:ext cx="2799526" cy="314325"/>
-          </a:xfrm>
-          <a:prstGeom prst="rect">
-            <a:avLst/>
-          </a:prstGeom>
-          <a:noFill/>
-          <a:ln w="9525">
-            <a:noFill/>
-            <a:miter lim="800000"/>
-            <a:headEnd/>
-            <a:tailEnd/>
-          </a:ln>
-        </p:spPr>
-      </p:pic>
       <p:sp>
         <p:nvSpPr>
-          <p:cNvPr id="15" name="Afgeronde rechthoek 5"/>
+          <p:cNvPr id="7" name="Text Placeholder 4"/>
+          <p:cNvSpPr>
+            <a:spLocks noGrp="1"/>
+          </p:cNvSpPr>
+          <p:nvPr>
+            <p:ph type="body" sz="quarter" idx="12"/>
+          </p:nvPr>
+        </p:nvSpPr>
+        <p:spPr>
+          <a:xfrm>
+            <a:off x="629320" y="2823865"/>
+            <a:ext cx="3082033" cy="432048"/>
+          </a:xfrm>
+          <a:prstGeom prst="rect">
+            <a:avLst/>
+          </a:prstGeom>
+        </p:spPr>
+        <p:txBody>
+          <a:bodyPr/>
+          <a:lstStyle>
+            <a:lvl1pPr marL="0" indent="0">
+              <a:buNone/>
+              <a:defRPr lang="en-GB" sz="2600" kern="1200" baseline="0" dirty="0">
+                <a:solidFill>
+                  <a:schemeClr val="bg1"/>
+                </a:solidFill>
+                <a:effectLst>
+                  <a:outerShdw blurRad="63500" dist="38100" algn="tl">
+                    <a:schemeClr val="bg1">
+                      <a:alpha val="70000"/>
+                    </a:schemeClr>
+                  </a:outerShdw>
+                </a:effectLst>
+                <a:latin typeface="+mn-lt"/>
+                <a:ea typeface="+mn-ea"/>
+                <a:cs typeface="Arial" pitchFamily="34" charset="0"/>
+              </a:defRPr>
+            </a:lvl1pPr>
+          </a:lstStyle>
+          <a:p>
+            <a:pPr lvl="0"/>
+            <a:r>
+              <a:rPr lang="en-US" smtClean="0"/>
+              <a:t>Click to edit Master text styles</a:t>
+            </a:r>
+          </a:p>
+        </p:txBody>
+      </p:sp>
+      <p:sp>
+        <p:nvSpPr>
+          <p:cNvPr id="11" name="Afgeronde rechthoek 10"/>
           <p:cNvSpPr/>
           <p:nvPr userDrawn="1"/>
         </p:nvSpPr>
         <p:spPr>
           <a:xfrm>
-            <a:off x="8816741" y="4659923"/>
-            <a:ext cx="2566368" cy="562708"/>
+            <a:off x="5917224" y="4659923"/>
+            <a:ext cx="2620107" cy="562708"/>
           </a:xfrm>
           <a:prstGeom prst="roundRect">
             <a:avLst/>
@@ -3526,14 +4350,14 @@
       </p:sp>
       <p:sp>
         <p:nvSpPr>
-          <p:cNvPr id="16" name="Tekstvak 4"/>
+          <p:cNvPr id="12" name="Tekstvak 11"/>
           <p:cNvSpPr txBox="1"/>
           <p:nvPr userDrawn="1"/>
         </p:nvSpPr>
         <p:spPr bwMode="auto">
           <a:xfrm>
-            <a:off x="8114097" y="6207371"/>
-            <a:ext cx="4077904" cy="430887"/>
+            <a:off x="5249007" y="6207368"/>
+            <a:ext cx="4317024" cy="430887"/>
           </a:xfrm>
           <a:prstGeom prst="rect">
             <a:avLst/>
@@ -3634,8 +4458,8 @@
         </p:blipFill>
         <p:spPr>
           <a:xfrm>
-            <a:off x="8604985" y="16032"/>
-            <a:ext cx="3606428" cy="6841968"/>
+            <a:off x="5765800" y="16032"/>
+            <a:ext cx="3392759" cy="6841968"/>
           </a:xfrm>
           <a:prstGeom prst="rect">
             <a:avLst/>
@@ -3653,8 +4477,8 @@
         </p:nvSpPr>
         <p:spPr>
           <a:xfrm>
-            <a:off x="2" y="15878"/>
-            <a:ext cx="7920567" cy="6842125"/>
+            <a:off x="0" y="15875"/>
+            <a:ext cx="5940425" cy="6842125"/>
           </a:xfrm>
           <a:prstGeom prst="rect">
             <a:avLst/>
@@ -3970,8 +4794,8 @@
         </p:blipFill>
         <p:spPr bwMode="auto">
           <a:xfrm>
-            <a:off x="8816741" y="4232278"/>
-            <a:ext cx="2799526" cy="314325"/>
+            <a:off x="5940425" y="4232275"/>
+            <a:ext cx="2771775" cy="314325"/>
           </a:xfrm>
           <a:prstGeom prst="rect">
             <a:avLst/>
@@ -3993,8 +4817,8 @@
         </p:nvSpPr>
         <p:spPr bwMode="auto">
           <a:xfrm>
-            <a:off x="8114097" y="6207371"/>
-            <a:ext cx="4077904" cy="430887"/>
+            <a:off x="5249007" y="6207368"/>
+            <a:ext cx="4317024" cy="430887"/>
           </a:xfrm>
           <a:prstGeom prst="rect">
             <a:avLst/>
@@ -4060,8 +4884,8 @@
         </p:nvSpPr>
         <p:spPr>
           <a:xfrm>
-            <a:off x="8816741" y="4659923"/>
-            <a:ext cx="2566368" cy="562708"/>
+            <a:off x="5917224" y="4659923"/>
+            <a:ext cx="2620107" cy="562708"/>
           </a:xfrm>
           <a:prstGeom prst="roundRect">
             <a:avLst/>
@@ -4165,8 +4989,8 @@
         </p:blipFill>
         <p:spPr bwMode="auto">
           <a:xfrm>
-            <a:off x="189942" y="-1512195"/>
-            <a:ext cx="9146563" cy="6724094"/>
+            <a:off x="142455" y="-1512195"/>
+            <a:ext cx="9001545" cy="6724094"/>
           </a:xfrm>
           <a:prstGeom prst="rect">
             <a:avLst/>
@@ -4198,14 +5022,14 @@
       </p:pic>
       <p:sp>
         <p:nvSpPr>
-          <p:cNvPr id="2" name="Rectangle 1"/>
-          <p:cNvSpPr/>
+          <p:cNvPr id="10" name="Tekstvak 1"/>
+          <p:cNvSpPr txBox="1"/>
           <p:nvPr userDrawn="1"/>
         </p:nvSpPr>
-        <p:spPr>
-          <a:xfrm>
-            <a:off x="-67377" y="-125128"/>
-            <a:ext cx="9577137" cy="3599848"/>
+        <p:spPr bwMode="auto">
+          <a:xfrm>
+            <a:off x="0" y="-97971"/>
+            <a:ext cx="9144000" cy="2895600"/>
           </a:xfrm>
           <a:prstGeom prst="rect">
             <a:avLst/>
@@ -4213,42 +5037,38 @@
           <a:solidFill>
             <a:srgbClr val="000000"/>
           </a:solidFill>
-          <a:ln>
-            <a:solidFill>
-              <a:srgbClr val="000000"/>
-            </a:solidFill>
+          <a:ln w="9525">
+            <a:noFill/>
+            <a:miter lim="800000"/>
+            <a:headEnd/>
+            <a:tailEnd/>
           </a:ln>
         </p:spPr>
-        <p:style>
-          <a:lnRef idx="2">
-            <a:schemeClr val="accent1">
-              <a:shade val="50000"/>
-            </a:schemeClr>
-          </a:lnRef>
-          <a:fillRef idx="1">
-            <a:schemeClr val="accent1"/>
-          </a:fillRef>
-          <a:effectRef idx="0">
-            <a:schemeClr val="accent1"/>
-          </a:effectRef>
-          <a:fontRef idx="minor">
-            <a:schemeClr val="lt1"/>
-          </a:fontRef>
-        </p:style>
         <p:txBody>
-          <a:bodyPr rtlCol="0" anchor="ctr"/>
+          <a:bodyPr wrap="square" lIns="720000" rIns="180000" rtlCol="0" anchor="t" anchorCtr="0">
+            <a:spAutoFit/>
+          </a:bodyPr>
           <a:lstStyle/>
           <a:p>
-            <a:pPr algn="ctr"/>
-            <a:endParaRPr lang="en-US">
-              <a:ln>
-                <a:solidFill>
-                  <a:sysClr val="windowText" lastClr="000000"/>
-                </a:solidFill>
-              </a:ln>
+            <a:pPr fontAlgn="auto">
+              <a:spcAft>
+                <a:spcPts val="0"/>
+              </a:spcAft>
+            </a:pPr>
+            <a:endParaRPr lang="nl-NL" sz="2800" dirty="0" smtClean="0">
               <a:solidFill>
-                <a:sysClr val="windowText" lastClr="000000"/>
+                <a:schemeClr val="bg1"/>
               </a:solidFill>
+              <a:effectLst>
+                <a:outerShdw blurRad="38100" dist="38100" dir="2700000" algn="tl">
+                  <a:srgbClr val="000000">
+                    <a:alpha val="43137"/>
+                  </a:srgbClr>
+                </a:outerShdw>
+              </a:effectLst>
+              <a:latin typeface="Tahoma" pitchFamily="34" charset="0"/>
+              <a:ea typeface="+mj-ea"/>
+              <a:cs typeface="Tahoma" pitchFamily="34" charset="0"/>
             </a:endParaRPr>
           </a:p>
         </p:txBody>
@@ -4291,14 +5111,14 @@
       </p:grpSpPr>
       <p:pic>
         <p:nvPicPr>
-          <p:cNvPr id="3" name="Picture 2"/>
+          <p:cNvPr id="1026" name="Picture 2"/>
           <p:cNvPicPr>
             <a:picLocks noChangeAspect="1" noChangeArrowheads="1"/>
           </p:cNvPicPr>
           <p:nvPr userDrawn="1"/>
         </p:nvPicPr>
         <p:blipFill>
-          <a:blip r:embed="rId24" cstate="print"/>
+          <a:blip r:embed="rId25" cstate="print"/>
           <a:srcRect/>
           <a:stretch>
             <a:fillRect/>
@@ -4306,7 +5126,7 @@
         </p:blipFill>
         <p:spPr bwMode="auto">
           <a:xfrm>
-            <a:off x="9407544" y="0"/>
+            <a:off x="6359543" y="0"/>
             <a:ext cx="2784456" cy="1573823"/>
           </a:xfrm>
           <a:prstGeom prst="rect">
@@ -4345,8 +5165,9 @@
     <p:sldLayoutId id="2147484231" r:id="rId18"/>
     <p:sldLayoutId id="2147484232" r:id="rId19"/>
     <p:sldLayoutId id="2147484296" r:id="rId20"/>
-    <p:sldLayoutId id="2147484298" r:id="rId21"/>
-    <p:sldLayoutId id="2147484295" r:id="rId22"/>
+    <p:sldLayoutId id="2147484297" r:id="rId21"/>
+    <p:sldLayoutId id="2147484298" r:id="rId22"/>
+    <p:sldLayoutId id="2147484295" r:id="rId23"/>
   </p:sldLayoutIdLst>
   <p:transition>
     <p:fade/>

</xml_diff>

<commit_message>
template van Beilen wordt gebruikt
</commit_message>
<xml_diff>
--- a/src/main/resources/template.pptx
+++ b/src/main/resources/template.pptx
@@ -140,7 +140,25 @@
       </a:defRPr>
     </a:lvl9pPr>
   </p:defaultTextStyle>
-  <p:extLst/>
+  <p:extLst>
+    <p:ext uri="{EFAFB233-063F-42B5-8137-9DF3F51BA10A}">
+      <p15:sldGuideLst xmlns:p15="http://schemas.microsoft.com/office/powerpoint/2012/main">
+        <p15:guide id="1" orient="horz" pos="2160">
+          <p15:clr>
+            <a:srgbClr val="A4A3A4"/>
+          </p15:clr>
+        </p15:guide>
+        <p15:guide id="2" pos="2880">
+          <p15:clr>
+            <a:srgbClr val="A4A3A4"/>
+          </p15:clr>
+        </p15:guide>
+      </p15:sldGuideLst>
+    </p:ext>
+    <p:ext uri="{2D200454-40CA-4A62-9FC3-DE9A4176ACB9}">
+      <p15:notesGuideLst xmlns:p15="http://schemas.microsoft.com/office/powerpoint/2012/main"/>
+    </p:ext>
+  </p:extLst>
 </p:presentation>
 </file>
 
@@ -235,7 +253,7 @@
               <a:pPr>
                 <a:defRPr/>
               </a:pPr>
-              <a:t>22/03/2016</a:t>
+              <a:t>07/12/2019</a:t>
             </a:fld>
             <a:endParaRPr lang="en-GB"/>
           </a:p>
@@ -310,7 +328,7 @@
               <a:pPr>
                 <a:defRPr/>
               </a:pPr>
-              <a:t>‹nr.›</a:t>
+              <a:t>‹#›</a:t>
             </a:fld>
             <a:endParaRPr lang="en-GB"/>
           </a:p>
@@ -319,7 +337,7 @@
     </p:spTree>
     <p:extLst>
       <p:ext uri="{BB962C8B-B14F-4D97-AF65-F5344CB8AC3E}">
-        <p14:creationId xmlns:p14="http://schemas.microsoft.com/office/powerpoint/2010/main" xmlns="" val="2562165451"/>
+        <p14:creationId xmlns:p14="http://schemas.microsoft.com/office/powerpoint/2010/main" val="2562165451"/>
       </p:ext>
     </p:extLst>
   </p:cSld>
@@ -418,7 +436,7 @@
               <a:pPr>
                 <a:defRPr/>
               </a:pPr>
-              <a:t>22-3-2016</a:t>
+              <a:t>07-12-2019</a:t>
             </a:fld>
             <a:endParaRPr lang="nl-NL"/>
           </a:p>
@@ -454,7 +472,7 @@
           <a:lstStyle/>
           <a:p>
             <a:pPr lvl="0"/>
-            <a:endParaRPr lang="nl-NL" noProof="0" smtClean="0"/>
+            <a:endParaRPr lang="nl-NL" noProof="0"/>
           </a:p>
         </p:txBody>
       </p:sp>
@@ -485,38 +503,38 @@
           <a:p>
             <a:pPr lvl="0"/>
             <a:r>
-              <a:rPr lang="en-US" noProof="0" smtClean="0"/>
+              <a:rPr lang="en-US" noProof="0"/>
               <a:t>Click to edit Master text styles</a:t>
             </a:r>
           </a:p>
           <a:p>
             <a:pPr lvl="1"/>
             <a:r>
-              <a:rPr lang="en-US" noProof="0" smtClean="0"/>
+              <a:rPr lang="en-US" noProof="0"/>
               <a:t>Second level</a:t>
             </a:r>
           </a:p>
           <a:p>
             <a:pPr lvl="2"/>
             <a:r>
-              <a:rPr lang="en-US" noProof="0" smtClean="0"/>
+              <a:rPr lang="en-US" noProof="0"/>
               <a:t>Third level</a:t>
             </a:r>
           </a:p>
           <a:p>
             <a:pPr lvl="3"/>
             <a:r>
-              <a:rPr lang="en-US" noProof="0" smtClean="0"/>
+              <a:rPr lang="en-US" noProof="0"/>
               <a:t>Fourth level</a:t>
             </a:r>
           </a:p>
           <a:p>
             <a:pPr lvl="4"/>
             <a:r>
-              <a:rPr lang="en-US" noProof="0" smtClean="0"/>
+              <a:rPr lang="en-US" noProof="0"/>
               <a:t>Fifth level</a:t>
             </a:r>
-            <a:endParaRPr lang="nl-NL" noProof="0" smtClean="0"/>
+            <a:endParaRPr lang="nl-NL" noProof="0"/>
           </a:p>
         </p:txBody>
       </p:sp>
@@ -589,7 +607,7 @@
               <a:pPr>
                 <a:defRPr/>
               </a:pPr>
-              <a:t>‹nr.›</a:t>
+              <a:t>‹#›</a:t>
             </a:fld>
             <a:endParaRPr lang="nl-NL"/>
           </a:p>
@@ -598,7 +616,7 @@
     </p:spTree>
     <p:extLst>
       <p:ext uri="{BB962C8B-B14F-4D97-AF65-F5344CB8AC3E}">
-        <p14:creationId xmlns:p14="http://schemas.microsoft.com/office/powerpoint/2010/main" xmlns="" val="4277614354"/>
+        <p14:creationId xmlns:p14="http://schemas.microsoft.com/office/powerpoint/2010/main" val="4277614354"/>
       </p:ext>
     </p:extLst>
   </p:cSld>
@@ -866,56 +884,48 @@
               </a:spcAft>
               <a:defRPr/>
             </a:pPr>
-            <a:r>
-              <a:rPr lang="nl-NL" sz="2800" dirty="0">
-                <a:solidFill>
-                  <a:schemeClr val="tx1">
-                    <a:lumMod val="95000"/>
-                  </a:schemeClr>
-                </a:solidFill>
-                <a:effectLst/>
-                <a:ea typeface="+mj-ea"/>
-                <a:cs typeface="Tahoma" pitchFamily="34" charset="0"/>
-              </a:rPr>
-              <a:t>Namens de kerkenraad van Assen Peelo</a:t>
-            </a:r>
-            <a:br>
-              <a:rPr lang="nl-NL" sz="2800" dirty="0">
-                <a:solidFill>
-                  <a:schemeClr val="tx1">
-                    <a:lumMod val="95000"/>
-                  </a:schemeClr>
-                </a:solidFill>
-                <a:effectLst/>
-                <a:ea typeface="+mj-ea"/>
-                <a:cs typeface="Tahoma" pitchFamily="34" charset="0"/>
-              </a:rPr>
-            </a:br>
-            <a:r>
-              <a:rPr lang="nl-NL" sz="2800" dirty="0">
-                <a:solidFill>
-                  <a:schemeClr val="tx1">
-                    <a:lumMod val="95000"/>
-                  </a:schemeClr>
-                </a:solidFill>
-                <a:effectLst/>
-                <a:ea typeface="+mj-ea"/>
-                <a:cs typeface="Tahoma" pitchFamily="34" charset="0"/>
-              </a:rPr>
-              <a:t>van harte welkom in deze kerkdienst.</a:t>
-            </a:r>
-            <a:br>
-              <a:rPr lang="nl-NL" sz="2800" dirty="0">
-                <a:solidFill>
-                  <a:schemeClr val="tx1">
-                    <a:lumMod val="95000"/>
-                  </a:schemeClr>
-                </a:solidFill>
-                <a:effectLst/>
-                <a:ea typeface="+mj-ea"/>
-                <a:cs typeface="Tahoma" pitchFamily="34" charset="0"/>
-              </a:rPr>
-            </a:br>
+            <a:endParaRPr lang="nl-NL" sz="2800" dirty="0">
+              <a:solidFill>
+                <a:schemeClr val="tx1">
+                  <a:lumMod val="95000"/>
+                </a:schemeClr>
+              </a:solidFill>
+              <a:effectLst/>
+              <a:ea typeface="+mj-ea"/>
+              <a:cs typeface="Tahoma" pitchFamily="34" charset="0"/>
+            </a:endParaRPr>
+          </a:p>
+          <a:p>
+            <a:pPr fontAlgn="auto">
+              <a:spcBef>
+                <a:spcPts val="0"/>
+              </a:spcBef>
+              <a:spcAft>
+                <a:spcPts val="0"/>
+              </a:spcAft>
+              <a:defRPr/>
+            </a:pPr>
+            <a:endParaRPr lang="nl-NL" sz="2800" dirty="0">
+              <a:solidFill>
+                <a:schemeClr val="tx1">
+                  <a:lumMod val="95000"/>
+                </a:schemeClr>
+              </a:solidFill>
+              <a:effectLst/>
+              <a:ea typeface="+mj-ea"/>
+              <a:cs typeface="Tahoma" pitchFamily="34" charset="0"/>
+            </a:endParaRPr>
+          </a:p>
+          <a:p>
+            <a:pPr fontAlgn="auto">
+              <a:spcBef>
+                <a:spcPts val="0"/>
+              </a:spcBef>
+              <a:spcAft>
+                <a:spcPts val="0"/>
+              </a:spcAft>
+              <a:defRPr/>
+            </a:pPr>
             <a:endParaRPr lang="nl-NL" sz="2800" dirty="0">
               <a:solidFill>
                 <a:schemeClr val="tx1">
@@ -988,7 +998,7 @@
               <a:defRPr/>
             </a:pPr>
             <a:r>
-              <a:rPr lang="nl-NL" sz="1100" dirty="0" smtClean="0">
+              <a:rPr lang="nl-NL" sz="1100" dirty="0">
                 <a:solidFill>
                   <a:schemeClr val="bg1"/>
                 </a:solidFill>
@@ -1004,20 +1014,6 @@
               </a:rPr>
               <a:t>3.4</a:t>
             </a:r>
-            <a:endParaRPr lang="nl-NL" sz="1100" dirty="0" smtClean="0">
-              <a:solidFill>
-                <a:schemeClr val="bg1"/>
-              </a:solidFill>
-              <a:effectLst>
-                <a:outerShdw blurRad="38100" dist="38100" dir="2700000" algn="tl">
-                  <a:srgbClr val="000000">
-                    <a:alpha val="43137"/>
-                  </a:srgbClr>
-                </a:outerShdw>
-              </a:effectLst>
-              <a:ea typeface="+mj-ea"/>
-              <a:cs typeface="Tahoma" pitchFamily="34" charset="0"/>
-            </a:endParaRPr>
           </a:p>
         </p:txBody>
       </p:sp>
@@ -1053,8 +1049,140 @@
           <a:p>
             <a:pPr lvl="0"/>
             <a:r>
-              <a:rPr lang="en-US" dirty="0" smtClean="0"/>
+              <a:rPr lang="en-US" dirty="0"/>
               <a:t>Click to edit Master text styles</a:t>
+            </a:r>
+          </a:p>
+        </p:txBody>
+      </p:sp>
+      <p:sp>
+        <p:nvSpPr>
+          <p:cNvPr id="7" name="TextBox 6">
+            <a:extLst>
+              <a:ext uri="{FF2B5EF4-FFF2-40B4-BE49-F238E27FC236}">
+                <a16:creationId xmlns:a16="http://schemas.microsoft.com/office/drawing/2014/main" id="{A625D2AD-D015-A746-B162-6503D197D59C}"/>
+              </a:ext>
+            </a:extLst>
+          </p:cNvPr>
+          <p:cNvSpPr txBox="1"/>
+          <p:nvPr userDrawn="1"/>
+        </p:nvSpPr>
+        <p:spPr bwMode="auto">
+          <a:xfrm>
+            <a:off x="0" y="0"/>
+            <a:ext cx="9144000" cy="523220"/>
+          </a:xfrm>
+          <a:prstGeom prst="rect">
+            <a:avLst/>
+          </a:prstGeom>
+          <a:noFill/>
+          <a:ln w="9525">
+            <a:noFill/>
+            <a:miter lim="800000"/>
+            <a:headEnd/>
+            <a:tailEnd/>
+          </a:ln>
+        </p:spPr>
+        <p:txBody>
+          <a:bodyPr wrap="square" lIns="360000" rIns="180000" rtlCol="0" anchor="t" anchorCtr="0">
+            <a:spAutoFit/>
+          </a:bodyPr>
+          <a:lstStyle/>
+          <a:p>
+            <a:pPr algn="ctr" fontAlgn="auto">
+              <a:spcAft>
+                <a:spcPts val="0"/>
+              </a:spcAft>
+            </a:pPr>
+            <a:r>
+              <a:rPr lang="en-US" sz="2800" dirty="0">
+                <a:solidFill>
+                  <a:schemeClr val="bg1"/>
+                </a:solidFill>
+                <a:effectLst>
+                  <a:outerShdw blurRad="38100" dist="38100" dir="2700000" algn="tl">
+                    <a:srgbClr val="000000">
+                      <a:alpha val="43137"/>
+                    </a:srgbClr>
+                  </a:outerShdw>
+                </a:effectLst>
+                <a:latin typeface="Tahoma" pitchFamily="34" charset="0"/>
+                <a:ea typeface="+mj-ea"/>
+                <a:cs typeface="Tahoma" pitchFamily="34" charset="0"/>
+              </a:rPr>
+              <a:t>Van </a:t>
+            </a:r>
+            <a:r>
+              <a:rPr lang="en-US" sz="2800" dirty="0" err="1">
+                <a:solidFill>
+                  <a:schemeClr val="bg1"/>
+                </a:solidFill>
+                <a:effectLst>
+                  <a:outerShdw blurRad="38100" dist="38100" dir="2700000" algn="tl">
+                    <a:srgbClr val="000000">
+                      <a:alpha val="43137"/>
+                    </a:srgbClr>
+                  </a:outerShdw>
+                </a:effectLst>
+                <a:latin typeface="Tahoma" pitchFamily="34" charset="0"/>
+                <a:ea typeface="+mj-ea"/>
+                <a:cs typeface="Tahoma" pitchFamily="34" charset="0"/>
+              </a:rPr>
+              <a:t>harte</a:t>
+            </a:r>
+            <a:r>
+              <a:rPr lang="en-US" sz="2800" dirty="0">
+                <a:solidFill>
+                  <a:schemeClr val="bg1"/>
+                </a:solidFill>
+                <a:effectLst>
+                  <a:outerShdw blurRad="38100" dist="38100" dir="2700000" algn="tl">
+                    <a:srgbClr val="000000">
+                      <a:alpha val="43137"/>
+                    </a:srgbClr>
+                  </a:outerShdw>
+                </a:effectLst>
+                <a:latin typeface="Tahoma" pitchFamily="34" charset="0"/>
+                <a:ea typeface="+mj-ea"/>
+                <a:cs typeface="Tahoma" pitchFamily="34" charset="0"/>
+              </a:rPr>
+              <a:t> </a:t>
+            </a:r>
+            <a:r>
+              <a:rPr lang="en-US" sz="2800" dirty="0" err="1">
+                <a:solidFill>
+                  <a:schemeClr val="bg1"/>
+                </a:solidFill>
+                <a:effectLst>
+                  <a:outerShdw blurRad="38100" dist="38100" dir="2700000" algn="tl">
+                    <a:srgbClr val="000000">
+                      <a:alpha val="43137"/>
+                    </a:srgbClr>
+                  </a:outerShdw>
+                </a:effectLst>
+                <a:latin typeface="Tahoma" pitchFamily="34" charset="0"/>
+                <a:ea typeface="+mj-ea"/>
+                <a:cs typeface="Tahoma" pitchFamily="34" charset="0"/>
+              </a:rPr>
+              <a:t>welkom</a:t>
+            </a:r>
+            <a:r>
+              <a:rPr lang="en-US" sz="2800" dirty="0">
+                <a:solidFill>
+                  <a:schemeClr val="bg1"/>
+                </a:solidFill>
+                <a:effectLst>
+                  <a:outerShdw blurRad="38100" dist="38100" dir="2700000" algn="tl">
+                    <a:srgbClr val="000000">
+                      <a:alpha val="43137"/>
+                    </a:srgbClr>
+                  </a:outerShdw>
+                </a:effectLst>
+                <a:latin typeface="Tahoma" pitchFamily="34" charset="0"/>
+                <a:ea typeface="+mj-ea"/>
+                <a:cs typeface="Tahoma" pitchFamily="34" charset="0"/>
+              </a:rPr>
+              <a:t>!</a:t>
             </a:r>
           </a:p>
         </p:txBody>
@@ -1104,8 +1232,8 @@
         </p:blipFill>
         <p:spPr bwMode="auto">
           <a:xfrm>
-            <a:off x="971550" y="549275"/>
-            <a:ext cx="2085975" cy="1866900"/>
+            <a:off x="1066367" y="634134"/>
+            <a:ext cx="1896341" cy="1697182"/>
           </a:xfrm>
           <a:prstGeom prst="rect">
             <a:avLst/>
@@ -1121,9 +1249,83 @@
               </a:schemeClr>
             </a:outerShdw>
           </a:effectLst>
-          <a:extLst/>
         </p:spPr>
       </p:pic>
+      <p:sp>
+        <p:nvSpPr>
+          <p:cNvPr id="3" name="TextBox 2">
+            <a:extLst>
+              <a:ext uri="{FF2B5EF4-FFF2-40B4-BE49-F238E27FC236}">
+                <a16:creationId xmlns:a16="http://schemas.microsoft.com/office/drawing/2014/main" id="{3D2513A7-F789-4F4A-B945-ABFF3AD4F07E}"/>
+              </a:ext>
+            </a:extLst>
+          </p:cNvPr>
+          <p:cNvSpPr txBox="1"/>
+          <p:nvPr userDrawn="1"/>
+        </p:nvSpPr>
+        <p:spPr bwMode="auto">
+          <a:xfrm>
+            <a:off x="0" y="0"/>
+            <a:ext cx="4374776" cy="523220"/>
+          </a:xfrm>
+          <a:prstGeom prst="rect">
+            <a:avLst/>
+          </a:prstGeom>
+          <a:noFill/>
+          <a:ln w="9525">
+            <a:noFill/>
+            <a:miter lim="800000"/>
+            <a:headEnd/>
+            <a:tailEnd/>
+          </a:ln>
+        </p:spPr>
+        <p:txBody>
+          <a:bodyPr wrap="square" lIns="360000" rIns="180000" rtlCol="0" anchor="t" anchorCtr="0">
+            <a:spAutoFit/>
+          </a:bodyPr>
+          <a:lstStyle/>
+          <a:p>
+            <a:pPr algn="l" fontAlgn="auto">
+              <a:spcAft>
+                <a:spcPts val="0"/>
+              </a:spcAft>
+            </a:pPr>
+            <a:r>
+              <a:rPr lang="en-US" sz="2800" dirty="0" err="1">
+                <a:solidFill>
+                  <a:schemeClr val="bg1"/>
+                </a:solidFill>
+                <a:effectLst>
+                  <a:outerShdw blurRad="38100" dist="38100" dir="2700000" algn="tl">
+                    <a:srgbClr val="000000">
+                      <a:alpha val="43137"/>
+                    </a:srgbClr>
+                  </a:outerShdw>
+                </a:effectLst>
+                <a:latin typeface="Tahoma" pitchFamily="34" charset="0"/>
+                <a:ea typeface="+mj-ea"/>
+                <a:cs typeface="Tahoma" pitchFamily="34" charset="0"/>
+              </a:rPr>
+              <a:t>Gebed</a:t>
+            </a:r>
+            <a:endParaRPr lang="en-US" sz="2800" dirty="0">
+              <a:solidFill>
+                <a:schemeClr val="bg1"/>
+              </a:solidFill>
+              <a:effectLst>
+                <a:outerShdw blurRad="38100" dist="38100" dir="2700000" algn="tl">
+                  <a:srgbClr val="000000">
+                    <a:alpha val="43137"/>
+                  </a:srgbClr>
+                </a:outerShdw>
+              </a:effectLst>
+              <a:latin typeface="Tahoma" pitchFamily="34" charset="0"/>
+              <a:ea typeface="+mj-ea"/>
+              <a:cs typeface="Tahoma" pitchFamily="34" charset="0"/>
+            </a:endParaRPr>
+          </a:p>
+        </p:txBody>
+      </p:sp>
     </p:spTree>
   </p:cSld>
   <p:clrMapOvr>
@@ -1169,8 +1371,8 @@
         </p:blipFill>
         <p:spPr bwMode="auto">
           <a:xfrm>
-            <a:off x="971550" y="549275"/>
-            <a:ext cx="2581275" cy="1736725"/>
+            <a:off x="1088880" y="628217"/>
+            <a:ext cx="2346614" cy="1578841"/>
           </a:xfrm>
           <a:prstGeom prst="rect">
             <a:avLst/>
@@ -1186,9 +1388,83 @@
               </a:schemeClr>
             </a:outerShdw>
           </a:effectLst>
-          <a:extLst/>
         </p:spPr>
       </p:pic>
+      <p:sp>
+        <p:nvSpPr>
+          <p:cNvPr id="4" name="TextBox 3">
+            <a:extLst>
+              <a:ext uri="{FF2B5EF4-FFF2-40B4-BE49-F238E27FC236}">
+                <a16:creationId xmlns:a16="http://schemas.microsoft.com/office/drawing/2014/main" id="{15211CD6-040C-4D45-ADC1-1C718D922D5D}"/>
+              </a:ext>
+            </a:extLst>
+          </p:cNvPr>
+          <p:cNvSpPr txBox="1"/>
+          <p:nvPr userDrawn="1"/>
+        </p:nvSpPr>
+        <p:spPr bwMode="auto">
+          <a:xfrm>
+            <a:off x="0" y="0"/>
+            <a:ext cx="4374776" cy="523220"/>
+          </a:xfrm>
+          <a:prstGeom prst="rect">
+            <a:avLst/>
+          </a:prstGeom>
+          <a:noFill/>
+          <a:ln w="9525">
+            <a:noFill/>
+            <a:miter lim="800000"/>
+            <a:headEnd/>
+            <a:tailEnd/>
+          </a:ln>
+        </p:spPr>
+        <p:txBody>
+          <a:bodyPr wrap="square" lIns="360000" rIns="180000" rtlCol="0" anchor="t" anchorCtr="0">
+            <a:spAutoFit/>
+          </a:bodyPr>
+          <a:lstStyle/>
+          <a:p>
+            <a:pPr algn="l" fontAlgn="auto">
+              <a:spcAft>
+                <a:spcPts val="0"/>
+              </a:spcAft>
+            </a:pPr>
+            <a:r>
+              <a:rPr lang="en-US" sz="2800" dirty="0" err="1">
+                <a:solidFill>
+                  <a:schemeClr val="bg1"/>
+                </a:solidFill>
+                <a:effectLst>
+                  <a:outerShdw blurRad="38100" dist="38100" dir="2700000" algn="tl">
+                    <a:srgbClr val="000000">
+                      <a:alpha val="43137"/>
+                    </a:srgbClr>
+                  </a:outerShdw>
+                </a:effectLst>
+                <a:latin typeface="Tahoma" pitchFamily="34" charset="0"/>
+                <a:ea typeface="+mj-ea"/>
+                <a:cs typeface="Tahoma" pitchFamily="34" charset="0"/>
+              </a:rPr>
+              <a:t>Doop</a:t>
+            </a:r>
+            <a:endParaRPr lang="en-US" sz="2800" dirty="0">
+              <a:solidFill>
+                <a:schemeClr val="bg1"/>
+              </a:solidFill>
+              <a:effectLst>
+                <a:outerShdw blurRad="38100" dist="38100" dir="2700000" algn="tl">
+                  <a:srgbClr val="000000">
+                    <a:alpha val="43137"/>
+                  </a:srgbClr>
+                </a:outerShdw>
+              </a:effectLst>
+              <a:latin typeface="Tahoma" pitchFamily="34" charset="0"/>
+              <a:ea typeface="+mj-ea"/>
+              <a:cs typeface="Tahoma" pitchFamily="34" charset="0"/>
+            </a:endParaRPr>
+          </a:p>
+        </p:txBody>
+      </p:sp>
     </p:spTree>
   </p:cSld>
   <p:clrMapOvr>
@@ -1234,8 +1510,8 @@
         </p:blipFill>
         <p:spPr bwMode="auto">
           <a:xfrm>
-            <a:off x="971550" y="549275"/>
-            <a:ext cx="1946275" cy="2009775"/>
+            <a:off x="1060017" y="640628"/>
+            <a:ext cx="1769341" cy="1827068"/>
           </a:xfrm>
           <a:prstGeom prst="rect">
             <a:avLst/>
@@ -1251,9 +1527,68 @@
               </a:schemeClr>
             </a:outerShdw>
           </a:effectLst>
-          <a:extLst/>
         </p:spPr>
       </p:pic>
+      <p:sp>
+        <p:nvSpPr>
+          <p:cNvPr id="4" name="TextBox 3">
+            <a:extLst>
+              <a:ext uri="{FF2B5EF4-FFF2-40B4-BE49-F238E27FC236}">
+                <a16:creationId xmlns:a16="http://schemas.microsoft.com/office/drawing/2014/main" id="{00B3CCE7-0D9F-B34D-98F7-119052FA1C3D}"/>
+              </a:ext>
+            </a:extLst>
+          </p:cNvPr>
+          <p:cNvSpPr txBox="1"/>
+          <p:nvPr userDrawn="1"/>
+        </p:nvSpPr>
+        <p:spPr bwMode="auto">
+          <a:xfrm>
+            <a:off x="0" y="0"/>
+            <a:ext cx="4374776" cy="523220"/>
+          </a:xfrm>
+          <a:prstGeom prst="rect">
+            <a:avLst/>
+          </a:prstGeom>
+          <a:noFill/>
+          <a:ln w="9525">
+            <a:noFill/>
+            <a:miter lim="800000"/>
+            <a:headEnd/>
+            <a:tailEnd/>
+          </a:ln>
+        </p:spPr>
+        <p:txBody>
+          <a:bodyPr wrap="square" lIns="360000" rIns="180000" rtlCol="0" anchor="t" anchorCtr="0">
+            <a:spAutoFit/>
+          </a:bodyPr>
+          <a:lstStyle/>
+          <a:p>
+            <a:pPr algn="l" fontAlgn="auto">
+              <a:spcAft>
+                <a:spcPts val="0"/>
+              </a:spcAft>
+            </a:pPr>
+            <a:r>
+              <a:rPr lang="en-US" sz="2800" dirty="0">
+                <a:solidFill>
+                  <a:schemeClr val="bg1"/>
+                </a:solidFill>
+                <a:effectLst>
+                  <a:outerShdw blurRad="38100" dist="38100" dir="2700000" algn="tl">
+                    <a:srgbClr val="000000">
+                      <a:alpha val="43137"/>
+                    </a:srgbClr>
+                  </a:outerShdw>
+                </a:effectLst>
+                <a:latin typeface="Tahoma" pitchFamily="34" charset="0"/>
+                <a:ea typeface="+mj-ea"/>
+                <a:cs typeface="Tahoma" pitchFamily="34" charset="0"/>
+              </a:rPr>
+              <a:t>Wet</a:t>
+            </a:r>
+          </a:p>
+        </p:txBody>
+      </p:sp>
     </p:spTree>
   </p:cSld>
   <p:clrMapOvr>
@@ -1299,8 +1634,8 @@
         </p:blipFill>
         <p:spPr bwMode="auto">
           <a:xfrm>
-            <a:off x="971550" y="565150"/>
-            <a:ext cx="2019300" cy="1841500"/>
+            <a:off x="1063337" y="648855"/>
+            <a:ext cx="1835727" cy="1674091"/>
           </a:xfrm>
           <a:prstGeom prst="rect">
             <a:avLst/>
@@ -1358,8 +1693,8 @@
         </p:blipFill>
         <p:spPr>
           <a:xfrm>
-            <a:off x="971550" y="579438"/>
-            <a:ext cx="2254250" cy="1939925"/>
+            <a:off x="1074016" y="667616"/>
+            <a:ext cx="2049318" cy="1763568"/>
           </a:xfrm>
           <a:prstGeom prst="rect">
             <a:avLst/>
@@ -1373,6 +1708,81 @@
           </a:effectLst>
         </p:spPr>
       </p:pic>
+      <p:sp>
+        <p:nvSpPr>
+          <p:cNvPr id="4" name="TextBox 3">
+            <a:extLst>
+              <a:ext uri="{FF2B5EF4-FFF2-40B4-BE49-F238E27FC236}">
+                <a16:creationId xmlns:a16="http://schemas.microsoft.com/office/drawing/2014/main" id="{F1625D6C-D973-A446-AEC0-152ED323F3E5}"/>
+              </a:ext>
+            </a:extLst>
+          </p:cNvPr>
+          <p:cNvSpPr txBox="1"/>
+          <p:nvPr userDrawn="1"/>
+        </p:nvSpPr>
+        <p:spPr bwMode="auto">
+          <a:xfrm>
+            <a:off x="0" y="0"/>
+            <a:ext cx="4374776" cy="523220"/>
+          </a:xfrm>
+          <a:prstGeom prst="rect">
+            <a:avLst/>
+          </a:prstGeom>
+          <a:noFill/>
+          <a:ln w="9525">
+            <a:noFill/>
+            <a:miter lim="800000"/>
+            <a:headEnd/>
+            <a:tailEnd/>
+          </a:ln>
+        </p:spPr>
+        <p:txBody>
+          <a:bodyPr wrap="square" lIns="360000" rIns="180000" rtlCol="0" anchor="t" anchorCtr="0">
+            <a:spAutoFit/>
+          </a:bodyPr>
+          <a:lstStyle/>
+          <a:p>
+            <a:pPr algn="l" fontAlgn="auto">
+              <a:spcAft>
+                <a:spcPts val="0"/>
+              </a:spcAft>
+            </a:pPr>
+            <a:r>
+              <a:rPr lang="en-US" sz="2800" dirty="0" err="1">
+                <a:solidFill>
+                  <a:schemeClr val="bg1"/>
+                </a:solidFill>
+                <a:effectLst>
+                  <a:outerShdw blurRad="38100" dist="38100" dir="2700000" algn="tl">
+                    <a:srgbClr val="000000">
+                      <a:alpha val="43137"/>
+                    </a:srgbClr>
+                  </a:outerShdw>
+                </a:effectLst>
+                <a:latin typeface="Tahoma" pitchFamily="34" charset="0"/>
+                <a:ea typeface="+mj-ea"/>
+                <a:cs typeface="Tahoma" pitchFamily="34" charset="0"/>
+              </a:rPr>
+              <a:t>Preek</a:t>
+            </a:r>
+            <a:endParaRPr lang="en-US" sz="2800" dirty="0">
+              <a:solidFill>
+                <a:schemeClr val="bg1"/>
+              </a:solidFill>
+              <a:effectLst>
+                <a:outerShdw blurRad="38100" dist="38100" dir="2700000" algn="tl">
+                  <a:srgbClr val="000000">
+                    <a:alpha val="43137"/>
+                  </a:srgbClr>
+                </a:outerShdw>
+              </a:effectLst>
+              <a:latin typeface="Tahoma" pitchFamily="34" charset="0"/>
+              <a:ea typeface="+mj-ea"/>
+              <a:cs typeface="Tahoma" pitchFamily="34" charset="0"/>
+            </a:endParaRPr>
+          </a:p>
+        </p:txBody>
+      </p:sp>
     </p:spTree>
   </p:cSld>
   <p:clrMapOvr>
@@ -1417,8 +1827,8 @@
         </p:blipFill>
         <p:spPr>
           <a:xfrm>
-            <a:off x="966788" y="549275"/>
-            <a:ext cx="2403475" cy="1470025"/>
+            <a:off x="1076037" y="616094"/>
+            <a:ext cx="2184977" cy="1336386"/>
           </a:xfrm>
           <a:prstGeom prst="rect">
             <a:avLst/>
@@ -1432,6 +1842,99 @@
           </a:effectLst>
         </p:spPr>
       </p:pic>
+      <p:sp>
+        <p:nvSpPr>
+          <p:cNvPr id="4" name="TextBox 3">
+            <a:extLst>
+              <a:ext uri="{FF2B5EF4-FFF2-40B4-BE49-F238E27FC236}">
+                <a16:creationId xmlns:a16="http://schemas.microsoft.com/office/drawing/2014/main" id="{D8C668AE-1D47-4140-8384-CCB2072798E6}"/>
+              </a:ext>
+            </a:extLst>
+          </p:cNvPr>
+          <p:cNvSpPr txBox="1"/>
+          <p:nvPr userDrawn="1"/>
+        </p:nvSpPr>
+        <p:spPr bwMode="auto">
+          <a:xfrm>
+            <a:off x="0" y="0"/>
+            <a:ext cx="4374776" cy="523220"/>
+          </a:xfrm>
+          <a:prstGeom prst="rect">
+            <a:avLst/>
+          </a:prstGeom>
+          <a:noFill/>
+          <a:ln w="9525">
+            <a:noFill/>
+            <a:miter lim="800000"/>
+            <a:headEnd/>
+            <a:tailEnd/>
+          </a:ln>
+        </p:spPr>
+        <p:txBody>
+          <a:bodyPr wrap="square" lIns="360000" rIns="180000" rtlCol="0" anchor="t" anchorCtr="0">
+            <a:spAutoFit/>
+          </a:bodyPr>
+          <a:lstStyle/>
+          <a:p>
+            <a:pPr algn="l" fontAlgn="auto">
+              <a:spcAft>
+                <a:spcPts val="0"/>
+              </a:spcAft>
+            </a:pPr>
+            <a:r>
+              <a:rPr lang="en-US" sz="2800" dirty="0">
+                <a:solidFill>
+                  <a:schemeClr val="bg1"/>
+                </a:solidFill>
+                <a:effectLst>
+                  <a:outerShdw blurRad="38100" dist="38100" dir="2700000" algn="tl">
+                    <a:srgbClr val="000000">
+                      <a:alpha val="43137"/>
+                    </a:srgbClr>
+                  </a:outerShdw>
+                </a:effectLst>
+                <a:latin typeface="Tahoma" pitchFamily="34" charset="0"/>
+                <a:ea typeface="+mj-ea"/>
+                <a:cs typeface="Tahoma" pitchFamily="34" charset="0"/>
+              </a:rPr>
+              <a:t>Heilig </a:t>
+            </a:r>
+            <a:r>
+              <a:rPr lang="en-US" sz="2800" dirty="0" err="1">
+                <a:solidFill>
+                  <a:schemeClr val="bg1"/>
+                </a:solidFill>
+                <a:effectLst>
+                  <a:outerShdw blurRad="38100" dist="38100" dir="2700000" algn="tl">
+                    <a:srgbClr val="000000">
+                      <a:alpha val="43137"/>
+                    </a:srgbClr>
+                  </a:outerShdw>
+                </a:effectLst>
+                <a:latin typeface="Tahoma" pitchFamily="34" charset="0"/>
+                <a:ea typeface="+mj-ea"/>
+                <a:cs typeface="Tahoma" pitchFamily="34" charset="0"/>
+              </a:rPr>
+              <a:t>Avondmaal</a:t>
+            </a:r>
+            <a:endParaRPr lang="en-US" sz="2800" dirty="0">
+              <a:solidFill>
+                <a:schemeClr val="bg1"/>
+              </a:solidFill>
+              <a:effectLst>
+                <a:outerShdw blurRad="38100" dist="38100" dir="2700000" algn="tl">
+                  <a:srgbClr val="000000">
+                    <a:alpha val="43137"/>
+                  </a:srgbClr>
+                </a:outerShdw>
+              </a:effectLst>
+              <a:latin typeface="Tahoma" pitchFamily="34" charset="0"/>
+              <a:ea typeface="+mj-ea"/>
+              <a:cs typeface="Tahoma" pitchFamily="34" charset="0"/>
+            </a:endParaRPr>
+          </a:p>
+        </p:txBody>
+      </p:sp>
     </p:spTree>
   </p:cSld>
   <p:clrMapOvr>
@@ -1476,8 +1979,8 @@
         </p:blipFill>
         <p:spPr>
           <a:xfrm>
-            <a:off x="971550" y="549275"/>
-            <a:ext cx="2120900" cy="1682750"/>
+            <a:off x="1067955" y="625764"/>
+            <a:ext cx="1928091" cy="1529773"/>
           </a:xfrm>
           <a:prstGeom prst="rect">
             <a:avLst/>
@@ -1491,6 +1994,81 @@
           </a:effectLst>
         </p:spPr>
       </p:pic>
+      <p:sp>
+        <p:nvSpPr>
+          <p:cNvPr id="4" name="TextBox 3">
+            <a:extLst>
+              <a:ext uri="{FF2B5EF4-FFF2-40B4-BE49-F238E27FC236}">
+                <a16:creationId xmlns:a16="http://schemas.microsoft.com/office/drawing/2014/main" id="{68E9731C-F423-574C-92B8-740ED85D2EB4}"/>
+              </a:ext>
+            </a:extLst>
+          </p:cNvPr>
+          <p:cNvSpPr txBox="1"/>
+          <p:nvPr userDrawn="1"/>
+        </p:nvSpPr>
+        <p:spPr bwMode="auto">
+          <a:xfrm>
+            <a:off x="0" y="0"/>
+            <a:ext cx="4374776" cy="523220"/>
+          </a:xfrm>
+          <a:prstGeom prst="rect">
+            <a:avLst/>
+          </a:prstGeom>
+          <a:noFill/>
+          <a:ln w="9525">
+            <a:noFill/>
+            <a:miter lim="800000"/>
+            <a:headEnd/>
+            <a:tailEnd/>
+          </a:ln>
+        </p:spPr>
+        <p:txBody>
+          <a:bodyPr wrap="square" lIns="360000" rIns="180000" rtlCol="0" anchor="t" anchorCtr="0">
+            <a:spAutoFit/>
+          </a:bodyPr>
+          <a:lstStyle/>
+          <a:p>
+            <a:pPr algn="l" fontAlgn="auto">
+              <a:spcAft>
+                <a:spcPts val="0"/>
+              </a:spcAft>
+            </a:pPr>
+            <a:r>
+              <a:rPr lang="en-US" sz="2800" dirty="0" err="1">
+                <a:solidFill>
+                  <a:schemeClr val="bg1"/>
+                </a:solidFill>
+                <a:effectLst>
+                  <a:outerShdw blurRad="38100" dist="38100" dir="2700000" algn="tl">
+                    <a:srgbClr val="000000">
+                      <a:alpha val="43137"/>
+                    </a:srgbClr>
+                  </a:outerShdw>
+                </a:effectLst>
+                <a:latin typeface="Tahoma" pitchFamily="34" charset="0"/>
+                <a:ea typeface="+mj-ea"/>
+                <a:cs typeface="Tahoma" pitchFamily="34" charset="0"/>
+              </a:rPr>
+              <a:t>Schriftlezing</a:t>
+            </a:r>
+            <a:endParaRPr lang="en-US" sz="2800" dirty="0">
+              <a:solidFill>
+                <a:schemeClr val="bg1"/>
+              </a:solidFill>
+              <a:effectLst>
+                <a:outerShdw blurRad="38100" dist="38100" dir="2700000" algn="tl">
+                  <a:srgbClr val="000000">
+                    <a:alpha val="43137"/>
+                  </a:srgbClr>
+                </a:outerShdw>
+              </a:effectLst>
+              <a:latin typeface="Tahoma" pitchFamily="34" charset="0"/>
+              <a:ea typeface="+mj-ea"/>
+              <a:cs typeface="Tahoma" pitchFamily="34" charset="0"/>
+            </a:endParaRPr>
+          </a:p>
+        </p:txBody>
+      </p:sp>
     </p:spTree>
   </p:cSld>
   <p:clrMapOvr>
@@ -1536,8 +2114,8 @@
         </p:blipFill>
         <p:spPr bwMode="auto">
           <a:xfrm>
-            <a:off x="971550" y="549275"/>
-            <a:ext cx="1963738" cy="1571625"/>
+            <a:off x="1060811" y="620712"/>
+            <a:ext cx="1785216" cy="1428750"/>
           </a:xfrm>
           <a:prstGeom prst="rect">
             <a:avLst/>
@@ -1579,54 +2157,6 @@
           <a:chExt cx="0" cy="0"/>
         </a:xfrm>
       </p:grpSpPr>
-      <p:sp>
-        <p:nvSpPr>
-          <p:cNvPr id="2" name="Rectangle 1"/>
-          <p:cNvSpPr/>
-          <p:nvPr/>
-        </p:nvSpPr>
-        <p:spPr>
-          <a:xfrm>
-            <a:off x="6227763" y="115888"/>
-            <a:ext cx="2916237" cy="1728787"/>
-          </a:xfrm>
-          <a:prstGeom prst="rect">
-            <a:avLst/>
-          </a:prstGeom>
-          <a:solidFill>
-            <a:srgbClr val="000000"/>
-          </a:solidFill>
-          <a:ln>
-            <a:noFill/>
-          </a:ln>
-        </p:spPr>
-        <p:style>
-          <a:lnRef idx="2">
-            <a:schemeClr val="accent1">
-              <a:shade val="50000"/>
-            </a:schemeClr>
-          </a:lnRef>
-          <a:fillRef idx="1">
-            <a:schemeClr val="accent1"/>
-          </a:fillRef>
-          <a:effectRef idx="0">
-            <a:schemeClr val="accent1"/>
-          </a:effectRef>
-          <a:fontRef idx="minor">
-            <a:schemeClr val="lt1"/>
-          </a:fontRef>
-        </p:style>
-        <p:txBody>
-          <a:bodyPr anchor="ctr"/>
-          <a:lstStyle/>
-          <a:p>
-            <a:pPr algn="ctr">
-              <a:defRPr/>
-            </a:pPr>
-            <a:endParaRPr lang="en-GB"/>
-          </a:p>
-        </p:txBody>
-      </p:sp>
     </p:spTree>
   </p:cSld>
   <p:clrMapOvr>
@@ -1699,7 +2229,7 @@
               <a:pPr>
                 <a:defRPr/>
               </a:pPr>
-              <a:t>22/03/2016</a:t>
+              <a:t>07/12/2019</a:t>
             </a:fld>
             <a:endParaRPr lang="en-GB"/>
           </a:p>
@@ -1792,7 +2322,7 @@
               <a:pPr>
                 <a:defRPr/>
               </a:pPr>
-              <a:t>‹nr.›</a:t>
+              <a:t>‹#›</a:t>
             </a:fld>
             <a:endParaRPr lang="en-GB"/>
           </a:p>
@@ -1868,7 +2398,7 @@
                 <a:effectLst/>
                 <a:cs typeface="Tahoma" pitchFamily="34" charset="0"/>
               </a:rPr>
-              <a:t>Agenda Assen-Peelo</a:t>
+              <a:t>Agenda</a:t>
             </a:r>
             <a:endParaRPr lang="en-GB" sz="3000" dirty="0">
               <a:solidFill>
@@ -1966,7 +2496,7 @@
           <a:p>
             <a:pPr lvl="0"/>
             <a:r>
-              <a:rPr lang="en-US" dirty="0" smtClean="0"/>
+              <a:rPr lang="en-US" dirty="0"/>
               <a:t>Click to edit Master text styles</a:t>
             </a:r>
           </a:p>
@@ -1974,14 +2504,20 @@
       </p:sp>
       <p:sp>
         <p:nvSpPr>
-          <p:cNvPr id="2" name="Tekstvak 1"/>
+          <p:cNvPr id="5" name="TextBox 4">
+            <a:extLst>
+              <a:ext uri="{FF2B5EF4-FFF2-40B4-BE49-F238E27FC236}">
+                <a16:creationId xmlns:a16="http://schemas.microsoft.com/office/drawing/2014/main" id="{B1552F27-2C2F-B44A-B99A-AC1CC0AB20A1}"/>
+              </a:ext>
+            </a:extLst>
+          </p:cNvPr>
           <p:cNvSpPr txBox="1"/>
           <p:nvPr userDrawn="1"/>
         </p:nvSpPr>
         <p:spPr bwMode="auto">
           <a:xfrm>
-            <a:off x="0" y="301253"/>
-            <a:ext cx="3525714" cy="584775"/>
+            <a:off x="0" y="0"/>
+            <a:ext cx="4374776" cy="523220"/>
           </a:xfrm>
           <a:prstGeom prst="rect">
             <a:avLst/>
@@ -1995,18 +2531,18 @@
           </a:ln>
         </p:spPr>
         <p:txBody>
-          <a:bodyPr wrap="square" lIns="720000" rIns="180000" rtlCol="0" anchor="t" anchorCtr="0">
+          <a:bodyPr wrap="square" lIns="360000" rIns="180000" rtlCol="0" anchor="t" anchorCtr="0">
             <a:spAutoFit/>
           </a:bodyPr>
           <a:lstStyle/>
           <a:p>
-            <a:pPr fontAlgn="auto">
+            <a:pPr algn="l" fontAlgn="auto">
               <a:spcAft>
                 <a:spcPts val="0"/>
               </a:spcAft>
             </a:pPr>
             <a:r>
-              <a:rPr lang="nl-NL" sz="3200" b="0" u="sng" dirty="0" smtClean="0">
+              <a:rPr lang="en-US" sz="2800" dirty="0" err="1">
                 <a:solidFill>
                   <a:schemeClr val="bg1"/>
                 </a:solidFill>
@@ -2023,6 +2559,21 @@
               </a:rPr>
               <a:t>Liturgie</a:t>
             </a:r>
+            <a:endParaRPr lang="en-US" sz="2800" dirty="0">
+              <a:solidFill>
+                <a:schemeClr val="bg1"/>
+              </a:solidFill>
+              <a:effectLst>
+                <a:outerShdw blurRad="38100" dist="38100" dir="2700000" algn="tl">
+                  <a:srgbClr val="000000">
+                    <a:alpha val="43137"/>
+                  </a:srgbClr>
+                </a:outerShdw>
+              </a:effectLst>
+              <a:latin typeface="Tahoma" pitchFamily="34" charset="0"/>
+              <a:ea typeface="+mj-ea"/>
+              <a:cs typeface="Tahoma" pitchFamily="34" charset="0"/>
+            </a:endParaRPr>
           </a:p>
         </p:txBody>
       </p:sp>
@@ -2066,7 +2617,7 @@
           <a:blip r:embed="rId2" cstate="print">
             <a:extLst>
               <a:ext uri="{28A0092B-C50C-407E-A947-70E740481C1C}">
-                <a14:useLocalDpi xmlns:a14="http://schemas.microsoft.com/office/drawing/2010/main" xmlns="" val="0"/>
+                <a14:useLocalDpi xmlns:a14="http://schemas.microsoft.com/office/drawing/2010/main" val="0"/>
               </a:ext>
             </a:extLst>
           </a:blip>
@@ -2089,14 +2640,14 @@
           </a:ln>
           <a:extLst>
             <a:ext uri="{909E8E84-426E-40DD-AFC4-6F175D3DCCD1}">
-              <a14:hiddenFill xmlns:a14="http://schemas.microsoft.com/office/drawing/2010/main" xmlns="">
+              <a14:hiddenFill xmlns:a14="http://schemas.microsoft.com/office/drawing/2010/main">
                 <a:solidFill>
                   <a:schemeClr val="accent1"/>
                 </a:solidFill>
               </a14:hiddenFill>
             </a:ext>
             <a:ext uri="{91240B29-F687-4F45-9708-019B960494DF}">
-              <a14:hiddenLine xmlns:a14="http://schemas.microsoft.com/office/drawing/2010/main" xmlns="" w="9525">
+              <a14:hiddenLine xmlns:a14="http://schemas.microsoft.com/office/drawing/2010/main" w="9525">
                 <a:solidFill>
                   <a:schemeClr val="tx1"/>
                 </a:solidFill>
@@ -2117,7 +2668,7 @@
         <p:spPr bwMode="auto">
           <a:xfrm>
             <a:off x="86264" y="543464"/>
-            <a:ext cx="5966071" cy="646331"/>
+            <a:ext cx="4536834" cy="646331"/>
           </a:xfrm>
           <a:prstGeom prst="rect">
             <a:avLst/>
@@ -2142,7 +2693,7 @@
               </a:spcAft>
             </a:pPr>
             <a:r>
-              <a:rPr lang="nl-NL" sz="3600" dirty="0" smtClean="0">
+              <a:rPr lang="nl-NL" sz="3600" dirty="0">
                 <a:solidFill>
                   <a:schemeClr val="bg1"/>
                 </a:solidFill>
@@ -2160,7 +2711,7 @@
               <a:t>Video</a:t>
             </a:r>
             <a:r>
-              <a:rPr lang="nl-NL" sz="3600" baseline="0" dirty="0" smtClean="0">
+              <a:rPr lang="nl-NL" sz="3600" baseline="0" dirty="0">
                 <a:solidFill>
                   <a:schemeClr val="bg1"/>
                 </a:solidFill>
@@ -2175,9 +2726,9 @@
                 <a:ea typeface="+mj-ea"/>
                 <a:cs typeface="Tahoma" pitchFamily="34" charset="0"/>
               </a:rPr>
-              <a:t> in het Noorderlicht</a:t>
-            </a:r>
-            <a:endParaRPr lang="nl-NL" sz="3600" dirty="0" smtClean="0">
+              <a:t> mededeling</a:t>
+            </a:r>
+            <a:endParaRPr lang="nl-NL" sz="3600" dirty="0">
               <a:solidFill>
                 <a:schemeClr val="bg1"/>
               </a:solidFill>
@@ -2229,7 +2780,7 @@
               </a:spcAft>
             </a:pPr>
             <a:r>
-              <a:rPr lang="nl-NL" sz="2400" dirty="0" smtClean="0">
+              <a:rPr lang="nl-NL" sz="2400" dirty="0">
                 <a:solidFill>
                   <a:schemeClr val="bg1"/>
                 </a:solidFill>
@@ -2254,7 +2805,7 @@
               </a:spcAft>
             </a:pPr>
             <a:r>
-              <a:rPr lang="nl-NL" sz="2400" dirty="0" smtClean="0">
+              <a:rPr lang="nl-NL" sz="2400" dirty="0">
                 <a:solidFill>
                   <a:schemeClr val="bg1"/>
                 </a:solidFill>
@@ -2272,7 +2823,7 @@
               <a:t>via een livestream</a:t>
             </a:r>
             <a:r>
-              <a:rPr lang="nl-NL" sz="2400" baseline="0" dirty="0" smtClean="0">
+              <a:rPr lang="nl-NL" sz="2400" baseline="0" dirty="0">
                 <a:solidFill>
                   <a:schemeClr val="bg1"/>
                 </a:solidFill>
@@ -2297,7 +2848,7 @@
               </a:spcAft>
             </a:pPr>
             <a:r>
-              <a:rPr lang="nl-NL" sz="2400" baseline="0" dirty="0" smtClean="0">
+              <a:rPr lang="nl-NL" sz="2400" baseline="0" dirty="0">
                 <a:solidFill>
                   <a:schemeClr val="bg1"/>
                 </a:solidFill>
@@ -2322,7 +2873,7 @@
               </a:spcAft>
             </a:pPr>
             <a:r>
-              <a:rPr lang="nl-NL" sz="2400" baseline="0" dirty="0" smtClean="0">
+              <a:rPr lang="nl-NL" sz="2400" baseline="0" dirty="0">
                 <a:solidFill>
                   <a:schemeClr val="bg1"/>
                 </a:solidFill>
@@ -2347,7 +2898,7 @@
               </a:spcAft>
             </a:pPr>
             <a:r>
-              <a:rPr lang="nl-NL" sz="2400" baseline="0" dirty="0" smtClean="0">
+              <a:rPr lang="nl-NL" sz="2400" baseline="0" dirty="0">
                 <a:solidFill>
                   <a:schemeClr val="bg1"/>
                 </a:solidFill>
@@ -2401,7 +2952,7 @@
               </a:spcAft>
             </a:pPr>
             <a:r>
-              <a:rPr lang="nl-NL" sz="2000" dirty="0" smtClean="0">
+              <a:rPr lang="nl-NL" sz="2000" dirty="0">
                 <a:solidFill>
                   <a:schemeClr val="bg1"/>
                 </a:solidFill>
@@ -2419,7 +2970,7 @@
               <a:t>Meer informatie</a:t>
             </a:r>
             <a:r>
-              <a:rPr lang="nl-NL" sz="2000" baseline="0" dirty="0" smtClean="0">
+              <a:rPr lang="nl-NL" sz="2000" baseline="0" dirty="0">
                 <a:solidFill>
                   <a:schemeClr val="bg1"/>
                 </a:solidFill>
@@ -2444,7 +2995,7 @@
               </a:spcAft>
             </a:pPr>
             <a:r>
-              <a:rPr lang="nl-NL" sz="2000" baseline="0" dirty="0" smtClean="0">
+              <a:rPr lang="nl-NL" sz="2000" baseline="0" dirty="0">
                 <a:solidFill>
                   <a:schemeClr val="bg1"/>
                 </a:solidFill>
@@ -2461,7 +3012,7 @@
               </a:rPr>
               <a:t>achter de desk.</a:t>
             </a:r>
-            <a:endParaRPr lang="nl-NL" sz="2000" dirty="0" smtClean="0">
+            <a:endParaRPr lang="nl-NL" sz="2000" dirty="0">
               <a:solidFill>
                 <a:schemeClr val="bg1"/>
               </a:solidFill>
@@ -2513,7 +3064,7 @@
               </a:spcAft>
             </a:pPr>
             <a:r>
-              <a:rPr lang="nl-NL" sz="2400" dirty="0" smtClean="0">
+              <a:rPr lang="nl-NL" sz="2400" dirty="0">
                 <a:solidFill>
                   <a:schemeClr val="bg1"/>
                 </a:solidFill>
@@ -2538,7 +3089,7 @@
               </a:spcAft>
             </a:pPr>
             <a:r>
-              <a:rPr lang="nl-NL" sz="2400" dirty="0" smtClean="0">
+              <a:rPr lang="nl-NL" sz="2400" dirty="0">
                 <a:solidFill>
                   <a:schemeClr val="bg1"/>
                 </a:solidFill>
@@ -2563,7 +3114,7 @@
               </a:spcAft>
             </a:pPr>
             <a:r>
-              <a:rPr lang="nl-NL" sz="2400" dirty="0" smtClean="0">
+              <a:rPr lang="nl-NL" sz="2400" dirty="0">
                 <a:solidFill>
                   <a:schemeClr val="bg1"/>
                 </a:solidFill>
@@ -2587,7 +3138,7 @@
                 <a:spcPts val="0"/>
               </a:spcAft>
             </a:pPr>
-            <a:endParaRPr lang="nl-NL" sz="2400" dirty="0" smtClean="0">
+            <a:endParaRPr lang="nl-NL" sz="2400" dirty="0">
               <a:solidFill>
                 <a:schemeClr val="bg1"/>
               </a:solidFill>
@@ -2610,7 +3161,7 @@
               </a:spcAft>
             </a:pPr>
             <a:r>
-              <a:rPr lang="nl-NL" sz="2400" dirty="0" smtClean="0">
+              <a:rPr lang="nl-NL" sz="2400" dirty="0">
                 <a:solidFill>
                   <a:schemeClr val="bg1"/>
                 </a:solidFill>
@@ -2635,7 +3186,7 @@
               </a:spcAft>
             </a:pPr>
             <a:r>
-              <a:rPr lang="nl-NL" sz="2400" kern="1200" dirty="0" err="1" smtClean="0">
+              <a:rPr lang="nl-NL" sz="2400" kern="1200" dirty="0" err="1">
                 <a:solidFill>
                   <a:schemeClr val="bg1"/>
                 </a:solidFill>
@@ -2652,7 +3203,7 @@
               </a:rPr>
               <a:t>www.gkvassenpeelo.nl</a:t>
             </a:r>
-            <a:endParaRPr lang="nl-NL" sz="2400" kern="1200" dirty="0" smtClean="0">
+            <a:endParaRPr lang="nl-NL" sz="2400" kern="1200" dirty="0">
               <a:solidFill>
                 <a:schemeClr val="bg1"/>
               </a:solidFill>
@@ -2687,7 +3238,7 @@
               <a:defRPr/>
             </a:pPr>
             <a:r>
-              <a:rPr lang="nl-NL" sz="2400" kern="1200" dirty="0" smtClean="0">
+              <a:rPr lang="nl-NL" sz="2400" kern="1200" dirty="0">
                 <a:solidFill>
                   <a:schemeClr val="bg1"/>
                 </a:solidFill>
@@ -2710,7 +3261,7 @@
     </p:spTree>
     <p:extLst>
       <p:ext uri="{BB962C8B-B14F-4D97-AF65-F5344CB8AC3E}">
-        <p14:creationId xmlns:p14="http://schemas.microsoft.com/office/powerpoint/2010/main" xmlns="" val="4036904755"/>
+        <p14:creationId xmlns:p14="http://schemas.microsoft.com/office/powerpoint/2010/main" val="4036904755"/>
       </p:ext>
     </p:extLst>
   </p:cSld>
@@ -2771,7 +3322,7 @@
               <a:defRPr/>
             </a:pPr>
             <a:r>
-              <a:rPr lang="en-US" sz="3200" dirty="0" err="1" smtClean="0">
+              <a:rPr lang="en-US" sz="3200" dirty="0" err="1">
                 <a:solidFill>
                   <a:schemeClr val="tx1">
                     <a:lumMod val="95000"/>
@@ -2815,7 +3366,7 @@
     </p:spTree>
     <p:extLst>
       <p:ext uri="{BB962C8B-B14F-4D97-AF65-F5344CB8AC3E}">
-        <p14:creationId xmlns:p14="http://schemas.microsoft.com/office/powerpoint/2010/main" xmlns="" val="2244282078"/>
+        <p14:creationId xmlns:p14="http://schemas.microsoft.com/office/powerpoint/2010/main" val="2244282078"/>
       </p:ext>
     </p:extLst>
   </p:cSld>
@@ -2877,45 +3428,44 @@
           <a:p>
             <a:pPr lvl="0"/>
             <a:r>
-              <a:rPr lang="nl-NL" dirty="0" smtClean="0"/>
+              <a:rPr lang="nl-NL" dirty="0"/>
               <a:t>Klik om de modelstijlen te bewerken</a:t>
             </a:r>
           </a:p>
           <a:p>
             <a:pPr lvl="1"/>
             <a:r>
-              <a:rPr lang="nl-NL" dirty="0" smtClean="0"/>
+              <a:rPr lang="nl-NL" dirty="0"/>
               <a:t>Tweede niveau</a:t>
             </a:r>
           </a:p>
           <a:p>
             <a:pPr lvl="2"/>
             <a:r>
-              <a:rPr lang="nl-NL" dirty="0" smtClean="0"/>
+              <a:rPr lang="nl-NL" dirty="0"/>
               <a:t>Derde niveau</a:t>
             </a:r>
           </a:p>
           <a:p>
             <a:pPr lvl="3"/>
             <a:r>
-              <a:rPr lang="nl-NL" dirty="0" smtClean="0"/>
+              <a:rPr lang="nl-NL" dirty="0"/>
               <a:t>Vierde niveau</a:t>
             </a:r>
           </a:p>
           <a:p>
             <a:pPr lvl="4"/>
             <a:r>
-              <a:rPr lang="nl-NL" dirty="0" smtClean="0"/>
+              <a:rPr lang="nl-NL" dirty="0"/>
               <a:t>Vijfde niveau</a:t>
             </a:r>
-            <a:endParaRPr lang="nl-NL" dirty="0"/>
           </a:p>
         </p:txBody>
       </p:sp>
     </p:spTree>
     <p:extLst>
       <p:ext uri="{BB962C8B-B14F-4D97-AF65-F5344CB8AC3E}">
-        <p14:creationId xmlns:p14="http://schemas.microsoft.com/office/powerpoint/2010/main" xmlns="" val="407480130"/>
+        <p14:creationId xmlns:p14="http://schemas.microsoft.com/office/powerpoint/2010/main" val="407480130"/>
       </p:ext>
     </p:extLst>
   </p:cSld>
@@ -2943,70 +3493,6 @@
           <a:chExt cx="0" cy="0"/>
         </a:xfrm>
       </p:grpSpPr>
-      <p:pic>
-        <p:nvPicPr>
-          <p:cNvPr id="2" name="Picture 2"/>
-          <p:cNvPicPr>
-            <a:picLocks noChangeAspect="1" noChangeArrowheads="1"/>
-          </p:cNvPicPr>
-          <p:nvPr/>
-        </p:nvPicPr>
-        <p:blipFill>
-          <a:blip r:embed="rId2" cstate="print"/>
-          <a:srcRect b="45238"/>
-          <a:stretch>
-            <a:fillRect/>
-          </a:stretch>
-        </p:blipFill>
-        <p:spPr bwMode="auto">
-          <a:xfrm>
-            <a:off x="179388" y="1700213"/>
-            <a:ext cx="8785225" cy="2582862"/>
-          </a:xfrm>
-          <a:prstGeom prst="rect">
-            <a:avLst/>
-          </a:prstGeom>
-          <a:noFill/>
-          <a:ln w="9525">
-            <a:noFill/>
-            <a:miter lim="800000"/>
-            <a:headEnd/>
-            <a:tailEnd/>
-          </a:ln>
-        </p:spPr>
-      </p:pic>
-      <p:pic>
-        <p:nvPicPr>
-          <p:cNvPr id="3" name="Picture 3"/>
-          <p:cNvPicPr>
-            <a:picLocks noChangeAspect="1" noChangeArrowheads="1"/>
-          </p:cNvPicPr>
-          <p:nvPr/>
-        </p:nvPicPr>
-        <p:blipFill>
-          <a:blip r:embed="rId2" cstate="print"/>
-          <a:srcRect l="77359" t="29018" r="943" b="45238"/>
-          <a:stretch>
-            <a:fillRect/>
-          </a:stretch>
-        </p:blipFill>
-        <p:spPr bwMode="auto">
-          <a:xfrm>
-            <a:off x="3492500" y="4437063"/>
-            <a:ext cx="2244725" cy="1647825"/>
-          </a:xfrm>
-          <a:prstGeom prst="rect">
-            <a:avLst/>
-          </a:prstGeom>
-          <a:noFill/>
-          <a:ln w="9525">
-            <a:noFill/>
-            <a:miter lim="800000"/>
-            <a:headEnd/>
-            <a:tailEnd/>
-          </a:ln>
-        </p:spPr>
-      </p:pic>
       <p:sp>
         <p:nvSpPr>
           <p:cNvPr id="4" name="Rechthoek 8"/>
@@ -3055,6 +3541,767 @@
           </a:p>
         </p:txBody>
       </p:sp>
+      <p:sp>
+        <p:nvSpPr>
+          <p:cNvPr id="11" name="Rechthoek 8">
+            <a:extLst>
+              <a:ext uri="{FF2B5EF4-FFF2-40B4-BE49-F238E27FC236}">
+                <a16:creationId xmlns:a16="http://schemas.microsoft.com/office/drawing/2014/main" id="{1BD57376-F477-5E4A-807A-3DBA721CD421}"/>
+              </a:ext>
+            </a:extLst>
+          </p:cNvPr>
+          <p:cNvSpPr/>
+          <p:nvPr userDrawn="1"/>
+        </p:nvSpPr>
+        <p:spPr>
+          <a:xfrm>
+            <a:off x="6732588" y="2924175"/>
+            <a:ext cx="2232025" cy="1296988"/>
+          </a:xfrm>
+          <a:prstGeom prst="rect">
+            <a:avLst/>
+          </a:prstGeom>
+          <a:solidFill>
+            <a:srgbClr val="000000"/>
+          </a:solidFill>
+          <a:ln>
+            <a:noFill/>
+          </a:ln>
+        </p:spPr>
+        <p:style>
+          <a:lnRef idx="2">
+            <a:schemeClr val="accent1">
+              <a:shade val="50000"/>
+            </a:schemeClr>
+          </a:lnRef>
+          <a:fillRef idx="1">
+            <a:schemeClr val="accent1"/>
+          </a:fillRef>
+          <a:effectRef idx="0">
+            <a:schemeClr val="accent1"/>
+          </a:effectRef>
+          <a:fontRef idx="minor">
+            <a:schemeClr val="lt1"/>
+          </a:fontRef>
+        </p:style>
+        <p:txBody>
+          <a:bodyPr anchor="ctr"/>
+          <a:lstStyle/>
+          <a:p>
+            <a:pPr algn="ctr" eaLnBrk="1" hangingPunct="1">
+              <a:defRPr/>
+            </a:pPr>
+            <a:endParaRPr lang="nl-NL"/>
+          </a:p>
+        </p:txBody>
+      </p:sp>
+      <p:grpSp>
+        <p:nvGrpSpPr>
+          <p:cNvPr id="12" name="Group 30">
+            <a:extLst>
+              <a:ext uri="{FF2B5EF4-FFF2-40B4-BE49-F238E27FC236}">
+                <a16:creationId xmlns:a16="http://schemas.microsoft.com/office/drawing/2014/main" id="{45970A84-4F6B-5C4C-AF1F-C670EE610F85}"/>
+              </a:ext>
+            </a:extLst>
+          </p:cNvPr>
+          <p:cNvGrpSpPr>
+            <a:grpSpLocks/>
+          </p:cNvGrpSpPr>
+          <p:nvPr userDrawn="1"/>
+        </p:nvGrpSpPr>
+        <p:grpSpPr bwMode="auto">
+          <a:xfrm>
+            <a:off x="36513" y="649288"/>
+            <a:ext cx="7848600" cy="2779712"/>
+            <a:chOff x="22" y="890"/>
+            <a:chExt cx="4944" cy="1751"/>
+          </a:xfrm>
+        </p:grpSpPr>
+        <p:sp>
+          <p:nvSpPr>
+            <p:cNvPr id="14" name="Text Box 26">
+              <a:extLst>
+                <a:ext uri="{FF2B5EF4-FFF2-40B4-BE49-F238E27FC236}">
+                  <a16:creationId xmlns:a16="http://schemas.microsoft.com/office/drawing/2014/main" id="{203D5507-8EFF-2C44-894C-20EEB8CE467E}"/>
+                </a:ext>
+              </a:extLst>
+            </p:cNvPr>
+            <p:cNvSpPr txBox="1">
+              <a:spLocks noChangeArrowheads="1"/>
+            </p:cNvSpPr>
+            <p:nvPr/>
+          </p:nvSpPr>
+          <p:spPr bwMode="auto">
+            <a:xfrm>
+              <a:off x="22" y="2381"/>
+              <a:ext cx="4944" cy="260"/>
+            </a:xfrm>
+            <a:prstGeom prst="rect">
+              <a:avLst/>
+            </a:prstGeom>
+            <a:noFill/>
+            <a:ln>
+              <a:noFill/>
+            </a:ln>
+          </p:spPr>
+          <p:txBody>
+            <a:bodyPr>
+              <a:spAutoFit/>
+            </a:bodyPr>
+            <a:lstStyle>
+              <a:lvl1pPr>
+                <a:defRPr sz="2600">
+                  <a:solidFill>
+                    <a:schemeClr val="bg1"/>
+                  </a:solidFill>
+                  <a:latin typeface="Arial" panose="020B0604020202020204" pitchFamily="34" charset="0"/>
+                </a:defRPr>
+              </a:lvl1pPr>
+              <a:lvl2pPr marL="742950" indent="-285750">
+                <a:spcBef>
+                  <a:spcPct val="20000"/>
+                </a:spcBef>
+                <a:defRPr sz="2600">
+                  <a:solidFill>
+                    <a:schemeClr val="bg1"/>
+                  </a:solidFill>
+                  <a:latin typeface="Arial" panose="020B0604020202020204" pitchFamily="34" charset="0"/>
+                </a:defRPr>
+              </a:lvl2pPr>
+              <a:lvl3pPr marL="1143000" indent="-228600">
+                <a:spcBef>
+                  <a:spcPct val="20000"/>
+                </a:spcBef>
+                <a:defRPr sz="2600">
+                  <a:solidFill>
+                    <a:schemeClr val="bg1"/>
+                  </a:solidFill>
+                  <a:latin typeface="Arial" panose="020B0604020202020204" pitchFamily="34" charset="0"/>
+                </a:defRPr>
+              </a:lvl3pPr>
+              <a:lvl4pPr marL="1600200" indent="-228600">
+                <a:spcBef>
+                  <a:spcPct val="20000"/>
+                </a:spcBef>
+                <a:defRPr sz="2600">
+                  <a:solidFill>
+                    <a:schemeClr val="bg1"/>
+                  </a:solidFill>
+                  <a:latin typeface="Arial" panose="020B0604020202020204" pitchFamily="34" charset="0"/>
+                </a:defRPr>
+              </a:lvl4pPr>
+              <a:lvl5pPr marL="2057400" indent="-228600">
+                <a:spcBef>
+                  <a:spcPct val="20000"/>
+                </a:spcBef>
+                <a:defRPr sz="2600">
+                  <a:solidFill>
+                    <a:schemeClr val="bg1"/>
+                  </a:solidFill>
+                  <a:latin typeface="Arial" panose="020B0604020202020204" pitchFamily="34" charset="0"/>
+                </a:defRPr>
+              </a:lvl5pPr>
+              <a:lvl6pPr marL="2514600" indent="-228600" eaLnBrk="0" fontAlgn="base" hangingPunct="0">
+                <a:spcBef>
+                  <a:spcPct val="20000"/>
+                </a:spcBef>
+                <a:spcAft>
+                  <a:spcPct val="0"/>
+                </a:spcAft>
+                <a:defRPr sz="2600">
+                  <a:solidFill>
+                    <a:schemeClr val="bg1"/>
+                  </a:solidFill>
+                  <a:latin typeface="Arial" panose="020B0604020202020204" pitchFamily="34" charset="0"/>
+                </a:defRPr>
+              </a:lvl6pPr>
+              <a:lvl7pPr marL="2971800" indent="-228600" eaLnBrk="0" fontAlgn="base" hangingPunct="0">
+                <a:spcBef>
+                  <a:spcPct val="20000"/>
+                </a:spcBef>
+                <a:spcAft>
+                  <a:spcPct val="0"/>
+                </a:spcAft>
+                <a:defRPr sz="2600">
+                  <a:solidFill>
+                    <a:schemeClr val="bg1"/>
+                  </a:solidFill>
+                  <a:latin typeface="Arial" panose="020B0604020202020204" pitchFamily="34" charset="0"/>
+                </a:defRPr>
+              </a:lvl7pPr>
+              <a:lvl8pPr marL="3429000" indent="-228600" eaLnBrk="0" fontAlgn="base" hangingPunct="0">
+                <a:spcBef>
+                  <a:spcPct val="20000"/>
+                </a:spcBef>
+                <a:spcAft>
+                  <a:spcPct val="0"/>
+                </a:spcAft>
+                <a:defRPr sz="2600">
+                  <a:solidFill>
+                    <a:schemeClr val="bg1"/>
+                  </a:solidFill>
+                  <a:latin typeface="Arial" panose="020B0604020202020204" pitchFamily="34" charset="0"/>
+                </a:defRPr>
+              </a:lvl8pPr>
+              <a:lvl9pPr marL="3886200" indent="-228600" eaLnBrk="0" fontAlgn="base" hangingPunct="0">
+                <a:spcBef>
+                  <a:spcPct val="20000"/>
+                </a:spcBef>
+                <a:spcAft>
+                  <a:spcPct val="0"/>
+                </a:spcAft>
+                <a:defRPr sz="2600">
+                  <a:solidFill>
+                    <a:schemeClr val="bg1"/>
+                  </a:solidFill>
+                  <a:latin typeface="Arial" panose="020B0604020202020204" pitchFamily="34" charset="0"/>
+                </a:defRPr>
+              </a:lvl9pPr>
+            </a:lstStyle>
+            <a:p>
+              <a:pPr eaLnBrk="1" hangingPunct="1">
+                <a:spcBef>
+                  <a:spcPct val="50000"/>
+                </a:spcBef>
+                <a:defRPr/>
+              </a:pPr>
+              <a:r>
+                <a:rPr lang="nl-NL" altLang="en-US" sz="2000" dirty="0"/>
+                <a:t>	  d</a:t>
+              </a:r>
+              <a:r>
+                <a:rPr lang="nl-NL" altLang="en-US" sz="2100" dirty="0"/>
+                <a:t>ie hemel en aarde gemaakt heeft. Amen.</a:t>
+              </a:r>
+              <a:endParaRPr lang="nl-NL" altLang="en-US" sz="1700" dirty="0"/>
+            </a:p>
+          </p:txBody>
+        </p:sp>
+        <p:graphicFrame>
+          <p:nvGraphicFramePr>
+            <p:cNvPr id="15" name="Object 27">
+              <a:extLst>
+                <a:ext uri="{FF2B5EF4-FFF2-40B4-BE49-F238E27FC236}">
+                  <a16:creationId xmlns:a16="http://schemas.microsoft.com/office/drawing/2014/main" id="{8314C9A3-ADA2-1843-BA27-0F146E77D091}"/>
+                </a:ext>
+              </a:extLst>
+            </p:cNvPr>
+            <p:cNvGraphicFramePr>
+              <a:graphicFrameLocks noChangeAspect="1"/>
+            </p:cNvGraphicFramePr>
+            <p:nvPr/>
+          </p:nvGraphicFramePr>
+          <p:xfrm>
+            <a:off x="144" y="1815"/>
+            <a:ext cx="3961" cy="624"/>
+          </p:xfrm>
+          <a:graphic>
+            <a:graphicData uri="http://schemas.openxmlformats.org/presentationml/2006/ole">
+              <mc:AlternateContent xmlns:mc="http://schemas.openxmlformats.org/markup-compatibility/2006">
+                <mc:Choice xmlns:v="urn:schemas-microsoft-com:vml" Requires="v">
+                  <p:oleObj spid="_x0000_s2063" name="Bitmapafbeelding" r:id="rId3" imgW="4419600" imgH="660400" progId="Paint.Picture">
+                    <p:embed/>
+                  </p:oleObj>
+                </mc:Choice>
+                <mc:Fallback>
+                  <p:oleObj name="Bitmapafbeelding" r:id="rId3" imgW="4419600" imgH="660400" progId="Paint.Picture">
+                    <p:embed/>
+                    <p:pic>
+                      <p:nvPicPr>
+                        <p:cNvPr id="6" name="Object 27">
+                          <a:extLst>
+                            <a:ext uri="{FF2B5EF4-FFF2-40B4-BE49-F238E27FC236}">
+                              <a16:creationId xmlns:a16="http://schemas.microsoft.com/office/drawing/2014/main" id="{12F4A970-FC1C-E641-85D3-B465A33A50AB}"/>
+                            </a:ext>
+                          </a:extLst>
+                        </p:cNvPr>
+                        <p:cNvPicPr>
+                          <a:picLocks noChangeAspect="1" noChangeArrowheads="1"/>
+                        </p:cNvPicPr>
+                        <p:nvPr/>
+                      </p:nvPicPr>
+                      <p:blipFill>
+                        <a:blip r:embed="rId4">
+                          <a:extLst>
+                            <a:ext uri="{28A0092B-C50C-407E-A947-70E740481C1C}">
+                              <a14:useLocalDpi xmlns:a14="http://schemas.microsoft.com/office/drawing/2010/main" val="0"/>
+                            </a:ext>
+                          </a:extLst>
+                        </a:blip>
+                        <a:srcRect r="5125"/>
+                        <a:stretch>
+                          <a:fillRect/>
+                        </a:stretch>
+                      </p:blipFill>
+                      <p:spPr bwMode="auto">
+                        <a:xfrm>
+                          <a:off x="144" y="1815"/>
+                          <a:ext cx="3961" cy="624"/>
+                        </a:xfrm>
+                        <a:prstGeom prst="rect">
+                          <a:avLst/>
+                        </a:prstGeom>
+                        <a:noFill/>
+                        <a:ln>
+                          <a:noFill/>
+                        </a:ln>
+                        <a:effectLst/>
+                        <a:extLst>
+                          <a:ext uri="{909E8E84-426E-40DD-AFC4-6F175D3DCCD1}">
+                            <a14:hiddenFill xmlns:a14="http://schemas.microsoft.com/office/drawing/2010/main">
+                              <a:solidFill>
+                                <a:schemeClr val="accent1"/>
+                              </a:solidFill>
+                            </a14:hiddenFill>
+                          </a:ext>
+                          <a:ext uri="{91240B29-F687-4F45-9708-019B960494DF}">
+                            <a14:hiddenLine xmlns:a14="http://schemas.microsoft.com/office/drawing/2010/main" w="9525">
+                              <a:solidFill>
+                                <a:schemeClr val="tx1"/>
+                              </a:solidFill>
+                              <a:miter lim="800000"/>
+                              <a:headEnd/>
+                              <a:tailEnd/>
+                            </a14:hiddenLine>
+                          </a:ext>
+                          <a:ext uri="{AF507438-7753-43E0-B8FC-AC1667EBCBE1}">
+                            <a14:hiddenEffects xmlns:a14="http://schemas.microsoft.com/office/drawing/2010/main">
+                              <a:effectLst>
+                                <a:outerShdw dist="35921" dir="2700000" algn="ctr" rotWithShape="0">
+                                  <a:schemeClr val="bg2"/>
+                                </a:outerShdw>
+                              </a:effectLst>
+                            </a14:hiddenEffects>
+                          </a:ext>
+                        </a:extLst>
+                      </p:spPr>
+                    </p:pic>
+                  </p:oleObj>
+                </mc:Fallback>
+              </mc:AlternateContent>
+            </a:graphicData>
+          </a:graphic>
+        </p:graphicFrame>
+        <p:sp>
+          <p:nvSpPr>
+            <p:cNvPr id="16" name="Text Box 28">
+              <a:extLst>
+                <a:ext uri="{FF2B5EF4-FFF2-40B4-BE49-F238E27FC236}">
+                  <a16:creationId xmlns:a16="http://schemas.microsoft.com/office/drawing/2014/main" id="{4EA7E48F-0423-4745-BAC0-DEEDAF92427B}"/>
+                </a:ext>
+              </a:extLst>
+            </p:cNvPr>
+            <p:cNvSpPr txBox="1">
+              <a:spLocks noChangeArrowheads="1"/>
+            </p:cNvSpPr>
+            <p:nvPr/>
+          </p:nvSpPr>
+          <p:spPr bwMode="auto">
+            <a:xfrm>
+              <a:off x="3292" y="1725"/>
+              <a:ext cx="949" cy="212"/>
+            </a:xfrm>
+            <a:prstGeom prst="rect">
+              <a:avLst/>
+            </a:prstGeom>
+            <a:noFill/>
+            <a:ln>
+              <a:noFill/>
+            </a:ln>
+          </p:spPr>
+          <p:txBody>
+            <a:bodyPr>
+              <a:spAutoFit/>
+            </a:bodyPr>
+            <a:lstStyle>
+              <a:lvl1pPr>
+                <a:defRPr sz="2600">
+                  <a:solidFill>
+                    <a:schemeClr val="bg1"/>
+                  </a:solidFill>
+                  <a:latin typeface="Arial" panose="020B0604020202020204" pitchFamily="34" charset="0"/>
+                </a:defRPr>
+              </a:lvl1pPr>
+              <a:lvl2pPr marL="742950" indent="-285750">
+                <a:spcBef>
+                  <a:spcPct val="20000"/>
+                </a:spcBef>
+                <a:defRPr sz="2600">
+                  <a:solidFill>
+                    <a:schemeClr val="bg1"/>
+                  </a:solidFill>
+                  <a:latin typeface="Arial" panose="020B0604020202020204" pitchFamily="34" charset="0"/>
+                </a:defRPr>
+              </a:lvl2pPr>
+              <a:lvl3pPr marL="1143000" indent="-228600">
+                <a:spcBef>
+                  <a:spcPct val="20000"/>
+                </a:spcBef>
+                <a:defRPr sz="2600">
+                  <a:solidFill>
+                    <a:schemeClr val="bg1"/>
+                  </a:solidFill>
+                  <a:latin typeface="Arial" panose="020B0604020202020204" pitchFamily="34" charset="0"/>
+                </a:defRPr>
+              </a:lvl3pPr>
+              <a:lvl4pPr marL="1600200" indent="-228600">
+                <a:spcBef>
+                  <a:spcPct val="20000"/>
+                </a:spcBef>
+                <a:defRPr sz="2600">
+                  <a:solidFill>
+                    <a:schemeClr val="bg1"/>
+                  </a:solidFill>
+                  <a:latin typeface="Arial" panose="020B0604020202020204" pitchFamily="34" charset="0"/>
+                </a:defRPr>
+              </a:lvl4pPr>
+              <a:lvl5pPr marL="2057400" indent="-228600">
+                <a:spcBef>
+                  <a:spcPct val="20000"/>
+                </a:spcBef>
+                <a:defRPr sz="2600">
+                  <a:solidFill>
+                    <a:schemeClr val="bg1"/>
+                  </a:solidFill>
+                  <a:latin typeface="Arial" panose="020B0604020202020204" pitchFamily="34" charset="0"/>
+                </a:defRPr>
+              </a:lvl5pPr>
+              <a:lvl6pPr marL="2514600" indent="-228600" eaLnBrk="0" fontAlgn="base" hangingPunct="0">
+                <a:spcBef>
+                  <a:spcPct val="20000"/>
+                </a:spcBef>
+                <a:spcAft>
+                  <a:spcPct val="0"/>
+                </a:spcAft>
+                <a:defRPr sz="2600">
+                  <a:solidFill>
+                    <a:schemeClr val="bg1"/>
+                  </a:solidFill>
+                  <a:latin typeface="Arial" panose="020B0604020202020204" pitchFamily="34" charset="0"/>
+                </a:defRPr>
+              </a:lvl6pPr>
+              <a:lvl7pPr marL="2971800" indent="-228600" eaLnBrk="0" fontAlgn="base" hangingPunct="0">
+                <a:spcBef>
+                  <a:spcPct val="20000"/>
+                </a:spcBef>
+                <a:spcAft>
+                  <a:spcPct val="0"/>
+                </a:spcAft>
+                <a:defRPr sz="2600">
+                  <a:solidFill>
+                    <a:schemeClr val="bg1"/>
+                  </a:solidFill>
+                  <a:latin typeface="Arial" panose="020B0604020202020204" pitchFamily="34" charset="0"/>
+                </a:defRPr>
+              </a:lvl7pPr>
+              <a:lvl8pPr marL="3429000" indent="-228600" eaLnBrk="0" fontAlgn="base" hangingPunct="0">
+                <a:spcBef>
+                  <a:spcPct val="20000"/>
+                </a:spcBef>
+                <a:spcAft>
+                  <a:spcPct val="0"/>
+                </a:spcAft>
+                <a:defRPr sz="2600">
+                  <a:solidFill>
+                    <a:schemeClr val="bg1"/>
+                  </a:solidFill>
+                  <a:latin typeface="Arial" panose="020B0604020202020204" pitchFamily="34" charset="0"/>
+                </a:defRPr>
+              </a:lvl8pPr>
+              <a:lvl9pPr marL="3886200" indent="-228600" eaLnBrk="0" fontAlgn="base" hangingPunct="0">
+                <a:spcBef>
+                  <a:spcPct val="20000"/>
+                </a:spcBef>
+                <a:spcAft>
+                  <a:spcPct val="0"/>
+                </a:spcAft>
+                <a:defRPr sz="2600">
+                  <a:solidFill>
+                    <a:schemeClr val="bg1"/>
+                  </a:solidFill>
+                  <a:latin typeface="Arial" panose="020B0604020202020204" pitchFamily="34" charset="0"/>
+                </a:defRPr>
+              </a:lvl9pPr>
+            </a:lstStyle>
+            <a:p>
+              <a:pPr eaLnBrk="1" hangingPunct="1">
+                <a:spcBef>
+                  <a:spcPct val="50000"/>
+                </a:spcBef>
+                <a:defRPr/>
+              </a:pPr>
+              <a:r>
+                <a:rPr lang="nl-NL" altLang="en-US" sz="1600" i="1"/>
+                <a:t>Na de groet:</a:t>
+              </a:r>
+            </a:p>
+          </p:txBody>
+        </p:sp>
+        <p:graphicFrame>
+          <p:nvGraphicFramePr>
+            <p:cNvPr id="17" name="Object 29">
+              <a:extLst>
+                <a:ext uri="{FF2B5EF4-FFF2-40B4-BE49-F238E27FC236}">
+                  <a16:creationId xmlns:a16="http://schemas.microsoft.com/office/drawing/2014/main" id="{86E625B7-D1FB-8945-AA02-304A206163C2}"/>
+                </a:ext>
+              </a:extLst>
+            </p:cNvPr>
+            <p:cNvGraphicFramePr>
+              <a:graphicFrameLocks noChangeAspect="1"/>
+            </p:cNvGraphicFramePr>
+            <p:nvPr/>
+          </p:nvGraphicFramePr>
+          <p:xfrm>
+            <a:off x="158" y="890"/>
+            <a:ext cx="3936" cy="592"/>
+          </p:xfrm>
+          <a:graphic>
+            <a:graphicData uri="http://schemas.openxmlformats.org/presentationml/2006/ole">
+              <mc:AlternateContent xmlns:mc="http://schemas.openxmlformats.org/markup-compatibility/2006">
+                <mc:Choice xmlns:v="urn:schemas-microsoft-com:vml" Requires="v">
+                  <p:oleObj spid="_x0000_s2064" name="Bitmapafbeelding" r:id="rId5" imgW="5010150" imgH="628650" progId="Paint.Picture">
+                    <p:embed/>
+                  </p:oleObj>
+                </mc:Choice>
+                <mc:Fallback>
+                  <p:oleObj name="Bitmapafbeelding" r:id="rId5" imgW="5010150" imgH="628650" progId="Paint.Picture">
+                    <p:embed/>
+                    <p:pic>
+                      <p:nvPicPr>
+                        <p:cNvPr id="8" name="Object 29">
+                          <a:extLst>
+                            <a:ext uri="{FF2B5EF4-FFF2-40B4-BE49-F238E27FC236}">
+                              <a16:creationId xmlns:a16="http://schemas.microsoft.com/office/drawing/2014/main" id="{04239782-2B13-5248-AA04-EF447A24AB82}"/>
+                            </a:ext>
+                          </a:extLst>
+                        </p:cNvPr>
+                        <p:cNvPicPr>
+                          <a:picLocks noChangeAspect="1" noChangeArrowheads="1"/>
+                        </p:cNvPicPr>
+                        <p:nvPr/>
+                      </p:nvPicPr>
+                      <p:blipFill>
+                        <a:blip r:embed="rId6">
+                          <a:extLst>
+                            <a:ext uri="{28A0092B-C50C-407E-A947-70E740481C1C}">
+                              <a14:useLocalDpi xmlns:a14="http://schemas.microsoft.com/office/drawing/2010/main" val="0"/>
+                            </a:ext>
+                          </a:extLst>
+                        </a:blip>
+                        <a:srcRect r="16667"/>
+                        <a:stretch>
+                          <a:fillRect/>
+                        </a:stretch>
+                      </p:blipFill>
+                      <p:spPr bwMode="auto">
+                        <a:xfrm>
+                          <a:off x="158" y="890"/>
+                          <a:ext cx="3936" cy="592"/>
+                        </a:xfrm>
+                        <a:prstGeom prst="rect">
+                          <a:avLst/>
+                        </a:prstGeom>
+                        <a:noFill/>
+                        <a:ln>
+                          <a:noFill/>
+                        </a:ln>
+                        <a:effectLst/>
+                        <a:extLst>
+                          <a:ext uri="{909E8E84-426E-40DD-AFC4-6F175D3DCCD1}">
+                            <a14:hiddenFill xmlns:a14="http://schemas.microsoft.com/office/drawing/2010/main">
+                              <a:solidFill>
+                                <a:schemeClr val="accent1"/>
+                              </a:solidFill>
+                            </a14:hiddenFill>
+                          </a:ext>
+                          <a:ext uri="{91240B29-F687-4F45-9708-019B960494DF}">
+                            <a14:hiddenLine xmlns:a14="http://schemas.microsoft.com/office/drawing/2010/main" w="9525">
+                              <a:solidFill>
+                                <a:schemeClr val="tx1"/>
+                              </a:solidFill>
+                              <a:miter lim="800000"/>
+                              <a:headEnd/>
+                              <a:tailEnd/>
+                            </a14:hiddenLine>
+                          </a:ext>
+                          <a:ext uri="{AF507438-7753-43E0-B8FC-AC1667EBCBE1}">
+                            <a14:hiddenEffects xmlns:a14="http://schemas.microsoft.com/office/drawing/2010/main">
+                              <a:effectLst>
+                                <a:outerShdw dist="35921" dir="2700000" algn="ctr" rotWithShape="0">
+                                  <a:schemeClr val="bg2"/>
+                                </a:outerShdw>
+                              </a:effectLst>
+                            </a14:hiddenEffects>
+                          </a:ext>
+                        </a:extLst>
+                      </p:spPr>
+                    </p:pic>
+                  </p:oleObj>
+                </mc:Fallback>
+              </mc:AlternateContent>
+            </a:graphicData>
+          </a:graphic>
+        </p:graphicFrame>
+        <p:sp>
+          <p:nvSpPr>
+            <p:cNvPr id="13" name="Text Box 25">
+              <a:extLst>
+                <a:ext uri="{FF2B5EF4-FFF2-40B4-BE49-F238E27FC236}">
+                  <a16:creationId xmlns:a16="http://schemas.microsoft.com/office/drawing/2014/main" id="{99D56CFF-7014-2648-971F-7F2C7A46797A}"/>
+                </a:ext>
+              </a:extLst>
+            </p:cNvPr>
+            <p:cNvSpPr txBox="1">
+              <a:spLocks noChangeArrowheads="1"/>
+            </p:cNvSpPr>
+            <p:nvPr/>
+          </p:nvSpPr>
+          <p:spPr bwMode="auto">
+            <a:xfrm>
+              <a:off x="22" y="1434"/>
+              <a:ext cx="4944" cy="260"/>
+            </a:xfrm>
+            <a:prstGeom prst="rect">
+              <a:avLst/>
+            </a:prstGeom>
+            <a:noFill/>
+            <a:ln>
+              <a:noFill/>
+            </a:ln>
+          </p:spPr>
+          <p:txBody>
+            <a:bodyPr>
+              <a:spAutoFit/>
+            </a:bodyPr>
+            <a:lstStyle>
+              <a:lvl1pPr>
+                <a:defRPr sz="2600">
+                  <a:solidFill>
+                    <a:schemeClr val="bg1"/>
+                  </a:solidFill>
+                  <a:latin typeface="Arial" panose="020B0604020202020204" pitchFamily="34" charset="0"/>
+                </a:defRPr>
+              </a:lvl1pPr>
+              <a:lvl2pPr marL="742950" indent="-285750">
+                <a:spcBef>
+                  <a:spcPct val="20000"/>
+                </a:spcBef>
+                <a:defRPr sz="2600">
+                  <a:solidFill>
+                    <a:schemeClr val="bg1"/>
+                  </a:solidFill>
+                  <a:latin typeface="Arial" panose="020B0604020202020204" pitchFamily="34" charset="0"/>
+                </a:defRPr>
+              </a:lvl2pPr>
+              <a:lvl3pPr marL="1143000" indent="-228600">
+                <a:spcBef>
+                  <a:spcPct val="20000"/>
+                </a:spcBef>
+                <a:defRPr sz="2600">
+                  <a:solidFill>
+                    <a:schemeClr val="bg1"/>
+                  </a:solidFill>
+                  <a:latin typeface="Arial" panose="020B0604020202020204" pitchFamily="34" charset="0"/>
+                </a:defRPr>
+              </a:lvl3pPr>
+              <a:lvl4pPr marL="1600200" indent="-228600">
+                <a:spcBef>
+                  <a:spcPct val="20000"/>
+                </a:spcBef>
+                <a:defRPr sz="2600">
+                  <a:solidFill>
+                    <a:schemeClr val="bg1"/>
+                  </a:solidFill>
+                  <a:latin typeface="Arial" panose="020B0604020202020204" pitchFamily="34" charset="0"/>
+                </a:defRPr>
+              </a:lvl4pPr>
+              <a:lvl5pPr marL="2057400" indent="-228600">
+                <a:spcBef>
+                  <a:spcPct val="20000"/>
+                </a:spcBef>
+                <a:defRPr sz="2600">
+                  <a:solidFill>
+                    <a:schemeClr val="bg1"/>
+                  </a:solidFill>
+                  <a:latin typeface="Arial" panose="020B0604020202020204" pitchFamily="34" charset="0"/>
+                </a:defRPr>
+              </a:lvl5pPr>
+              <a:lvl6pPr marL="2514600" indent="-228600" eaLnBrk="0" fontAlgn="base" hangingPunct="0">
+                <a:spcBef>
+                  <a:spcPct val="20000"/>
+                </a:spcBef>
+                <a:spcAft>
+                  <a:spcPct val="0"/>
+                </a:spcAft>
+                <a:defRPr sz="2600">
+                  <a:solidFill>
+                    <a:schemeClr val="bg1"/>
+                  </a:solidFill>
+                  <a:latin typeface="Arial" panose="020B0604020202020204" pitchFamily="34" charset="0"/>
+                </a:defRPr>
+              </a:lvl6pPr>
+              <a:lvl7pPr marL="2971800" indent="-228600" eaLnBrk="0" fontAlgn="base" hangingPunct="0">
+                <a:spcBef>
+                  <a:spcPct val="20000"/>
+                </a:spcBef>
+                <a:spcAft>
+                  <a:spcPct val="0"/>
+                </a:spcAft>
+                <a:defRPr sz="2600">
+                  <a:solidFill>
+                    <a:schemeClr val="bg1"/>
+                  </a:solidFill>
+                  <a:latin typeface="Arial" panose="020B0604020202020204" pitchFamily="34" charset="0"/>
+                </a:defRPr>
+              </a:lvl7pPr>
+              <a:lvl8pPr marL="3429000" indent="-228600" eaLnBrk="0" fontAlgn="base" hangingPunct="0">
+                <a:spcBef>
+                  <a:spcPct val="20000"/>
+                </a:spcBef>
+                <a:spcAft>
+                  <a:spcPct val="0"/>
+                </a:spcAft>
+                <a:defRPr sz="2600">
+                  <a:solidFill>
+                    <a:schemeClr val="bg1"/>
+                  </a:solidFill>
+                  <a:latin typeface="Arial" panose="020B0604020202020204" pitchFamily="34" charset="0"/>
+                </a:defRPr>
+              </a:lvl8pPr>
+              <a:lvl9pPr marL="3886200" indent="-228600" eaLnBrk="0" fontAlgn="base" hangingPunct="0">
+                <a:spcBef>
+                  <a:spcPct val="20000"/>
+                </a:spcBef>
+                <a:spcAft>
+                  <a:spcPct val="0"/>
+                </a:spcAft>
+                <a:defRPr sz="2600">
+                  <a:solidFill>
+                    <a:schemeClr val="bg1"/>
+                  </a:solidFill>
+                  <a:latin typeface="Arial" panose="020B0604020202020204" pitchFamily="34" charset="0"/>
+                </a:defRPr>
+              </a:lvl9pPr>
+            </a:lstStyle>
+            <a:p>
+              <a:pPr eaLnBrk="1" hangingPunct="1">
+                <a:spcBef>
+                  <a:spcPct val="50000"/>
+                </a:spcBef>
+                <a:defRPr/>
+              </a:pPr>
+              <a:r>
+                <a:rPr lang="nl-NL" altLang="en-US" sz="2100"/>
+                <a:t>	  Onze hulp is in de naam van de H</a:t>
+              </a:r>
+              <a:r>
+                <a:rPr lang="nl-NL" altLang="en-US" sz="1700"/>
+                <a:t>ERE</a:t>
+              </a:r>
+            </a:p>
+          </p:txBody>
+        </p:sp>
+      </p:grpSp>
     </p:spTree>
   </p:cSld>
   <p:clrMapOvr>
@@ -3121,7 +4368,7 @@
           <a:p>
             <a:pPr lvl="0"/>
             <a:r>
-              <a:rPr lang="en-US" smtClean="0"/>
+              <a:rPr lang="en-US"/>
               <a:t>Click to edit Master text styles</a:t>
             </a:r>
           </a:p>
@@ -3166,7 +4413,7 @@
           <a:p>
             <a:pPr lvl="0"/>
             <a:r>
-              <a:rPr lang="en-US" smtClean="0"/>
+              <a:rPr lang="en-US"/>
               <a:t>Click to edit Master text styles</a:t>
             </a:r>
           </a:p>
@@ -3200,54 +4447,6 @@
           <a:chExt cx="0" cy="0"/>
         </a:xfrm>
       </p:grpSpPr>
-      <p:sp>
-        <p:nvSpPr>
-          <p:cNvPr id="3" name="Rectangle 2"/>
-          <p:cNvSpPr/>
-          <p:nvPr/>
-        </p:nvSpPr>
-        <p:spPr>
-          <a:xfrm>
-            <a:off x="6372225" y="0"/>
-            <a:ext cx="2771775" cy="1989138"/>
-          </a:xfrm>
-          <a:prstGeom prst="rect">
-            <a:avLst/>
-          </a:prstGeom>
-          <a:solidFill>
-            <a:srgbClr val="000000"/>
-          </a:solidFill>
-          <a:ln>
-            <a:noFill/>
-          </a:ln>
-        </p:spPr>
-        <p:style>
-          <a:lnRef idx="2">
-            <a:schemeClr val="accent1">
-              <a:shade val="50000"/>
-            </a:schemeClr>
-          </a:lnRef>
-          <a:fillRef idx="1">
-            <a:schemeClr val="accent1"/>
-          </a:fillRef>
-          <a:effectRef idx="0">
-            <a:schemeClr val="accent1"/>
-          </a:effectRef>
-          <a:fontRef idx="minor">
-            <a:schemeClr val="lt1"/>
-          </a:fontRef>
-        </p:style>
-        <p:txBody>
-          <a:bodyPr anchor="ctr"/>
-          <a:lstStyle/>
-          <a:p>
-            <a:pPr algn="ctr">
-              <a:defRPr/>
-            </a:pPr>
-            <a:endParaRPr lang="en-GB"/>
-          </a:p>
-        </p:txBody>
-      </p:sp>
       <p:sp>
         <p:nvSpPr>
           <p:cNvPr id="5" name="Text Placeholder 4"/>
@@ -3286,7 +4485,7 @@
           <a:p>
             <a:pPr lvl="0"/>
             <a:r>
-              <a:rPr lang="en-US" smtClean="0"/>
+              <a:rPr lang="en-US"/>
               <a:t>Click to edit Master text styles</a:t>
             </a:r>
           </a:p>
@@ -3539,7 +4738,7 @@
           <a:p>
             <a:pPr lvl="0"/>
             <a:r>
-              <a:rPr lang="en-US" smtClean="0"/>
+              <a:rPr lang="en-US"/>
               <a:t>Click to edit Master text styles</a:t>
             </a:r>
           </a:p>
@@ -3587,7 +4786,7 @@
           <a:p>
             <a:pPr lvl="0"/>
             <a:r>
-              <a:rPr lang="en-US" smtClean="0"/>
+              <a:rPr lang="en-US"/>
               <a:t>Click to edit Master text styles</a:t>
             </a:r>
           </a:p>
@@ -3629,8 +4828,8 @@
         </p:nvSpPr>
         <p:spPr>
           <a:xfrm>
-            <a:off x="0" y="15875"/>
-            <a:ext cx="5940425" cy="6842125"/>
+            <a:off x="0" y="546847"/>
+            <a:ext cx="5940425" cy="6311153"/>
           </a:xfrm>
           <a:prstGeom prst="rect">
             <a:avLst/>
@@ -3881,7 +5080,7 @@
         </p:nvSpPr>
         <p:spPr>
           <a:xfrm>
-            <a:off x="1956470" y="2026940"/>
+            <a:off x="1956470" y="2582751"/>
             <a:ext cx="3082033" cy="432048"/>
           </a:xfrm>
           <a:prstGeom prst="rect">
@@ -3913,7 +5112,7 @@
           <a:p>
             <a:pPr lvl="0"/>
             <a:r>
-              <a:rPr lang="en-US" smtClean="0"/>
+              <a:rPr lang="en-US" dirty="0"/>
               <a:t>Click to edit Master text styles</a:t>
             </a:r>
           </a:p>
@@ -3931,7 +5130,7 @@
         </p:nvSpPr>
         <p:spPr>
           <a:xfrm>
-            <a:off x="2502570" y="2426990"/>
+            <a:off x="2502570" y="2982801"/>
             <a:ext cx="3082033" cy="432048"/>
           </a:xfrm>
           <a:prstGeom prst="rect">
@@ -3963,7 +5162,7 @@
           <a:p>
             <a:pPr lvl="0"/>
             <a:r>
-              <a:rPr lang="en-US" smtClean="0"/>
+              <a:rPr lang="en-US"/>
               <a:t>Click to edit Master text styles</a:t>
             </a:r>
           </a:p>
@@ -3981,7 +5180,7 @@
         </p:nvSpPr>
         <p:spPr>
           <a:xfrm>
-            <a:off x="629320" y="2823865"/>
+            <a:off x="629320" y="3379676"/>
             <a:ext cx="3082033" cy="432048"/>
           </a:xfrm>
           <a:prstGeom prst="rect">
@@ -4013,7 +5212,7 @@
           <a:p>
             <a:pPr lvl="0"/>
             <a:r>
-              <a:rPr lang="en-US" smtClean="0"/>
+              <a:rPr lang="en-US"/>
               <a:t>Click to edit Master text styles</a:t>
             </a:r>
           </a:p>
@@ -4062,7 +5261,7 @@
           <a:p>
             <a:pPr algn="l"/>
             <a:r>
-              <a:rPr lang="nl-NL" sz="1600" b="1" dirty="0" smtClean="0">
+              <a:rPr lang="nl-NL" sz="1600" b="1" dirty="0">
                 <a:solidFill>
                   <a:schemeClr val="bg1"/>
                 </a:solidFill>
@@ -4074,7 +5273,7 @@
           <a:p>
             <a:pPr algn="l"/>
             <a:r>
-              <a:rPr lang="nl-NL" sz="1600" b="0" dirty="0" smtClean="0">
+              <a:rPr lang="nl-NL" sz="1600" b="0" dirty="0">
                 <a:solidFill>
                   <a:schemeClr val="bg1"/>
                 </a:solidFill>
@@ -4087,7 +5286,7 @@
           </a:p>
           <a:p>
             <a:pPr algn="l"/>
-            <a:endParaRPr lang="nl-NL" sz="1600" b="0" dirty="0" smtClean="0">
+            <a:endParaRPr lang="nl-NL" sz="1600" b="0" dirty="0">
               <a:solidFill>
                 <a:schemeClr val="bg1"/>
               </a:solidFill>
@@ -4099,7 +5298,7 @@
           <a:p>
             <a:pPr algn="l"/>
             <a:r>
-              <a:rPr lang="nl-NL" sz="1600" b="1" dirty="0" smtClean="0">
+              <a:rPr lang="nl-NL" sz="1600" b="1" dirty="0">
                 <a:solidFill>
                   <a:schemeClr val="bg1"/>
                 </a:solidFill>
@@ -4113,7 +5312,7 @@
           <a:p>
             <a:pPr algn="l"/>
             <a:r>
-              <a:rPr lang="nl-NL" sz="1600" b="0" dirty="0" smtClean="0">
+              <a:rPr lang="nl-NL" sz="1600" b="0" dirty="0">
                 <a:solidFill>
                   <a:schemeClr val="bg1"/>
                 </a:solidFill>
@@ -4126,7 +5325,7 @@
           </a:p>
           <a:p>
             <a:pPr algn="l"/>
-            <a:endParaRPr lang="nl-NL" sz="1600" b="0" dirty="0" smtClean="0">
+            <a:endParaRPr lang="nl-NL" sz="1600" b="0" dirty="0">
               <a:solidFill>
                 <a:schemeClr val="bg1"/>
               </a:solidFill>
@@ -4138,7 +5337,7 @@
           <a:p>
             <a:pPr algn="l"/>
             <a:r>
-              <a:rPr lang="nl-NL" sz="1600" b="1" dirty="0" smtClean="0">
+              <a:rPr lang="nl-NL" sz="1600" b="1" dirty="0">
                 <a:solidFill>
                   <a:schemeClr val="bg1"/>
                 </a:solidFill>
@@ -4152,7 +5351,7 @@
           <a:p>
             <a:pPr algn="l"/>
             <a:r>
-              <a:rPr lang="nl-NL" sz="1600" b="0" dirty="0" smtClean="0">
+              <a:rPr lang="nl-NL" sz="1600" b="0" dirty="0">
                 <a:solidFill>
                   <a:schemeClr val="bg1"/>
                 </a:solidFill>
@@ -4165,7 +5364,7 @@
           </a:p>
           <a:p>
             <a:pPr algn="l"/>
-            <a:endParaRPr lang="nl-NL" sz="1600" b="0" dirty="0" smtClean="0">
+            <a:endParaRPr lang="nl-NL" sz="1600" b="0" dirty="0">
               <a:solidFill>
                 <a:schemeClr val="bg1"/>
               </a:solidFill>
@@ -4176,7 +5375,7 @@
           </a:p>
           <a:p>
             <a:pPr algn="l"/>
-            <a:endParaRPr lang="nl-NL" sz="1600" b="0" dirty="0" smtClean="0">
+            <a:endParaRPr lang="nl-NL" sz="1600" b="0" dirty="0">
               <a:solidFill>
                 <a:schemeClr val="bg1"/>
               </a:solidFill>
@@ -4187,7 +5386,7 @@
           </a:p>
           <a:p>
             <a:pPr algn="l"/>
-            <a:endParaRPr lang="nl-NL" sz="1600" b="0" dirty="0" smtClean="0">
+            <a:endParaRPr lang="nl-NL" sz="1600" b="0" dirty="0">
               <a:solidFill>
                 <a:schemeClr val="bg1"/>
               </a:solidFill>
@@ -4198,7 +5397,7 @@
           </a:p>
           <a:p>
             <a:pPr algn="l"/>
-            <a:endParaRPr lang="nl-NL" sz="1600" b="0" dirty="0" smtClean="0">
+            <a:endParaRPr lang="nl-NL" sz="1600" b="0" dirty="0">
               <a:solidFill>
                 <a:schemeClr val="bg1"/>
               </a:solidFill>
@@ -4209,7 +5408,7 @@
           </a:p>
           <a:p>
             <a:pPr algn="l"/>
-            <a:endParaRPr lang="nl-NL" sz="1600" b="0" dirty="0" smtClean="0">
+            <a:endParaRPr lang="nl-NL" sz="1600" b="0" dirty="0">
               <a:solidFill>
                 <a:schemeClr val="bg1"/>
               </a:solidFill>
@@ -4220,7 +5419,7 @@
           </a:p>
           <a:p>
             <a:pPr algn="l"/>
-            <a:endParaRPr lang="nl-NL" sz="1600" b="0" dirty="0" smtClean="0">
+            <a:endParaRPr lang="nl-NL" sz="1600" b="0" dirty="0">
               <a:solidFill>
                 <a:schemeClr val="bg1"/>
               </a:solidFill>
@@ -4232,7 +5431,7 @@
           <a:p>
             <a:pPr algn="l"/>
             <a:r>
-              <a:rPr lang="nl-NL" sz="1600" b="1" dirty="0" smtClean="0">
+              <a:rPr lang="nl-NL" sz="1600" b="1" dirty="0">
                 <a:solidFill>
                   <a:schemeClr val="bg1"/>
                 </a:solidFill>
@@ -4250,7 +5449,7 @@
               </a:spcAft>
             </a:pPr>
             <a:r>
-              <a:rPr lang="nl-NL" sz="1200" b="0" kern="1200" dirty="0" smtClean="0">
+              <a:rPr lang="nl-NL" sz="1200" b="0" kern="1200" dirty="0">
                 <a:solidFill>
                   <a:schemeClr val="bg1"/>
                 </a:solidFill>
@@ -4269,7 +5468,7 @@
               </a:spcAft>
             </a:pPr>
             <a:r>
-              <a:rPr lang="nl-NL" sz="1200" b="0" kern="1200" dirty="0" smtClean="0">
+              <a:rPr lang="nl-NL" sz="1200" b="0" kern="1200" dirty="0">
                 <a:solidFill>
                   <a:schemeClr val="bg1"/>
                 </a:solidFill>
@@ -4288,7 +5487,7 @@
               </a:spcAft>
             </a:pPr>
             <a:r>
-              <a:rPr lang="nl-NL" sz="1200" b="0" kern="1200" dirty="0" smtClean="0">
+              <a:rPr lang="nl-NL" sz="1200" b="0" kern="1200" dirty="0">
                 <a:solidFill>
                   <a:schemeClr val="bg1"/>
                 </a:solidFill>
@@ -4307,7 +5506,7 @@
               </a:spcAft>
             </a:pPr>
             <a:r>
-              <a:rPr lang="nl-NL" sz="1200" b="0" kern="1200" dirty="0" smtClean="0">
+              <a:rPr lang="nl-NL" sz="1200" b="0" kern="1200" dirty="0">
                 <a:solidFill>
                   <a:schemeClr val="bg1"/>
                 </a:solidFill>
@@ -4627,23 +5826,10 @@
                 <a:latin typeface="Arial" pitchFamily="34" charset="0"/>
                 <a:cs typeface="Arial" pitchFamily="34" charset="0"/>
               </a:rPr>
-              <a:t>Wel </a:t>
-            </a:r>
-            <a:r>
-              <a:rPr lang="nl-NL" sz="2600" dirty="0" smtClean="0">
-                <a:solidFill>
-                  <a:schemeClr val="tx1">
-                    <a:lumMod val="95000"/>
-                  </a:schemeClr>
-                </a:solidFill>
-                <a:effectLst/>
-                <a:latin typeface="Arial" pitchFamily="34" charset="0"/>
-                <a:cs typeface="Arial" pitchFamily="34" charset="0"/>
-              </a:rPr>
-              <a:t>thuis</a:t>
-            </a:r>
-            <a:r>
-              <a:rPr lang="nl-NL" sz="2600" baseline="0" dirty="0" smtClean="0">
+              <a:t>Wel thuis</a:t>
+            </a:r>
+            <a:r>
+              <a:rPr lang="nl-NL" sz="2600" baseline="0" dirty="0">
                 <a:solidFill>
                   <a:schemeClr val="tx1">
                     <a:lumMod val="95000"/>
@@ -4711,7 +5897,7 @@
           <a:p>
             <a:pPr algn="l"/>
             <a:r>
-              <a:rPr lang="nl-NL" sz="1600" b="1" dirty="0" smtClean="0">
+              <a:rPr lang="nl-NL" sz="1600" b="1" dirty="0">
                 <a:solidFill>
                   <a:schemeClr val="bg1"/>
                 </a:solidFill>
@@ -4723,7 +5909,7 @@
           <a:p>
             <a:pPr algn="l"/>
             <a:r>
-              <a:rPr lang="nl-NL" sz="1600" b="0" dirty="0" smtClean="0">
+              <a:rPr lang="nl-NL" sz="1600" b="0" dirty="0">
                 <a:solidFill>
                   <a:schemeClr val="bg1"/>
                 </a:solidFill>
@@ -4736,7 +5922,7 @@
           </a:p>
           <a:p>
             <a:pPr algn="l"/>
-            <a:endParaRPr lang="nl-NL" sz="1600" b="0" dirty="0" smtClean="0">
+            <a:endParaRPr lang="nl-NL" sz="1600" b="0" dirty="0">
               <a:solidFill>
                 <a:schemeClr val="bg1"/>
               </a:solidFill>
@@ -4748,7 +5934,7 @@
           <a:p>
             <a:pPr algn="l"/>
             <a:r>
-              <a:rPr lang="nl-NL" sz="1600" b="1" dirty="0" smtClean="0">
+              <a:rPr lang="nl-NL" sz="1600" b="1" dirty="0">
                 <a:solidFill>
                   <a:schemeClr val="bg1"/>
                 </a:solidFill>
@@ -4762,7 +5948,7 @@
           <a:p>
             <a:pPr algn="l"/>
             <a:r>
-              <a:rPr lang="nl-NL" sz="1600" b="0" dirty="0" smtClean="0">
+              <a:rPr lang="nl-NL" sz="1600" b="0" dirty="0">
                 <a:solidFill>
                   <a:schemeClr val="bg1"/>
                 </a:solidFill>
@@ -4775,7 +5961,7 @@
           </a:p>
           <a:p>
             <a:pPr algn="l"/>
-            <a:endParaRPr lang="nl-NL" sz="1600" b="0" dirty="0" smtClean="0">
+            <a:endParaRPr lang="nl-NL" sz="1600" b="0" dirty="0">
               <a:solidFill>
                 <a:schemeClr val="bg1"/>
               </a:solidFill>
@@ -4787,7 +5973,7 @@
           <a:p>
             <a:pPr algn="l"/>
             <a:r>
-              <a:rPr lang="nl-NL" sz="1600" b="1" dirty="0" smtClean="0">
+              <a:rPr lang="nl-NL" sz="1600" b="1" dirty="0">
                 <a:solidFill>
                   <a:schemeClr val="bg1"/>
                 </a:solidFill>
@@ -4801,7 +5987,7 @@
           <a:p>
             <a:pPr algn="l"/>
             <a:r>
-              <a:rPr lang="nl-NL" sz="1600" b="0" dirty="0" smtClean="0">
+              <a:rPr lang="nl-NL" sz="1600" b="0" dirty="0">
                 <a:solidFill>
                   <a:schemeClr val="bg1"/>
                 </a:solidFill>
@@ -4814,7 +6000,7 @@
           </a:p>
           <a:p>
             <a:pPr algn="l"/>
-            <a:endParaRPr lang="nl-NL" sz="1600" b="0" dirty="0" smtClean="0">
+            <a:endParaRPr lang="nl-NL" sz="1600" b="0" dirty="0">
               <a:solidFill>
                 <a:schemeClr val="bg1"/>
               </a:solidFill>
@@ -4825,7 +6011,7 @@
           </a:p>
           <a:p>
             <a:pPr algn="l"/>
-            <a:endParaRPr lang="nl-NL" sz="1600" b="0" dirty="0" smtClean="0">
+            <a:endParaRPr lang="nl-NL" sz="1600" b="0" dirty="0">
               <a:solidFill>
                 <a:schemeClr val="bg1"/>
               </a:solidFill>
@@ -4836,7 +6022,7 @@
           </a:p>
           <a:p>
             <a:pPr algn="l"/>
-            <a:endParaRPr lang="nl-NL" sz="1600" b="0" dirty="0" smtClean="0">
+            <a:endParaRPr lang="nl-NL" sz="1600" b="0" dirty="0">
               <a:solidFill>
                 <a:schemeClr val="bg1"/>
               </a:solidFill>
@@ -4847,7 +6033,7 @@
           </a:p>
           <a:p>
             <a:pPr algn="l"/>
-            <a:endParaRPr lang="nl-NL" sz="1600" b="0" dirty="0" smtClean="0">
+            <a:endParaRPr lang="nl-NL" sz="1600" b="0" dirty="0">
               <a:solidFill>
                 <a:schemeClr val="bg1"/>
               </a:solidFill>
@@ -4858,7 +6044,7 @@
           </a:p>
           <a:p>
             <a:pPr algn="l"/>
-            <a:endParaRPr lang="nl-NL" sz="1600" b="0" dirty="0" smtClean="0">
+            <a:endParaRPr lang="nl-NL" sz="1600" b="0" dirty="0">
               <a:solidFill>
                 <a:schemeClr val="bg1"/>
               </a:solidFill>
@@ -4869,7 +6055,7 @@
           </a:p>
           <a:p>
             <a:pPr algn="l"/>
-            <a:endParaRPr lang="nl-NL" sz="1600" b="0" dirty="0" smtClean="0">
+            <a:endParaRPr lang="nl-NL" sz="1600" b="0" dirty="0">
               <a:solidFill>
                 <a:schemeClr val="bg1"/>
               </a:solidFill>
@@ -4881,7 +6067,7 @@
           <a:p>
             <a:pPr algn="l"/>
             <a:r>
-              <a:rPr lang="nl-NL" sz="1600" b="1" dirty="0" smtClean="0">
+              <a:rPr lang="nl-NL" sz="1600" b="1" dirty="0">
                 <a:solidFill>
                   <a:schemeClr val="bg1"/>
                 </a:solidFill>
@@ -4899,7 +6085,7 @@
               </a:spcAft>
             </a:pPr>
             <a:r>
-              <a:rPr lang="nl-NL" sz="1200" b="0" kern="1200" dirty="0" smtClean="0">
+              <a:rPr lang="nl-NL" sz="1200" b="0" kern="1200" dirty="0">
                 <a:solidFill>
                   <a:schemeClr val="bg1"/>
                 </a:solidFill>
@@ -4918,7 +6104,7 @@
               </a:spcAft>
             </a:pPr>
             <a:r>
-              <a:rPr lang="nl-NL" sz="1200" b="0" kern="1200" dirty="0" smtClean="0">
+              <a:rPr lang="nl-NL" sz="1200" b="0" kern="1200" dirty="0">
                 <a:solidFill>
                   <a:schemeClr val="bg1"/>
                 </a:solidFill>
@@ -4937,7 +6123,7 @@
               </a:spcAft>
             </a:pPr>
             <a:r>
-              <a:rPr lang="nl-NL" sz="1200" b="0" kern="1200" dirty="0" smtClean="0">
+              <a:rPr lang="nl-NL" sz="1200" b="0" kern="1200" dirty="0">
                 <a:solidFill>
                   <a:schemeClr val="bg1"/>
                 </a:solidFill>
@@ -4956,7 +6142,7 @@
               </a:spcAft>
             </a:pPr>
             <a:r>
-              <a:rPr lang="nl-NL" sz="1200" b="0" kern="1200" dirty="0" smtClean="0">
+              <a:rPr lang="nl-NL" sz="1200" b="0" kern="1200" dirty="0">
                 <a:solidFill>
                   <a:schemeClr val="bg1"/>
                 </a:solidFill>
@@ -5011,612 +6197,390 @@
       </p:grpSpPr>
       <p:sp>
         <p:nvSpPr>
-          <p:cNvPr id="2" name="Rectangle 1"/>
-          <p:cNvSpPr/>
-          <p:nvPr/>
+          <p:cNvPr id="7" name="Rectangle 2">
+            <a:extLst>
+              <a:ext uri="{FF2B5EF4-FFF2-40B4-BE49-F238E27FC236}">
+                <a16:creationId xmlns:a16="http://schemas.microsoft.com/office/drawing/2014/main" id="{25FF9ADD-A346-CD45-AE72-FC0535E71293}"/>
+              </a:ext>
+            </a:extLst>
+          </p:cNvPr>
+          <p:cNvSpPr>
+            <a:spLocks noGrp="1" noChangeArrowheads="1"/>
+          </p:cNvSpPr>
+          <p:nvPr>
+            <p:ph type="title"/>
+          </p:nvPr>
         </p:nvSpPr>
         <p:spPr>
           <a:xfrm>
-            <a:off x="5795963" y="0"/>
-            <a:ext cx="3348037" cy="1844675"/>
+            <a:off x="0" y="0"/>
+            <a:ext cx="8480425" cy="517525"/>
           </a:xfrm>
           <a:prstGeom prst="rect">
             <a:avLst/>
           </a:prstGeom>
-          <a:solidFill>
-            <a:srgbClr val="000000"/>
-          </a:solidFill>
-          <a:ln>
-            <a:noFill/>
-          </a:ln>
         </p:spPr>
-        <p:style>
-          <a:lnRef idx="2">
-            <a:schemeClr val="accent1">
-              <a:shade val="50000"/>
-            </a:schemeClr>
-          </a:lnRef>
-          <a:fillRef idx="1">
-            <a:schemeClr val="accent1"/>
-          </a:fillRef>
-          <a:effectRef idx="0">
-            <a:schemeClr val="accent1"/>
-          </a:effectRef>
-          <a:fontRef idx="minor">
-            <a:schemeClr val="lt1"/>
-          </a:fontRef>
-        </p:style>
         <p:txBody>
-          <a:bodyPr anchor="ctr"/>
-          <a:lstStyle/>
-          <a:p>
-            <a:pPr algn="ctr">
-              <a:defRPr/>
-            </a:pPr>
-            <a:endParaRPr lang="en-GB"/>
+          <a:bodyPr/>
+          <a:lstStyle>
+            <a:lvl1pPr algn="l">
+              <a:defRPr sz="2600">
+                <a:latin typeface="Arial" panose="020B0604020202020204" pitchFamily="34" charset="0"/>
+                <a:cs typeface="Arial" panose="020B0604020202020204" pitchFamily="34" charset="0"/>
+              </a:defRPr>
+            </a:lvl1pPr>
+          </a:lstStyle>
+          <a:p>
+            <a:pPr eaLnBrk="1" hangingPunct="1"/>
+            <a:r>
+              <a:rPr lang="nl-NL" altLang="en-US" dirty="0"/>
+              <a:t>Zegen</a:t>
+            </a:r>
           </a:p>
         </p:txBody>
       </p:sp>
       <p:sp>
         <p:nvSpPr>
-          <p:cNvPr id="3" name="TextBox 2"/>
-          <p:cNvSpPr txBox="1"/>
-          <p:nvPr/>
+          <p:cNvPr id="8" name="Rectangle 3">
+            <a:extLst>
+              <a:ext uri="{FF2B5EF4-FFF2-40B4-BE49-F238E27FC236}">
+                <a16:creationId xmlns:a16="http://schemas.microsoft.com/office/drawing/2014/main" id="{73A17D15-8A3E-8449-BF16-725263676503}"/>
+              </a:ext>
+            </a:extLst>
+          </p:cNvPr>
+          <p:cNvSpPr>
+            <a:spLocks noGrp="1" noChangeArrowheads="1"/>
+          </p:cNvSpPr>
+          <p:nvPr>
+            <p:ph type="body" sz="half" idx="1"/>
+          </p:nvPr>
         </p:nvSpPr>
-        <p:spPr bwMode="auto">
+        <p:spPr>
           <a:xfrm>
-            <a:off x="0" y="0"/>
-            <a:ext cx="6443663" cy="1844675"/>
+            <a:off x="0" y="611188"/>
+            <a:ext cx="9051925" cy="6246812"/>
           </a:xfrm>
           <a:prstGeom prst="rect">
             <a:avLst/>
           </a:prstGeom>
-          <a:noFill/>
-          <a:ln w="9525">
-            <a:noFill/>
-            <a:miter lim="800000"/>
-            <a:headEnd/>
-            <a:tailEnd/>
-          </a:ln>
         </p:spPr>
         <p:txBody>
-          <a:bodyPr wrap="none" lIns="180000" rIns="180000" anchor="b"/>
-          <a:lstStyle/>
-          <a:p>
-            <a:pPr fontAlgn="auto">
-              <a:spcAft>
-                <a:spcPts val="0"/>
-              </a:spcAft>
+          <a:bodyPr/>
+          <a:lstStyle>
+            <a:lvl1pPr>
+              <a:buNone/>
               <a:defRPr/>
-            </a:pPr>
-            <a:r>
-              <a:rPr lang="en-GB" sz="3000" dirty="0" err="1">
-                <a:solidFill>
-                  <a:schemeClr val="tx1">
-                    <a:lumMod val="95000"/>
-                  </a:schemeClr>
-                </a:solidFill>
-                <a:effectLst/>
-              </a:rPr>
-              <a:t>Gezongen</a:t>
-            </a:r>
-            <a:r>
-              <a:rPr lang="en-GB" sz="3000" dirty="0">
-                <a:solidFill>
-                  <a:schemeClr val="tx1">
-                    <a:lumMod val="95000"/>
-                  </a:schemeClr>
-                </a:solidFill>
-                <a:effectLst/>
-              </a:rPr>
-              <a:t> Amen</a:t>
-            </a:r>
-            <a:endParaRPr lang="en-GB" sz="3000" dirty="0">
-              <a:solidFill>
-                <a:schemeClr val="tx1">
-                  <a:lumMod val="95000"/>
-                </a:schemeClr>
-              </a:solidFill>
-              <a:effectLst/>
-              <a:ea typeface="+mj-ea"/>
-              <a:cs typeface="Tahoma" pitchFamily="34" charset="0"/>
-            </a:endParaRPr>
-          </a:p>
-          <a:p>
-            <a:pPr fontAlgn="auto">
-              <a:spcAft>
-                <a:spcPts val="0"/>
-              </a:spcAft>
-              <a:defRPr/>
-            </a:pPr>
-            <a:endParaRPr lang="en-GB" sz="2800" dirty="0">
-              <a:solidFill>
-                <a:schemeClr val="tx1">
-                  <a:lumMod val="95000"/>
-                </a:schemeClr>
-              </a:solidFill>
-              <a:effectLst/>
-            </a:endParaRPr>
+            </a:lvl1pPr>
+          </a:lstStyle>
+          <a:p>
+            <a:pPr marL="0" indent="0" eaLnBrk="1" hangingPunct="1"/>
+            <a:r>
+              <a:rPr lang="nl-NL" altLang="en-US" sz="1600" i="1" dirty="0"/>
+              <a:t>Als antwoord op de zegen zingen we gezamenlijk:</a:t>
+            </a:r>
+            <a:endParaRPr lang="nl-NL" altLang="en-US" sz="1600" dirty="0"/>
           </a:p>
         </p:txBody>
       </p:sp>
-      <p:pic>
-        <p:nvPicPr>
-          <p:cNvPr id="4" name="Picture 2"/>
-          <p:cNvPicPr>
-            <a:picLocks noChangeAspect="1" noChangeArrowheads="1"/>
-          </p:cNvPicPr>
-          <p:nvPr/>
-        </p:nvPicPr>
-        <p:blipFill>
-          <a:blip r:embed="rId2" cstate="print"/>
-          <a:srcRect l="9837" t="15523" b="33356"/>
-          <a:stretch>
-            <a:fillRect/>
-          </a:stretch>
-        </p:blipFill>
-        <p:spPr bwMode="auto">
+      <p:grpSp>
+        <p:nvGrpSpPr>
+          <p:cNvPr id="9" name="Group 23">
+            <a:extLst>
+              <a:ext uri="{FF2B5EF4-FFF2-40B4-BE49-F238E27FC236}">
+                <a16:creationId xmlns:a16="http://schemas.microsoft.com/office/drawing/2014/main" id="{E760738F-29E5-EE44-861E-45C810282F41}"/>
+              </a:ext>
+            </a:extLst>
+          </p:cNvPr>
+          <p:cNvGrpSpPr>
+            <a:grpSpLocks/>
+          </p:cNvGrpSpPr>
+          <p:nvPr userDrawn="1"/>
+        </p:nvGrpSpPr>
+        <p:grpSpPr bwMode="auto">
           <a:xfrm>
-            <a:off x="709613" y="1484313"/>
-            <a:ext cx="8242300" cy="4537075"/>
+            <a:off x="250825" y="981075"/>
+            <a:ext cx="7131050" cy="1223963"/>
+            <a:chOff x="158" y="1162"/>
+            <a:chExt cx="4492" cy="771"/>
           </a:xfrm>
-          <a:prstGeom prst="rect">
-            <a:avLst/>
-          </a:prstGeom>
-          <a:noFill/>
-          <a:ln w="9525">
+        </p:grpSpPr>
+        <p:sp>
+          <p:nvSpPr>
+            <p:cNvPr id="10" name="Text Box 4">
+              <a:extLst>
+                <a:ext uri="{FF2B5EF4-FFF2-40B4-BE49-F238E27FC236}">
+                  <a16:creationId xmlns:a16="http://schemas.microsoft.com/office/drawing/2014/main" id="{4B54B648-EB9B-564B-A7F3-ECA9B109232F}"/>
+                </a:ext>
+              </a:extLst>
+            </p:cNvPr>
+            <p:cNvSpPr txBox="1">
+              <a:spLocks noChangeArrowheads="1"/>
+            </p:cNvSpPr>
+            <p:nvPr/>
+          </p:nvSpPr>
+          <p:spPr bwMode="auto">
+            <a:xfrm>
+              <a:off x="749" y="1683"/>
+              <a:ext cx="3901" cy="250"/>
+            </a:xfrm>
+            <a:prstGeom prst="rect">
+              <a:avLst/>
+            </a:prstGeom>
             <a:noFill/>
-            <a:miter lim="800000"/>
-            <a:headEnd/>
-            <a:tailEnd/>
-          </a:ln>
-        </p:spPr>
-      </p:pic>
-      <p:sp>
-        <p:nvSpPr>
-          <p:cNvPr id="5" name="Tekstvak 5"/>
-          <p:cNvSpPr txBox="1">
-            <a:spLocks noChangeArrowheads="1"/>
-          </p:cNvSpPr>
-          <p:nvPr/>
-        </p:nvSpPr>
-        <p:spPr bwMode="auto">
-          <a:xfrm>
-            <a:off x="1504950" y="6051550"/>
-            <a:ext cx="7127875" cy="369888"/>
-          </a:xfrm>
-          <a:prstGeom prst="rect">
-            <a:avLst/>
-          </a:prstGeom>
-          <a:noFill/>
-          <a:ln>
-            <a:noFill/>
-          </a:ln>
-          <a:extLst/>
-        </p:spPr>
-        <p:txBody>
-          <a:bodyPr>
-            <a:spAutoFit/>
-          </a:bodyPr>
-          <a:lstStyle>
-            <a:lvl1pPr eaLnBrk="0" hangingPunct="0">
-              <a:defRPr>
-                <a:solidFill>
-                  <a:schemeClr val="tx1"/>
-                </a:solidFill>
-                <a:latin typeface="Arial" charset="0"/>
-                <a:cs typeface="Arial" charset="0"/>
-              </a:defRPr>
-            </a:lvl1pPr>
-            <a:lvl2pPr marL="742950" indent="-285750" eaLnBrk="0" hangingPunct="0">
-              <a:defRPr>
-                <a:solidFill>
-                  <a:schemeClr val="tx1"/>
-                </a:solidFill>
-                <a:latin typeface="Arial" charset="0"/>
-                <a:cs typeface="Arial" charset="0"/>
-              </a:defRPr>
-            </a:lvl2pPr>
-            <a:lvl3pPr marL="1143000" indent="-228600" eaLnBrk="0" hangingPunct="0">
-              <a:defRPr>
-                <a:solidFill>
-                  <a:schemeClr val="tx1"/>
-                </a:solidFill>
-                <a:latin typeface="Arial" charset="0"/>
-                <a:cs typeface="Arial" charset="0"/>
-              </a:defRPr>
-            </a:lvl3pPr>
-            <a:lvl4pPr marL="1600200" indent="-228600" eaLnBrk="0" hangingPunct="0">
-              <a:defRPr>
-                <a:solidFill>
-                  <a:schemeClr val="tx1"/>
-                </a:solidFill>
-                <a:latin typeface="Arial" charset="0"/>
-                <a:cs typeface="Arial" charset="0"/>
-              </a:defRPr>
-            </a:lvl4pPr>
-            <a:lvl5pPr marL="2057400" indent="-228600" eaLnBrk="0" hangingPunct="0">
-              <a:defRPr>
-                <a:solidFill>
-                  <a:schemeClr val="tx1"/>
-                </a:solidFill>
-                <a:latin typeface="Arial" charset="0"/>
-                <a:cs typeface="Arial" charset="0"/>
-              </a:defRPr>
-            </a:lvl5pPr>
-            <a:lvl6pPr marL="2514600" indent="-228600" eaLnBrk="0" fontAlgn="base" hangingPunct="0">
-              <a:spcBef>
-                <a:spcPct val="0"/>
-              </a:spcBef>
-              <a:spcAft>
-                <a:spcPct val="0"/>
-              </a:spcAft>
-              <a:defRPr>
-                <a:solidFill>
-                  <a:schemeClr val="tx1"/>
-                </a:solidFill>
-                <a:latin typeface="Arial" charset="0"/>
-                <a:cs typeface="Arial" charset="0"/>
-              </a:defRPr>
-            </a:lvl6pPr>
-            <a:lvl7pPr marL="2971800" indent="-228600" eaLnBrk="0" fontAlgn="base" hangingPunct="0">
-              <a:spcBef>
-                <a:spcPct val="0"/>
-              </a:spcBef>
-              <a:spcAft>
-                <a:spcPct val="0"/>
-              </a:spcAft>
-              <a:defRPr>
-                <a:solidFill>
-                  <a:schemeClr val="tx1"/>
-                </a:solidFill>
-                <a:latin typeface="Arial" charset="0"/>
-                <a:cs typeface="Arial" charset="0"/>
-              </a:defRPr>
-            </a:lvl7pPr>
-            <a:lvl8pPr marL="3429000" indent="-228600" eaLnBrk="0" fontAlgn="base" hangingPunct="0">
-              <a:spcBef>
-                <a:spcPct val="0"/>
-              </a:spcBef>
-              <a:spcAft>
-                <a:spcPct val="0"/>
-              </a:spcAft>
-              <a:defRPr>
-                <a:solidFill>
-                  <a:schemeClr val="tx1"/>
-                </a:solidFill>
-                <a:latin typeface="Arial" charset="0"/>
-                <a:cs typeface="Arial" charset="0"/>
-              </a:defRPr>
-            </a:lvl8pPr>
-            <a:lvl9pPr marL="3886200" indent="-228600" eaLnBrk="0" fontAlgn="base" hangingPunct="0">
-              <a:spcBef>
-                <a:spcPct val="0"/>
-              </a:spcBef>
-              <a:spcAft>
-                <a:spcPct val="0"/>
-              </a:spcAft>
-              <a:defRPr>
-                <a:solidFill>
-                  <a:schemeClr val="tx1"/>
-                </a:solidFill>
-                <a:latin typeface="Arial" charset="0"/>
-                <a:cs typeface="Arial" charset="0"/>
-              </a:defRPr>
-            </a:lvl9pPr>
-          </a:lstStyle>
-          <a:p>
-            <a:pPr eaLnBrk="1" hangingPunct="1">
-              <a:defRPr/>
-            </a:pPr>
-            <a:r>
-              <a:rPr lang="nl-NL" dirty="0" smtClean="0">
-                <a:solidFill>
-                  <a:schemeClr val="bg1"/>
-                </a:solidFill>
-              </a:rPr>
-              <a:t>A -      men,      A -       men,     A        -            -          -          men</a:t>
-            </a:r>
-          </a:p>
-        </p:txBody>
-      </p:sp>
-      <p:sp>
-        <p:nvSpPr>
-          <p:cNvPr id="6" name="Tekstvak 6"/>
-          <p:cNvSpPr txBox="1">
-            <a:spLocks noChangeArrowheads="1"/>
-          </p:cNvSpPr>
-          <p:nvPr/>
-        </p:nvSpPr>
-        <p:spPr bwMode="auto">
-          <a:xfrm>
-            <a:off x="347663" y="1773238"/>
-            <a:ext cx="339725" cy="4246562"/>
-          </a:xfrm>
-          <a:prstGeom prst="rect">
-            <a:avLst/>
-          </a:prstGeom>
-          <a:noFill/>
-          <a:ln>
-            <a:noFill/>
-          </a:ln>
-          <a:extLst/>
-        </p:spPr>
-        <p:txBody>
-          <a:bodyPr wrap="none">
-            <a:spAutoFit/>
-          </a:bodyPr>
-          <a:lstStyle>
-            <a:lvl1pPr eaLnBrk="0" hangingPunct="0">
-              <a:defRPr>
-                <a:solidFill>
-                  <a:schemeClr val="tx1"/>
-                </a:solidFill>
-                <a:latin typeface="Arial" charset="0"/>
-                <a:cs typeface="Arial" charset="0"/>
-              </a:defRPr>
-            </a:lvl1pPr>
-            <a:lvl2pPr marL="742950" indent="-285750" eaLnBrk="0" hangingPunct="0">
-              <a:defRPr>
-                <a:solidFill>
-                  <a:schemeClr val="tx1"/>
-                </a:solidFill>
-                <a:latin typeface="Arial" charset="0"/>
-                <a:cs typeface="Arial" charset="0"/>
-              </a:defRPr>
-            </a:lvl2pPr>
-            <a:lvl3pPr marL="1143000" indent="-228600" eaLnBrk="0" hangingPunct="0">
-              <a:defRPr>
-                <a:solidFill>
-                  <a:schemeClr val="tx1"/>
-                </a:solidFill>
-                <a:latin typeface="Arial" charset="0"/>
-                <a:cs typeface="Arial" charset="0"/>
-              </a:defRPr>
-            </a:lvl3pPr>
-            <a:lvl4pPr marL="1600200" indent="-228600" eaLnBrk="0" hangingPunct="0">
-              <a:defRPr>
-                <a:solidFill>
-                  <a:schemeClr val="tx1"/>
-                </a:solidFill>
-                <a:latin typeface="Arial" charset="0"/>
-                <a:cs typeface="Arial" charset="0"/>
-              </a:defRPr>
-            </a:lvl4pPr>
-            <a:lvl5pPr marL="2057400" indent="-228600" eaLnBrk="0" hangingPunct="0">
-              <a:defRPr>
-                <a:solidFill>
-                  <a:schemeClr val="tx1"/>
-                </a:solidFill>
-                <a:latin typeface="Arial" charset="0"/>
-                <a:cs typeface="Arial" charset="0"/>
-              </a:defRPr>
-            </a:lvl5pPr>
-            <a:lvl6pPr marL="2514600" indent="-228600" eaLnBrk="0" fontAlgn="base" hangingPunct="0">
-              <a:spcBef>
-                <a:spcPct val="0"/>
-              </a:spcBef>
-              <a:spcAft>
-                <a:spcPct val="0"/>
-              </a:spcAft>
-              <a:defRPr>
-                <a:solidFill>
-                  <a:schemeClr val="tx1"/>
-                </a:solidFill>
-                <a:latin typeface="Arial" charset="0"/>
-                <a:cs typeface="Arial" charset="0"/>
-              </a:defRPr>
-            </a:lvl6pPr>
-            <a:lvl7pPr marL="2971800" indent="-228600" eaLnBrk="0" fontAlgn="base" hangingPunct="0">
-              <a:spcBef>
-                <a:spcPct val="0"/>
-              </a:spcBef>
-              <a:spcAft>
-                <a:spcPct val="0"/>
-              </a:spcAft>
-              <a:defRPr>
-                <a:solidFill>
-                  <a:schemeClr val="tx1"/>
-                </a:solidFill>
-                <a:latin typeface="Arial" charset="0"/>
-                <a:cs typeface="Arial" charset="0"/>
-              </a:defRPr>
-            </a:lvl7pPr>
-            <a:lvl8pPr marL="3429000" indent="-228600" eaLnBrk="0" fontAlgn="base" hangingPunct="0">
-              <a:spcBef>
-                <a:spcPct val="0"/>
-              </a:spcBef>
-              <a:spcAft>
-                <a:spcPct val="0"/>
-              </a:spcAft>
-              <a:defRPr>
-                <a:solidFill>
-                  <a:schemeClr val="tx1"/>
-                </a:solidFill>
-                <a:latin typeface="Arial" charset="0"/>
-                <a:cs typeface="Arial" charset="0"/>
-              </a:defRPr>
-            </a:lvl8pPr>
-            <a:lvl9pPr marL="3886200" indent="-228600" eaLnBrk="0" fontAlgn="base" hangingPunct="0">
-              <a:spcBef>
-                <a:spcPct val="0"/>
-              </a:spcBef>
-              <a:spcAft>
-                <a:spcPct val="0"/>
-              </a:spcAft>
-              <a:defRPr>
-                <a:solidFill>
-                  <a:schemeClr val="tx1"/>
-                </a:solidFill>
-                <a:latin typeface="Arial" charset="0"/>
-                <a:cs typeface="Arial" charset="0"/>
-              </a:defRPr>
-            </a:lvl9pPr>
-          </a:lstStyle>
-          <a:p>
-            <a:pPr eaLnBrk="1" hangingPunct="1">
-              <a:defRPr/>
-            </a:pPr>
-            <a:r>
-              <a:rPr lang="nl-NL" dirty="0" smtClean="0">
-                <a:solidFill>
-                  <a:schemeClr val="bg1"/>
-                </a:solidFill>
-              </a:rPr>
-              <a:t>S</a:t>
-            </a:r>
-          </a:p>
-          <a:p>
-            <a:pPr eaLnBrk="1" hangingPunct="1">
-              <a:defRPr/>
-            </a:pPr>
-            <a:endParaRPr lang="nl-NL" dirty="0" smtClean="0">
-              <a:solidFill>
-                <a:schemeClr val="bg1"/>
-              </a:solidFill>
-            </a:endParaRPr>
-          </a:p>
-          <a:p>
-            <a:pPr eaLnBrk="1" hangingPunct="1">
-              <a:defRPr/>
-            </a:pPr>
-            <a:endParaRPr lang="nl-NL" dirty="0" smtClean="0">
-              <a:solidFill>
-                <a:schemeClr val="bg1"/>
-              </a:solidFill>
-            </a:endParaRPr>
-          </a:p>
-          <a:p>
-            <a:pPr eaLnBrk="1" hangingPunct="1">
-              <a:defRPr/>
-            </a:pPr>
-            <a:endParaRPr lang="nl-NL" dirty="0" smtClean="0">
-              <a:solidFill>
-                <a:schemeClr val="bg1"/>
-              </a:solidFill>
-            </a:endParaRPr>
-          </a:p>
-          <a:p>
-            <a:pPr eaLnBrk="1" hangingPunct="1">
-              <a:defRPr/>
-            </a:pPr>
-            <a:endParaRPr lang="nl-NL" dirty="0" smtClean="0">
-              <a:solidFill>
-                <a:schemeClr val="bg1"/>
-              </a:solidFill>
-            </a:endParaRPr>
-          </a:p>
-          <a:p>
-            <a:pPr eaLnBrk="1" hangingPunct="1">
-              <a:defRPr/>
-            </a:pPr>
-            <a:r>
-              <a:rPr lang="nl-NL" dirty="0" smtClean="0">
-                <a:solidFill>
-                  <a:schemeClr val="bg1"/>
-                </a:solidFill>
-              </a:rPr>
-              <a:t>A</a:t>
-            </a:r>
-          </a:p>
-          <a:p>
-            <a:pPr eaLnBrk="1" hangingPunct="1">
-              <a:defRPr/>
-            </a:pPr>
-            <a:endParaRPr lang="nl-NL" dirty="0" smtClean="0">
-              <a:solidFill>
-                <a:schemeClr val="bg1"/>
-              </a:solidFill>
-            </a:endParaRPr>
-          </a:p>
-          <a:p>
-            <a:pPr eaLnBrk="1" hangingPunct="1">
-              <a:defRPr/>
-            </a:pPr>
-            <a:endParaRPr lang="nl-NL" dirty="0" smtClean="0">
-              <a:solidFill>
-                <a:schemeClr val="bg1"/>
-              </a:solidFill>
-            </a:endParaRPr>
-          </a:p>
-          <a:p>
-            <a:pPr eaLnBrk="1" hangingPunct="1">
-              <a:defRPr/>
-            </a:pPr>
-            <a:endParaRPr lang="nl-NL" dirty="0" smtClean="0">
-              <a:solidFill>
-                <a:schemeClr val="bg1"/>
-              </a:solidFill>
-            </a:endParaRPr>
-          </a:p>
-          <a:p>
-            <a:pPr eaLnBrk="1" hangingPunct="1">
-              <a:defRPr/>
-            </a:pPr>
-            <a:r>
-              <a:rPr lang="nl-NL" dirty="0" smtClean="0">
-                <a:solidFill>
-                  <a:schemeClr val="bg1"/>
-                </a:solidFill>
-              </a:rPr>
-              <a:t>T</a:t>
-            </a:r>
-          </a:p>
-          <a:p>
-            <a:pPr eaLnBrk="1" hangingPunct="1">
-              <a:defRPr/>
-            </a:pPr>
-            <a:endParaRPr lang="nl-NL" dirty="0" smtClean="0">
-              <a:solidFill>
-                <a:schemeClr val="bg1"/>
-              </a:solidFill>
-            </a:endParaRPr>
-          </a:p>
-          <a:p>
-            <a:pPr eaLnBrk="1" hangingPunct="1">
-              <a:defRPr/>
-            </a:pPr>
-            <a:endParaRPr lang="nl-NL" dirty="0" smtClean="0">
-              <a:solidFill>
-                <a:schemeClr val="bg1"/>
-              </a:solidFill>
-            </a:endParaRPr>
-          </a:p>
-          <a:p>
-            <a:pPr eaLnBrk="1" hangingPunct="1">
-              <a:defRPr/>
-            </a:pPr>
-            <a:endParaRPr lang="nl-NL" dirty="0" smtClean="0">
-              <a:solidFill>
-                <a:schemeClr val="bg1"/>
-              </a:solidFill>
-            </a:endParaRPr>
-          </a:p>
-          <a:p>
-            <a:pPr eaLnBrk="1" hangingPunct="1">
-              <a:defRPr/>
-            </a:pPr>
-            <a:endParaRPr lang="nl-NL" dirty="0" smtClean="0">
-              <a:solidFill>
-                <a:schemeClr val="bg1"/>
-              </a:solidFill>
-            </a:endParaRPr>
-          </a:p>
-          <a:p>
-            <a:pPr eaLnBrk="1" hangingPunct="1">
-              <a:defRPr/>
-            </a:pPr>
-            <a:r>
-              <a:rPr lang="nl-NL" dirty="0" smtClean="0">
-                <a:solidFill>
-                  <a:schemeClr val="bg1"/>
-                </a:solidFill>
-              </a:rPr>
-              <a:t>B</a:t>
-            </a:r>
-          </a:p>
-        </p:txBody>
-      </p:sp>
+            <a:ln>
+              <a:noFill/>
+            </a:ln>
+            <a:extLst>
+              <a:ext uri="{909E8E84-426E-40DD-AFC4-6F175D3DCCD1}">
+                <a14:hiddenFill xmlns:a14="http://schemas.microsoft.com/office/drawing/2010/main">
+                  <a:solidFill>
+                    <a:srgbClr val="FFFFFF"/>
+                  </a:solidFill>
+                </a14:hiddenFill>
+              </a:ext>
+              <a:ext uri="{91240B29-F687-4F45-9708-019B960494DF}">
+                <a14:hiddenLine xmlns:a14="http://schemas.microsoft.com/office/drawing/2010/main" w="9525">
+                  <a:solidFill>
+                    <a:srgbClr val="000000"/>
+                  </a:solidFill>
+                  <a:miter lim="800000"/>
+                  <a:headEnd/>
+                  <a:tailEnd/>
+                </a14:hiddenLine>
+              </a:ext>
+            </a:extLst>
+          </p:spPr>
+          <p:txBody>
+            <a:bodyPr>
+              <a:spAutoFit/>
+            </a:bodyPr>
+            <a:lstStyle>
+              <a:lvl1pPr>
+                <a:defRPr sz="2600">
+                  <a:solidFill>
+                    <a:schemeClr val="bg1"/>
+                  </a:solidFill>
+                  <a:latin typeface="Arial" panose="020B0604020202020204" pitchFamily="34" charset="0"/>
+                </a:defRPr>
+              </a:lvl1pPr>
+              <a:lvl2pPr marL="742950" indent="-285750">
+                <a:spcBef>
+                  <a:spcPct val="20000"/>
+                </a:spcBef>
+                <a:defRPr sz="2600">
+                  <a:solidFill>
+                    <a:schemeClr val="bg1"/>
+                  </a:solidFill>
+                  <a:latin typeface="Arial" panose="020B0604020202020204" pitchFamily="34" charset="0"/>
+                </a:defRPr>
+              </a:lvl2pPr>
+              <a:lvl3pPr marL="1143000" indent="-228600">
+                <a:spcBef>
+                  <a:spcPct val="20000"/>
+                </a:spcBef>
+                <a:defRPr sz="2600">
+                  <a:solidFill>
+                    <a:schemeClr val="bg1"/>
+                  </a:solidFill>
+                  <a:latin typeface="Arial" panose="020B0604020202020204" pitchFamily="34" charset="0"/>
+                </a:defRPr>
+              </a:lvl3pPr>
+              <a:lvl4pPr marL="1600200" indent="-228600">
+                <a:spcBef>
+                  <a:spcPct val="20000"/>
+                </a:spcBef>
+                <a:defRPr sz="2600">
+                  <a:solidFill>
+                    <a:schemeClr val="bg1"/>
+                  </a:solidFill>
+                  <a:latin typeface="Arial" panose="020B0604020202020204" pitchFamily="34" charset="0"/>
+                </a:defRPr>
+              </a:lvl4pPr>
+              <a:lvl5pPr marL="2057400" indent="-228600">
+                <a:spcBef>
+                  <a:spcPct val="20000"/>
+                </a:spcBef>
+                <a:defRPr sz="2600">
+                  <a:solidFill>
+                    <a:schemeClr val="bg1"/>
+                  </a:solidFill>
+                  <a:latin typeface="Arial" panose="020B0604020202020204" pitchFamily="34" charset="0"/>
+                </a:defRPr>
+              </a:lvl5pPr>
+              <a:lvl6pPr marL="2514600" indent="-228600" eaLnBrk="0" fontAlgn="base" hangingPunct="0">
+                <a:spcBef>
+                  <a:spcPct val="20000"/>
+                </a:spcBef>
+                <a:spcAft>
+                  <a:spcPct val="0"/>
+                </a:spcAft>
+                <a:defRPr sz="2600">
+                  <a:solidFill>
+                    <a:schemeClr val="bg1"/>
+                  </a:solidFill>
+                  <a:latin typeface="Arial" panose="020B0604020202020204" pitchFamily="34" charset="0"/>
+                </a:defRPr>
+              </a:lvl6pPr>
+              <a:lvl7pPr marL="2971800" indent="-228600" eaLnBrk="0" fontAlgn="base" hangingPunct="0">
+                <a:spcBef>
+                  <a:spcPct val="20000"/>
+                </a:spcBef>
+                <a:spcAft>
+                  <a:spcPct val="0"/>
+                </a:spcAft>
+                <a:defRPr sz="2600">
+                  <a:solidFill>
+                    <a:schemeClr val="bg1"/>
+                  </a:solidFill>
+                  <a:latin typeface="Arial" panose="020B0604020202020204" pitchFamily="34" charset="0"/>
+                </a:defRPr>
+              </a:lvl7pPr>
+              <a:lvl8pPr marL="3429000" indent="-228600" eaLnBrk="0" fontAlgn="base" hangingPunct="0">
+                <a:spcBef>
+                  <a:spcPct val="20000"/>
+                </a:spcBef>
+                <a:spcAft>
+                  <a:spcPct val="0"/>
+                </a:spcAft>
+                <a:defRPr sz="2600">
+                  <a:solidFill>
+                    <a:schemeClr val="bg1"/>
+                  </a:solidFill>
+                  <a:latin typeface="Arial" panose="020B0604020202020204" pitchFamily="34" charset="0"/>
+                </a:defRPr>
+              </a:lvl8pPr>
+              <a:lvl9pPr marL="3886200" indent="-228600" eaLnBrk="0" fontAlgn="base" hangingPunct="0">
+                <a:spcBef>
+                  <a:spcPct val="20000"/>
+                </a:spcBef>
+                <a:spcAft>
+                  <a:spcPct val="0"/>
+                </a:spcAft>
+                <a:defRPr sz="2600">
+                  <a:solidFill>
+                    <a:schemeClr val="bg1"/>
+                  </a:solidFill>
+                  <a:latin typeface="Arial" panose="020B0604020202020204" pitchFamily="34" charset="0"/>
+                </a:defRPr>
+              </a:lvl9pPr>
+            </a:lstStyle>
+            <a:p>
+              <a:r>
+                <a:rPr lang="nl-NL" altLang="en-US" sz="2000" dirty="0"/>
+                <a:t>Geloofd zij God de Heer, voor eeuwig. Amen, amen.</a:t>
+              </a:r>
+              <a:endParaRPr lang="nl-NL" altLang="en-US" sz="2400" dirty="0">
+                <a:latin typeface="Times New Roman" panose="02020603050405020304" pitchFamily="18" charset="0"/>
+              </a:endParaRPr>
+            </a:p>
+          </p:txBody>
+        </p:sp>
+        <p:graphicFrame>
+          <p:nvGraphicFramePr>
+            <p:cNvPr id="11" name="Object 21">
+              <a:extLst>
+                <a:ext uri="{FF2B5EF4-FFF2-40B4-BE49-F238E27FC236}">
+                  <a16:creationId xmlns:a16="http://schemas.microsoft.com/office/drawing/2014/main" id="{5A36317A-C642-B042-BE0F-D9019E2A4120}"/>
+                </a:ext>
+              </a:extLst>
+            </p:cNvPr>
+            <p:cNvGraphicFramePr>
+              <a:graphicFrameLocks noChangeAspect="1"/>
+            </p:cNvGraphicFramePr>
+            <p:nvPr/>
+          </p:nvGraphicFramePr>
+          <p:xfrm>
+            <a:off x="158" y="1162"/>
+            <a:ext cx="4400" cy="529"/>
+          </p:xfrm>
+          <a:graphic>
+            <a:graphicData uri="http://schemas.openxmlformats.org/presentationml/2006/ole">
+              <mc:AlternateContent xmlns:mc="http://schemas.openxmlformats.org/markup-compatibility/2006">
+                <mc:Choice xmlns:v="urn:schemas-microsoft-com:vml" Requires="v">
+                  <p:oleObj spid="_x0000_s3079" name="Bitmapafbeelding" r:id="rId3" imgW="4914900" imgH="590550" progId="Paint.Picture">
+                    <p:embed/>
+                  </p:oleObj>
+                </mc:Choice>
+                <mc:Fallback>
+                  <p:oleObj name="Bitmapafbeelding" r:id="rId3" imgW="4914900" imgH="590550" progId="Paint.Picture">
+                    <p:embed/>
+                    <p:pic>
+                      <p:nvPicPr>
+                        <p:cNvPr id="19461" name="Object 21">
+                          <a:extLst>
+                            <a:ext uri="{FF2B5EF4-FFF2-40B4-BE49-F238E27FC236}">
+                              <a16:creationId xmlns:a16="http://schemas.microsoft.com/office/drawing/2014/main" id="{1C4BF95F-DBCB-034D-B3CC-D7231AD3C973}"/>
+                            </a:ext>
+                          </a:extLst>
+                        </p:cNvPr>
+                        <p:cNvPicPr>
+                          <a:picLocks noChangeAspect="1" noChangeArrowheads="1"/>
+                        </p:cNvPicPr>
+                        <p:nvPr/>
+                      </p:nvPicPr>
+                      <p:blipFill>
+                        <a:blip r:embed="rId4">
+                          <a:extLst>
+                            <a:ext uri="{28A0092B-C50C-407E-A947-70E740481C1C}">
+                              <a14:useLocalDpi xmlns:a14="http://schemas.microsoft.com/office/drawing/2010/main" val="0"/>
+                            </a:ext>
+                          </a:extLst>
+                        </a:blip>
+                        <a:srcRect/>
+                        <a:stretch>
+                          <a:fillRect/>
+                        </a:stretch>
+                      </p:blipFill>
+                      <p:spPr bwMode="auto">
+                        <a:xfrm>
+                          <a:off x="158" y="1162"/>
+                          <a:ext cx="4400" cy="529"/>
+                        </a:xfrm>
+                        <a:prstGeom prst="rect">
+                          <a:avLst/>
+                        </a:prstGeom>
+                        <a:noFill/>
+                        <a:ln>
+                          <a:noFill/>
+                        </a:ln>
+                        <a:effectLst/>
+                        <a:extLst>
+                          <a:ext uri="{909E8E84-426E-40DD-AFC4-6F175D3DCCD1}">
+                            <a14:hiddenFill xmlns:a14="http://schemas.microsoft.com/office/drawing/2010/main">
+                              <a:solidFill>
+                                <a:schemeClr val="accent1"/>
+                              </a:solidFill>
+                            </a14:hiddenFill>
+                          </a:ext>
+                          <a:ext uri="{91240B29-F687-4F45-9708-019B960494DF}">
+                            <a14:hiddenLine xmlns:a14="http://schemas.microsoft.com/office/drawing/2010/main" w="9525">
+                              <a:solidFill>
+                                <a:schemeClr val="tx1"/>
+                              </a:solidFill>
+                              <a:miter lim="800000"/>
+                              <a:headEnd/>
+                              <a:tailEnd/>
+                            </a14:hiddenLine>
+                          </a:ext>
+                          <a:ext uri="{AF507438-7753-43E0-B8FC-AC1667EBCBE1}">
+                            <a14:hiddenEffects xmlns:a14="http://schemas.microsoft.com/office/drawing/2010/main">
+                              <a:effectLst>
+                                <a:outerShdw dist="35921" dir="2700000" algn="ctr" rotWithShape="0">
+                                  <a:schemeClr val="bg2"/>
+                                </a:outerShdw>
+                              </a:effectLst>
+                            </a14:hiddenEffects>
+                          </a:ext>
+                        </a:extLst>
+                      </p:spPr>
+                    </p:pic>
+                  </p:oleObj>
+                </mc:Fallback>
+              </mc:AlternateContent>
+            </a:graphicData>
+          </a:graphic>
+        </p:graphicFrame>
+      </p:grpSp>
     </p:spTree>
   </p:cSld>
   <p:clrMapOvr>
@@ -5653,38 +6617,158 @@
           <a:chExt cx="0" cy="0"/>
         </a:xfrm>
       </p:grpSpPr>
-      <p:pic>
-        <p:nvPicPr>
-          <p:cNvPr id="1026" name="Picture 2"/>
-          <p:cNvPicPr>
-            <a:picLocks noChangeAspect="1" noChangeArrowheads="1"/>
-          </p:cNvPicPr>
+      <p:graphicFrame>
+        <p:nvGraphicFramePr>
+          <p:cNvPr id="3" name="Object 10">
+            <a:extLst>
+              <a:ext uri="{FF2B5EF4-FFF2-40B4-BE49-F238E27FC236}">
+                <a16:creationId xmlns:a16="http://schemas.microsoft.com/office/drawing/2014/main" id="{E8FEF027-A08B-D14D-8B0B-5777E7DC20E3}"/>
+              </a:ext>
+            </a:extLst>
+          </p:cNvPr>
+          <p:cNvGraphicFramePr>
+            <a:graphicFrameLocks noChangeAspect="1"/>
+          </p:cNvGraphicFramePr>
           <p:nvPr userDrawn="1"/>
-        </p:nvPicPr>
-        <p:blipFill>
-          <a:blip r:embed="rId25" cstate="print"/>
-          <a:srcRect/>
-          <a:stretch>
-            <a:fillRect/>
-          </a:stretch>
-        </p:blipFill>
+        </p:nvGraphicFramePr>
+        <p:xfrm>
+          <a:off x="8467725" y="0"/>
+          <a:ext cx="676275" cy="533400"/>
+        </p:xfrm>
+        <a:graphic>
+          <a:graphicData uri="http://schemas.openxmlformats.org/presentationml/2006/ole">
+            <mc:AlternateContent xmlns:mc="http://schemas.openxmlformats.org/markup-compatibility/2006">
+              <mc:Choice xmlns:v="urn:schemas-microsoft-com:vml" Requires="v">
+                <p:oleObj spid="_x0000_s1033" name="Photo Editor-foto" r:id="rId26" imgW="781050" imgH="590550" progId="MSPhotoEd.3">
+                  <p:embed/>
+                </p:oleObj>
+              </mc:Choice>
+              <mc:Fallback>
+                <p:oleObj name="Photo Editor-foto" r:id="rId26" imgW="781050" imgH="590550" progId="MSPhotoEd.3">
+                  <p:embed/>
+                  <p:pic>
+                    <p:nvPicPr>
+                      <p:cNvPr id="1026" name="Object 10">
+                        <a:extLst>
+                          <a:ext uri="{FF2B5EF4-FFF2-40B4-BE49-F238E27FC236}">
+                            <a16:creationId xmlns:a16="http://schemas.microsoft.com/office/drawing/2014/main" id="{DD06C2DA-83CB-5E47-A4D8-A49B3E70AAC2}"/>
+                          </a:ext>
+                        </a:extLst>
+                      </p:cNvPr>
+                      <p:cNvPicPr>
+                        <a:picLocks noChangeAspect="1" noChangeArrowheads="1"/>
+                      </p:cNvPicPr>
+                      <p:nvPr/>
+                    </p:nvPicPr>
+                    <p:blipFill>
+                      <a:blip r:embed="rId27">
+                        <a:extLst>
+                          <a:ext uri="{28A0092B-C50C-407E-A947-70E740481C1C}">
+                            <a14:useLocalDpi xmlns:a14="http://schemas.microsoft.com/office/drawing/2010/main" val="0"/>
+                          </a:ext>
+                        </a:extLst>
+                      </a:blip>
+                      <a:srcRect t="6667" r="10506"/>
+                      <a:stretch>
+                        <a:fillRect/>
+                      </a:stretch>
+                    </p:blipFill>
+                    <p:spPr bwMode="auto">
+                      <a:xfrm>
+                        <a:off x="8467725" y="0"/>
+                        <a:ext cx="676275" cy="533400"/>
+                      </a:xfrm>
+                      <a:prstGeom prst="rect">
+                        <a:avLst/>
+                      </a:prstGeom>
+                      <a:noFill/>
+                      <a:ln>
+                        <a:noFill/>
+                      </a:ln>
+                      <a:effectLst/>
+                      <a:extLst>
+                        <a:ext uri="{909E8E84-426E-40DD-AFC4-6F175D3DCCD1}">
+                          <a14:hiddenFill xmlns:a14="http://schemas.microsoft.com/office/drawing/2010/main">
+                            <a:solidFill>
+                              <a:schemeClr val="accent1"/>
+                            </a:solidFill>
+                          </a14:hiddenFill>
+                        </a:ext>
+                        <a:ext uri="{91240B29-F687-4F45-9708-019B960494DF}">
+                          <a14:hiddenLine xmlns:a14="http://schemas.microsoft.com/office/drawing/2010/main" w="9525" algn="ctr">
+                            <a:solidFill>
+                              <a:schemeClr val="tx1"/>
+                            </a:solidFill>
+                            <a:miter lim="800000"/>
+                            <a:headEnd/>
+                            <a:tailEnd/>
+                          </a14:hiddenLine>
+                        </a:ext>
+                        <a:ext uri="{AF507438-7753-43E0-B8FC-AC1667EBCBE1}">
+                          <a14:hiddenEffects xmlns:a14="http://schemas.microsoft.com/office/drawing/2010/main">
+                            <a:effectLst>
+                              <a:outerShdw dist="35921" dir="2700000" algn="ctr" rotWithShape="0">
+                                <a:schemeClr val="bg2"/>
+                              </a:outerShdw>
+                            </a:effectLst>
+                          </a14:hiddenEffects>
+                        </a:ext>
+                      </a:extLst>
+                    </p:spPr>
+                  </p:pic>
+                </p:oleObj>
+              </mc:Fallback>
+            </mc:AlternateContent>
+          </a:graphicData>
+        </a:graphic>
+      </p:graphicFrame>
+      <p:sp>
+        <p:nvSpPr>
+          <p:cNvPr id="4" name="Line 7">
+            <a:extLst>
+              <a:ext uri="{FF2B5EF4-FFF2-40B4-BE49-F238E27FC236}">
+                <a16:creationId xmlns:a16="http://schemas.microsoft.com/office/drawing/2014/main" id="{B8CD1303-14F7-CB4F-A999-CF4C4A77B340}"/>
+              </a:ext>
+            </a:extLst>
+          </p:cNvPr>
+          <p:cNvSpPr>
+            <a:spLocks noChangeShapeType="1"/>
+          </p:cNvSpPr>
+          <p:nvPr userDrawn="1"/>
+        </p:nvSpPr>
         <p:spPr bwMode="auto">
-          <a:xfrm>
-            <a:off x="6359543" y="0"/>
-            <a:ext cx="2784456" cy="1573823"/>
+          <a:xfrm flipV="1">
+            <a:off x="0" y="558800"/>
+            <a:ext cx="9144000" cy="0"/>
           </a:xfrm>
-          <a:prstGeom prst="rect">
+          <a:prstGeom prst="line">
             <a:avLst/>
           </a:prstGeom>
           <a:noFill/>
-          <a:ln w="9525">
-            <a:noFill/>
-            <a:miter lim="800000"/>
+          <a:ln w="57150">
+            <a:solidFill>
+              <a:srgbClr val="33CC33"/>
+            </a:solidFill>
+            <a:round/>
             <a:headEnd/>
             <a:tailEnd/>
           </a:ln>
+          <a:extLst>
+            <a:ext uri="{909E8E84-426E-40DD-AFC4-6F175D3DCCD1}">
+              <a14:hiddenFill xmlns:a14="http://schemas.microsoft.com/office/drawing/2010/main">
+                <a:noFill/>
+              </a14:hiddenFill>
+            </a:ext>
+          </a:extLst>
         </p:spPr>
-      </p:pic>
+        <p:txBody>
+          <a:bodyPr/>
+          <a:lstStyle/>
+          <a:p>
+            <a:endParaRPr lang="en-US"/>
+          </a:p>
+        </p:txBody>
+      </p:sp>
     </p:spTree>
   </p:cSld>
   <p:clrMap bg1="lt1" tx1="dk1" bg2="lt2" tx2="dk2" accent1="accent1" accent2="accent2" accent3="accent3" accent4="accent4" accent5="accent5" accent6="accent6" hlink="hlink" folHlink="folHlink"/>
@@ -5716,13 +6800,6 @@
   <p:transition>
     <p:fade/>
   </p:transition>
-  <p:timing>
-    <p:tnLst>
-      <p:par>
-        <p:cTn id="1" dur="indefinite" restart="never" nodeType="tmRoot"/>
-      </p:par>
-    </p:tnLst>
-  </p:timing>
   <p:txStyles>
     <p:titleStyle>
       <a:lvl1pPr algn="ctr" rtl="0" eaLnBrk="1" fontAlgn="base" hangingPunct="1">
@@ -6125,7 +7202,7 @@
     </p:spTree>
     <p:extLst>
       <p:ext uri="{BB962C8B-B14F-4D97-AF65-F5344CB8AC3E}">
-        <p14:creationId xmlns:p14="http://schemas.microsoft.com/office/powerpoint/2010/main" xmlns="" val="1735715938"/>
+        <p14:creationId xmlns:p14="http://schemas.microsoft.com/office/powerpoint/2010/main" val="1735715938"/>
       </p:ext>
     </p:extLst>
   </p:cSld>
@@ -6135,13 +7212,6 @@
   <p:transition>
     <p:fade/>
   </p:transition>
-  <p:timing>
-    <p:tnLst>
-      <p:par>
-        <p:cTn id="1" dur="indefinite" restart="never" nodeType="tmRoot"/>
-      </p:par>
-    </p:tnLst>
-  </p:timing>
 </p:sld>
 </file>
 

</xml_diff>